<commit_message>
ajout des commandes sql au pp
</commit_message>
<xml_diff>
--- a/php.pptx
+++ b/php.pptx
@@ -8021,6 +8021,52 @@
           </a:graphicData>
         </a:graphic>
       </p:graphicFrame>
+      <p:sp>
+        <p:nvSpPr>
+          <p:cNvPr id="3" name="ZoneTexte 2"/>
+          <p:cNvSpPr txBox="1"/>
+          <p:nvPr/>
+        </p:nvSpPr>
+        <p:spPr>
+          <a:xfrm>
+            <a:off x="1187624" y="4509120"/>
+            <a:ext cx="6984776" cy="923330"/>
+          </a:xfrm>
+          <a:prstGeom prst="rect">
+            <a:avLst/>
+          </a:prstGeom>
+          <a:noFill/>
+        </p:spPr>
+        <p:txBody>
+          <a:bodyPr wrap="square" rtlCol="0">
+            <a:spAutoFit/>
+          </a:bodyPr>
+          <a:lstStyle/>
+          <a:p>
+            <a:r>
+              <a:rPr lang="en-US" dirty="0"/>
+              <a:t>CREATE TABLE "</a:t>
+            </a:r>
+            <a:r>
+              <a:rPr lang="en-US" dirty="0" err="1"/>
+              <a:t>Disp_prelev</a:t>
+            </a:r>
+            <a:r>
+              <a:rPr lang="en-US" dirty="0"/>
+              <a:t>" ("ID" INTEGER PRIMARY KEY  AUTOINCREMENT  NOT NULL  UNIQUE , "</a:t>
+            </a:r>
+            <a:r>
+              <a:rPr lang="en-US" dirty="0" err="1"/>
+              <a:t>Dispositif</a:t>
+            </a:r>
+            <a:r>
+              <a:rPr lang="en-US" dirty="0"/>
+              <a:t>" TEXT NOT NULL , "Condition" TEXT)</a:t>
+            </a:r>
+            <a:endParaRPr lang="fr-FR" dirty="0"/>
+          </a:p>
+        </p:txBody>
+      </p:sp>
     </p:spTree>
     <p:extLst>
       <p:ext uri="{BB962C8B-B14F-4D97-AF65-F5344CB8AC3E}">
@@ -8438,6 +8484,60 @@
           </a:graphicData>
         </a:graphic>
       </p:graphicFrame>
+      <p:sp>
+        <p:nvSpPr>
+          <p:cNvPr id="3" name="ZoneTexte 2"/>
+          <p:cNvSpPr txBox="1"/>
+          <p:nvPr/>
+        </p:nvSpPr>
+        <p:spPr>
+          <a:xfrm>
+            <a:off x="827584" y="5157192"/>
+            <a:ext cx="7416824" cy="923330"/>
+          </a:xfrm>
+          <a:prstGeom prst="rect">
+            <a:avLst/>
+          </a:prstGeom>
+          <a:noFill/>
+        </p:spPr>
+        <p:txBody>
+          <a:bodyPr wrap="square" rtlCol="0">
+            <a:spAutoFit/>
+          </a:bodyPr>
+          <a:lstStyle/>
+          <a:p>
+            <a:r>
+              <a:rPr lang="en-US" dirty="0"/>
+              <a:t>CREATE TABLE "</a:t>
+            </a:r>
+            <a:r>
+              <a:rPr lang="en-US" dirty="0" err="1"/>
+              <a:t>Class_limites</a:t>
+            </a:r>
+            <a:r>
+              <a:rPr lang="en-US" dirty="0"/>
+              <a:t>" ("ID" INTEGER PRIMARY KEY  NOT NULL  UNIQUE , "</a:t>
+            </a:r>
+            <a:r>
+              <a:rPr lang="en-US" dirty="0" err="1"/>
+              <a:t>Classe</a:t>
+            </a:r>
+            <a:r>
+              <a:rPr lang="en-US" dirty="0"/>
+              <a:t>" TEXT NOT NULL , "Type" TEXT NOT NULL , "</a:t>
+            </a:r>
+            <a:r>
+              <a:rPr lang="en-US" dirty="0" err="1"/>
+              <a:t>Limite</a:t>
+            </a:r>
+            <a:r>
+              <a:rPr lang="en-US" dirty="0"/>
+              <a:t>" INTEGER NOT NULL )</a:t>
+            </a:r>
+            <a:endParaRPr lang="fr-FR" dirty="0"/>
+          </a:p>
+        </p:txBody>
+      </p:sp>
     </p:spTree>
     <p:extLst>
       <p:ext uri="{BB962C8B-B14F-4D97-AF65-F5344CB8AC3E}">
@@ -8707,6 +8807,52 @@
           </a:graphicData>
         </a:graphic>
       </p:graphicFrame>
+      <p:sp>
+        <p:nvSpPr>
+          <p:cNvPr id="3" name="ZoneTexte 2"/>
+          <p:cNvSpPr txBox="1"/>
+          <p:nvPr/>
+        </p:nvSpPr>
+        <p:spPr>
+          <a:xfrm>
+            <a:off x="1619672" y="3789040"/>
+            <a:ext cx="6048672" cy="923330"/>
+          </a:xfrm>
+          <a:prstGeom prst="rect">
+            <a:avLst/>
+          </a:prstGeom>
+          <a:noFill/>
+        </p:spPr>
+        <p:txBody>
+          <a:bodyPr wrap="square" rtlCol="0">
+            <a:spAutoFit/>
+          </a:bodyPr>
+          <a:lstStyle/>
+          <a:p>
+            <a:r>
+              <a:rPr lang="en-US" dirty="0"/>
+              <a:t>CREATE TABLE "</a:t>
+            </a:r>
+            <a:r>
+              <a:rPr lang="en-US" dirty="0" err="1"/>
+              <a:t>Lieux_prelev</a:t>
+            </a:r>
+            <a:r>
+              <a:rPr lang="en-US" dirty="0"/>
+              <a:t>" ("ID" INTEGER PRIMARY KEY  AUTOINCREMENT  NOT NULL  UNIQUE , "</a:t>
+            </a:r>
+            <a:r>
+              <a:rPr lang="en-US" dirty="0" err="1"/>
+              <a:t>Lieux</a:t>
+            </a:r>
+            <a:r>
+              <a:rPr lang="en-US" dirty="0"/>
+              <a:t>" TEXT NOT NULL )</a:t>
+            </a:r>
+            <a:endParaRPr lang="fr-FR" dirty="0"/>
+          </a:p>
+        </p:txBody>
+      </p:sp>
     </p:spTree>
     <p:extLst>
       <p:ext uri="{BB962C8B-B14F-4D97-AF65-F5344CB8AC3E}">
@@ -8859,11 +9005,7 @@
                     <a:p>
                       <a:r>
                         <a:rPr lang="fr-FR" sz="1200" dirty="0" smtClean="0"/>
-                        <a:t>Clé </a:t>
-                      </a:r>
-                      <a:r>
-                        <a:rPr lang="fr-FR" sz="1200" dirty="0" smtClean="0"/>
-                        <a:t> primaire</a:t>
+                        <a:t>Clé  primaire</a:t>
                       </a:r>
                       <a:endParaRPr lang="fr-FR" sz="1200" dirty="0"/>
                     </a:p>
@@ -8998,6 +9140,139 @@
           </a:graphicData>
         </a:graphic>
       </p:graphicFrame>
+      <p:sp>
+        <p:nvSpPr>
+          <p:cNvPr id="3" name="ZoneTexte 2"/>
+          <p:cNvSpPr txBox="1"/>
+          <p:nvPr/>
+        </p:nvSpPr>
+        <p:spPr>
+          <a:xfrm>
+            <a:off x="1907704" y="3501008"/>
+            <a:ext cx="5904656" cy="2308324"/>
+          </a:xfrm>
+          <a:prstGeom prst="rect">
+            <a:avLst/>
+          </a:prstGeom>
+          <a:noFill/>
+        </p:spPr>
+        <p:txBody>
+          <a:bodyPr wrap="square" rtlCol="0">
+            <a:spAutoFit/>
+          </a:bodyPr>
+          <a:lstStyle/>
+          <a:p>
+            <a:r>
+              <a:rPr lang="fr-FR" dirty="0"/>
+              <a:t>CREATE TABLE "</a:t>
+            </a:r>
+            <a:r>
+              <a:rPr lang="fr-FR" dirty="0" err="1"/>
+              <a:t>Points_prelev</a:t>
+            </a:r>
+            <a:r>
+              <a:rPr lang="fr-FR" dirty="0"/>
+              <a:t>" ("ID" INTEGER PRIMARY KEY  AUTOINCREMENT  NOT NULL  UNIQUE , "Points" TEXT NOT NULL, "</a:t>
+            </a:r>
+            <a:r>
+              <a:rPr lang="fr-FR" dirty="0" err="1"/>
+              <a:t>IDdisp</a:t>
+            </a:r>
+            <a:r>
+              <a:rPr lang="fr-FR" dirty="0"/>
+              <a:t>" INTEGER NOT NULL, "</a:t>
+            </a:r>
+            <a:r>
+              <a:rPr lang="fr-FR" dirty="0" err="1"/>
+              <a:t>IDclass</a:t>
+            </a:r>
+            <a:r>
+              <a:rPr lang="fr-FR" dirty="0"/>
+              <a:t>" INTEGER NOT NULL,"</a:t>
+            </a:r>
+            <a:r>
+              <a:rPr lang="fr-FR" dirty="0" err="1"/>
+              <a:t>IDlieu</a:t>
+            </a:r>
+            <a:r>
+              <a:rPr lang="fr-FR" dirty="0"/>
+              <a:t>" INTEGER NOT NULL,</a:t>
+            </a:r>
+          </a:p>
+          <a:p>
+            <a:r>
+              <a:rPr lang="fr-FR" dirty="0"/>
+              <a:t>FOREIGN KEY (</a:t>
+            </a:r>
+            <a:r>
+              <a:rPr lang="fr-FR" dirty="0" err="1"/>
+              <a:t>IDdisp</a:t>
+            </a:r>
+            <a:r>
+              <a:rPr lang="fr-FR" dirty="0"/>
+              <a:t>) REFERENCES </a:t>
+            </a:r>
+            <a:r>
+              <a:rPr lang="fr-FR" dirty="0" err="1"/>
+              <a:t>Disp_prelv</a:t>
+            </a:r>
+            <a:r>
+              <a:rPr lang="fr-FR" dirty="0"/>
+              <a:t>(ID),</a:t>
+            </a:r>
+          </a:p>
+          <a:p>
+            <a:r>
+              <a:rPr lang="fr-FR" dirty="0"/>
+              <a:t>FOREIGN KEY (</a:t>
+            </a:r>
+            <a:r>
+              <a:rPr lang="fr-FR" dirty="0" err="1"/>
+              <a:t>IDclass</a:t>
+            </a:r>
+            <a:r>
+              <a:rPr lang="fr-FR" dirty="0"/>
+              <a:t>) REFERENCES </a:t>
+            </a:r>
+            <a:r>
+              <a:rPr lang="fr-FR" dirty="0" err="1"/>
+              <a:t>Class_limites</a:t>
+            </a:r>
+            <a:r>
+              <a:rPr lang="fr-FR" dirty="0"/>
+              <a:t>(ID),</a:t>
+            </a:r>
+          </a:p>
+          <a:p>
+            <a:r>
+              <a:rPr lang="fr-FR" dirty="0"/>
+              <a:t>FOREIGN KEY (</a:t>
+            </a:r>
+            <a:r>
+              <a:rPr lang="fr-FR" dirty="0" err="1"/>
+              <a:t>IDlieu</a:t>
+            </a:r>
+            <a:r>
+              <a:rPr lang="fr-FR" dirty="0"/>
+              <a:t>) REFERENCES </a:t>
+            </a:r>
+            <a:r>
+              <a:rPr lang="fr-FR" dirty="0" err="1"/>
+              <a:t>Lieux_prelev</a:t>
+            </a:r>
+            <a:r>
+              <a:rPr lang="fr-FR" dirty="0"/>
+              <a:t>(ID)</a:t>
+            </a:r>
+          </a:p>
+          <a:p>
+            <a:r>
+              <a:rPr lang="fr-FR" dirty="0"/>
+              <a:t>)</a:t>
+            </a:r>
+          </a:p>
+        </p:txBody>
+      </p:sp>
     </p:spTree>
     <p:extLst>
       <p:ext uri="{BB962C8B-B14F-4D97-AF65-F5344CB8AC3E}">

</xml_diff>

<commit_message>
ajout de commentaires dans la table résultats, mise à jour de la requête sql dans le pp, ajout de points autres
</commit_message>
<xml_diff>
--- a/php.pptx
+++ b/php.pptx
@@ -4354,8 +4354,8 @@
         </p:nvSpPr>
         <p:spPr>
           <a:xfrm>
-            <a:off x="899592" y="5157192"/>
-            <a:ext cx="7632848" cy="1477328"/>
+            <a:off x="467544" y="4941168"/>
+            <a:ext cx="8093183" cy="1477328"/>
           </a:xfrm>
           <a:prstGeom prst="rect">
             <a:avLst/>
@@ -4410,7 +4410,7 @@
             </a:r>
             <a:r>
               <a:rPr lang="fr-FR" dirty="0"/>
-              <a:t>" INTEGER NOT NULL,</a:t>
+              <a:t>" INTEGER NOT NULL, "Commentaire" TEXT,</a:t>
             </a:r>
           </a:p>
           <a:p>
@@ -4440,6 +4440,7 @@
               <a:rPr lang="fr-FR" dirty="0"/>
               <a:t>)</a:t>
             </a:r>
+            <a:endParaRPr lang="fr-FR" dirty="0"/>
           </a:p>
         </p:txBody>
       </p:sp>
@@ -7757,7 +7758,7 @@
         <p:spPr/>
         <p:txBody>
           <a:bodyPr>
-            <a:normAutofit lnSpcReduction="10000"/>
+            <a:normAutofit fontScale="85000" lnSpcReduction="20000"/>
           </a:bodyPr>
           <a:lstStyle/>
           <a:p>
@@ -7906,11 +7907,51 @@
             <a:pPr lvl="2"/>
             <a:r>
               <a:rPr lang="fr-FR" sz="1600" dirty="0" smtClean="0"/>
-              <a:t>Surface - </a:t>
+              <a:t>Surface </a:t>
+            </a:r>
+            <a:r>
+              <a:rPr lang="fr-FR" sz="1600" dirty="0" smtClean="0"/>
+              <a:t>– </a:t>
             </a:r>
             <a:r>
               <a:rPr lang="fr-FR" sz="1600" dirty="0" err="1" smtClean="0"/>
               <a:t>Countact</a:t>
+            </a:r>
+            <a:endParaRPr lang="fr-FR" sz="1600" dirty="0" smtClean="0"/>
+          </a:p>
+          <a:p>
+            <a:pPr lvl="1"/>
+            <a:r>
+              <a:rPr lang="fr-FR" sz="2000" dirty="0" smtClean="0"/>
+              <a:t>Ajouts de points supplémentaires  :</a:t>
+            </a:r>
+          </a:p>
+          <a:p>
+            <a:pPr lvl="2"/>
+            <a:r>
+              <a:rPr lang="fr-FR" sz="1600" dirty="0" smtClean="0"/>
+              <a:t>Autre Air classe A</a:t>
+            </a:r>
+          </a:p>
+          <a:p>
+            <a:pPr lvl="2"/>
+            <a:r>
+              <a:rPr lang="fr-FR" sz="1600" dirty="0" smtClean="0"/>
+              <a:t>Autre Surface classe A</a:t>
+            </a:r>
+          </a:p>
+          <a:p>
+            <a:pPr lvl="2"/>
+            <a:r>
+              <a:rPr lang="fr-FR" sz="1600" dirty="0" smtClean="0"/>
+              <a:t>Autre Air classe D</a:t>
+            </a:r>
+          </a:p>
+          <a:p>
+            <a:pPr lvl="2"/>
+            <a:r>
+              <a:rPr lang="fr-FR" sz="1600" dirty="0" smtClean="0"/>
+              <a:t>Autre Surface classe D</a:t>
             </a:r>
             <a:endParaRPr lang="fr-FR" sz="1600" dirty="0" smtClean="0"/>
           </a:p>

</xml_diff>

<commit_message>
ajout de la table points_prelev, avec modification du fichier accueil.php pour référencer la page points.php
</commit_message>
<xml_diff>
--- a/php.pptx
+++ b/php.pptx
@@ -68,7 +68,7 @@
       </p:grpSpPr>
       <p:sp>
         <p:nvSpPr>
-          <p:cNvPr id="24" name="PlaceHolder 1"/>
+          <p:cNvPr id="23" name="PlaceHolder 1"/>
           <p:cNvSpPr>
             <a:spLocks noGrp="1"/>
           </p:cNvSpPr>
@@ -95,7 +95,7 @@
       </p:sp>
       <p:sp>
         <p:nvSpPr>
-          <p:cNvPr id="25" name="PlaceHolder 2"/>
+          <p:cNvPr id="24" name="PlaceHolder 2"/>
           <p:cNvSpPr>
             <a:spLocks noGrp="1"/>
           </p:cNvSpPr>
@@ -121,7 +121,7 @@
       </p:sp>
       <p:sp>
         <p:nvSpPr>
-          <p:cNvPr id="26" name="PlaceHolder 3"/>
+          <p:cNvPr id="25" name="PlaceHolder 3"/>
           <p:cNvSpPr>
             <a:spLocks noGrp="1"/>
           </p:cNvSpPr>
@@ -169,7 +169,7 @@
       </p:grpSpPr>
       <p:sp>
         <p:nvSpPr>
-          <p:cNvPr id="27" name="PlaceHolder 1"/>
+          <p:cNvPr id="26" name="PlaceHolder 1"/>
           <p:cNvSpPr>
             <a:spLocks noGrp="1"/>
           </p:cNvSpPr>
@@ -196,7 +196,7 @@
       </p:sp>
       <p:sp>
         <p:nvSpPr>
-          <p:cNvPr id="28" name="PlaceHolder 2"/>
+          <p:cNvPr id="27" name="PlaceHolder 2"/>
           <p:cNvSpPr>
             <a:spLocks noGrp="1"/>
           </p:cNvSpPr>
@@ -222,7 +222,7 @@
       </p:sp>
       <p:sp>
         <p:nvSpPr>
-          <p:cNvPr id="29" name="PlaceHolder 3"/>
+          <p:cNvPr id="28" name="PlaceHolder 3"/>
           <p:cNvSpPr>
             <a:spLocks noGrp="1"/>
           </p:cNvSpPr>
@@ -248,7 +248,7 @@
       </p:sp>
       <p:sp>
         <p:nvSpPr>
-          <p:cNvPr id="30" name="PlaceHolder 4"/>
+          <p:cNvPr id="29" name="PlaceHolder 4"/>
           <p:cNvSpPr>
             <a:spLocks noGrp="1"/>
           </p:cNvSpPr>
@@ -274,7 +274,7 @@
       </p:sp>
       <p:sp>
         <p:nvSpPr>
-          <p:cNvPr id="31" name="PlaceHolder 5"/>
+          <p:cNvPr id="30" name="PlaceHolder 5"/>
           <p:cNvSpPr>
             <a:spLocks noGrp="1"/>
           </p:cNvSpPr>
@@ -322,7 +322,7 @@
       </p:grpSpPr>
       <p:sp>
         <p:nvSpPr>
-          <p:cNvPr id="32" name="PlaceHolder 1"/>
+          <p:cNvPr id="31" name="PlaceHolder 1"/>
           <p:cNvSpPr>
             <a:spLocks noGrp="1"/>
           </p:cNvSpPr>
@@ -349,7 +349,7 @@
       </p:sp>
       <p:sp>
         <p:nvSpPr>
-          <p:cNvPr id="33" name="PlaceHolder 2"/>
+          <p:cNvPr id="32" name="PlaceHolder 2"/>
           <p:cNvSpPr>
             <a:spLocks noGrp="1"/>
           </p:cNvSpPr>
@@ -375,7 +375,7 @@
       </p:sp>
       <p:sp>
         <p:nvSpPr>
-          <p:cNvPr id="34" name="PlaceHolder 3"/>
+          <p:cNvPr id="33" name="PlaceHolder 3"/>
           <p:cNvSpPr>
             <a:spLocks noGrp="1"/>
           </p:cNvSpPr>
@@ -401,7 +401,7 @@
       </p:sp>
       <p:pic>
         <p:nvPicPr>
-          <p:cNvPr id="35" name="" descr=""/>
+          <p:cNvPr id="34" name="" descr=""/>
           <p:cNvPicPr/>
           <p:nvPr/>
         </p:nvPicPr>
@@ -424,7 +424,7 @@
       </p:pic>
       <p:pic>
         <p:nvPicPr>
-          <p:cNvPr id="36" name="" descr=""/>
+          <p:cNvPr id="35" name="" descr=""/>
           <p:cNvPicPr/>
           <p:nvPr/>
         </p:nvPicPr>
@@ -491,7 +491,7 @@
       </p:grpSpPr>
       <p:sp>
         <p:nvSpPr>
-          <p:cNvPr id="39" name="PlaceHolder 1"/>
+          <p:cNvPr id="38" name="PlaceHolder 1"/>
           <p:cNvSpPr>
             <a:spLocks noGrp="1"/>
           </p:cNvSpPr>
@@ -518,7 +518,7 @@
       </p:sp>
       <p:sp>
         <p:nvSpPr>
-          <p:cNvPr id="40" name="PlaceHolder 2"/>
+          <p:cNvPr id="39" name="PlaceHolder 2"/>
           <p:cNvSpPr>
             <a:spLocks noGrp="1"/>
           </p:cNvSpPr>
@@ -567,7 +567,7 @@
       </p:grpSpPr>
       <p:sp>
         <p:nvSpPr>
-          <p:cNvPr id="41" name="PlaceHolder 1"/>
+          <p:cNvPr id="40" name="PlaceHolder 1"/>
           <p:cNvSpPr>
             <a:spLocks noGrp="1"/>
           </p:cNvSpPr>
@@ -594,7 +594,7 @@
       </p:sp>
       <p:sp>
         <p:nvSpPr>
-          <p:cNvPr id="42" name="PlaceHolder 2"/>
+          <p:cNvPr id="41" name="PlaceHolder 2"/>
           <p:cNvSpPr>
             <a:spLocks noGrp="1"/>
           </p:cNvSpPr>
@@ -642,7 +642,7 @@
       </p:grpSpPr>
       <p:sp>
         <p:nvSpPr>
-          <p:cNvPr id="43" name="PlaceHolder 1"/>
+          <p:cNvPr id="42" name="PlaceHolder 1"/>
           <p:cNvSpPr>
             <a:spLocks noGrp="1"/>
           </p:cNvSpPr>
@@ -669,7 +669,7 @@
       </p:sp>
       <p:sp>
         <p:nvSpPr>
-          <p:cNvPr id="44" name="PlaceHolder 2"/>
+          <p:cNvPr id="43" name="PlaceHolder 2"/>
           <p:cNvSpPr>
             <a:spLocks noGrp="1"/>
           </p:cNvSpPr>
@@ -695,7 +695,7 @@
       </p:sp>
       <p:sp>
         <p:nvSpPr>
-          <p:cNvPr id="45" name="PlaceHolder 3"/>
+          <p:cNvPr id="44" name="PlaceHolder 3"/>
           <p:cNvSpPr>
             <a:spLocks noGrp="1"/>
           </p:cNvSpPr>
@@ -743,7 +743,7 @@
       </p:grpSpPr>
       <p:sp>
         <p:nvSpPr>
-          <p:cNvPr id="46" name="PlaceHolder 1"/>
+          <p:cNvPr id="45" name="PlaceHolder 1"/>
           <p:cNvSpPr>
             <a:spLocks noGrp="1"/>
           </p:cNvSpPr>
@@ -792,7 +792,7 @@
       </p:grpSpPr>
       <p:sp>
         <p:nvSpPr>
-          <p:cNvPr id="47" name="PlaceHolder 1"/>
+          <p:cNvPr id="46" name="PlaceHolder 1"/>
           <p:cNvSpPr>
             <a:spLocks noGrp="1"/>
           </p:cNvSpPr>
@@ -841,7 +841,7 @@
       </p:grpSpPr>
       <p:sp>
         <p:nvSpPr>
-          <p:cNvPr id="48" name="PlaceHolder 1"/>
+          <p:cNvPr id="47" name="PlaceHolder 1"/>
           <p:cNvSpPr>
             <a:spLocks noGrp="1"/>
           </p:cNvSpPr>
@@ -868,7 +868,7 @@
       </p:sp>
       <p:sp>
         <p:nvSpPr>
-          <p:cNvPr id="49" name="PlaceHolder 2"/>
+          <p:cNvPr id="48" name="PlaceHolder 2"/>
           <p:cNvSpPr>
             <a:spLocks noGrp="1"/>
           </p:cNvSpPr>
@@ -894,7 +894,7 @@
       </p:sp>
       <p:sp>
         <p:nvSpPr>
-          <p:cNvPr id="50" name="PlaceHolder 3"/>
+          <p:cNvPr id="49" name="PlaceHolder 3"/>
           <p:cNvSpPr>
             <a:spLocks noGrp="1"/>
           </p:cNvSpPr>
@@ -920,7 +920,7 @@
       </p:sp>
       <p:sp>
         <p:nvSpPr>
-          <p:cNvPr id="51" name="PlaceHolder 4"/>
+          <p:cNvPr id="50" name="PlaceHolder 4"/>
           <p:cNvSpPr>
             <a:spLocks noGrp="1"/>
           </p:cNvSpPr>
@@ -968,7 +968,7 @@
       </p:grpSpPr>
       <p:sp>
         <p:nvSpPr>
-          <p:cNvPr id="3" name="PlaceHolder 1"/>
+          <p:cNvPr id="2" name="PlaceHolder 1"/>
           <p:cNvSpPr>
             <a:spLocks noGrp="1"/>
           </p:cNvSpPr>
@@ -995,7 +995,7 @@
       </p:sp>
       <p:sp>
         <p:nvSpPr>
-          <p:cNvPr id="4" name="PlaceHolder 2"/>
+          <p:cNvPr id="3" name="PlaceHolder 2"/>
           <p:cNvSpPr>
             <a:spLocks noGrp="1"/>
           </p:cNvSpPr>
@@ -1044,7 +1044,7 @@
       </p:grpSpPr>
       <p:sp>
         <p:nvSpPr>
-          <p:cNvPr id="52" name="PlaceHolder 1"/>
+          <p:cNvPr id="51" name="PlaceHolder 1"/>
           <p:cNvSpPr>
             <a:spLocks noGrp="1"/>
           </p:cNvSpPr>
@@ -1071,7 +1071,7 @@
       </p:sp>
       <p:sp>
         <p:nvSpPr>
-          <p:cNvPr id="53" name="PlaceHolder 2"/>
+          <p:cNvPr id="52" name="PlaceHolder 2"/>
           <p:cNvSpPr>
             <a:spLocks noGrp="1"/>
           </p:cNvSpPr>
@@ -1097,7 +1097,7 @@
       </p:sp>
       <p:sp>
         <p:nvSpPr>
-          <p:cNvPr id="54" name="PlaceHolder 3"/>
+          <p:cNvPr id="53" name="PlaceHolder 3"/>
           <p:cNvSpPr>
             <a:spLocks noGrp="1"/>
           </p:cNvSpPr>
@@ -1123,7 +1123,7 @@
       </p:sp>
       <p:sp>
         <p:nvSpPr>
-          <p:cNvPr id="55" name="PlaceHolder 4"/>
+          <p:cNvPr id="54" name="PlaceHolder 4"/>
           <p:cNvSpPr>
             <a:spLocks noGrp="1"/>
           </p:cNvSpPr>
@@ -1171,7 +1171,7 @@
       </p:grpSpPr>
       <p:sp>
         <p:nvSpPr>
-          <p:cNvPr id="56" name="PlaceHolder 1"/>
+          <p:cNvPr id="55" name="PlaceHolder 1"/>
           <p:cNvSpPr>
             <a:spLocks noGrp="1"/>
           </p:cNvSpPr>
@@ -1198,7 +1198,7 @@
       </p:sp>
       <p:sp>
         <p:nvSpPr>
-          <p:cNvPr id="57" name="PlaceHolder 2"/>
+          <p:cNvPr id="56" name="PlaceHolder 2"/>
           <p:cNvSpPr>
             <a:spLocks noGrp="1"/>
           </p:cNvSpPr>
@@ -1224,7 +1224,7 @@
       </p:sp>
       <p:sp>
         <p:nvSpPr>
-          <p:cNvPr id="58" name="PlaceHolder 3"/>
+          <p:cNvPr id="57" name="PlaceHolder 3"/>
           <p:cNvSpPr>
             <a:spLocks noGrp="1"/>
           </p:cNvSpPr>
@@ -1250,7 +1250,7 @@
       </p:sp>
       <p:sp>
         <p:nvSpPr>
-          <p:cNvPr id="59" name="PlaceHolder 4"/>
+          <p:cNvPr id="58" name="PlaceHolder 4"/>
           <p:cNvSpPr>
             <a:spLocks noGrp="1"/>
           </p:cNvSpPr>
@@ -1298,7 +1298,7 @@
       </p:grpSpPr>
       <p:sp>
         <p:nvSpPr>
-          <p:cNvPr id="60" name="PlaceHolder 1"/>
+          <p:cNvPr id="59" name="PlaceHolder 1"/>
           <p:cNvSpPr>
             <a:spLocks noGrp="1"/>
           </p:cNvSpPr>
@@ -1325,7 +1325,7 @@
       </p:sp>
       <p:sp>
         <p:nvSpPr>
-          <p:cNvPr id="61" name="PlaceHolder 2"/>
+          <p:cNvPr id="60" name="PlaceHolder 2"/>
           <p:cNvSpPr>
             <a:spLocks noGrp="1"/>
           </p:cNvSpPr>
@@ -1351,7 +1351,7 @@
       </p:sp>
       <p:sp>
         <p:nvSpPr>
-          <p:cNvPr id="62" name="PlaceHolder 3"/>
+          <p:cNvPr id="61" name="PlaceHolder 3"/>
           <p:cNvSpPr>
             <a:spLocks noGrp="1"/>
           </p:cNvSpPr>
@@ -1399,7 +1399,7 @@
       </p:grpSpPr>
       <p:sp>
         <p:nvSpPr>
-          <p:cNvPr id="63" name="PlaceHolder 1"/>
+          <p:cNvPr id="62" name="PlaceHolder 1"/>
           <p:cNvSpPr>
             <a:spLocks noGrp="1"/>
           </p:cNvSpPr>
@@ -1426,7 +1426,7 @@
       </p:sp>
       <p:sp>
         <p:nvSpPr>
-          <p:cNvPr id="64" name="PlaceHolder 2"/>
+          <p:cNvPr id="63" name="PlaceHolder 2"/>
           <p:cNvSpPr>
             <a:spLocks noGrp="1"/>
           </p:cNvSpPr>
@@ -1452,7 +1452,7 @@
       </p:sp>
       <p:sp>
         <p:nvSpPr>
-          <p:cNvPr id="65" name="PlaceHolder 3"/>
+          <p:cNvPr id="64" name="PlaceHolder 3"/>
           <p:cNvSpPr>
             <a:spLocks noGrp="1"/>
           </p:cNvSpPr>
@@ -1478,7 +1478,7 @@
       </p:sp>
       <p:sp>
         <p:nvSpPr>
-          <p:cNvPr id="66" name="PlaceHolder 4"/>
+          <p:cNvPr id="65" name="PlaceHolder 4"/>
           <p:cNvSpPr>
             <a:spLocks noGrp="1"/>
           </p:cNvSpPr>
@@ -1504,7 +1504,7 @@
       </p:sp>
       <p:sp>
         <p:nvSpPr>
-          <p:cNvPr id="67" name="PlaceHolder 5"/>
+          <p:cNvPr id="66" name="PlaceHolder 5"/>
           <p:cNvSpPr>
             <a:spLocks noGrp="1"/>
           </p:cNvSpPr>
@@ -1552,7 +1552,7 @@
       </p:grpSpPr>
       <p:sp>
         <p:nvSpPr>
-          <p:cNvPr id="68" name="PlaceHolder 1"/>
+          <p:cNvPr id="67" name="PlaceHolder 1"/>
           <p:cNvSpPr>
             <a:spLocks noGrp="1"/>
           </p:cNvSpPr>
@@ -1579,7 +1579,7 @@
       </p:sp>
       <p:sp>
         <p:nvSpPr>
-          <p:cNvPr id="69" name="PlaceHolder 2"/>
+          <p:cNvPr id="68" name="PlaceHolder 2"/>
           <p:cNvSpPr>
             <a:spLocks noGrp="1"/>
           </p:cNvSpPr>
@@ -1605,7 +1605,7 @@
       </p:sp>
       <p:sp>
         <p:nvSpPr>
-          <p:cNvPr id="70" name="PlaceHolder 3"/>
+          <p:cNvPr id="69" name="PlaceHolder 3"/>
           <p:cNvSpPr>
             <a:spLocks noGrp="1"/>
           </p:cNvSpPr>
@@ -1631,7 +1631,7 @@
       </p:sp>
       <p:pic>
         <p:nvPicPr>
-          <p:cNvPr id="71" name="" descr=""/>
+          <p:cNvPr id="70" name="" descr=""/>
           <p:cNvPicPr/>
           <p:nvPr/>
         </p:nvPicPr>
@@ -1654,7 +1654,7 @@
       </p:pic>
       <p:pic>
         <p:nvPicPr>
-          <p:cNvPr id="72" name="" descr=""/>
+          <p:cNvPr id="71" name="" descr=""/>
           <p:cNvPicPr/>
           <p:nvPr/>
         </p:nvPicPr>
@@ -1699,7 +1699,7 @@
       </p:grpSpPr>
       <p:sp>
         <p:nvSpPr>
-          <p:cNvPr id="5" name="PlaceHolder 1"/>
+          <p:cNvPr id="4" name="PlaceHolder 1"/>
           <p:cNvSpPr>
             <a:spLocks noGrp="1"/>
           </p:cNvSpPr>
@@ -1726,7 +1726,7 @@
       </p:sp>
       <p:sp>
         <p:nvSpPr>
-          <p:cNvPr id="6" name="PlaceHolder 2"/>
+          <p:cNvPr id="5" name="PlaceHolder 2"/>
           <p:cNvSpPr>
             <a:spLocks noGrp="1"/>
           </p:cNvSpPr>
@@ -1774,7 +1774,7 @@
       </p:grpSpPr>
       <p:sp>
         <p:nvSpPr>
-          <p:cNvPr id="7" name="PlaceHolder 1"/>
+          <p:cNvPr id="6" name="PlaceHolder 1"/>
           <p:cNvSpPr>
             <a:spLocks noGrp="1"/>
           </p:cNvSpPr>
@@ -1801,7 +1801,7 @@
       </p:sp>
       <p:sp>
         <p:nvSpPr>
-          <p:cNvPr id="8" name="PlaceHolder 2"/>
+          <p:cNvPr id="7" name="PlaceHolder 2"/>
           <p:cNvSpPr>
             <a:spLocks noGrp="1"/>
           </p:cNvSpPr>
@@ -1827,7 +1827,7 @@
       </p:sp>
       <p:sp>
         <p:nvSpPr>
-          <p:cNvPr id="9" name="PlaceHolder 3"/>
+          <p:cNvPr id="8" name="PlaceHolder 3"/>
           <p:cNvSpPr>
             <a:spLocks noGrp="1"/>
           </p:cNvSpPr>
@@ -1875,7 +1875,7 @@
       </p:grpSpPr>
       <p:sp>
         <p:nvSpPr>
-          <p:cNvPr id="10" name="PlaceHolder 1"/>
+          <p:cNvPr id="9" name="PlaceHolder 1"/>
           <p:cNvSpPr>
             <a:spLocks noGrp="1"/>
           </p:cNvSpPr>
@@ -1924,7 +1924,7 @@
       </p:grpSpPr>
       <p:sp>
         <p:nvSpPr>
-          <p:cNvPr id="11" name="PlaceHolder 1"/>
+          <p:cNvPr id="10" name="PlaceHolder 1"/>
           <p:cNvSpPr>
             <a:spLocks noGrp="1"/>
           </p:cNvSpPr>
@@ -1973,7 +1973,7 @@
       </p:grpSpPr>
       <p:sp>
         <p:nvSpPr>
-          <p:cNvPr id="12" name="PlaceHolder 1"/>
+          <p:cNvPr id="11" name="PlaceHolder 1"/>
           <p:cNvSpPr>
             <a:spLocks noGrp="1"/>
           </p:cNvSpPr>
@@ -2000,7 +2000,7 @@
       </p:sp>
       <p:sp>
         <p:nvSpPr>
-          <p:cNvPr id="13" name="PlaceHolder 2"/>
+          <p:cNvPr id="12" name="PlaceHolder 2"/>
           <p:cNvSpPr>
             <a:spLocks noGrp="1"/>
           </p:cNvSpPr>
@@ -2026,7 +2026,7 @@
       </p:sp>
       <p:sp>
         <p:nvSpPr>
-          <p:cNvPr id="14" name="PlaceHolder 3"/>
+          <p:cNvPr id="13" name="PlaceHolder 3"/>
           <p:cNvSpPr>
             <a:spLocks noGrp="1"/>
           </p:cNvSpPr>
@@ -2052,7 +2052,7 @@
       </p:sp>
       <p:sp>
         <p:nvSpPr>
-          <p:cNvPr id="15" name="PlaceHolder 4"/>
+          <p:cNvPr id="14" name="PlaceHolder 4"/>
           <p:cNvSpPr>
             <a:spLocks noGrp="1"/>
           </p:cNvSpPr>
@@ -2100,7 +2100,7 @@
       </p:grpSpPr>
       <p:sp>
         <p:nvSpPr>
-          <p:cNvPr id="16" name="PlaceHolder 1"/>
+          <p:cNvPr id="15" name="PlaceHolder 1"/>
           <p:cNvSpPr>
             <a:spLocks noGrp="1"/>
           </p:cNvSpPr>
@@ -2127,7 +2127,7 @@
       </p:sp>
       <p:sp>
         <p:nvSpPr>
-          <p:cNvPr id="17" name="PlaceHolder 2"/>
+          <p:cNvPr id="16" name="PlaceHolder 2"/>
           <p:cNvSpPr>
             <a:spLocks noGrp="1"/>
           </p:cNvSpPr>
@@ -2153,7 +2153,7 @@
       </p:sp>
       <p:sp>
         <p:nvSpPr>
-          <p:cNvPr id="18" name="PlaceHolder 3"/>
+          <p:cNvPr id="17" name="PlaceHolder 3"/>
           <p:cNvSpPr>
             <a:spLocks noGrp="1"/>
           </p:cNvSpPr>
@@ -2179,7 +2179,7 @@
       </p:sp>
       <p:sp>
         <p:nvSpPr>
-          <p:cNvPr id="19" name="PlaceHolder 4"/>
+          <p:cNvPr id="18" name="PlaceHolder 4"/>
           <p:cNvSpPr>
             <a:spLocks noGrp="1"/>
           </p:cNvSpPr>
@@ -2227,7 +2227,7 @@
       </p:grpSpPr>
       <p:sp>
         <p:nvSpPr>
-          <p:cNvPr id="20" name="PlaceHolder 1"/>
+          <p:cNvPr id="19" name="PlaceHolder 1"/>
           <p:cNvSpPr>
             <a:spLocks noGrp="1"/>
           </p:cNvSpPr>
@@ -2254,7 +2254,7 @@
       </p:sp>
       <p:sp>
         <p:nvSpPr>
-          <p:cNvPr id="21" name="PlaceHolder 2"/>
+          <p:cNvPr id="20" name="PlaceHolder 2"/>
           <p:cNvSpPr>
             <a:spLocks noGrp="1"/>
           </p:cNvSpPr>
@@ -2280,7 +2280,7 @@
       </p:sp>
       <p:sp>
         <p:nvSpPr>
-          <p:cNvPr id="22" name="PlaceHolder 3"/>
+          <p:cNvPr id="21" name="PlaceHolder 3"/>
           <p:cNvSpPr>
             <a:spLocks noGrp="1"/>
           </p:cNvSpPr>
@@ -2306,7 +2306,7 @@
       </p:sp>
       <p:sp>
         <p:nvSpPr>
-          <p:cNvPr id="23" name="PlaceHolder 4"/>
+          <p:cNvPr id="22" name="PlaceHolder 4"/>
           <p:cNvSpPr>
             <a:spLocks noGrp="1"/>
           </p:cNvSpPr>
@@ -2371,8 +2371,8 @@
         </p:nvSpPr>
         <p:spPr>
           <a:xfrm>
-            <a:off x="457200" y="274680"/>
-            <a:ext cx="8228880" cy="1142280"/>
+            <a:off x="457200" y="273600"/>
+            <a:ext cx="8228880" cy="1144440"/>
           </a:xfrm>
           <a:prstGeom prst="rect">
             <a:avLst/>
@@ -2389,33 +2389,6 @@
       <p:sp>
         <p:nvSpPr>
           <p:cNvPr id="1" name="PlaceHolder 2"/>
-          <p:cNvSpPr>
-            <a:spLocks noGrp="1"/>
-          </p:cNvSpPr>
-          <p:nvPr>
-            <p:ph type="subTitle"/>
-          </p:nvPr>
-        </p:nvSpPr>
-        <p:spPr>
-          <a:xfrm>
-            <a:off x="457200" y="1600200"/>
-            <a:ext cx="8228880" cy="4525200"/>
-          </a:xfrm>
-          <a:prstGeom prst="rect">
-            <a:avLst/>
-          </a:prstGeom>
-        </p:spPr>
-        <p:txBody>
-          <a:bodyPr lIns="0" rIns="0" tIns="0" bIns="0" anchor="ctr"/>
-          <a:p>
-            <a:pPr algn="ctr"/>
-            <a:endParaRPr/>
-          </a:p>
-        </p:txBody>
-      </p:sp>
-      <p:sp>
-        <p:nvSpPr>
-          <p:cNvPr id="2" name="PlaceHolder 3"/>
           <p:cNvSpPr>
             <a:spLocks noGrp="1"/>
           </p:cNvSpPr>
@@ -2426,7 +2399,7 @@
         <p:spPr>
           <a:xfrm>
             <a:off x="457200" y="1604520"/>
-            <a:ext cx="8229240" cy="3976920"/>
+            <a:ext cx="8228880" cy="3976560"/>
           </a:xfrm>
           <a:prstGeom prst="rect">
             <a:avLst/>
@@ -2444,7 +2417,7 @@
               <a:buChar char=""/>
             </a:pPr>
             <a:r>
-              <a:rPr lang="fr-FR" sz="3200" spc="-1">
+              <a:rPr lang="fr-FR" sz="1800" spc="-1">
                 <a:latin typeface="Arial"/>
               </a:rPr>
               <a:t>Cliquez pour éditer le format du plan de texte</a:t>
@@ -2461,7 +2434,7 @@
               <a:buChar char=""/>
             </a:pPr>
             <a:r>
-              <a:rPr lang="fr-FR" sz="2800" spc="-1">
+              <a:rPr lang="fr-FR" sz="1800" spc="-1">
                 <a:latin typeface="Arial"/>
               </a:rPr>
               <a:t>Second niveau de plan</a:t>
@@ -2478,7 +2451,7 @@
               <a:buChar char=""/>
             </a:pPr>
             <a:r>
-              <a:rPr lang="fr-FR" sz="2400" spc="-1">
+              <a:rPr lang="fr-FR" sz="1800" spc="-1">
                 <a:latin typeface="Arial"/>
               </a:rPr>
               <a:t>Troisième niveau de plan</a:t>
@@ -2495,7 +2468,7 @@
               <a:buChar char=""/>
             </a:pPr>
             <a:r>
-              <a:rPr lang="fr-FR" sz="2000" spc="-1">
+              <a:rPr lang="fr-FR" sz="1800" spc="-1">
                 <a:latin typeface="Arial"/>
               </a:rPr>
               <a:t>Quatrième niveau de plan</a:t>
@@ -2512,7 +2485,7 @@
               <a:buChar char=""/>
             </a:pPr>
             <a:r>
-              <a:rPr lang="fr-FR" sz="2000" spc="-1">
+              <a:rPr lang="fr-FR" sz="1800" spc="-1">
                 <a:latin typeface="Arial"/>
               </a:rPr>
               <a:t>Cinquième niveau de plan</a:t>
@@ -2529,7 +2502,7 @@
               <a:buChar char=""/>
             </a:pPr>
             <a:r>
-              <a:rPr lang="fr-FR" sz="2000" spc="-1">
+              <a:rPr lang="fr-FR" sz="1800" spc="-1">
                 <a:latin typeface="Arial"/>
               </a:rPr>
               <a:t>Sixième niveau de plan</a:t>
@@ -2546,7 +2519,7 @@
               <a:buChar char=""/>
             </a:pPr>
             <a:r>
-              <a:rPr lang="fr-FR" sz="2000" spc="-1">
+              <a:rPr lang="fr-FR" sz="1800" spc="-1">
                 <a:latin typeface="Arial"/>
               </a:rPr>
               <a:t>Septième niveau de plan</a:t>
@@ -2601,7 +2574,7 @@
       </p:grpSpPr>
       <p:sp>
         <p:nvSpPr>
-          <p:cNvPr id="37" name="PlaceHolder 1"/>
+          <p:cNvPr id="36" name="PlaceHolder 1"/>
           <p:cNvSpPr>
             <a:spLocks noGrp="1"/>
           </p:cNvSpPr>
@@ -2634,7 +2607,7 @@
       </p:sp>
       <p:sp>
         <p:nvSpPr>
-          <p:cNvPr id="38" name="PlaceHolder 2"/>
+          <p:cNvPr id="37" name="PlaceHolder 2"/>
           <p:cNvSpPr>
             <a:spLocks noGrp="1"/>
           </p:cNvSpPr>
@@ -2813,14 +2786,14 @@
       </p:grpSpPr>
       <p:sp>
         <p:nvSpPr>
-          <p:cNvPr id="73" name="CustomShape 1"/>
+          <p:cNvPr id="72" name="CustomShape 1"/>
           <p:cNvSpPr/>
           <p:nvPr/>
         </p:nvSpPr>
         <p:spPr>
           <a:xfrm>
             <a:off x="685800" y="2130480"/>
-            <a:ext cx="7771680" cy="1469160"/>
+            <a:ext cx="7771320" cy="1468800"/>
           </a:xfrm>
           <a:prstGeom prst="rect">
             <a:avLst/>
@@ -2855,6 +2828,7 @@
                   </a:solidFill>
                 </a:uFill>
                 <a:latin typeface="Calibri"/>
+                <a:ea typeface="DejaVu Sans"/>
               </a:rPr>
               <a:t>Suivi des prélèvements microbiologiques d’environnement de l’unité de préparation de nutrition parentérale</a:t>
             </a:r>
@@ -2864,14 +2838,14 @@
       </p:sp>
       <p:sp>
         <p:nvSpPr>
-          <p:cNvPr id="74" name="CustomShape 2"/>
+          <p:cNvPr id="73" name="CustomShape 2"/>
           <p:cNvSpPr/>
           <p:nvPr/>
         </p:nvSpPr>
         <p:spPr>
           <a:xfrm>
             <a:off x="1371600" y="3886200"/>
-            <a:ext cx="6400080" cy="1751760"/>
+            <a:ext cx="6399720" cy="1751400"/>
           </a:xfrm>
           <a:prstGeom prst="rect">
             <a:avLst/>
@@ -2906,6 +2880,7 @@
                   </a:solidFill>
                 </a:uFill>
                 <a:latin typeface="Calibri"/>
+                <a:ea typeface="DejaVu Sans"/>
               </a:rPr>
               <a:t>T. Liautaud</a:t>
             </a:r>
@@ -2928,6 +2903,7 @@
                   </a:solidFill>
                 </a:uFill>
                 <a:latin typeface="Calibri"/>
+                <a:ea typeface="DejaVu Sans"/>
               </a:rPr>
               <a:t>DU Bioinformatique</a:t>
             </a:r>
@@ -2950,6 +2926,7 @@
                   </a:solidFill>
                 </a:uFill>
                 <a:latin typeface="Calibri"/>
+                <a:ea typeface="DejaVu Sans"/>
               </a:rPr>
               <a:t>I. Nicolis – Université Paris-Descartes</a:t>
             </a:r>
@@ -3008,14 +2985,14 @@
       </p:grpSpPr>
       <p:sp>
         <p:nvSpPr>
-          <p:cNvPr id="93" name="CustomShape 1"/>
+          <p:cNvPr id="92" name="CustomShape 1"/>
           <p:cNvSpPr/>
           <p:nvPr/>
         </p:nvSpPr>
         <p:spPr>
           <a:xfrm>
             <a:off x="457200" y="274680"/>
-            <a:ext cx="8228880" cy="1142280"/>
+            <a:ext cx="8228520" cy="1141920"/>
           </a:xfrm>
           <a:prstGeom prst="rect">
             <a:avLst/>
@@ -3050,6 +3027,7 @@
                   </a:solidFill>
                 </a:uFill>
                 <a:latin typeface="Calibri"/>
+                <a:ea typeface="DejaVu Sans"/>
               </a:rPr>
               <a:t>Table du planning</a:t>
             </a:r>
@@ -3059,7 +3037,7 @@
       </p:sp>
       <p:graphicFrame>
         <p:nvGraphicFramePr>
-          <p:cNvPr id="94" name="Table 2"/>
+          <p:cNvPr id="93" name="Table 2"/>
           <p:cNvGraphicFramePr/>
           <p:nvPr/>
         </p:nvGraphicFramePr>
@@ -3657,14 +3635,14 @@
       </p:graphicFrame>
       <p:sp>
         <p:nvSpPr>
-          <p:cNvPr id="95" name="CustomShape 3"/>
+          <p:cNvPr id="94" name="CustomShape 3"/>
           <p:cNvSpPr/>
           <p:nvPr/>
         </p:nvSpPr>
         <p:spPr>
           <a:xfrm>
             <a:off x="1619640" y="3645000"/>
-            <a:ext cx="4823640" cy="2010240"/>
+            <a:ext cx="4823280" cy="2009880"/>
           </a:xfrm>
           <a:prstGeom prst="rect">
             <a:avLst/>
@@ -3832,11 +3810,11 @@
 </file>
 
 <file path=ppt/slides/slide11.xml><?xml version="1.0" encoding="UTF-8" standalone="yes"?>
-<p:sld xmlns:a="http://schemas.openxmlformats.org/drawingml/2006/main" xmlns:p="http://schemas.openxmlformats.org/presentationml/2006/main" xmlns:r="http://schemas.openxmlformats.org/officeDocument/2006/relationships"><p:cSld><p:spTree><p:nvGrpSpPr>        <p:cNvPr id="1" name=""/>        <p:cNvGrpSpPr/>        <p:nvPr/>      </p:nvGrpSpPr>      <p:grpSpPr>        <a:xfrm>          <a:off x="0" y="0"/>          <a:ext cx="0" cy="0"/>          <a:chOff x="0" y="0"/>          <a:chExt cx="0" cy="0"/>        </a:xfrm>      </p:grpSpPr><p:sp><p:nvSpPr><p:cNvPr id="96" name="CustomShape 1"></p:cNvPr><p:cNvSpPr/><p:nvPr/></p:nvSpPr><p:spPr><a:xfrm><a:off x="457200" y="274680"/><a:ext cx="8228880" cy="1142280"/></a:xfrm><a:prstGeom prst="rect"><a:avLst></a:avLst></a:prstGeom><a:noFill/><a:ln><a:noFill/></a:ln></p:spPr><p:style><a:lnRef idx="0"/><a:fillRef idx="0"/><a:effectRef idx="0"/><a:fontRef idx="minor"/></p:style><p:txBody><a:bodyPr lIns="90000" rIns="90000" tIns="45000" bIns="45000" anchor="ctr"></a:bodyPr><a:p><a:pPr algn="ctr"><a:lnSpc><a:spcPct val="100000"/></a:lnSpc></a:pPr><a:r><a:rPr lang="fr-FR" sz="4400" spc="-1" strike="noStrike"><a:solidFill><a:srgbClr val="000000"/></a:solidFill><a:uFill><a:solidFill><a:srgbClr val="ffffff"/></a:solidFill></a:uFill><a:latin typeface="Calibri"/></a:rPr><a:t>Prélèvements</a:t></a:r><a:endParaRPr/></a:p></p:txBody></p:sp><p:graphicFrame><p:nvGraphicFramePr><p:cNvPr id="97" name="Table 2"/><p:cNvGraphicFramePr/><p:nvPr/></p:nvGraphicFramePr><p:xfrm><a:off x="64440" y="1556640"/><a:ext cx="8899200" cy="2176200"/></p:xfrm><a:graphic><a:graphicData uri="http://schemas.openxmlformats.org/drawingml/2006/table"><a:tbl><a:tblPr/><a:tblGrid><a:gridCol w="2114280"/><a:gridCol w="1168920"/><a:gridCol w="1152000"/><a:gridCol w="1152000"/><a:gridCol w="1080000"/><a:gridCol w="2232360"/></a:tblGrid><a:tr h="896400"><a:tc><a:txBody><a:bodyPr></a:bodyPr><a:p><a:pPr><a:lnSpc><a:spcPct val="100000"/></a:lnSpc></a:pPr><a:r><a:rPr b="1" lang="fr-FR" sz="1800" spc="-1" strike="noStrike"><a:solidFill><a:srgbClr val="ffffff"/></a:solidFill><a:uFill><a:solidFill><a:srgbClr val="ffffff"/></a:solidFill></a:uFill><a:latin typeface="Calibri"/></a:rPr><a:t>Etiquette</a:t></a:r><a:endParaRPr/></a:p></a:txBody><a:tcPr marL="91440" marR="91440"><a:lnL w="12240"><a:solidFill><a:srgbClr val="ffffff"/></a:solidFill></a:lnL><a:lnR w="12240"><a:solidFill><a:srgbClr val="ffffff"/></a:solidFill></a:lnR><a:lnT w="12240"><a:solidFill><a:srgbClr val="ffffff"/></a:solidFill></a:lnT><a:lnB w="38160"><a:solidFill><a:srgbClr val="ffffff"/></a:solidFill></a:lnB><a:solidFill><a:srgbClr val="4f81bd"/></a:solidFill></a:tcPr></a:tc><a:tc><a:txBody><a:bodyPr></a:bodyPr><a:p><a:pPr><a:lnSpc><a:spcPct val="100000"/></a:lnSpc></a:pPr><a:r><a:rPr b="1" lang="fr-FR" sz="1800" spc="-1" strike="noStrike"><a:solidFill><a:srgbClr val="ffffff"/></a:solidFill><a:uFill><a:solidFill><a:srgbClr val="ffffff"/></a:solidFill></a:uFill><a:latin typeface="Calibri"/></a:rPr><a:t>Nom de variable</a:t></a:r><a:endParaRPr/></a:p></a:txBody><a:tcPr marL="91440" marR="91440"><a:lnL w="12240"><a:solidFill><a:srgbClr val="ffffff"/></a:solidFill></a:lnL><a:lnR w="12240"><a:solidFill><a:srgbClr val="ffffff"/></a:solidFill></a:lnR><a:lnT w="12240"><a:solidFill><a:srgbClr val="ffffff"/></a:solidFill></a:lnT><a:lnB w="38160"><a:solidFill><a:srgbClr val="ffffff"/></a:solidFill></a:lnB><a:solidFill><a:srgbClr val="4f81bd"/></a:solidFill></a:tcPr></a:tc><a:tc><a:txBody><a:bodyPr></a:bodyPr><a:p><a:pPr><a:lnSpc><a:spcPct val="100000"/></a:lnSpc></a:pPr><a:r><a:rPr b="1" lang="fr-FR" sz="1800" spc="-1" strike="noStrike"><a:solidFill><a:srgbClr val="ffffff"/></a:solidFill><a:uFill><a:solidFill><a:srgbClr val="ffffff"/></a:solidFill></a:uFill><a:latin typeface="Calibri"/></a:rPr><a:t>Type</a:t></a:r><a:endParaRPr/></a:p></a:txBody><a:tcPr marL="91440" marR="91440"><a:lnL w="12240"><a:solidFill><a:srgbClr val="ffffff"/></a:solidFill></a:lnL><a:lnR w="12240"><a:solidFill><a:srgbClr val="ffffff"/></a:solidFill></a:lnR><a:lnT w="12240"><a:solidFill><a:srgbClr val="ffffff"/></a:solidFill></a:lnT><a:lnB w="38160"><a:solidFill><a:srgbClr val="ffffff"/></a:solidFill></a:lnB><a:solidFill><a:srgbClr val="4f81bd"/></a:solidFill></a:tcPr></a:tc><a:tc><a:txBody><a:bodyPr></a:bodyPr><a:p><a:pPr><a:lnSpc><a:spcPct val="100000"/></a:lnSpc></a:pPr><a:r><a:rPr b="1" lang="fr-FR" sz="1800" spc="-1" strike="noStrike"><a:solidFill><a:srgbClr val="ffffff"/></a:solidFill><a:uFill><a:solidFill><a:srgbClr val="ffffff"/></a:solidFill></a:uFill><a:latin typeface="Calibri"/></a:rPr><a:t>Table</a:t></a:r><a:endParaRPr/></a:p></a:txBody><a:tcPr marL="91440" marR="91440"><a:lnL w="12240"><a:solidFill><a:srgbClr val="ffffff"/></a:solidFill></a:lnL><a:lnR w="12240"><a:solidFill><a:srgbClr val="ffffff"/></a:solidFill></a:lnR><a:lnT w="12240"><a:solidFill><a:srgbClr val="ffffff"/></a:solidFill></a:lnT><a:lnB w="38160"><a:solidFill><a:srgbClr val="ffffff"/></a:solidFill></a:lnB><a:solidFill><a:srgbClr val="4f81bd"/></a:solidFill></a:tcPr></a:tc><a:tc><a:txBody><a:bodyPr></a:bodyPr><a:p><a:pPr><a:lnSpc><a:spcPct val="100000"/></a:lnSpc></a:pPr><a:r><a:rPr b="1" lang="fr-FR" sz="1800" spc="-1" strike="noStrike"><a:solidFill><a:srgbClr val="ffffff"/></a:solidFill><a:uFill><a:solidFill><a:srgbClr val="ffffff"/></a:solidFill></a:uFill><a:latin typeface="Calibri"/></a:rPr><a:t>Clé </a:t></a:r><a:endParaRPr/></a:p><a:p><a:pPr><a:lnSpc><a:spcPct val="100000"/></a:lnSpc></a:pPr><a:r><a:rPr b="1" lang="fr-FR" sz="1800" spc="-1" strike="noStrike"><a:solidFill><a:srgbClr val="ffffff"/></a:solidFill><a:uFill><a:solidFill><a:srgbClr val="ffffff"/></a:solidFill></a:uFill><a:latin typeface="Calibri"/></a:rPr><a:t>primaire</a:t></a:r><a:endParaRPr/></a:p></a:txBody><a:tcPr marL="91440" marR="91440"><a:lnL w="12240"><a:solidFill><a:srgbClr val="ffffff"/></a:solidFill></a:lnL><a:lnR w="12240"><a:solidFill><a:srgbClr val="ffffff"/></a:solidFill></a:lnR><a:lnT w="12240"><a:solidFill><a:srgbClr val="ffffff"/></a:solidFill></a:lnT><a:lnB w="38160"><a:solidFill><a:srgbClr val="ffffff"/></a:solidFill></a:lnB><a:solidFill><a:srgbClr val="4f81bd"/></a:solidFill></a:tcPr></a:tc><a:tc><a:txBody><a:bodyPr></a:bodyPr><a:p><a:pPr><a:lnSpc><a:spcPct val="100000"/></a:lnSpc></a:pPr><a:r><a:rPr b="1" lang="fr-FR" sz="1800" spc="-1" strike="noStrike"><a:solidFill><a:srgbClr val="ffffff"/></a:solidFill><a:uFill><a:solidFill><a:srgbClr val="ffffff"/></a:solidFill></a:uFill><a:latin typeface="Calibri"/></a:rPr><a:t>Clé étrangère</a:t></a:r><a:endParaRPr/></a:p></a:txBody><a:tcPr marL="91440" marR="91440"><a:lnL w="12240"><a:solidFill><a:srgbClr val="ffffff"/></a:solidFill></a:lnL><a:lnR w="12240"><a:solidFill><a:srgbClr val="ffffff"/></a:solidFill></a:lnR><a:lnT w="12240"><a:solidFill><a:srgbClr val="ffffff"/></a:solidFill></a:lnT><a:lnB w="38160"><a:solidFill><a:srgbClr val="ffffff"/></a:solidFill></a:lnB><a:solidFill><a:srgbClr val="4f81bd"/></a:solidFill></a:tcPr></a:tc></a:tr><a:tr h="640080"><a:tc><a:txBody><a:bodyPr></a:bodyPr><a:p><a:pPr><a:lnSpc><a:spcPct val="100000"/></a:lnSpc></a:pPr><a:r><a:rPr lang="fr-FR" sz="1800" spc="-1" strike="noStrike"><a:solidFill><a:srgbClr val="000000"/></a:solidFill><a:uFill><a:solidFill><a:srgbClr val="ffffff"/></a:solidFill></a:uFill><a:latin typeface="Calibri"/></a:rPr><a:t>Prelevement fait</a:t></a:r><a:endParaRPr/></a:p></a:txBody><a:tcPr marL="91440" marR="91440"><a:lnL w="12240"><a:solidFill><a:srgbClr val="ffffff"/></a:solidFill></a:lnL><a:lnR w="12240"><a:solidFill><a:srgbClr val="ffffff"/></a:solidFill></a:lnR><a:lnT w="12240"><a:solidFill><a:srgbClr val="ffffff"/></a:solidFill></a:lnT><a:lnB w="12240"><a:solidFill><a:srgbClr val="ffffff"/></a:solidFill></a:lnB><a:solidFill><a:srgbClr val="d0d8e7"/></a:solidFill></a:tcPr></a:tc><a:tc><a:txBody><a:bodyPr></a:bodyPr><a:p><a:pPr><a:lnSpc><a:spcPct val="100000"/></a:lnSpc></a:pPr><a:r><a:rPr lang="fr-FR" sz="1800" spc="-1" strike="noStrike"><a:solidFill><a:srgbClr val="000000"/></a:solidFill><a:uFill><a:solidFill><a:srgbClr val="ffffff"/></a:solidFill></a:uFill><a:latin typeface="Calibri"/></a:rPr><a:t>Fait</a:t></a:r><a:endParaRPr/></a:p></a:txBody><a:tcPr marL="91440" marR="91440"><a:lnL w="12240"><a:solidFill><a:srgbClr val="ffffff"/></a:solidFill></a:lnL><a:lnR w="12240"><a:solidFill><a:srgbClr val="ffffff"/></a:solidFill></a:lnR><a:lnT w="12240"><a:solidFill><a:srgbClr val="ffffff"/></a:solidFill></a:lnT><a:lnB w="12240"><a:solidFill><a:srgbClr val="ffffff"/></a:solidFill></a:lnB><a:solidFill><a:srgbClr val="d0d8e7"/></a:solidFill></a:tcPr></a:tc><a:tc><a:txBody><a:bodyPr></a:bodyPr><a:p><a:pPr><a:lnSpc><a:spcPct val="100000"/></a:lnSpc></a:pPr><a:r><a:rPr lang="fr-FR" sz="1800" spc="-1" strike="noStrike"><a:solidFill><a:srgbClr val="000000"/></a:solidFill><a:uFill><a:solidFill><a:srgbClr val="ffffff"/></a:solidFill></a:uFill><a:latin typeface="Calibri"/></a:rPr><a:t>Bool</a:t></a:r><a:endParaRPr/></a:p></a:txBody><a:tcPr marL="91440" marR="91440"><a:lnL w="12240"><a:solidFill><a:srgbClr val="ffffff"/></a:solidFill></a:lnL><a:lnR w="12240"><a:solidFill><a:srgbClr val="ffffff"/></a:solidFill></a:lnR><a:lnT w="12240"><a:solidFill><a:srgbClr val="ffffff"/></a:solidFill></a:lnT><a:lnB w="12240"><a:solidFill><a:srgbClr val="ffffff"/></a:solidFill></a:lnB><a:solidFill><a:srgbClr val="d0d8e7"/></a:solidFill></a:tcPr></a:tc><a:tc rowSpan="2"><a:txBody><a:bodyPr></a:bodyPr><a:p><a:pPr><a:lnSpc><a:spcPct val="100000"/></a:lnSpc></a:pPr><a:r><a:rPr lang="fr-FR" sz="1800" spc="-1" strike="noStrike"><a:solidFill><a:srgbClr val="000000"/></a:solidFill><a:uFill><a:solidFill><a:srgbClr val="ffffff"/></a:solidFill></a:uFill><a:latin typeface="Calibri"/></a:rPr><a:t>Prélèvements</a:t></a:r><a:endParaRPr/></a:p></a:txBody><a:tcPr marL="91440" marR="91440"><a:lnL w="12240"><a:solidFill><a:srgbClr val="ffffff"/></a:solidFill></a:lnL><a:lnR w="12240"><a:solidFill><a:srgbClr val="ffffff"/></a:solidFill></a:lnR><a:lnT w="12240"><a:solidFill><a:srgbClr val="ffffff"/></a:solidFill></a:lnT><a:lnB w="12240"><a:solidFill><a:srgbClr val="ffffff"/></a:solidFill></a:lnB><a:solidFill><a:srgbClr val="d0d8e7"/></a:solidFill></a:tcPr></a:tc><a:tc rowSpan="2"><a:txBody><a:bodyPr></a:bodyPr><a:p><a:pPr><a:lnSpc><a:spcPct val="100000"/></a:lnSpc></a:pPr><a:r><a:rPr lang="fr-FR" sz="1800" spc="-1" strike="noStrike"><a:solidFill><a:srgbClr val="000000"/></a:solidFill><a:uFill><a:solidFill><a:srgbClr val="ffffff"/></a:solidFill></a:uFill><a:latin typeface="Calibri"/></a:rPr><a:t>ID</a:t></a:r><a:endParaRPr/></a:p></a:txBody><a:tcPr marL="91440" marR="91440"><a:lnL w="12240"><a:solidFill><a:srgbClr val="ffffff"/></a:solidFill></a:lnL><a:lnR w="12240"><a:solidFill><a:srgbClr val="ffffff"/></a:solidFill></a:lnR><a:lnT w="12240"><a:solidFill><a:srgbClr val="ffffff"/></a:solidFill></a:lnT><a:lnB w="12240"><a:solidFill><a:srgbClr val="ffffff"/></a:solidFill></a:lnB><a:solidFill><a:srgbClr val="d0d8e7"/></a:solidFill></a:tcPr></a:tc><a:tc rowSpan="2"><a:txBody><a:bodyPr></a:bodyPr><a:p><a:pPr><a:lnSpc><a:spcPct val="100000"/></a:lnSpc></a:pPr><a:r><a:rPr lang="fr-FR" sz="1800" spc="-1" strike="noStrike"><a:solidFill><a:srgbClr val="000000"/></a:solidFill><a:uFill><a:solidFill><a:srgbClr val="ffffff"/></a:solidFill></a:uFill><a:latin typeface="Calibri"/></a:rPr><a:t>Points-prelev(ID)</a:t></a:r><a:endParaRPr/></a:p><a:p><a:pPr><a:lnSpc><a:spcPct val="100000"/></a:lnSpc></a:pPr><a:endParaRPr/></a:p></a:txBody><a:tcPr marL="91440" marR="91440"><a:lnL w="12240"><a:solidFill><a:srgbClr val="ffffff"/></a:solidFill></a:lnL><a:lnR w="12240"><a:solidFill><a:srgbClr val="ffffff"/></a:solidFill></a:lnR><a:lnT w="12240"><a:solidFill><a:srgbClr val="ffffff"/></a:solidFill></a:lnT><a:lnB w="12240"><a:solidFill><a:srgbClr val="ffffff"/></a:solidFill></a:lnB><a:solidFill><a:srgbClr val="d0d8e7"/></a:solidFill></a:tcPr></a:tc></a:tr><a:tr h="640080"><a:tc><a:txBody><a:bodyPr></a:bodyPr><a:p><a:pPr><a:lnSpc><a:spcPct val="100000"/></a:lnSpc></a:pPr><a:r><a:rPr lang="fr-FR" sz="1800" spc="-1" strike="noStrike"><a:solidFill><a:srgbClr val="000000"/></a:solidFill><a:uFill><a:solidFill><a:srgbClr val="ffffff"/></a:solidFill></a:uFill><a:latin typeface="Calibri"/></a:rPr><a:t>Date prélèvement</a:t></a:r><a:endParaRPr/></a:p></a:txBody><a:tcPr marL="91440" marR="91440"><a:lnL w="12240"><a:solidFill><a:srgbClr val="ffffff"/></a:solidFill></a:lnL><a:lnR w="12240"><a:solidFill><a:srgbClr val="ffffff"/></a:solidFill></a:lnR><a:lnT w="12240"><a:solidFill><a:srgbClr val="ffffff"/></a:solidFill></a:lnT><a:lnB w="12240"><a:solidFill><a:srgbClr val="ffffff"/></a:solidFill></a:lnB><a:solidFill><a:srgbClr val="e9ecf3"/></a:solidFill></a:tcPr></a:tc><a:tc><a:txBody><a:bodyPr></a:bodyPr><a:p><a:pPr><a:lnSpc><a:spcPct val="100000"/></a:lnSpc></a:pPr><a:r><a:rPr lang="fr-FR" sz="1800" spc="-1" strike="noStrike"><a:solidFill><a:srgbClr val="000000"/></a:solidFill><a:uFill><a:solidFill><a:srgbClr val="ffffff"/></a:solidFill></a:uFill><a:latin typeface="Calibri"/></a:rPr><a:t>Date_prel</a:t></a:r><a:endParaRPr/></a:p></a:txBody><a:tcPr marL="91440" marR="91440"><a:lnL w="12240"><a:solidFill><a:srgbClr val="ffffff"/></a:solidFill></a:lnL><a:lnR w="12240"><a:solidFill><a:srgbClr val="ffffff"/></a:solidFill></a:lnR><a:lnT w="12240"><a:solidFill><a:srgbClr val="ffffff"/></a:solidFill></a:lnT><a:lnB w="12240"><a:solidFill><a:srgbClr val="ffffff"/></a:solidFill></a:lnB><a:solidFill><a:srgbClr val="e9ecf3"/></a:solidFill></a:tcPr></a:tc><a:tc><a:txBody><a:bodyPr></a:bodyPr><a:p><a:pPr><a:lnSpc><a:spcPct val="100000"/></a:lnSpc></a:pPr><a:r><a:rPr lang="fr-FR" sz="1800" spc="-1" strike="noStrike"><a:solidFill><a:srgbClr val="000000"/></a:solidFill><a:uFill><a:solidFill><a:srgbClr val="ffffff"/></a:solidFill></a:uFill><a:latin typeface="Calibri"/></a:rPr><a:t>Datetime</a:t></a:r><a:endParaRPr/></a:p></a:txBody><a:tcPr marL="91440" marR="91440"><a:lnL w="12240"><a:solidFill><a:srgbClr val="ffffff"/></a:solidFill></a:lnL><a:lnR w="12240"><a:solidFill><a:srgbClr val="ffffff"/></a:solidFill></a:lnR><a:lnT w="12240"><a:solidFill><a:srgbClr val="ffffff"/></a:solidFill></a:lnT><a:lnB w="12240"><a:solidFill><a:srgbClr val="ffffff"/></a:solidFill></a:lnB><a:solidFill><a:srgbClr val="e9ecf3"/></a:solidFill></a:tcPr></a:tc><a:tcPr><a:solidFill><a:srgbClr val="729fcf"/></a:solidFill></a:tcPr></a:tc><a:tcPr><a:solidFill><a:srgbClr val="729fcf"/></a:solidFill></a:tcPr></a:tc><a:tcPr><a:solidFill><a:srgbClr val="729fcf"/></a:solidFill></a:tcPr></a:tc></a:tr></a:tbl></a:graphicData></a:graphic></p:graphicFrame></p:spTree></p:cSld><p:timing><p:tnLst><p:par><p:cTn id="21" dur="indefinite" restart="never" nodeType="tmRoot"><p:childTnLst><p:seq><p:cTn id="22" nodeType="mainSeq"></p:cTn><p:prevCondLst><p:cond delay="0" evt="onPrev"><p:tgtEl><p:sldTgt/></p:tgtEl></p:cond></p:prevCondLst><p:nextCondLst><p:cond delay="0" evt="onNext"><p:tgtEl><p:sldTgt/></p:tgtEl></p:cond></p:nextCondLst></p:seq></p:childTnLst></p:cTn></p:par></p:tnLst></p:timing></p:sld>
+<p:sld xmlns:a="http://schemas.openxmlformats.org/drawingml/2006/main" xmlns:p="http://schemas.openxmlformats.org/presentationml/2006/main" xmlns:r="http://schemas.openxmlformats.org/officeDocument/2006/relationships"><p:cSld><p:spTree><p:nvGrpSpPr>        <p:cNvPr id="1" name=""/>        <p:cNvGrpSpPr/>        <p:nvPr/>      </p:nvGrpSpPr>      <p:grpSpPr>        <a:xfrm>          <a:off x="0" y="0"/>          <a:ext cx="0" cy="0"/>          <a:chOff x="0" y="0"/>          <a:chExt cx="0" cy="0"/>        </a:xfrm>      </p:grpSpPr><p:sp><p:nvSpPr><p:cNvPr id="95" name="CustomShape 1"></p:cNvPr><p:cNvSpPr/><p:nvPr/></p:nvSpPr><p:spPr><a:xfrm><a:off x="457200" y="274680"/><a:ext cx="8228520" cy="1141920"/></a:xfrm><a:prstGeom prst="rect"><a:avLst></a:avLst></a:prstGeom><a:noFill/><a:ln><a:noFill/></a:ln></p:spPr><p:style><a:lnRef idx="0"></a:lnRef><a:fillRef idx="0"/><a:effectRef idx="0"></a:effectRef><a:fontRef idx="minor"/></p:style><p:txBody><a:bodyPr lIns="90000" rIns="90000" tIns="45000" bIns="45000" anchor="ctr"></a:bodyPr><a:p><a:pPr algn="ctr"><a:lnSpc><a:spcPct val="100000"/></a:lnSpc></a:pPr><a:r><a:rPr lang="fr-FR" sz="4400" spc="-1" strike="noStrike"><a:solidFill><a:srgbClr val="000000"/></a:solidFill><a:uFill><a:solidFill><a:srgbClr val="ffffff"/></a:solidFill></a:uFill><a:latin typeface="Calibri"/><a:ea typeface="DejaVu Sans"/></a:rPr><a:t>Prélèvements</a:t></a:r><a:endParaRPr/></a:p></p:txBody></p:sp><p:graphicFrame><p:nvGraphicFramePr><p:cNvPr id="96" name="Table 2"/><p:cNvGraphicFramePr/><p:nvPr/></p:nvGraphicFramePr><p:xfrm><a:off x="64440" y="1556640"/><a:ext cx="8899200" cy="2176200"/></p:xfrm><a:graphic><a:graphicData uri="http://schemas.openxmlformats.org/drawingml/2006/table"><a:tbl><a:tblPr/><a:tblGrid><a:gridCol w="2114280"/><a:gridCol w="1168920"/><a:gridCol w="1152000"/><a:gridCol w="1152000"/><a:gridCol w="1080000"/><a:gridCol w="2232360"/></a:tblGrid><a:tr h="896400"><a:tc><a:txBody><a:bodyPr></a:bodyPr><a:p><a:pPr><a:lnSpc><a:spcPct val="100000"/></a:lnSpc></a:pPr><a:r><a:rPr b="1" lang="fr-FR" sz="1800" spc="-1" strike="noStrike"><a:solidFill><a:srgbClr val="ffffff"/></a:solidFill><a:uFill><a:solidFill><a:srgbClr val="ffffff"/></a:solidFill></a:uFill><a:latin typeface="Calibri"/></a:rPr><a:t>Etiquette</a:t></a:r><a:endParaRPr/></a:p></a:txBody><a:tcPr marL="91440" marR="91440"><a:lnL w="12240"><a:solidFill><a:srgbClr val="ffffff"/></a:solidFill></a:lnL><a:lnR w="12240"><a:solidFill><a:srgbClr val="ffffff"/></a:solidFill></a:lnR><a:lnT w="12240"><a:solidFill><a:srgbClr val="ffffff"/></a:solidFill></a:lnT><a:lnB w="38160"><a:solidFill><a:srgbClr val="ffffff"/></a:solidFill></a:lnB><a:solidFill><a:srgbClr val="4f81bd"/></a:solidFill></a:tcPr></a:tc><a:tc><a:txBody><a:bodyPr></a:bodyPr><a:p><a:pPr><a:lnSpc><a:spcPct val="100000"/></a:lnSpc></a:pPr><a:r><a:rPr b="1" lang="fr-FR" sz="1800" spc="-1" strike="noStrike"><a:solidFill><a:srgbClr val="ffffff"/></a:solidFill><a:uFill><a:solidFill><a:srgbClr val="ffffff"/></a:solidFill></a:uFill><a:latin typeface="Calibri"/></a:rPr><a:t>Nom de variable</a:t></a:r><a:endParaRPr/></a:p></a:txBody><a:tcPr marL="91440" marR="91440"><a:lnL w="12240"><a:solidFill><a:srgbClr val="ffffff"/></a:solidFill></a:lnL><a:lnR w="12240"><a:solidFill><a:srgbClr val="ffffff"/></a:solidFill></a:lnR><a:lnT w="12240"><a:solidFill><a:srgbClr val="ffffff"/></a:solidFill></a:lnT><a:lnB w="38160"><a:solidFill><a:srgbClr val="ffffff"/></a:solidFill></a:lnB><a:solidFill><a:srgbClr val="4f81bd"/></a:solidFill></a:tcPr></a:tc><a:tc><a:txBody><a:bodyPr></a:bodyPr><a:p><a:pPr><a:lnSpc><a:spcPct val="100000"/></a:lnSpc></a:pPr><a:r><a:rPr b="1" lang="fr-FR" sz="1800" spc="-1" strike="noStrike"><a:solidFill><a:srgbClr val="ffffff"/></a:solidFill><a:uFill><a:solidFill><a:srgbClr val="ffffff"/></a:solidFill></a:uFill><a:latin typeface="Calibri"/></a:rPr><a:t>Type</a:t></a:r><a:endParaRPr/></a:p></a:txBody><a:tcPr marL="91440" marR="91440"><a:lnL w="12240"><a:solidFill><a:srgbClr val="ffffff"/></a:solidFill></a:lnL><a:lnR w="12240"><a:solidFill><a:srgbClr val="ffffff"/></a:solidFill></a:lnR><a:lnT w="12240"><a:solidFill><a:srgbClr val="ffffff"/></a:solidFill></a:lnT><a:lnB w="38160"><a:solidFill><a:srgbClr val="ffffff"/></a:solidFill></a:lnB><a:solidFill><a:srgbClr val="4f81bd"/></a:solidFill></a:tcPr></a:tc><a:tc><a:txBody><a:bodyPr></a:bodyPr><a:p><a:pPr><a:lnSpc><a:spcPct val="100000"/></a:lnSpc></a:pPr><a:r><a:rPr b="1" lang="fr-FR" sz="1800" spc="-1" strike="noStrike"><a:solidFill><a:srgbClr val="ffffff"/></a:solidFill><a:uFill><a:solidFill><a:srgbClr val="ffffff"/></a:solidFill></a:uFill><a:latin typeface="Calibri"/></a:rPr><a:t>Table</a:t></a:r><a:endParaRPr/></a:p></a:txBody><a:tcPr marL="91440" marR="91440"><a:lnL w="12240"><a:solidFill><a:srgbClr val="ffffff"/></a:solidFill></a:lnL><a:lnR w="12240"><a:solidFill><a:srgbClr val="ffffff"/></a:solidFill></a:lnR><a:lnT w="12240"><a:solidFill><a:srgbClr val="ffffff"/></a:solidFill></a:lnT><a:lnB w="38160"><a:solidFill><a:srgbClr val="ffffff"/></a:solidFill></a:lnB><a:solidFill><a:srgbClr val="4f81bd"/></a:solidFill></a:tcPr></a:tc><a:tc><a:txBody><a:bodyPr></a:bodyPr><a:p><a:pPr><a:lnSpc><a:spcPct val="100000"/></a:lnSpc></a:pPr><a:r><a:rPr b="1" lang="fr-FR" sz="1800" spc="-1" strike="noStrike"><a:solidFill><a:srgbClr val="ffffff"/></a:solidFill><a:uFill><a:solidFill><a:srgbClr val="ffffff"/></a:solidFill></a:uFill><a:latin typeface="Calibri"/></a:rPr><a:t>Clé </a:t></a:r><a:endParaRPr/></a:p><a:p><a:pPr><a:lnSpc><a:spcPct val="100000"/></a:lnSpc></a:pPr><a:r><a:rPr b="1" lang="fr-FR" sz="1800" spc="-1" strike="noStrike"><a:solidFill><a:srgbClr val="ffffff"/></a:solidFill><a:uFill><a:solidFill><a:srgbClr val="ffffff"/></a:solidFill></a:uFill><a:latin typeface="Calibri"/></a:rPr><a:t>primaire</a:t></a:r><a:endParaRPr/></a:p></a:txBody><a:tcPr marL="91440" marR="91440"><a:lnL w="12240"><a:solidFill><a:srgbClr val="ffffff"/></a:solidFill></a:lnL><a:lnR w="12240"><a:solidFill><a:srgbClr val="ffffff"/></a:solidFill></a:lnR><a:lnT w="12240"><a:solidFill><a:srgbClr val="ffffff"/></a:solidFill></a:lnT><a:lnB w="38160"><a:solidFill><a:srgbClr val="ffffff"/></a:solidFill></a:lnB><a:solidFill><a:srgbClr val="4f81bd"/></a:solidFill></a:tcPr></a:tc><a:tc><a:txBody><a:bodyPr></a:bodyPr><a:p><a:pPr><a:lnSpc><a:spcPct val="100000"/></a:lnSpc></a:pPr><a:r><a:rPr b="1" lang="fr-FR" sz="1800" spc="-1" strike="noStrike"><a:solidFill><a:srgbClr val="ffffff"/></a:solidFill><a:uFill><a:solidFill><a:srgbClr val="ffffff"/></a:solidFill></a:uFill><a:latin typeface="Calibri"/></a:rPr><a:t>Clé étrangère</a:t></a:r><a:endParaRPr/></a:p></a:txBody><a:tcPr marL="91440" marR="91440"><a:lnL w="12240"><a:solidFill><a:srgbClr val="ffffff"/></a:solidFill></a:lnL><a:lnR w="12240"><a:solidFill><a:srgbClr val="ffffff"/></a:solidFill></a:lnR><a:lnT w="12240"><a:solidFill><a:srgbClr val="ffffff"/></a:solidFill></a:lnT><a:lnB w="38160"><a:solidFill><a:srgbClr val="ffffff"/></a:solidFill></a:lnB><a:solidFill><a:srgbClr val="4f81bd"/></a:solidFill></a:tcPr></a:tc></a:tr><a:tr h="640080"><a:tc><a:txBody><a:bodyPr></a:bodyPr><a:p><a:pPr><a:lnSpc><a:spcPct val="100000"/></a:lnSpc></a:pPr><a:r><a:rPr lang="fr-FR" sz="1800" spc="-1" strike="noStrike"><a:solidFill><a:srgbClr val="000000"/></a:solidFill><a:uFill><a:solidFill><a:srgbClr val="ffffff"/></a:solidFill></a:uFill><a:latin typeface="Calibri"/></a:rPr><a:t>Prelevement fait</a:t></a:r><a:endParaRPr/></a:p></a:txBody><a:tcPr marL="91440" marR="91440"><a:lnL w="12240"><a:solidFill><a:srgbClr val="ffffff"/></a:solidFill></a:lnL><a:lnR w="12240"><a:solidFill><a:srgbClr val="ffffff"/></a:solidFill></a:lnR><a:lnT w="12240"><a:solidFill><a:srgbClr val="ffffff"/></a:solidFill></a:lnT><a:lnB w="12240"><a:solidFill><a:srgbClr val="ffffff"/></a:solidFill></a:lnB><a:solidFill><a:srgbClr val="d0d8e7"/></a:solidFill></a:tcPr></a:tc><a:tc><a:txBody><a:bodyPr></a:bodyPr><a:p><a:pPr><a:lnSpc><a:spcPct val="100000"/></a:lnSpc></a:pPr><a:r><a:rPr lang="fr-FR" sz="1800" spc="-1" strike="noStrike"><a:solidFill><a:srgbClr val="000000"/></a:solidFill><a:uFill><a:solidFill><a:srgbClr val="ffffff"/></a:solidFill></a:uFill><a:latin typeface="Calibri"/></a:rPr><a:t>Fait</a:t></a:r><a:endParaRPr/></a:p></a:txBody><a:tcPr marL="91440" marR="91440"><a:lnL w="12240"><a:solidFill><a:srgbClr val="ffffff"/></a:solidFill></a:lnL><a:lnR w="12240"><a:solidFill><a:srgbClr val="ffffff"/></a:solidFill></a:lnR><a:lnT w="12240"><a:solidFill><a:srgbClr val="ffffff"/></a:solidFill></a:lnT><a:lnB w="12240"><a:solidFill><a:srgbClr val="ffffff"/></a:solidFill></a:lnB><a:solidFill><a:srgbClr val="d0d8e7"/></a:solidFill></a:tcPr></a:tc><a:tc><a:txBody><a:bodyPr></a:bodyPr><a:p><a:pPr><a:lnSpc><a:spcPct val="100000"/></a:lnSpc></a:pPr><a:r><a:rPr lang="fr-FR" sz="1800" spc="-1" strike="noStrike"><a:solidFill><a:srgbClr val="000000"/></a:solidFill><a:uFill><a:solidFill><a:srgbClr val="ffffff"/></a:solidFill></a:uFill><a:latin typeface="Calibri"/></a:rPr><a:t>Bool</a:t></a:r><a:endParaRPr/></a:p></a:txBody><a:tcPr marL="91440" marR="91440"><a:lnL w="12240"><a:solidFill><a:srgbClr val="ffffff"/></a:solidFill></a:lnL><a:lnR w="12240"><a:solidFill><a:srgbClr val="ffffff"/></a:solidFill></a:lnR><a:lnT w="12240"><a:solidFill><a:srgbClr val="ffffff"/></a:solidFill></a:lnT><a:lnB w="12240"><a:solidFill><a:srgbClr val="ffffff"/></a:solidFill></a:lnB><a:solidFill><a:srgbClr val="d0d8e7"/></a:solidFill></a:tcPr></a:tc><a:tc rowSpan="2"><a:txBody><a:bodyPr></a:bodyPr><a:p><a:pPr><a:lnSpc><a:spcPct val="100000"/></a:lnSpc></a:pPr><a:r><a:rPr lang="fr-FR" sz="1800" spc="-1" strike="noStrike"><a:solidFill><a:srgbClr val="000000"/></a:solidFill><a:uFill><a:solidFill><a:srgbClr val="ffffff"/></a:solidFill></a:uFill><a:latin typeface="Calibri"/></a:rPr><a:t>Prélèvements</a:t></a:r><a:endParaRPr/></a:p></a:txBody><a:tcPr marL="91440" marR="91440"><a:lnL w="12240"><a:solidFill><a:srgbClr val="ffffff"/></a:solidFill></a:lnL><a:lnR w="12240"><a:solidFill><a:srgbClr val="ffffff"/></a:solidFill></a:lnR><a:lnT w="12240"><a:solidFill><a:srgbClr val="ffffff"/></a:solidFill></a:lnT><a:lnB w="12240"><a:solidFill><a:srgbClr val="ffffff"/></a:solidFill></a:lnB><a:solidFill><a:srgbClr val="d0d8e7"/></a:solidFill></a:tcPr></a:tc><a:tc rowSpan="2"><a:txBody><a:bodyPr></a:bodyPr><a:p><a:pPr><a:lnSpc><a:spcPct val="100000"/></a:lnSpc></a:pPr><a:r><a:rPr lang="fr-FR" sz="1800" spc="-1" strike="noStrike"><a:solidFill><a:srgbClr val="000000"/></a:solidFill><a:uFill><a:solidFill><a:srgbClr val="ffffff"/></a:solidFill></a:uFill><a:latin typeface="Calibri"/></a:rPr><a:t>ID</a:t></a:r><a:endParaRPr/></a:p></a:txBody><a:tcPr marL="91440" marR="91440"><a:lnL w="12240"><a:solidFill><a:srgbClr val="ffffff"/></a:solidFill></a:lnL><a:lnR w="12240"><a:solidFill><a:srgbClr val="ffffff"/></a:solidFill></a:lnR><a:lnT w="12240"><a:solidFill><a:srgbClr val="ffffff"/></a:solidFill></a:lnT><a:lnB w="12240"><a:solidFill><a:srgbClr val="ffffff"/></a:solidFill></a:lnB><a:solidFill><a:srgbClr val="d0d8e7"/></a:solidFill></a:tcPr></a:tc><a:tc rowSpan="2"><a:txBody><a:bodyPr></a:bodyPr><a:p><a:pPr><a:lnSpc><a:spcPct val="100000"/></a:lnSpc></a:pPr><a:r><a:rPr lang="fr-FR" sz="1800" spc="-1" strike="noStrike"><a:solidFill><a:srgbClr val="000000"/></a:solidFill><a:uFill><a:solidFill><a:srgbClr val="ffffff"/></a:solidFill></a:uFill><a:latin typeface="Calibri"/></a:rPr><a:t>Points-prelev(ID)</a:t></a:r><a:endParaRPr/></a:p><a:p><a:pPr><a:lnSpc><a:spcPct val="100000"/></a:lnSpc></a:pPr><a:endParaRPr/></a:p></a:txBody><a:tcPr marL="91440" marR="91440"><a:lnL w="12240"><a:solidFill><a:srgbClr val="ffffff"/></a:solidFill></a:lnL><a:lnR w="12240"><a:solidFill><a:srgbClr val="ffffff"/></a:solidFill></a:lnR><a:lnT w="12240"><a:solidFill><a:srgbClr val="ffffff"/></a:solidFill></a:lnT><a:lnB w="12240"><a:solidFill><a:srgbClr val="ffffff"/></a:solidFill></a:lnB><a:solidFill><a:srgbClr val="d0d8e7"/></a:solidFill></a:tcPr></a:tc></a:tr><a:tr h="640080"><a:tc><a:txBody><a:bodyPr></a:bodyPr><a:p><a:pPr><a:lnSpc><a:spcPct val="100000"/></a:lnSpc></a:pPr><a:r><a:rPr lang="fr-FR" sz="1800" spc="-1" strike="noStrike"><a:solidFill><a:srgbClr val="000000"/></a:solidFill><a:uFill><a:solidFill><a:srgbClr val="ffffff"/></a:solidFill></a:uFill><a:latin typeface="Calibri"/></a:rPr><a:t>Date prélèvement</a:t></a:r><a:endParaRPr/></a:p></a:txBody><a:tcPr marL="91440" marR="91440"><a:lnL w="12240"><a:solidFill><a:srgbClr val="ffffff"/></a:solidFill></a:lnL><a:lnR w="12240"><a:solidFill><a:srgbClr val="ffffff"/></a:solidFill></a:lnR><a:lnT w="12240"><a:solidFill><a:srgbClr val="ffffff"/></a:solidFill></a:lnT><a:lnB w="12240"><a:solidFill><a:srgbClr val="ffffff"/></a:solidFill></a:lnB><a:solidFill><a:srgbClr val="e9ecf3"/></a:solidFill></a:tcPr></a:tc><a:tc><a:txBody><a:bodyPr></a:bodyPr><a:p><a:pPr><a:lnSpc><a:spcPct val="100000"/></a:lnSpc></a:pPr><a:r><a:rPr lang="fr-FR" sz="1800" spc="-1" strike="noStrike"><a:solidFill><a:srgbClr val="000000"/></a:solidFill><a:uFill><a:solidFill><a:srgbClr val="ffffff"/></a:solidFill></a:uFill><a:latin typeface="Calibri"/></a:rPr><a:t>Date_prel</a:t></a:r><a:endParaRPr/></a:p></a:txBody><a:tcPr marL="91440" marR="91440"><a:lnL w="12240"><a:solidFill><a:srgbClr val="ffffff"/></a:solidFill></a:lnL><a:lnR w="12240"><a:solidFill><a:srgbClr val="ffffff"/></a:solidFill></a:lnR><a:lnT w="12240"><a:solidFill><a:srgbClr val="ffffff"/></a:solidFill></a:lnT><a:lnB w="12240"><a:solidFill><a:srgbClr val="ffffff"/></a:solidFill></a:lnB><a:solidFill><a:srgbClr val="e9ecf3"/></a:solidFill></a:tcPr></a:tc><a:tc><a:txBody><a:bodyPr></a:bodyPr><a:p><a:pPr><a:lnSpc><a:spcPct val="100000"/></a:lnSpc></a:pPr><a:r><a:rPr lang="fr-FR" sz="1800" spc="-1" strike="noStrike"><a:solidFill><a:srgbClr val="000000"/></a:solidFill><a:uFill><a:solidFill><a:srgbClr val="ffffff"/></a:solidFill></a:uFill><a:latin typeface="Calibri"/></a:rPr><a:t>Datetime</a:t></a:r><a:endParaRPr/></a:p></a:txBody><a:tcPr marL="91440" marR="91440"><a:lnL w="12240"><a:solidFill><a:srgbClr val="ffffff"/></a:solidFill></a:lnL><a:lnR w="12240"><a:solidFill><a:srgbClr val="ffffff"/></a:solidFill></a:lnR><a:lnT w="12240"><a:solidFill><a:srgbClr val="ffffff"/></a:solidFill></a:lnT><a:lnB w="12240"><a:solidFill><a:srgbClr val="ffffff"/></a:solidFill></a:lnB><a:solidFill><a:srgbClr val="e9ecf3"/></a:solidFill></a:tcPr></a:tc><a:tcPr><a:solidFill><a:srgbClr val="729fcf"/></a:solidFill></a:tcPr></a:tc><a:tcPr><a:solidFill><a:srgbClr val="729fcf"/></a:solidFill></a:tcPr></a:tc><a:tcPr><a:solidFill><a:srgbClr val="729fcf"/></a:solidFill></a:tcPr></a:tc></a:tr></a:tbl></a:graphicData></a:graphic></p:graphicFrame></p:spTree></p:cSld></p:sld>
 </file>
 
 <file path=ppt/slides/slide12.xml><?xml version="1.0" encoding="UTF-8" standalone="yes"?>
-<p:sld xmlns:a="http://schemas.openxmlformats.org/drawingml/2006/main" xmlns:p="http://schemas.openxmlformats.org/presentationml/2006/main" xmlns:r="http://schemas.openxmlformats.org/officeDocument/2006/relationships"><p:cSld><p:spTree><p:nvGrpSpPr>        <p:cNvPr id="1" name=""/>        <p:cNvGrpSpPr/>        <p:nvPr/>      </p:nvGrpSpPr>      <p:grpSpPr>        <a:xfrm>          <a:off x="0" y="0"/>          <a:ext cx="0" cy="0"/>          <a:chOff x="0" y="0"/>          <a:chExt cx="0" cy="0"/>        </a:xfrm>      </p:grpSpPr><p:sp><p:nvSpPr><p:cNvPr id="98" name="CustomShape 1"></p:cNvPr><p:cNvSpPr/><p:nvPr/></p:nvSpPr><p:spPr><a:xfrm><a:off x="457200" y="274680"/><a:ext cx="8228880" cy="1142280"/></a:xfrm><a:prstGeom prst="rect"><a:avLst></a:avLst></a:prstGeom><a:noFill/><a:ln><a:noFill/></a:ln></p:spPr><p:style><a:lnRef idx="0"/><a:fillRef idx="0"/><a:effectRef idx="0"/><a:fontRef idx="minor"/></p:style><p:txBody><a:bodyPr lIns="90000" rIns="90000" tIns="45000" bIns="45000" anchor="ctr"></a:bodyPr><a:p><a:pPr algn="ctr"><a:lnSpc><a:spcPct val="100000"/></a:lnSpc></a:pPr><a:r><a:rPr lang="fr-FR" sz="4400" spc="-1" strike="noStrike"><a:solidFill><a:srgbClr val="000000"/></a:solidFill><a:uFill><a:solidFill><a:srgbClr val="ffffff"/></a:solidFill></a:uFill><a:latin typeface="Calibri"/></a:rPr><a:t>Resultats</a:t></a:r><a:endParaRPr/></a:p></p:txBody></p:sp><p:graphicFrame><p:nvGraphicFramePr><p:cNvPr id="99" name="Table 2"/><p:cNvGraphicFramePr/><p:nvPr/></p:nvGraphicFramePr><p:xfrm><a:off x="64440" y="1556640"/><a:ext cx="8899200" cy="2815560"/></p:xfrm><a:graphic><a:graphicData uri="http://schemas.openxmlformats.org/drawingml/2006/table"><a:tbl><a:tblPr/><a:tblGrid><a:gridCol w="2114280"/><a:gridCol w="1168920"/><a:gridCol w="1152000"/><a:gridCol w="1152000"/><a:gridCol w="1080000"/><a:gridCol w="2232360"/></a:tblGrid><a:tr h="896400"><a:tc><a:txBody><a:bodyPr></a:bodyPr><a:p><a:pPr><a:lnSpc><a:spcPct val="100000"/></a:lnSpc></a:pPr><a:r><a:rPr b="1" lang="fr-FR" sz="1800" spc="-1" strike="noStrike"><a:solidFill><a:srgbClr val="ffffff"/></a:solidFill><a:uFill><a:solidFill><a:srgbClr val="ffffff"/></a:solidFill></a:uFill><a:latin typeface="Calibri"/></a:rPr><a:t>Etiquette</a:t></a:r><a:endParaRPr/></a:p></a:txBody><a:tcPr marL="91440" marR="91440"><a:lnL w="12240"><a:solidFill><a:srgbClr val="ffffff"/></a:solidFill></a:lnL><a:lnR w="12240"><a:solidFill><a:srgbClr val="ffffff"/></a:solidFill></a:lnR><a:lnT w="12240"><a:solidFill><a:srgbClr val="ffffff"/></a:solidFill></a:lnT><a:lnB w="38160"><a:solidFill><a:srgbClr val="ffffff"/></a:solidFill></a:lnB><a:solidFill><a:srgbClr val="4f81bd"/></a:solidFill></a:tcPr></a:tc><a:tc><a:txBody><a:bodyPr></a:bodyPr><a:p><a:pPr><a:lnSpc><a:spcPct val="100000"/></a:lnSpc></a:pPr><a:r><a:rPr b="1" lang="fr-FR" sz="1800" spc="-1" strike="noStrike"><a:solidFill><a:srgbClr val="ffffff"/></a:solidFill><a:uFill><a:solidFill><a:srgbClr val="ffffff"/></a:solidFill></a:uFill><a:latin typeface="Calibri"/></a:rPr><a:t>Nom de variable</a:t></a:r><a:endParaRPr/></a:p></a:txBody><a:tcPr marL="91440" marR="91440"><a:lnL w="12240"><a:solidFill><a:srgbClr val="ffffff"/></a:solidFill></a:lnL><a:lnR w="12240"><a:solidFill><a:srgbClr val="ffffff"/></a:solidFill></a:lnR><a:lnT w="12240"><a:solidFill><a:srgbClr val="ffffff"/></a:solidFill></a:lnT><a:lnB w="38160"><a:solidFill><a:srgbClr val="ffffff"/></a:solidFill></a:lnB><a:solidFill><a:srgbClr val="4f81bd"/></a:solidFill></a:tcPr></a:tc><a:tc><a:txBody><a:bodyPr></a:bodyPr><a:p><a:pPr><a:lnSpc><a:spcPct val="100000"/></a:lnSpc></a:pPr><a:r><a:rPr b="1" lang="fr-FR" sz="1800" spc="-1" strike="noStrike"><a:solidFill><a:srgbClr val="ffffff"/></a:solidFill><a:uFill><a:solidFill><a:srgbClr val="ffffff"/></a:solidFill></a:uFill><a:latin typeface="Calibri"/></a:rPr><a:t>Type</a:t></a:r><a:endParaRPr/></a:p></a:txBody><a:tcPr marL="91440" marR="91440"><a:lnL w="12240"><a:solidFill><a:srgbClr val="ffffff"/></a:solidFill></a:lnL><a:lnR w="12240"><a:solidFill><a:srgbClr val="ffffff"/></a:solidFill></a:lnR><a:lnT w="12240"><a:solidFill><a:srgbClr val="ffffff"/></a:solidFill></a:lnT><a:lnB w="38160"><a:solidFill><a:srgbClr val="ffffff"/></a:solidFill></a:lnB><a:solidFill><a:srgbClr val="4f81bd"/></a:solidFill></a:tcPr></a:tc><a:tc><a:txBody><a:bodyPr></a:bodyPr><a:p><a:pPr><a:lnSpc><a:spcPct val="100000"/></a:lnSpc></a:pPr><a:r><a:rPr b="1" lang="fr-FR" sz="1800" spc="-1" strike="noStrike"><a:solidFill><a:srgbClr val="ffffff"/></a:solidFill><a:uFill><a:solidFill><a:srgbClr val="ffffff"/></a:solidFill></a:uFill><a:latin typeface="Calibri"/></a:rPr><a:t>Table</a:t></a:r><a:endParaRPr/></a:p></a:txBody><a:tcPr marL="91440" marR="91440"><a:lnL w="12240"><a:solidFill><a:srgbClr val="ffffff"/></a:solidFill></a:lnL><a:lnR w="12240"><a:solidFill><a:srgbClr val="ffffff"/></a:solidFill></a:lnR><a:lnT w="12240"><a:solidFill><a:srgbClr val="ffffff"/></a:solidFill></a:lnT><a:lnB w="38160"><a:solidFill><a:srgbClr val="ffffff"/></a:solidFill></a:lnB><a:solidFill><a:srgbClr val="4f81bd"/></a:solidFill></a:tcPr></a:tc><a:tc><a:txBody><a:bodyPr></a:bodyPr><a:p><a:pPr><a:lnSpc><a:spcPct val="100000"/></a:lnSpc></a:pPr><a:r><a:rPr b="1" lang="fr-FR" sz="1800" spc="-1" strike="noStrike"><a:solidFill><a:srgbClr val="ffffff"/></a:solidFill><a:uFill><a:solidFill><a:srgbClr val="ffffff"/></a:solidFill></a:uFill><a:latin typeface="Calibri"/></a:rPr><a:t>Clé </a:t></a:r><a:endParaRPr/></a:p><a:p><a:pPr><a:lnSpc><a:spcPct val="100000"/></a:lnSpc></a:pPr><a:r><a:rPr b="1" lang="fr-FR" sz="1800" spc="-1" strike="noStrike"><a:solidFill><a:srgbClr val="ffffff"/></a:solidFill><a:uFill><a:solidFill><a:srgbClr val="ffffff"/></a:solidFill></a:uFill><a:latin typeface="Calibri"/></a:rPr><a:t>primaire</a:t></a:r><a:endParaRPr/></a:p></a:txBody><a:tcPr marL="91440" marR="91440"><a:lnL w="12240"><a:solidFill><a:srgbClr val="ffffff"/></a:solidFill></a:lnL><a:lnR w="12240"><a:solidFill><a:srgbClr val="ffffff"/></a:solidFill></a:lnR><a:lnT w="12240"><a:solidFill><a:srgbClr val="ffffff"/></a:solidFill></a:lnT><a:lnB w="38160"><a:solidFill><a:srgbClr val="ffffff"/></a:solidFill></a:lnB><a:solidFill><a:srgbClr val="4f81bd"/></a:solidFill></a:tcPr></a:tc><a:tc><a:txBody><a:bodyPr></a:bodyPr><a:p><a:pPr><a:lnSpc><a:spcPct val="100000"/></a:lnSpc></a:pPr><a:r><a:rPr b="1" lang="fr-FR" sz="1800" spc="-1" strike="noStrike"><a:solidFill><a:srgbClr val="ffffff"/></a:solidFill><a:uFill><a:solidFill><a:srgbClr val="ffffff"/></a:solidFill></a:uFill><a:latin typeface="Calibri"/></a:rPr><a:t>Clé étrangère</a:t></a:r><a:endParaRPr/></a:p></a:txBody><a:tcPr marL="91440" marR="91440"><a:lnL w="12240"><a:solidFill><a:srgbClr val="ffffff"/></a:solidFill></a:lnL><a:lnR w="12240"><a:solidFill><a:srgbClr val="ffffff"/></a:solidFill></a:lnR><a:lnT w="12240"><a:solidFill><a:srgbClr val="ffffff"/></a:solidFill></a:lnT><a:lnB w="38160"><a:solidFill><a:srgbClr val="ffffff"/></a:solidFill></a:lnB><a:solidFill><a:srgbClr val="4f81bd"/></a:solidFill></a:tcPr></a:tc></a:tr><a:tr h="640080"><a:tc><a:txBody><a:bodyPr></a:bodyPr><a:p><a:pPr><a:lnSpc><a:spcPct val="100000"/></a:lnSpc></a:pPr><a:r><a:rPr lang="fr-FR" sz="1800" spc="-1" strike="noStrike"><a:solidFill><a:srgbClr val="000000"/></a:solidFill><a:uFill><a:solidFill><a:srgbClr val="ffffff"/></a:solidFill></a:uFill><a:latin typeface="Calibri"/></a:rPr><a:t>Nombre microorganismes</a:t></a:r><a:endParaRPr/></a:p></a:txBody><a:tcPr marL="91440" marR="91440"><a:lnL w="12240"><a:solidFill><a:srgbClr val="ffffff"/></a:solidFill></a:lnL><a:lnR w="12240"><a:solidFill><a:srgbClr val="ffffff"/></a:solidFill></a:lnR><a:lnT w="12240"><a:solidFill><a:srgbClr val="ffffff"/></a:solidFill></a:lnT><a:lnB w="12240"><a:solidFill><a:srgbClr val="ffffff"/></a:solidFill></a:lnB><a:solidFill><a:srgbClr val="d0d8e7"/></a:solidFill></a:tcPr></a:tc><a:tc><a:txBody><a:bodyPr></a:bodyPr><a:p><a:pPr><a:lnSpc><a:spcPct val="100000"/></a:lnSpc></a:pPr><a:r><a:rPr lang="fr-FR" sz="1800" spc="-1" strike="noStrike"><a:solidFill><a:srgbClr val="000000"/></a:solidFill><a:uFill><a:solidFill><a:srgbClr val="ffffff"/></a:solidFill></a:uFill><a:latin typeface="Calibri"/></a:rPr><a:t>Nb</a:t></a:r><a:endParaRPr/></a:p></a:txBody><a:tcPr marL="91440" marR="91440"><a:lnL w="12240"><a:solidFill><a:srgbClr val="ffffff"/></a:solidFill></a:lnL><a:lnR w="12240"><a:solidFill><a:srgbClr val="ffffff"/></a:solidFill></a:lnR><a:lnT w="12240"><a:solidFill><a:srgbClr val="ffffff"/></a:solidFill></a:lnT><a:lnB w="12240"><a:solidFill><a:srgbClr val="ffffff"/></a:solidFill></a:lnB><a:solidFill><a:srgbClr val="d0d8e7"/></a:solidFill></a:tcPr></a:tc><a:tc><a:txBody><a:bodyPr></a:bodyPr><a:p><a:pPr><a:lnSpc><a:spcPct val="100000"/></a:lnSpc></a:pPr><a:r><a:rPr lang="fr-FR" sz="1800" spc="-1" strike="noStrike"><a:solidFill><a:srgbClr val="000000"/></a:solidFill><a:uFill><a:solidFill><a:srgbClr val="ffffff"/></a:solidFill></a:uFill><a:latin typeface="Calibri"/></a:rPr><a:t>Integer</a:t></a:r><a:endParaRPr/></a:p></a:txBody><a:tcPr marL="91440" marR="91440"><a:lnL w="12240"><a:solidFill><a:srgbClr val="ffffff"/></a:solidFill></a:lnL><a:lnR w="12240"><a:solidFill><a:srgbClr val="ffffff"/></a:solidFill></a:lnR><a:lnT w="12240"><a:solidFill><a:srgbClr val="ffffff"/></a:solidFill></a:lnT><a:lnB w="12240"><a:solidFill><a:srgbClr val="ffffff"/></a:solidFill></a:lnB><a:solidFill><a:srgbClr val="d0d8e7"/></a:solidFill></a:tcPr></a:tc><a:tc rowSpan="3"><a:txBody><a:bodyPr></a:bodyPr><a:p><a:pPr><a:lnSpc><a:spcPct val="100000"/></a:lnSpc></a:pPr><a:r><a:rPr lang="fr-FR" sz="1800" spc="-1" strike="noStrike"><a:solidFill><a:srgbClr val="000000"/></a:solidFill><a:uFill><a:solidFill><a:srgbClr val="ffffff"/></a:solidFill></a:uFill><a:latin typeface="Calibri"/></a:rPr><a:t>Resultats</a:t></a:r><a:endParaRPr/></a:p></a:txBody><a:tcPr marL="91440" marR="91440"><a:lnL w="12240"><a:solidFill><a:srgbClr val="ffffff"/></a:solidFill></a:lnL><a:lnR w="12240"><a:solidFill><a:srgbClr val="ffffff"/></a:solidFill></a:lnR><a:lnT w="12240"><a:solidFill><a:srgbClr val="ffffff"/></a:solidFill></a:lnT><a:lnB w="12240"><a:solidFill><a:srgbClr val="ffffff"/></a:solidFill></a:lnB><a:solidFill><a:srgbClr val="d0d8e7"/></a:solidFill></a:tcPr></a:tc><a:tc rowSpan="3"><a:txBody><a:bodyPr></a:bodyPr><a:p><a:pPr><a:lnSpc><a:spcPct val="100000"/></a:lnSpc></a:pPr><a:r><a:rPr lang="fr-FR" sz="1800" spc="-1" strike="noStrike"><a:solidFill><a:srgbClr val="000000"/></a:solidFill><a:uFill><a:solidFill><a:srgbClr val="ffffff"/></a:solidFill></a:uFill><a:latin typeface="Calibri"/></a:rPr><a:t>ID</a:t></a:r><a:endParaRPr/></a:p></a:txBody><a:tcPr marL="91440" marR="91440"><a:lnL w="12240"><a:solidFill><a:srgbClr val="ffffff"/></a:solidFill></a:lnL><a:lnR w="12240"><a:solidFill><a:srgbClr val="ffffff"/></a:solidFill></a:lnR><a:lnT w="12240"><a:solidFill><a:srgbClr val="ffffff"/></a:solidFill></a:lnT><a:lnB w="12240"><a:solidFill><a:srgbClr val="ffffff"/></a:solidFill></a:lnB><a:solidFill><a:srgbClr val="d0d8e7"/></a:solidFill></a:tcPr></a:tc><a:tc rowSpan="3"><a:txBody><a:bodyPr></a:bodyPr><a:p><a:pPr><a:lnSpc><a:spcPct val="100000"/></a:lnSpc></a:pPr><a:r><a:rPr lang="fr-FR" sz="1800" spc="-1" strike="noStrike"><a:solidFill><a:srgbClr val="000000"/></a:solidFill><a:uFill><a:solidFill><a:srgbClr val="ffffff"/></a:solidFill></a:uFill><a:latin typeface="Calibri"/></a:rPr><a:t>Prélèvements(ID)</a:t></a:r><a:endParaRPr/></a:p><a:p><a:pPr><a:lnSpc><a:spcPct val="100000"/></a:lnSpc></a:pPr><a:endParaRPr/></a:p></a:txBody><a:tcPr marL="91440" marR="91440"><a:lnL w="12240"><a:solidFill><a:srgbClr val="ffffff"/></a:solidFill></a:lnL><a:lnR w="12240"><a:solidFill><a:srgbClr val="ffffff"/></a:solidFill></a:lnR><a:lnT w="12240"><a:solidFill><a:srgbClr val="ffffff"/></a:solidFill></a:lnT><a:lnB w="12240"><a:solidFill><a:srgbClr val="ffffff"/></a:solidFill></a:lnB><a:solidFill><a:srgbClr val="d0d8e7"/></a:solidFill></a:tcPr></a:tc></a:tr><a:tr h="639360"><a:tc><a:txBody><a:bodyPr></a:bodyPr><a:p><a:pPr><a:lnSpc><a:spcPct val="100000"/></a:lnSpc></a:pPr><a:r><a:rPr lang="fr-FR" sz="1800" spc="-1" strike="noStrike"><a:solidFill><a:srgbClr val="000000"/></a:solidFill><a:uFill><a:solidFill><a:srgbClr val="ffffff"/></a:solidFill></a:uFill><a:latin typeface="Calibri"/></a:rPr><a:t>Date résultat</a:t></a:r><a:endParaRPr/></a:p></a:txBody><a:tcPr marL="91440" marR="91440"><a:lnL w="12240"><a:solidFill><a:srgbClr val="ffffff"/></a:solidFill></a:lnL><a:lnR w="12240"><a:solidFill><a:srgbClr val="ffffff"/></a:solidFill></a:lnR><a:lnT w="12240"><a:solidFill><a:srgbClr val="ffffff"/></a:solidFill></a:lnT><a:lnB w="12240"><a:solidFill><a:srgbClr val="ffffff"/></a:solidFill></a:lnB><a:solidFill><a:srgbClr val="e9ecf3"/></a:solidFill></a:tcPr></a:tc><a:tc><a:txBody><a:bodyPr></a:bodyPr><a:p><a:pPr><a:lnSpc><a:spcPct val="100000"/></a:lnSpc></a:pPr><a:r><a:rPr lang="fr-FR" sz="1800" spc="-1" strike="noStrike"><a:solidFill><a:srgbClr val="000000"/></a:solidFill><a:uFill><a:solidFill><a:srgbClr val="ffffff"/></a:solidFill></a:uFill><a:latin typeface="Calibri"/></a:rPr><a:t>Date_res</a:t></a:r><a:endParaRPr/></a:p></a:txBody><a:tcPr marL="91440" marR="91440"><a:lnL w="12240"><a:solidFill><a:srgbClr val="ffffff"/></a:solidFill></a:lnL><a:lnR w="12240"><a:solidFill><a:srgbClr val="ffffff"/></a:solidFill></a:lnR><a:lnT w="12240"><a:solidFill><a:srgbClr val="ffffff"/></a:solidFill></a:lnT><a:lnB w="12240"><a:solidFill><a:srgbClr val="ffffff"/></a:solidFill></a:lnB><a:solidFill><a:srgbClr val="e9ecf3"/></a:solidFill></a:tcPr></a:tc><a:tc><a:txBody><a:bodyPr></a:bodyPr><a:p><a:pPr><a:lnSpc><a:spcPct val="100000"/></a:lnSpc></a:pPr><a:r><a:rPr lang="fr-FR" sz="1800" spc="-1" strike="noStrike"><a:solidFill><a:srgbClr val="000000"/></a:solidFill><a:uFill><a:solidFill><a:srgbClr val="ffffff"/></a:solidFill></a:uFill><a:latin typeface="Calibri"/></a:rPr><a:t>Datetime</a:t></a:r><a:endParaRPr/></a:p></a:txBody><a:tcPr marL="91440" marR="91440"><a:lnL w="12240"><a:solidFill><a:srgbClr val="ffffff"/></a:solidFill></a:lnL><a:lnR w="12240"><a:solidFill><a:srgbClr val="ffffff"/></a:solidFill></a:lnR><a:lnT w="12240"><a:solidFill><a:srgbClr val="ffffff"/></a:solidFill></a:lnT><a:lnB w="12240"><a:solidFill><a:srgbClr val="ffffff"/></a:solidFill></a:lnB><a:solidFill><a:srgbClr val="e9ecf3"/></a:solidFill></a:tcPr></a:tc><a:tc vMerge="1"><a:tcPr><a:solidFill><a:srgbClr val="729fcf"/></a:solidFill></a:tcPr></a:tc><a:tc vMerge="1"><a:tcPr><a:solidFill><a:srgbClr val="729fcf"/></a:solidFill></a:tcPr></a:tc><a:tc vMerge="1"><a:tcPr><a:solidFill><a:srgbClr val="729fcf"/></a:solidFill></a:tcPr></a:tc></a:tr><a:tr h="640080"><a:tc><a:txBody><a:bodyPr></a:bodyPr><a:p><a:r><a:rPr lang="fr-FR" sz="1800" spc="-1" strike="noStrike"><a:uFill><a:solidFill><a:srgbClr val="ffffff"/></a:solidFill></a:uFill><a:latin typeface="Calibri"/></a:rPr><a:t>Micro-organisme</a:t></a:r><a:endParaRPr/></a:p></a:txBody><a:tcPr marL="91440" marR="91440"><a:lnL w="12240"><a:solidFill><a:srgbClr val="ffffff"/></a:solidFill></a:lnL><a:lnR w="12240"><a:solidFill><a:srgbClr val="ffffff"/></a:solidFill></a:lnR><a:lnT w="12240"><a:solidFill><a:srgbClr val="ffffff"/></a:solidFill></a:lnT><a:lnB w="12240"><a:solidFill><a:srgbClr val="ffffff"/></a:solidFill></a:lnB><a:solidFill><a:srgbClr val="e9ecf3"/></a:solidFill></a:tcPr></a:tc><a:tc><a:txBody><a:bodyPr></a:bodyPr><a:p><a:r><a:rPr lang="fr-FR" sz="1800" spc="-1" strike="noStrike"><a:uFill><a:solidFill><a:srgbClr val="ffffff"/></a:solidFill></a:uFill><a:latin typeface="Calibri"/></a:rPr><a:t>micro</a:t></a:r><a:endParaRPr/></a:p></a:txBody><a:tcPr marL="91440" marR="91440"><a:lnL w="12240"><a:solidFill><a:srgbClr val="ffffff"/></a:solidFill></a:lnL><a:lnR w="12240"><a:solidFill><a:srgbClr val="ffffff"/></a:solidFill></a:lnR><a:lnT w="12240"><a:solidFill><a:srgbClr val="ffffff"/></a:solidFill></a:lnT><a:lnB w="12240"><a:solidFill><a:srgbClr val="ffffff"/></a:solidFill></a:lnB><a:solidFill><a:srgbClr val="e9ecf3"/></a:solidFill></a:tcPr></a:tc><a:tc><a:txBody><a:bodyPr></a:bodyPr><a:p><a:r><a:rPr lang="fr-FR" sz="1800" spc="-1" strike="noStrike"><a:solidFill><a:srgbClr val="000000"/></a:solidFill><a:uFill><a:solidFill><a:srgbClr val="ffffff"/></a:solidFill></a:uFill><a:latin typeface="Calibri"/><a:ea typeface="Droid Sans Fallback"/></a:rPr><a:t>text</a:t></a:r><a:endParaRPr/></a:p></a:txBody><a:tcPr marL="91440" marR="91440"><a:lnL w="12240"><a:solidFill><a:srgbClr val="ffffff"/></a:solidFill></a:lnL><a:lnR w="12240"><a:solidFill><a:srgbClr val="ffffff"/></a:solidFill></a:lnR><a:lnT w="12240"><a:solidFill><a:srgbClr val="ffffff"/></a:solidFill></a:lnT><a:lnB w="12240"><a:solidFill><a:srgbClr val="ffffff"/></a:solidFill></a:lnB><a:solidFill><a:srgbClr val="e9ecf3"/></a:solidFill></a:tcPr></a:tc><a:tcPr><a:solidFill><a:srgbClr val="729fcf"/></a:solidFill></a:tcPr></a:tc><a:tcPr><a:solidFill><a:srgbClr val="729fcf"/></a:solidFill></a:tcPr></a:tc><a:tcPr><a:solidFill><a:srgbClr val="729fcf"/></a:solidFill></a:tcPr></a:tc></a:tr></a:tbl></a:graphicData></a:graphic></p:graphicFrame></p:spTree></p:cSld><p:timing><p:tnLst><p:par><p:cTn id="23" dur="indefinite" restart="never" nodeType="tmRoot"><p:childTnLst><p:seq><p:cTn id="24" nodeType="mainSeq"></p:cTn><p:prevCondLst><p:cond delay="0" evt="onPrev"><p:tgtEl><p:sldTgt/></p:tgtEl></p:cond></p:prevCondLst><p:nextCondLst><p:cond delay="0" evt="onNext"><p:tgtEl><p:sldTgt/></p:tgtEl></p:cond></p:nextCondLst></p:seq></p:childTnLst></p:cTn></p:par></p:tnLst></p:timing></p:sld>
+<p:sld xmlns:a="http://schemas.openxmlformats.org/drawingml/2006/main" xmlns:p="http://schemas.openxmlformats.org/presentationml/2006/main" xmlns:r="http://schemas.openxmlformats.org/officeDocument/2006/relationships"><p:cSld><p:spTree><p:nvGrpSpPr>        <p:cNvPr id="1" name=""/>        <p:cNvGrpSpPr/>        <p:nvPr/>      </p:nvGrpSpPr>      <p:grpSpPr>        <a:xfrm>          <a:off x="0" y="0"/>          <a:ext cx="0" cy="0"/>          <a:chOff x="0" y="0"/>          <a:chExt cx="0" cy="0"/>        </a:xfrm>      </p:grpSpPr><p:sp><p:nvSpPr><p:cNvPr id="97" name="CustomShape 1"></p:cNvPr><p:cNvSpPr/><p:nvPr/></p:nvSpPr><p:spPr><a:xfrm><a:off x="457200" y="274680"/><a:ext cx="8228520" cy="1141920"/></a:xfrm><a:prstGeom prst="rect"><a:avLst></a:avLst></a:prstGeom><a:noFill/><a:ln><a:noFill/></a:ln></p:spPr><p:style><a:lnRef idx="0"></a:lnRef><a:fillRef idx="0"/><a:effectRef idx="0"></a:effectRef><a:fontRef idx="minor"/></p:style><p:txBody><a:bodyPr lIns="90000" rIns="90000" tIns="45000" bIns="45000" anchor="ctr"></a:bodyPr><a:p><a:pPr algn="ctr"><a:lnSpc><a:spcPct val="100000"/></a:lnSpc></a:pPr><a:r><a:rPr lang="fr-FR" sz="4400" spc="-1" strike="noStrike"><a:solidFill><a:srgbClr val="000000"/></a:solidFill><a:uFill><a:solidFill><a:srgbClr val="ffffff"/></a:solidFill></a:uFill><a:latin typeface="Calibri"/><a:ea typeface="DejaVu Sans"/></a:rPr><a:t>Resultats</a:t></a:r><a:endParaRPr/></a:p></p:txBody></p:sp><p:graphicFrame><p:nvGraphicFramePr><p:cNvPr id="98" name="Table 2"/><p:cNvGraphicFramePr/><p:nvPr/></p:nvGraphicFramePr><p:xfrm><a:off x="64440" y="1556640"/><a:ext cx="8899200" cy="2815560"/></p:xfrm><a:graphic><a:graphicData uri="http://schemas.openxmlformats.org/drawingml/2006/table"><a:tbl><a:tblPr/><a:tblGrid><a:gridCol w="2114280"/><a:gridCol w="1168920"/><a:gridCol w="1152000"/><a:gridCol w="1152000"/><a:gridCol w="1080000"/><a:gridCol w="2232360"/></a:tblGrid><a:tr h="896400"><a:tc><a:txBody><a:bodyPr></a:bodyPr><a:p><a:pPr><a:lnSpc><a:spcPct val="100000"/></a:lnSpc></a:pPr><a:r><a:rPr b="1" lang="fr-FR" sz="1800" spc="-1" strike="noStrike"><a:solidFill><a:srgbClr val="ffffff"/></a:solidFill><a:uFill><a:solidFill><a:srgbClr val="ffffff"/></a:solidFill></a:uFill><a:latin typeface="Calibri"/></a:rPr><a:t>Etiquette</a:t></a:r><a:endParaRPr/></a:p></a:txBody><a:tcPr marL="91440" marR="91440"><a:lnL w="12240"><a:solidFill><a:srgbClr val="ffffff"/></a:solidFill></a:lnL><a:lnR w="12240"><a:solidFill><a:srgbClr val="ffffff"/></a:solidFill></a:lnR><a:lnT w="12240"><a:solidFill><a:srgbClr val="ffffff"/></a:solidFill></a:lnT><a:lnB w="38160"><a:solidFill><a:srgbClr val="ffffff"/></a:solidFill></a:lnB><a:solidFill><a:srgbClr val="4f81bd"/></a:solidFill></a:tcPr></a:tc><a:tc><a:txBody><a:bodyPr></a:bodyPr><a:p><a:pPr><a:lnSpc><a:spcPct val="100000"/></a:lnSpc></a:pPr><a:r><a:rPr b="1" lang="fr-FR" sz="1800" spc="-1" strike="noStrike"><a:solidFill><a:srgbClr val="ffffff"/></a:solidFill><a:uFill><a:solidFill><a:srgbClr val="ffffff"/></a:solidFill></a:uFill><a:latin typeface="Calibri"/></a:rPr><a:t>Nom de variable</a:t></a:r><a:endParaRPr/></a:p></a:txBody><a:tcPr marL="91440" marR="91440"><a:lnL w="12240"><a:solidFill><a:srgbClr val="ffffff"/></a:solidFill></a:lnL><a:lnR w="12240"><a:solidFill><a:srgbClr val="ffffff"/></a:solidFill></a:lnR><a:lnT w="12240"><a:solidFill><a:srgbClr val="ffffff"/></a:solidFill></a:lnT><a:lnB w="38160"><a:solidFill><a:srgbClr val="ffffff"/></a:solidFill></a:lnB><a:solidFill><a:srgbClr val="4f81bd"/></a:solidFill></a:tcPr></a:tc><a:tc><a:txBody><a:bodyPr></a:bodyPr><a:p><a:pPr><a:lnSpc><a:spcPct val="100000"/></a:lnSpc></a:pPr><a:r><a:rPr b="1" lang="fr-FR" sz="1800" spc="-1" strike="noStrike"><a:solidFill><a:srgbClr val="ffffff"/></a:solidFill><a:uFill><a:solidFill><a:srgbClr val="ffffff"/></a:solidFill></a:uFill><a:latin typeface="Calibri"/></a:rPr><a:t>Type</a:t></a:r><a:endParaRPr/></a:p></a:txBody><a:tcPr marL="91440" marR="91440"><a:lnL w="12240"><a:solidFill><a:srgbClr val="ffffff"/></a:solidFill></a:lnL><a:lnR w="12240"><a:solidFill><a:srgbClr val="ffffff"/></a:solidFill></a:lnR><a:lnT w="12240"><a:solidFill><a:srgbClr val="ffffff"/></a:solidFill></a:lnT><a:lnB w="38160"><a:solidFill><a:srgbClr val="ffffff"/></a:solidFill></a:lnB><a:solidFill><a:srgbClr val="4f81bd"/></a:solidFill></a:tcPr></a:tc><a:tc><a:txBody><a:bodyPr></a:bodyPr><a:p><a:pPr><a:lnSpc><a:spcPct val="100000"/></a:lnSpc></a:pPr><a:r><a:rPr b="1" lang="fr-FR" sz="1800" spc="-1" strike="noStrike"><a:solidFill><a:srgbClr val="ffffff"/></a:solidFill><a:uFill><a:solidFill><a:srgbClr val="ffffff"/></a:solidFill></a:uFill><a:latin typeface="Calibri"/></a:rPr><a:t>Table</a:t></a:r><a:endParaRPr/></a:p></a:txBody><a:tcPr marL="91440" marR="91440"><a:lnL w="12240"><a:solidFill><a:srgbClr val="ffffff"/></a:solidFill></a:lnL><a:lnR w="12240"><a:solidFill><a:srgbClr val="ffffff"/></a:solidFill></a:lnR><a:lnT w="12240"><a:solidFill><a:srgbClr val="ffffff"/></a:solidFill></a:lnT><a:lnB w="38160"><a:solidFill><a:srgbClr val="ffffff"/></a:solidFill></a:lnB><a:solidFill><a:srgbClr val="4f81bd"/></a:solidFill></a:tcPr></a:tc><a:tc><a:txBody><a:bodyPr></a:bodyPr><a:p><a:pPr><a:lnSpc><a:spcPct val="100000"/></a:lnSpc></a:pPr><a:r><a:rPr b="1" lang="fr-FR" sz="1800" spc="-1" strike="noStrike"><a:solidFill><a:srgbClr val="ffffff"/></a:solidFill><a:uFill><a:solidFill><a:srgbClr val="ffffff"/></a:solidFill></a:uFill><a:latin typeface="Calibri"/></a:rPr><a:t>Clé </a:t></a:r><a:endParaRPr/></a:p><a:p><a:pPr><a:lnSpc><a:spcPct val="100000"/></a:lnSpc></a:pPr><a:r><a:rPr b="1" lang="fr-FR" sz="1800" spc="-1" strike="noStrike"><a:solidFill><a:srgbClr val="ffffff"/></a:solidFill><a:uFill><a:solidFill><a:srgbClr val="ffffff"/></a:solidFill></a:uFill><a:latin typeface="Calibri"/></a:rPr><a:t>primaire</a:t></a:r><a:endParaRPr/></a:p></a:txBody><a:tcPr marL="91440" marR="91440"><a:lnL w="12240"><a:solidFill><a:srgbClr val="ffffff"/></a:solidFill></a:lnL><a:lnR w="12240"><a:solidFill><a:srgbClr val="ffffff"/></a:solidFill></a:lnR><a:lnT w="12240"><a:solidFill><a:srgbClr val="ffffff"/></a:solidFill></a:lnT><a:lnB w="38160"><a:solidFill><a:srgbClr val="ffffff"/></a:solidFill></a:lnB><a:solidFill><a:srgbClr val="4f81bd"/></a:solidFill></a:tcPr></a:tc><a:tc><a:txBody><a:bodyPr></a:bodyPr><a:p><a:pPr><a:lnSpc><a:spcPct val="100000"/></a:lnSpc></a:pPr><a:r><a:rPr b="1" lang="fr-FR" sz="1800" spc="-1" strike="noStrike"><a:solidFill><a:srgbClr val="ffffff"/></a:solidFill><a:uFill><a:solidFill><a:srgbClr val="ffffff"/></a:solidFill></a:uFill><a:latin typeface="Calibri"/></a:rPr><a:t>Clé étrangère</a:t></a:r><a:endParaRPr/></a:p></a:txBody><a:tcPr marL="91440" marR="91440"><a:lnL w="12240"><a:solidFill><a:srgbClr val="ffffff"/></a:solidFill></a:lnL><a:lnR w="12240"><a:solidFill><a:srgbClr val="ffffff"/></a:solidFill></a:lnR><a:lnT w="12240"><a:solidFill><a:srgbClr val="ffffff"/></a:solidFill></a:lnT><a:lnB w="38160"><a:solidFill><a:srgbClr val="ffffff"/></a:solidFill></a:lnB><a:solidFill><a:srgbClr val="4f81bd"/></a:solidFill></a:tcPr></a:tc></a:tr><a:tr h="640080"><a:tc><a:txBody><a:bodyPr></a:bodyPr><a:p><a:pPr><a:lnSpc><a:spcPct val="100000"/></a:lnSpc></a:pPr><a:r><a:rPr lang="fr-FR" sz="1800" spc="-1" strike="noStrike"><a:solidFill><a:srgbClr val="000000"/></a:solidFill><a:uFill><a:solidFill><a:srgbClr val="ffffff"/></a:solidFill></a:uFill><a:latin typeface="Calibri"/></a:rPr><a:t>Nombre microorganismes</a:t></a:r><a:endParaRPr/></a:p></a:txBody><a:tcPr marL="91440" marR="91440"><a:lnL w="12240"><a:solidFill><a:srgbClr val="ffffff"/></a:solidFill></a:lnL><a:lnR w="12240"><a:solidFill><a:srgbClr val="ffffff"/></a:solidFill></a:lnR><a:lnT w="12240"><a:solidFill><a:srgbClr val="ffffff"/></a:solidFill></a:lnT><a:lnB w="12240"><a:solidFill><a:srgbClr val="ffffff"/></a:solidFill></a:lnB><a:solidFill><a:srgbClr val="d0d8e7"/></a:solidFill></a:tcPr></a:tc><a:tc><a:txBody><a:bodyPr></a:bodyPr><a:p><a:pPr><a:lnSpc><a:spcPct val="100000"/></a:lnSpc></a:pPr><a:r><a:rPr lang="fr-FR" sz="1800" spc="-1" strike="noStrike"><a:solidFill><a:srgbClr val="000000"/></a:solidFill><a:uFill><a:solidFill><a:srgbClr val="ffffff"/></a:solidFill></a:uFill><a:latin typeface="Calibri"/></a:rPr><a:t>Nb</a:t></a:r><a:endParaRPr/></a:p></a:txBody><a:tcPr marL="91440" marR="91440"><a:lnL w="12240"><a:solidFill><a:srgbClr val="ffffff"/></a:solidFill></a:lnL><a:lnR w="12240"><a:solidFill><a:srgbClr val="ffffff"/></a:solidFill></a:lnR><a:lnT w="12240"><a:solidFill><a:srgbClr val="ffffff"/></a:solidFill></a:lnT><a:lnB w="12240"><a:solidFill><a:srgbClr val="ffffff"/></a:solidFill></a:lnB><a:solidFill><a:srgbClr val="d0d8e7"/></a:solidFill></a:tcPr></a:tc><a:tc><a:txBody><a:bodyPr></a:bodyPr><a:p><a:pPr><a:lnSpc><a:spcPct val="100000"/></a:lnSpc></a:pPr><a:r><a:rPr lang="fr-FR" sz="1800" spc="-1" strike="noStrike"><a:solidFill><a:srgbClr val="000000"/></a:solidFill><a:uFill><a:solidFill><a:srgbClr val="ffffff"/></a:solidFill></a:uFill><a:latin typeface="Calibri"/></a:rPr><a:t>Integer</a:t></a:r><a:endParaRPr/></a:p></a:txBody><a:tcPr marL="91440" marR="91440"><a:lnL w="12240"><a:solidFill><a:srgbClr val="ffffff"/></a:solidFill></a:lnL><a:lnR w="12240"><a:solidFill><a:srgbClr val="ffffff"/></a:solidFill></a:lnR><a:lnT w="12240"><a:solidFill><a:srgbClr val="ffffff"/></a:solidFill></a:lnT><a:lnB w="12240"><a:solidFill><a:srgbClr val="ffffff"/></a:solidFill></a:lnB><a:solidFill><a:srgbClr val="d0d8e7"/></a:solidFill></a:tcPr></a:tc><a:tc rowSpan="3"><a:txBody><a:bodyPr></a:bodyPr><a:p><a:pPr><a:lnSpc><a:spcPct val="100000"/></a:lnSpc></a:pPr><a:r><a:rPr lang="fr-FR" sz="1800" spc="-1" strike="noStrike"><a:solidFill><a:srgbClr val="000000"/></a:solidFill><a:uFill><a:solidFill><a:srgbClr val="ffffff"/></a:solidFill></a:uFill><a:latin typeface="Calibri"/></a:rPr><a:t>Resultats</a:t></a:r><a:endParaRPr/></a:p></a:txBody><a:tcPr marL="91440" marR="91440"><a:lnL w="12240"><a:solidFill><a:srgbClr val="ffffff"/></a:solidFill></a:lnL><a:lnR w="12240"><a:solidFill><a:srgbClr val="ffffff"/></a:solidFill></a:lnR><a:lnT w="12240"><a:solidFill><a:srgbClr val="ffffff"/></a:solidFill></a:lnT><a:lnB w="12240"><a:solidFill><a:srgbClr val="ffffff"/></a:solidFill></a:lnB><a:solidFill><a:srgbClr val="d0d8e7"/></a:solidFill></a:tcPr></a:tc><a:tc rowSpan="3"><a:txBody><a:bodyPr></a:bodyPr><a:p><a:pPr><a:lnSpc><a:spcPct val="100000"/></a:lnSpc></a:pPr><a:r><a:rPr lang="fr-FR" sz="1800" spc="-1" strike="noStrike"><a:solidFill><a:srgbClr val="000000"/></a:solidFill><a:uFill><a:solidFill><a:srgbClr val="ffffff"/></a:solidFill></a:uFill><a:latin typeface="Calibri"/></a:rPr><a:t>ID</a:t></a:r><a:endParaRPr/></a:p></a:txBody><a:tcPr marL="91440" marR="91440"><a:lnL w="12240"><a:solidFill><a:srgbClr val="ffffff"/></a:solidFill></a:lnL><a:lnR w="12240"><a:solidFill><a:srgbClr val="ffffff"/></a:solidFill></a:lnR><a:lnT w="12240"><a:solidFill><a:srgbClr val="ffffff"/></a:solidFill></a:lnT><a:lnB w="12240"><a:solidFill><a:srgbClr val="ffffff"/></a:solidFill></a:lnB><a:solidFill><a:srgbClr val="d0d8e7"/></a:solidFill></a:tcPr></a:tc><a:tc rowSpan="3"><a:txBody><a:bodyPr></a:bodyPr><a:p><a:pPr><a:lnSpc><a:spcPct val="100000"/></a:lnSpc></a:pPr><a:r><a:rPr lang="fr-FR" sz="1800" spc="-1" strike="noStrike"><a:solidFill><a:srgbClr val="000000"/></a:solidFill><a:uFill><a:solidFill><a:srgbClr val="ffffff"/></a:solidFill></a:uFill><a:latin typeface="Calibri"/></a:rPr><a:t>Prélèvements(ID)</a:t></a:r><a:endParaRPr/></a:p><a:p><a:pPr><a:lnSpc><a:spcPct val="100000"/></a:lnSpc></a:pPr><a:endParaRPr/></a:p></a:txBody><a:tcPr marL="91440" marR="91440"><a:lnL w="12240"><a:solidFill><a:srgbClr val="ffffff"/></a:solidFill></a:lnL><a:lnR w="12240"><a:solidFill><a:srgbClr val="ffffff"/></a:solidFill></a:lnR><a:lnT w="12240"><a:solidFill><a:srgbClr val="ffffff"/></a:solidFill></a:lnT><a:lnB w="12240"><a:solidFill><a:srgbClr val="ffffff"/></a:solidFill></a:lnB><a:solidFill><a:srgbClr val="d0d8e7"/></a:solidFill></a:tcPr></a:tc></a:tr><a:tr h="639360"><a:tc><a:txBody><a:bodyPr></a:bodyPr><a:p><a:pPr><a:lnSpc><a:spcPct val="100000"/></a:lnSpc></a:pPr><a:r><a:rPr lang="fr-FR" sz="1800" spc="-1" strike="noStrike"><a:solidFill><a:srgbClr val="000000"/></a:solidFill><a:uFill><a:solidFill><a:srgbClr val="ffffff"/></a:solidFill></a:uFill><a:latin typeface="Calibri"/></a:rPr><a:t>Date résultat</a:t></a:r><a:endParaRPr/></a:p></a:txBody><a:tcPr marL="91440" marR="91440"><a:lnL w="12240"><a:solidFill><a:srgbClr val="ffffff"/></a:solidFill></a:lnL><a:lnR w="12240"><a:solidFill><a:srgbClr val="ffffff"/></a:solidFill></a:lnR><a:lnT w="12240"><a:solidFill><a:srgbClr val="ffffff"/></a:solidFill></a:lnT><a:lnB w="12240"><a:solidFill><a:srgbClr val="ffffff"/></a:solidFill></a:lnB><a:solidFill><a:srgbClr val="e9ecf3"/></a:solidFill></a:tcPr></a:tc><a:tc><a:txBody><a:bodyPr></a:bodyPr><a:p><a:pPr><a:lnSpc><a:spcPct val="100000"/></a:lnSpc></a:pPr><a:r><a:rPr lang="fr-FR" sz="1800" spc="-1" strike="noStrike"><a:solidFill><a:srgbClr val="000000"/></a:solidFill><a:uFill><a:solidFill><a:srgbClr val="ffffff"/></a:solidFill></a:uFill><a:latin typeface="Calibri"/></a:rPr><a:t>Date_res</a:t></a:r><a:endParaRPr/></a:p></a:txBody><a:tcPr marL="91440" marR="91440"><a:lnL w="12240"><a:solidFill><a:srgbClr val="ffffff"/></a:solidFill></a:lnL><a:lnR w="12240"><a:solidFill><a:srgbClr val="ffffff"/></a:solidFill></a:lnR><a:lnT w="12240"><a:solidFill><a:srgbClr val="ffffff"/></a:solidFill></a:lnT><a:lnB w="12240"><a:solidFill><a:srgbClr val="ffffff"/></a:solidFill></a:lnB><a:solidFill><a:srgbClr val="e9ecf3"/></a:solidFill></a:tcPr></a:tc><a:tc><a:txBody><a:bodyPr></a:bodyPr><a:p><a:pPr><a:lnSpc><a:spcPct val="100000"/></a:lnSpc></a:pPr><a:r><a:rPr lang="fr-FR" sz="1800" spc="-1" strike="noStrike"><a:solidFill><a:srgbClr val="000000"/></a:solidFill><a:uFill><a:solidFill><a:srgbClr val="ffffff"/></a:solidFill></a:uFill><a:latin typeface="Calibri"/></a:rPr><a:t>Datetime</a:t></a:r><a:endParaRPr/></a:p></a:txBody><a:tcPr marL="91440" marR="91440"><a:lnL w="12240"><a:solidFill><a:srgbClr val="ffffff"/></a:solidFill></a:lnL><a:lnR w="12240"><a:solidFill><a:srgbClr val="ffffff"/></a:solidFill></a:lnR><a:lnT w="12240"><a:solidFill><a:srgbClr val="ffffff"/></a:solidFill></a:lnT><a:lnB w="12240"><a:solidFill><a:srgbClr val="ffffff"/></a:solidFill></a:lnB><a:solidFill><a:srgbClr val="e9ecf3"/></a:solidFill></a:tcPr></a:tc><a:tc vMerge="1"><a:tcPr><a:solidFill><a:srgbClr val="729fcf"/></a:solidFill></a:tcPr></a:tc><a:tc vMerge="1"><a:tcPr><a:solidFill><a:srgbClr val="729fcf"/></a:solidFill></a:tcPr></a:tc><a:tc vMerge="1"><a:tcPr><a:solidFill><a:srgbClr val="729fcf"/></a:solidFill></a:tcPr></a:tc></a:tr><a:tr h="640080"><a:tc><a:txBody><a:bodyPr></a:bodyPr><a:p><a:r><a:rPr lang="fr-FR" sz="1800" spc="-1" strike="noStrike"><a:uFill><a:solidFill><a:srgbClr val="ffffff"/></a:solidFill></a:uFill><a:latin typeface="Calibri"/></a:rPr><a:t>Micro-organisme</a:t></a:r><a:endParaRPr/></a:p></a:txBody><a:tcPr marL="91440" marR="91440"><a:lnL w="12240"><a:solidFill><a:srgbClr val="ffffff"/></a:solidFill></a:lnL><a:lnR w="12240"><a:solidFill><a:srgbClr val="ffffff"/></a:solidFill></a:lnR><a:lnT w="12240"><a:solidFill><a:srgbClr val="ffffff"/></a:solidFill></a:lnT><a:lnB w="12240"><a:solidFill><a:srgbClr val="ffffff"/></a:solidFill></a:lnB><a:solidFill><a:srgbClr val="e9ecf3"/></a:solidFill></a:tcPr></a:tc><a:tc><a:txBody><a:bodyPr></a:bodyPr><a:p><a:r><a:rPr lang="fr-FR" sz="1800" spc="-1" strike="noStrike"><a:uFill><a:solidFill><a:srgbClr val="ffffff"/></a:solidFill></a:uFill><a:latin typeface="Calibri"/></a:rPr><a:t>micro</a:t></a:r><a:endParaRPr/></a:p></a:txBody><a:tcPr marL="91440" marR="91440"><a:lnL w="12240"><a:solidFill><a:srgbClr val="ffffff"/></a:solidFill></a:lnL><a:lnR w="12240"><a:solidFill><a:srgbClr val="ffffff"/></a:solidFill></a:lnR><a:lnT w="12240"><a:solidFill><a:srgbClr val="ffffff"/></a:solidFill></a:lnT><a:lnB w="12240"><a:solidFill><a:srgbClr val="ffffff"/></a:solidFill></a:lnB><a:solidFill><a:srgbClr val="e9ecf3"/></a:solidFill></a:tcPr></a:tc><a:tc><a:txBody><a:bodyPr></a:bodyPr><a:p><a:r><a:rPr lang="fr-FR" sz="1800" spc="-1" strike="noStrike"><a:solidFill><a:srgbClr val="000000"/></a:solidFill><a:uFill><a:solidFill><a:srgbClr val="ffffff"/></a:solidFill></a:uFill><a:latin typeface="Calibri"/><a:ea typeface="Droid Sans Fallback"/></a:rPr><a:t>text</a:t></a:r><a:endParaRPr/></a:p></a:txBody><a:tcPr marL="91440" marR="91440"><a:lnL w="12240"><a:solidFill><a:srgbClr val="ffffff"/></a:solidFill></a:lnL><a:lnR w="12240"><a:solidFill><a:srgbClr val="ffffff"/></a:solidFill></a:lnR><a:lnT w="12240"><a:solidFill><a:srgbClr val="ffffff"/></a:solidFill></a:lnT><a:lnB w="12240"><a:solidFill><a:srgbClr val="ffffff"/></a:solidFill></a:lnB><a:solidFill><a:srgbClr val="e9ecf3"/></a:solidFill></a:tcPr></a:tc><a:tcPr><a:solidFill><a:srgbClr val="729fcf"/></a:solidFill></a:tcPr></a:tc><a:tcPr><a:solidFill><a:srgbClr val="729fcf"/></a:solidFill></a:tcPr></a:tc><a:tcPr><a:solidFill><a:srgbClr val="729fcf"/></a:solidFill></a:tcPr></a:tc></a:tr></a:tbl></a:graphicData></a:graphic></p:graphicFrame></p:spTree></p:cSld></p:sld>
 </file>
 
 <file path=ppt/slides/slide13.xml><?xml version="1.0" encoding="utf-8"?>
@@ -3858,14 +3836,14 @@
       </p:grpSpPr>
       <p:sp>
         <p:nvSpPr>
-          <p:cNvPr id="100" name="CustomShape 1"/>
+          <p:cNvPr id="99" name="CustomShape 1"/>
           <p:cNvSpPr/>
           <p:nvPr/>
         </p:nvSpPr>
         <p:spPr>
           <a:xfrm>
             <a:off x="395640" y="201600"/>
-            <a:ext cx="7704000" cy="631080"/>
+            <a:ext cx="7703640" cy="630720"/>
           </a:xfrm>
           <a:prstGeom prst="rect">
             <a:avLst/>
@@ -3900,6 +3878,7 @@
                   </a:solidFill>
                 </a:uFill>
                 <a:latin typeface="Calibri"/>
+                <a:ea typeface="DejaVu Sans"/>
               </a:rPr>
               <a:t>ERD (Entity Relationship Diagram)</a:t>
             </a:r>
@@ -3909,14 +3888,14 @@
       </p:sp>
       <p:sp>
         <p:nvSpPr>
-          <p:cNvPr id="101" name="CustomShape 2"/>
+          <p:cNvPr id="100" name="CustomShape 2"/>
           <p:cNvSpPr/>
           <p:nvPr/>
         </p:nvSpPr>
         <p:spPr>
           <a:xfrm>
             <a:off x="2517120" y="1366200"/>
-            <a:ext cx="1907280" cy="364320"/>
+            <a:ext cx="1906920" cy="363960"/>
           </a:xfrm>
           <a:prstGeom prst="rect">
             <a:avLst/>
@@ -3966,14 +3945,14 @@
       </p:sp>
       <p:sp>
         <p:nvSpPr>
-          <p:cNvPr id="102" name="CustomShape 3"/>
+          <p:cNvPr id="101" name="CustomShape 3"/>
           <p:cNvSpPr/>
           <p:nvPr/>
         </p:nvSpPr>
         <p:spPr>
           <a:xfrm>
             <a:off x="179640" y="2574360"/>
-            <a:ext cx="1440360" cy="637920"/>
+            <a:ext cx="1440000" cy="637560"/>
           </a:xfrm>
           <a:prstGeom prst="rect">
             <a:avLst/>
@@ -4023,14 +4002,14 @@
       </p:sp>
       <p:sp>
         <p:nvSpPr>
-          <p:cNvPr id="103" name="CustomShape 4"/>
+          <p:cNvPr id="102" name="CustomShape 4"/>
           <p:cNvSpPr/>
           <p:nvPr/>
         </p:nvSpPr>
         <p:spPr>
           <a:xfrm>
             <a:off x="5897520" y="1268640"/>
-            <a:ext cx="2004840" cy="364320"/>
+            <a:ext cx="2004480" cy="363960"/>
           </a:xfrm>
           <a:prstGeom prst="rect">
             <a:avLst/>
@@ -4080,14 +4059,14 @@
       </p:sp>
       <p:sp>
         <p:nvSpPr>
-          <p:cNvPr id="104" name="CustomShape 5"/>
+          <p:cNvPr id="103" name="CustomShape 5"/>
           <p:cNvSpPr/>
           <p:nvPr/>
         </p:nvSpPr>
         <p:spPr>
           <a:xfrm>
             <a:off x="3601800" y="5229360"/>
-            <a:ext cx="1941840" cy="364320"/>
+            <a:ext cx="1941480" cy="363960"/>
           </a:xfrm>
           <a:prstGeom prst="rect">
             <a:avLst/>
@@ -4137,14 +4116,14 @@
       </p:sp>
       <p:sp>
         <p:nvSpPr>
-          <p:cNvPr id="105" name="CustomShape 6"/>
+          <p:cNvPr id="104" name="CustomShape 6"/>
           <p:cNvSpPr/>
           <p:nvPr/>
         </p:nvSpPr>
         <p:spPr>
           <a:xfrm>
             <a:off x="2428200" y="2565720"/>
-            <a:ext cx="2085120" cy="364320"/>
+            <a:ext cx="2084760" cy="363960"/>
           </a:xfrm>
           <a:prstGeom prst="rect">
             <a:avLst/>
@@ -4194,14 +4173,14 @@
       </p:sp>
       <p:sp>
         <p:nvSpPr>
-          <p:cNvPr id="106" name="CustomShape 7"/>
+          <p:cNvPr id="105" name="CustomShape 7"/>
           <p:cNvSpPr/>
           <p:nvPr/>
         </p:nvSpPr>
         <p:spPr>
           <a:xfrm>
             <a:off x="6292080" y="2542320"/>
-            <a:ext cx="1223280" cy="364320"/>
+            <a:ext cx="1222920" cy="363960"/>
           </a:xfrm>
           <a:prstGeom prst="rect">
             <a:avLst/>
@@ -4251,7 +4230,7 @@
       </p:sp>
       <p:sp>
         <p:nvSpPr>
-          <p:cNvPr id="107" name="Line 8"/>
+          <p:cNvPr id="106" name="Line 8"/>
           <p:cNvSpPr/>
           <p:nvPr/>
         </p:nvSpPr>
@@ -4285,7 +4264,7 @@
       </p:sp>
       <p:sp>
         <p:nvSpPr>
-          <p:cNvPr id="108" name="Line 9"/>
+          <p:cNvPr id="107" name="Line 9"/>
           <p:cNvSpPr/>
           <p:nvPr/>
         </p:nvSpPr>
@@ -4319,7 +4298,7 @@
       </p:sp>
       <p:sp>
         <p:nvSpPr>
-          <p:cNvPr id="109" name="Line 10"/>
+          <p:cNvPr id="108" name="Line 10"/>
           <p:cNvSpPr/>
           <p:nvPr/>
         </p:nvSpPr>
@@ -4353,7 +4332,7 @@
       </p:sp>
       <p:sp>
         <p:nvSpPr>
-          <p:cNvPr id="110" name="Line 11"/>
+          <p:cNvPr id="109" name="Line 11"/>
           <p:cNvSpPr/>
           <p:nvPr/>
         </p:nvSpPr>
@@ -4387,7 +4366,7 @@
       </p:sp>
       <p:sp>
         <p:nvSpPr>
-          <p:cNvPr id="111" name="Line 12"/>
+          <p:cNvPr id="110" name="Line 12"/>
           <p:cNvSpPr/>
           <p:nvPr/>
         </p:nvSpPr>
@@ -4421,7 +4400,7 @@
       </p:sp>
       <p:sp>
         <p:nvSpPr>
-          <p:cNvPr id="112" name="Line 13"/>
+          <p:cNvPr id="111" name="Line 13"/>
           <p:cNvSpPr/>
           <p:nvPr/>
         </p:nvSpPr>
@@ -4455,7 +4434,7 @@
       </p:sp>
       <p:sp>
         <p:nvSpPr>
-          <p:cNvPr id="113" name="Line 14"/>
+          <p:cNvPr id="112" name="Line 14"/>
           <p:cNvSpPr/>
           <p:nvPr/>
         </p:nvSpPr>
@@ -4489,7 +4468,7 @@
       </p:sp>
       <p:sp>
         <p:nvSpPr>
-          <p:cNvPr id="114" name="Line 15"/>
+          <p:cNvPr id="113" name="Line 15"/>
           <p:cNvSpPr/>
           <p:nvPr/>
         </p:nvSpPr>
@@ -4523,7 +4502,7 @@
       </p:sp>
       <p:sp>
         <p:nvSpPr>
-          <p:cNvPr id="115" name="Line 16"/>
+          <p:cNvPr id="114" name="Line 16"/>
           <p:cNvSpPr/>
           <p:nvPr/>
         </p:nvSpPr>
@@ -4557,7 +4536,7 @@
       </p:sp>
       <p:sp>
         <p:nvSpPr>
-          <p:cNvPr id="116" name="Line 17"/>
+          <p:cNvPr id="115" name="Line 17"/>
           <p:cNvSpPr/>
           <p:nvPr/>
         </p:nvSpPr>
@@ -4591,7 +4570,7 @@
       </p:sp>
       <p:sp>
         <p:nvSpPr>
-          <p:cNvPr id="117" name="Line 18"/>
+          <p:cNvPr id="116" name="Line 18"/>
           <p:cNvSpPr/>
           <p:nvPr/>
         </p:nvSpPr>
@@ -4625,7 +4604,7 @@
       </p:sp>
       <p:sp>
         <p:nvSpPr>
-          <p:cNvPr id="118" name="Line 19"/>
+          <p:cNvPr id="117" name="Line 19"/>
           <p:cNvSpPr/>
           <p:nvPr/>
         </p:nvSpPr>
@@ -4659,7 +4638,7 @@
       </p:sp>
       <p:sp>
         <p:nvSpPr>
-          <p:cNvPr id="119" name="Line 20"/>
+          <p:cNvPr id="118" name="Line 20"/>
           <p:cNvSpPr/>
           <p:nvPr/>
         </p:nvSpPr>
@@ -4693,7 +4672,7 @@
       </p:sp>
       <p:sp>
         <p:nvSpPr>
-          <p:cNvPr id="120" name="Line 21"/>
+          <p:cNvPr id="119" name="Line 21"/>
           <p:cNvSpPr/>
           <p:nvPr/>
         </p:nvSpPr>
@@ -4727,7 +4706,7 @@
       </p:sp>
       <p:sp>
         <p:nvSpPr>
-          <p:cNvPr id="121" name="Line 22"/>
+          <p:cNvPr id="120" name="Line 22"/>
           <p:cNvSpPr/>
           <p:nvPr/>
         </p:nvSpPr>
@@ -4761,7 +4740,7 @@
       </p:sp>
       <p:sp>
         <p:nvSpPr>
-          <p:cNvPr id="122" name="Line 23"/>
+          <p:cNvPr id="121" name="Line 23"/>
           <p:cNvSpPr/>
           <p:nvPr/>
         </p:nvSpPr>
@@ -4795,7 +4774,7 @@
       </p:sp>
       <p:sp>
         <p:nvSpPr>
-          <p:cNvPr id="123" name="Line 24"/>
+          <p:cNvPr id="122" name="Line 24"/>
           <p:cNvSpPr/>
           <p:nvPr/>
         </p:nvSpPr>
@@ -4829,7 +4808,7 @@
       </p:sp>
       <p:sp>
         <p:nvSpPr>
-          <p:cNvPr id="124" name="Line 25"/>
+          <p:cNvPr id="123" name="Line 25"/>
           <p:cNvSpPr/>
           <p:nvPr/>
         </p:nvSpPr>
@@ -4863,7 +4842,7 @@
       </p:sp>
       <p:sp>
         <p:nvSpPr>
-          <p:cNvPr id="125" name="Line 26"/>
+          <p:cNvPr id="124" name="Line 26"/>
           <p:cNvSpPr/>
           <p:nvPr/>
         </p:nvSpPr>
@@ -4897,7 +4876,7 @@
       </p:sp>
       <p:sp>
         <p:nvSpPr>
-          <p:cNvPr id="126" name="Line 27"/>
+          <p:cNvPr id="125" name="Line 27"/>
           <p:cNvSpPr/>
           <p:nvPr/>
         </p:nvSpPr>
@@ -4931,7 +4910,7 @@
       </p:sp>
       <p:sp>
         <p:nvSpPr>
-          <p:cNvPr id="127" name="Line 28"/>
+          <p:cNvPr id="126" name="Line 28"/>
           <p:cNvSpPr/>
           <p:nvPr/>
         </p:nvSpPr>
@@ -4965,7 +4944,7 @@
       </p:sp>
       <p:sp>
         <p:nvSpPr>
-          <p:cNvPr id="128" name="Line 29"/>
+          <p:cNvPr id="127" name="Line 29"/>
           <p:cNvSpPr/>
           <p:nvPr/>
         </p:nvSpPr>
@@ -4999,7 +4978,7 @@
       </p:sp>
       <p:sp>
         <p:nvSpPr>
-          <p:cNvPr id="129" name="Line 30"/>
+          <p:cNvPr id="128" name="Line 30"/>
           <p:cNvSpPr/>
           <p:nvPr/>
         </p:nvSpPr>
@@ -5033,7 +5012,7 @@
       </p:sp>
       <p:sp>
         <p:nvSpPr>
-          <p:cNvPr id="130" name="Line 31"/>
+          <p:cNvPr id="129" name="Line 31"/>
           <p:cNvSpPr/>
           <p:nvPr/>
         </p:nvSpPr>
@@ -5067,7 +5046,7 @@
       </p:sp>
       <p:sp>
         <p:nvSpPr>
-          <p:cNvPr id="131" name="Line 32"/>
+          <p:cNvPr id="130" name="Line 32"/>
           <p:cNvSpPr/>
           <p:nvPr/>
         </p:nvSpPr>
@@ -5101,7 +5080,7 @@
       </p:sp>
       <p:sp>
         <p:nvSpPr>
-          <p:cNvPr id="132" name="Line 33"/>
+          <p:cNvPr id="131" name="Line 33"/>
           <p:cNvSpPr/>
           <p:nvPr/>
         </p:nvSpPr>
@@ -5135,7 +5114,7 @@
       </p:sp>
       <p:sp>
         <p:nvSpPr>
-          <p:cNvPr id="133" name="Line 34"/>
+          <p:cNvPr id="132" name="Line 34"/>
           <p:cNvSpPr/>
           <p:nvPr/>
         </p:nvSpPr>
@@ -5169,14 +5148,14 @@
       </p:sp>
       <p:sp>
         <p:nvSpPr>
-          <p:cNvPr id="134" name="CustomShape 35"/>
+          <p:cNvPr id="133" name="CustomShape 35"/>
           <p:cNvSpPr/>
           <p:nvPr/>
         </p:nvSpPr>
         <p:spPr>
           <a:xfrm>
             <a:off x="3600000" y="6259320"/>
-            <a:ext cx="1941840" cy="364320"/>
+            <a:ext cx="1941480" cy="363960"/>
           </a:xfrm>
           <a:prstGeom prst="rect">
             <a:avLst/>
@@ -5226,7 +5205,7 @@
       </p:sp>
       <p:sp>
         <p:nvSpPr>
-          <p:cNvPr id="135" name="Line 36"/>
+          <p:cNvPr id="134" name="Line 36"/>
           <p:cNvSpPr/>
           <p:nvPr/>
         </p:nvSpPr>
@@ -5260,7 +5239,7 @@
       </p:sp>
       <p:sp>
         <p:nvSpPr>
-          <p:cNvPr id="136" name="Line 37"/>
+          <p:cNvPr id="135" name="Line 37"/>
           <p:cNvSpPr/>
           <p:nvPr/>
         </p:nvSpPr>
@@ -5294,7 +5273,7 @@
       </p:sp>
       <p:sp>
         <p:nvSpPr>
-          <p:cNvPr id="137" name="Line 38"/>
+          <p:cNvPr id="136" name="Line 38"/>
           <p:cNvSpPr/>
           <p:nvPr/>
         </p:nvSpPr>
@@ -5328,7 +5307,7 @@
       </p:sp>
       <p:sp>
         <p:nvSpPr>
-          <p:cNvPr id="138" name="Line 39"/>
+          <p:cNvPr id="137" name="Line 39"/>
           <p:cNvSpPr/>
           <p:nvPr/>
         </p:nvSpPr>
@@ -5362,7 +5341,7 @@
       </p:sp>
       <p:sp>
         <p:nvSpPr>
-          <p:cNvPr id="139" name="Line 40"/>
+          <p:cNvPr id="138" name="Line 40"/>
           <p:cNvSpPr/>
           <p:nvPr/>
         </p:nvSpPr>
@@ -5396,7 +5375,7 @@
       </p:sp>
       <p:sp>
         <p:nvSpPr>
-          <p:cNvPr id="140" name="Line 41"/>
+          <p:cNvPr id="139" name="Line 41"/>
           <p:cNvSpPr/>
           <p:nvPr/>
         </p:nvSpPr>
@@ -5430,7 +5409,7 @@
       </p:sp>
       <p:sp>
         <p:nvSpPr>
-          <p:cNvPr id="141" name="Line 42"/>
+          <p:cNvPr id="140" name="Line 42"/>
           <p:cNvSpPr/>
           <p:nvPr/>
         </p:nvSpPr>
@@ -5467,10 +5446,10 @@
   <p:timing>
     <p:tnLst>
       <p:par>
-        <p:cTn id="25" dur="indefinite" restart="never" nodeType="tmRoot">
+        <p:cTn id="21" dur="indefinite" restart="never" nodeType="tmRoot">
           <p:childTnLst>
             <p:seq>
-              <p:cTn id="26" nodeType="mainSeq"/>
+              <p:cTn id="22" nodeType="mainSeq"/>
               <p:prevCondLst>
                 <p:cond delay="0" evt="onPrev">
                   <p:tgtEl>
@@ -5513,14 +5492,14 @@
       </p:grpSpPr>
       <p:sp>
         <p:nvSpPr>
-          <p:cNvPr id="142" name="CustomShape 1"/>
+          <p:cNvPr id="141" name="CustomShape 1"/>
           <p:cNvSpPr/>
           <p:nvPr/>
         </p:nvSpPr>
         <p:spPr>
           <a:xfrm>
             <a:off x="457200" y="274680"/>
-            <a:ext cx="8228880" cy="1142280"/>
+            <a:ext cx="8228520" cy="1141920"/>
           </a:xfrm>
           <a:prstGeom prst="rect">
             <a:avLst/>
@@ -5555,6 +5534,7 @@
                   </a:solidFill>
                 </a:uFill>
                 <a:latin typeface="Calibri"/>
+                <a:ea typeface="DejaVu Sans"/>
               </a:rPr>
               <a:t>ERM</a:t>
             </a:r>
@@ -5564,14 +5544,14 @@
       </p:sp>
       <p:sp>
         <p:nvSpPr>
-          <p:cNvPr id="143" name="CustomShape 2"/>
+          <p:cNvPr id="142" name="CustomShape 2"/>
           <p:cNvSpPr/>
           <p:nvPr/>
         </p:nvSpPr>
         <p:spPr>
           <a:xfrm>
             <a:off x="457200" y="1600200"/>
-            <a:ext cx="8228880" cy="4525200"/>
+            <a:ext cx="8228520" cy="4524840"/>
           </a:xfrm>
           <a:prstGeom prst="rect">
             <a:avLst/>
@@ -5593,10 +5573,10 @@
   <p:timing>
     <p:tnLst>
       <p:par>
-        <p:cTn id="27" dur="indefinite" restart="never" nodeType="tmRoot">
+        <p:cTn id="23" dur="indefinite" restart="never" nodeType="tmRoot">
           <p:childTnLst>
             <p:seq>
-              <p:cTn id="28" nodeType="mainSeq"/>
+              <p:cTn id="24" nodeType="mainSeq"/>
               <p:prevCondLst>
                 <p:cond delay="0" evt="onPrev">
                   <p:tgtEl>
@@ -5639,14 +5619,14 @@
       </p:grpSpPr>
       <p:sp>
         <p:nvSpPr>
-          <p:cNvPr id="144" name="CustomShape 1"/>
+          <p:cNvPr id="143" name="CustomShape 1"/>
           <p:cNvSpPr/>
           <p:nvPr/>
         </p:nvSpPr>
         <p:spPr>
           <a:xfrm>
             <a:off x="457200" y="274680"/>
-            <a:ext cx="8228880" cy="1142280"/>
+            <a:ext cx="8228520" cy="1141920"/>
           </a:xfrm>
           <a:prstGeom prst="rect">
             <a:avLst/>
@@ -5681,6 +5661,7 @@
                   </a:solidFill>
                 </a:uFill>
                 <a:latin typeface="Calibri"/>
+                <a:ea typeface="DejaVu Sans"/>
               </a:rPr>
               <a:t>Masques de saisie</a:t>
             </a:r>
@@ -5690,14 +5671,14 @@
       </p:sp>
       <p:sp>
         <p:nvSpPr>
-          <p:cNvPr id="145" name="CustomShape 2"/>
+          <p:cNvPr id="144" name="CustomShape 2"/>
           <p:cNvSpPr/>
           <p:nvPr/>
         </p:nvSpPr>
         <p:spPr>
           <a:xfrm>
             <a:off x="1506960" y="3747600"/>
-            <a:ext cx="4968000" cy="2087640"/>
+            <a:ext cx="4967640" cy="2087280"/>
           </a:xfrm>
           <a:prstGeom prst="rect">
             <a:avLst/>
@@ -5723,14 +5704,14 @@
       </p:sp>
       <p:sp>
         <p:nvSpPr>
-          <p:cNvPr id="146" name="CustomShape 3"/>
+          <p:cNvPr id="145" name="CustomShape 3"/>
           <p:cNvSpPr/>
           <p:nvPr/>
         </p:nvSpPr>
         <p:spPr>
           <a:xfrm>
             <a:off x="1711440" y="3819600"/>
-            <a:ext cx="1319760" cy="454320"/>
+            <a:ext cx="1319400" cy="453960"/>
           </a:xfrm>
           <a:prstGeom prst="rect">
             <a:avLst/>
@@ -5777,14 +5758,14 @@
       </p:sp>
       <p:sp>
         <p:nvSpPr>
-          <p:cNvPr id="147" name="CustomShape 4"/>
+          <p:cNvPr id="146" name="CustomShape 4"/>
           <p:cNvSpPr/>
           <p:nvPr/>
         </p:nvSpPr>
         <p:spPr>
           <a:xfrm>
             <a:off x="3282840" y="3819600"/>
-            <a:ext cx="1456200" cy="454320"/>
+            <a:ext cx="1455840" cy="453960"/>
           </a:xfrm>
           <a:prstGeom prst="rect">
             <a:avLst/>
@@ -5831,14 +5812,14 @@
       </p:sp>
       <p:sp>
         <p:nvSpPr>
-          <p:cNvPr id="148" name="CustomShape 5"/>
+          <p:cNvPr id="147" name="CustomShape 5"/>
           <p:cNvSpPr/>
           <p:nvPr/>
         </p:nvSpPr>
         <p:spPr>
           <a:xfrm>
             <a:off x="1683720" y="4611600"/>
-            <a:ext cx="659520" cy="454320"/>
+            <a:ext cx="659160" cy="453960"/>
           </a:xfrm>
           <a:prstGeom prst="rect">
             <a:avLst/>
@@ -5885,14 +5866,14 @@
       </p:sp>
       <p:sp>
         <p:nvSpPr>
-          <p:cNvPr id="149" name="CustomShape 6"/>
+          <p:cNvPr id="148" name="CustomShape 6"/>
           <p:cNvSpPr/>
           <p:nvPr/>
         </p:nvSpPr>
         <p:spPr>
           <a:xfrm>
             <a:off x="1683720" y="5035680"/>
-            <a:ext cx="659520" cy="454320"/>
+            <a:ext cx="659160" cy="453960"/>
           </a:xfrm>
           <a:prstGeom prst="rect">
             <a:avLst/>
@@ -5939,14 +5920,14 @@
       </p:sp>
       <p:sp>
         <p:nvSpPr>
-          <p:cNvPr id="150" name="CustomShape 7"/>
+          <p:cNvPr id="149" name="CustomShape 7"/>
           <p:cNvSpPr/>
           <p:nvPr/>
         </p:nvSpPr>
         <p:spPr>
           <a:xfrm>
             <a:off x="3208680" y="4251600"/>
-            <a:ext cx="1063440" cy="454320"/>
+            <a:ext cx="1063080" cy="453960"/>
           </a:xfrm>
           <a:prstGeom prst="rect">
             <a:avLst/>
@@ -5993,14 +5974,14 @@
       </p:sp>
       <p:sp>
         <p:nvSpPr>
-          <p:cNvPr id="151" name="CustomShape 8"/>
+          <p:cNvPr id="150" name="CustomShape 8"/>
           <p:cNvSpPr/>
           <p:nvPr/>
         </p:nvSpPr>
         <p:spPr>
           <a:xfrm>
             <a:off x="4438080" y="4251600"/>
-            <a:ext cx="722160" cy="454320"/>
+            <a:ext cx="721800" cy="453960"/>
           </a:xfrm>
           <a:prstGeom prst="rect">
             <a:avLst/>
@@ -6047,14 +6028,14 @@
       </p:sp>
       <p:sp>
         <p:nvSpPr>
-          <p:cNvPr id="152" name="CustomShape 9"/>
+          <p:cNvPr id="151" name="CustomShape 9"/>
           <p:cNvSpPr/>
           <p:nvPr/>
         </p:nvSpPr>
         <p:spPr>
           <a:xfrm>
             <a:off x="5343840" y="4251600"/>
-            <a:ext cx="572400" cy="454320"/>
+            <a:ext cx="572040" cy="453960"/>
           </a:xfrm>
           <a:prstGeom prst="rect">
             <a:avLst/>
@@ -6101,14 +6082,14 @@
       </p:sp>
       <p:sp>
         <p:nvSpPr>
-          <p:cNvPr id="153" name="CustomShape 10"/>
+          <p:cNvPr id="152" name="CustomShape 10"/>
           <p:cNvSpPr/>
           <p:nvPr/>
         </p:nvSpPr>
         <p:spPr>
           <a:xfrm>
             <a:off x="3448080" y="4653000"/>
-            <a:ext cx="659520" cy="276120"/>
+            <a:ext cx="659160" cy="275760"/>
           </a:xfrm>
           <a:prstGeom prst="rect">
             <a:avLst/>
@@ -6129,14 +6110,14 @@
       </p:sp>
       <p:sp>
         <p:nvSpPr>
-          <p:cNvPr id="154" name="CustomShape 11"/>
+          <p:cNvPr id="153" name="CustomShape 11"/>
           <p:cNvSpPr/>
           <p:nvPr/>
         </p:nvSpPr>
         <p:spPr>
           <a:xfrm>
             <a:off x="3448080" y="5035680"/>
-            <a:ext cx="659520" cy="276120"/>
+            <a:ext cx="659160" cy="275760"/>
           </a:xfrm>
           <a:prstGeom prst="rect">
             <a:avLst/>
@@ -6157,14 +6138,14 @@
       </p:sp>
       <p:sp>
         <p:nvSpPr>
-          <p:cNvPr id="155" name="CustomShape 12"/>
+          <p:cNvPr id="154" name="CustomShape 12"/>
           <p:cNvSpPr/>
           <p:nvPr/>
         </p:nvSpPr>
         <p:spPr>
           <a:xfrm>
             <a:off x="4468320" y="4653000"/>
-            <a:ext cx="659520" cy="276120"/>
+            <a:ext cx="659160" cy="275760"/>
           </a:xfrm>
           <a:prstGeom prst="rect">
             <a:avLst/>
@@ -6185,14 +6166,14 @@
       </p:sp>
       <p:sp>
         <p:nvSpPr>
-          <p:cNvPr id="156" name="CustomShape 13"/>
+          <p:cNvPr id="155" name="CustomShape 13"/>
           <p:cNvSpPr/>
           <p:nvPr/>
         </p:nvSpPr>
         <p:spPr>
           <a:xfrm>
             <a:off x="4468320" y="5035680"/>
-            <a:ext cx="659520" cy="276120"/>
+            <a:ext cx="659160" cy="275760"/>
           </a:xfrm>
           <a:prstGeom prst="rect">
             <a:avLst/>
@@ -6213,14 +6194,14 @@
       </p:sp>
       <p:sp>
         <p:nvSpPr>
-          <p:cNvPr id="157" name="CustomShape 14"/>
+          <p:cNvPr id="156" name="CustomShape 14"/>
           <p:cNvSpPr/>
           <p:nvPr/>
         </p:nvSpPr>
         <p:spPr>
           <a:xfrm>
             <a:off x="5319360" y="4653000"/>
-            <a:ext cx="659520" cy="276120"/>
+            <a:ext cx="659160" cy="275760"/>
           </a:xfrm>
           <a:prstGeom prst="rect">
             <a:avLst/>
@@ -6241,14 +6222,14 @@
       </p:sp>
       <p:sp>
         <p:nvSpPr>
-          <p:cNvPr id="158" name="CustomShape 15"/>
+          <p:cNvPr id="157" name="CustomShape 15"/>
           <p:cNvSpPr/>
           <p:nvPr/>
         </p:nvSpPr>
         <p:spPr>
           <a:xfrm>
             <a:off x="5319360" y="5035680"/>
-            <a:ext cx="659520" cy="276120"/>
+            <a:ext cx="659160" cy="275760"/>
           </a:xfrm>
           <a:prstGeom prst="rect">
             <a:avLst/>
@@ -6269,14 +6250,14 @@
       </p:sp>
       <p:sp>
         <p:nvSpPr>
-          <p:cNvPr id="159" name="CustomShape 16"/>
+          <p:cNvPr id="158" name="CustomShape 16"/>
           <p:cNvSpPr/>
           <p:nvPr/>
         </p:nvSpPr>
         <p:spPr>
           <a:xfrm>
             <a:off x="1527120" y="1340640"/>
-            <a:ext cx="3476160" cy="2087640"/>
+            <a:ext cx="3475800" cy="2087280"/>
           </a:xfrm>
           <a:prstGeom prst="rect">
             <a:avLst/>
@@ -6302,14 +6283,14 @@
       </p:sp>
       <p:sp>
         <p:nvSpPr>
-          <p:cNvPr id="160" name="CustomShape 17"/>
+          <p:cNvPr id="159" name="CustomShape 17"/>
           <p:cNvSpPr/>
           <p:nvPr/>
         </p:nvSpPr>
         <p:spPr>
           <a:xfrm>
             <a:off x="1731600" y="1412640"/>
-            <a:ext cx="1319760" cy="454320"/>
+            <a:ext cx="1319400" cy="453960"/>
           </a:xfrm>
           <a:prstGeom prst="rect">
             <a:avLst/>
@@ -6356,14 +6337,14 @@
       </p:sp>
       <p:sp>
         <p:nvSpPr>
-          <p:cNvPr id="161" name="CustomShape 18"/>
+          <p:cNvPr id="160" name="CustomShape 18"/>
           <p:cNvSpPr/>
           <p:nvPr/>
         </p:nvSpPr>
         <p:spPr>
           <a:xfrm>
             <a:off x="3303000" y="1412640"/>
-            <a:ext cx="1456200" cy="454320"/>
+            <a:ext cx="1455840" cy="453960"/>
           </a:xfrm>
           <a:prstGeom prst="rect">
             <a:avLst/>
@@ -6410,14 +6391,14 @@
       </p:sp>
       <p:sp>
         <p:nvSpPr>
-          <p:cNvPr id="162" name="CustomShape 19"/>
+          <p:cNvPr id="161" name="CustomShape 19"/>
           <p:cNvSpPr/>
           <p:nvPr/>
         </p:nvSpPr>
         <p:spPr>
           <a:xfrm>
             <a:off x="1703880" y="2205000"/>
-            <a:ext cx="659520" cy="454320"/>
+            <a:ext cx="659160" cy="453960"/>
           </a:xfrm>
           <a:prstGeom prst="rect">
             <a:avLst/>
@@ -6464,14 +6445,14 @@
       </p:sp>
       <p:sp>
         <p:nvSpPr>
-          <p:cNvPr id="163" name="CustomShape 20"/>
+          <p:cNvPr id="162" name="CustomShape 20"/>
           <p:cNvSpPr/>
           <p:nvPr/>
         </p:nvSpPr>
         <p:spPr>
           <a:xfrm>
             <a:off x="1703880" y="2628720"/>
-            <a:ext cx="659520" cy="454320"/>
+            <a:ext cx="659160" cy="453960"/>
           </a:xfrm>
           <a:prstGeom prst="rect">
             <a:avLst/>
@@ -6518,14 +6499,14 @@
       </p:sp>
       <p:sp>
         <p:nvSpPr>
-          <p:cNvPr id="164" name="CustomShape 21"/>
+          <p:cNvPr id="163" name="CustomShape 21"/>
           <p:cNvSpPr/>
           <p:nvPr/>
         </p:nvSpPr>
         <p:spPr>
           <a:xfrm>
             <a:off x="1703880" y="3036600"/>
-            <a:ext cx="659520" cy="454320"/>
+            <a:ext cx="659160" cy="453960"/>
           </a:xfrm>
           <a:prstGeom prst="rect">
             <a:avLst/>
@@ -6572,14 +6553,14 @@
       </p:sp>
       <p:sp>
         <p:nvSpPr>
-          <p:cNvPr id="165" name="CustomShape 22"/>
+          <p:cNvPr id="164" name="CustomShape 22"/>
           <p:cNvSpPr/>
           <p:nvPr/>
         </p:nvSpPr>
         <p:spPr>
           <a:xfrm>
             <a:off x="2555280" y="1845000"/>
-            <a:ext cx="892080" cy="272520"/>
+            <a:ext cx="891720" cy="272160"/>
           </a:xfrm>
           <a:prstGeom prst="rect">
             <a:avLst/>
@@ -6626,14 +6607,14 @@
       </p:sp>
       <p:sp>
         <p:nvSpPr>
-          <p:cNvPr id="166" name="CustomShape 23"/>
+          <p:cNvPr id="165" name="CustomShape 23"/>
           <p:cNvSpPr/>
           <p:nvPr/>
         </p:nvSpPr>
         <p:spPr>
           <a:xfrm>
             <a:off x="2690640" y="2274120"/>
-            <a:ext cx="140400" cy="137880"/>
+            <a:ext cx="140040" cy="137520"/>
           </a:xfrm>
           <a:prstGeom prst="ellipse">
             <a:avLst/>
@@ -6662,14 +6643,14 @@
       </p:sp>
       <p:sp>
         <p:nvSpPr>
-          <p:cNvPr id="167" name="CustomShape 24"/>
+          <p:cNvPr id="166" name="CustomShape 24"/>
           <p:cNvSpPr/>
           <p:nvPr/>
         </p:nvSpPr>
         <p:spPr>
           <a:xfrm>
             <a:off x="2690640" y="2698200"/>
-            <a:ext cx="140400" cy="137880"/>
+            <a:ext cx="140040" cy="137520"/>
           </a:xfrm>
           <a:prstGeom prst="ellipse">
             <a:avLst/>
@@ -6698,14 +6679,14 @@
       </p:sp>
       <p:sp>
         <p:nvSpPr>
-          <p:cNvPr id="168" name="CustomShape 25"/>
+          <p:cNvPr id="167" name="CustomShape 25"/>
           <p:cNvSpPr/>
           <p:nvPr/>
         </p:nvSpPr>
         <p:spPr>
           <a:xfrm>
             <a:off x="2690640" y="3105720"/>
-            <a:ext cx="140400" cy="137880"/>
+            <a:ext cx="140040" cy="137520"/>
           </a:xfrm>
           <a:prstGeom prst="ellipse">
             <a:avLst/>
@@ -6734,14 +6715,14 @@
       </p:sp>
       <p:sp>
         <p:nvSpPr>
-          <p:cNvPr id="169" name="CustomShape 26"/>
+          <p:cNvPr id="168" name="CustomShape 26"/>
           <p:cNvSpPr/>
           <p:nvPr/>
         </p:nvSpPr>
         <p:spPr>
           <a:xfrm>
             <a:off x="2727360" y="2310840"/>
-            <a:ext cx="69840" cy="68400"/>
+            <a:ext cx="69480" cy="68040"/>
           </a:xfrm>
           <a:prstGeom prst="ellipse">
             <a:avLst/>
@@ -6773,14 +6754,14 @@
       </p:sp>
       <p:sp>
         <p:nvSpPr>
-          <p:cNvPr id="170" name="CustomShape 27"/>
+          <p:cNvPr id="169" name="CustomShape 27"/>
           <p:cNvSpPr/>
           <p:nvPr/>
         </p:nvSpPr>
         <p:spPr>
           <a:xfrm>
             <a:off x="2727360" y="2734200"/>
-            <a:ext cx="69840" cy="68400"/>
+            <a:ext cx="69480" cy="68040"/>
           </a:xfrm>
           <a:prstGeom prst="ellipse">
             <a:avLst/>
@@ -6812,14 +6793,14 @@
       </p:sp>
       <p:sp>
         <p:nvSpPr>
-          <p:cNvPr id="171" name="CustomShape 28"/>
+          <p:cNvPr id="170" name="CustomShape 28"/>
           <p:cNvSpPr/>
           <p:nvPr/>
         </p:nvSpPr>
         <p:spPr>
           <a:xfrm>
             <a:off x="1693800" y="5445360"/>
-            <a:ext cx="659520" cy="454320"/>
+            <a:ext cx="659160" cy="453960"/>
           </a:xfrm>
           <a:prstGeom prst="rect">
             <a:avLst/>
@@ -6866,14 +6847,14 @@
       </p:sp>
       <p:sp>
         <p:nvSpPr>
-          <p:cNvPr id="172" name="CustomShape 29"/>
+          <p:cNvPr id="171" name="CustomShape 29"/>
           <p:cNvSpPr/>
           <p:nvPr/>
         </p:nvSpPr>
         <p:spPr>
           <a:xfrm>
             <a:off x="3450240" y="5445360"/>
-            <a:ext cx="1017720" cy="454320"/>
+            <a:ext cx="1017360" cy="453960"/>
           </a:xfrm>
           <a:prstGeom prst="rect">
             <a:avLst/>
@@ -6923,10 +6904,10 @@
   <p:timing>
     <p:tnLst>
       <p:par>
-        <p:cTn id="29" dur="indefinite" restart="never" nodeType="tmRoot">
+        <p:cTn id="25" dur="indefinite" restart="never" nodeType="tmRoot">
           <p:childTnLst>
             <p:seq>
-              <p:cTn id="30" nodeType="mainSeq"/>
+              <p:cTn id="26" nodeType="mainSeq"/>
               <p:prevCondLst>
                 <p:cond delay="0" evt="onPrev">
                   <p:tgtEl>
@@ -6969,14 +6950,14 @@
       </p:grpSpPr>
       <p:sp>
         <p:nvSpPr>
-          <p:cNvPr id="75" name="CustomShape 1"/>
+          <p:cNvPr id="74" name="CustomShape 1"/>
           <p:cNvSpPr/>
           <p:nvPr/>
         </p:nvSpPr>
         <p:spPr>
           <a:xfrm>
             <a:off x="457200" y="274680"/>
-            <a:ext cx="8228880" cy="1142280"/>
+            <a:ext cx="8228520" cy="1141920"/>
           </a:xfrm>
           <a:prstGeom prst="rect">
             <a:avLst/>
@@ -7011,6 +6992,7 @@
                   </a:solidFill>
                 </a:uFill>
                 <a:latin typeface="Calibri"/>
+                <a:ea typeface="DejaVu Sans"/>
               </a:rPr>
               <a:t>Objectifs</a:t>
             </a:r>
@@ -7020,14 +7002,14 @@
       </p:sp>
       <p:sp>
         <p:nvSpPr>
-          <p:cNvPr id="76" name="CustomShape 2"/>
+          <p:cNvPr id="75" name="CustomShape 2"/>
           <p:cNvSpPr/>
           <p:nvPr/>
         </p:nvSpPr>
         <p:spPr>
           <a:xfrm>
             <a:off x="457200" y="1600200"/>
-            <a:ext cx="8228880" cy="4525200"/>
+            <a:ext cx="8228520" cy="4524840"/>
           </a:xfrm>
           <a:prstGeom prst="rect">
             <a:avLst/>
@@ -7046,7 +7028,7 @@
         <p:txBody>
           <a:bodyPr lIns="90000" rIns="90000" tIns="45000" bIns="45000"/>
           <a:p>
-            <a:pPr marL="343080" indent="-342360">
+            <a:pPr marL="343080" indent="-342000">
               <a:lnSpc>
                 <a:spcPct val="100000"/>
               </a:lnSpc>
@@ -7064,13 +7046,14 @@
                   </a:solidFill>
                 </a:uFill>
                 <a:latin typeface="Calibri"/>
+                <a:ea typeface="DejaVu Sans"/>
               </a:rPr>
               <a:t>Saisie des prélèvements</a:t>
             </a:r>
             <a:endParaRPr/>
           </a:p>
           <a:p>
-            <a:pPr marL="343080" indent="-342360">
+            <a:pPr marL="343080" indent="-342000">
               <a:lnSpc>
                 <a:spcPct val="100000"/>
               </a:lnSpc>
@@ -7088,13 +7071,14 @@
                   </a:solidFill>
                 </a:uFill>
                 <a:latin typeface="Calibri"/>
+                <a:ea typeface="DejaVu Sans"/>
               </a:rPr>
               <a:t>Saisie des résultats</a:t>
             </a:r>
             <a:endParaRPr/>
           </a:p>
           <a:p>
-            <a:pPr marL="343080" indent="-342360">
+            <a:pPr marL="343080" indent="-342000">
               <a:lnSpc>
                 <a:spcPct val="100000"/>
               </a:lnSpc>
@@ -7112,13 +7096,14 @@
                   </a:solidFill>
                 </a:uFill>
                 <a:latin typeface="Calibri"/>
+                <a:ea typeface="DejaVu Sans"/>
               </a:rPr>
               <a:t>Affichage sur image ?</a:t>
             </a:r>
             <a:endParaRPr/>
           </a:p>
           <a:p>
-            <a:pPr marL="343080" indent="-342360">
+            <a:pPr marL="343080" indent="-342000">
               <a:lnSpc>
                 <a:spcPct val="100000"/>
               </a:lnSpc>
@@ -7136,13 +7121,14 @@
                   </a:solidFill>
                 </a:uFill>
                 <a:latin typeface="Calibri"/>
+                <a:ea typeface="DejaVu Sans"/>
               </a:rPr>
               <a:t>Extraction des données</a:t>
             </a:r>
             <a:endParaRPr/>
           </a:p>
           <a:p>
-            <a:pPr marL="343080" indent="-342360">
+            <a:pPr marL="343080" indent="-342000">
               <a:lnSpc>
                 <a:spcPct val="100000"/>
               </a:lnSpc>
@@ -7160,6 +7146,7 @@
                   </a:solidFill>
                 </a:uFill>
                 <a:latin typeface="Calibri"/>
+                <a:ea typeface="DejaVu Sans"/>
               </a:rPr>
               <a:t>Graphiques ?</a:t>
             </a:r>
@@ -7218,14 +7205,14 @@
       </p:grpSpPr>
       <p:sp>
         <p:nvSpPr>
-          <p:cNvPr id="77" name="CustomShape 1"/>
+          <p:cNvPr id="76" name="CustomShape 1"/>
           <p:cNvSpPr/>
           <p:nvPr/>
         </p:nvSpPr>
         <p:spPr>
           <a:xfrm>
             <a:off x="457200" y="274680"/>
-            <a:ext cx="8228880" cy="1142280"/>
+            <a:ext cx="8228520" cy="1141920"/>
           </a:xfrm>
           <a:prstGeom prst="rect">
             <a:avLst/>
@@ -7260,6 +7247,7 @@
                   </a:solidFill>
                 </a:uFill>
                 <a:latin typeface="Calibri"/>
+                <a:ea typeface="DejaVu Sans"/>
               </a:rPr>
               <a:t>Données</a:t>
             </a:r>
@@ -7269,14 +7257,14 @@
       </p:sp>
       <p:sp>
         <p:nvSpPr>
-          <p:cNvPr id="78" name="CustomShape 2"/>
+          <p:cNvPr id="77" name="CustomShape 2"/>
           <p:cNvSpPr/>
           <p:nvPr/>
         </p:nvSpPr>
         <p:spPr>
           <a:xfrm>
             <a:off x="457200" y="1600200"/>
-            <a:ext cx="8228880" cy="4525200"/>
+            <a:ext cx="8228520" cy="4524840"/>
           </a:xfrm>
           <a:prstGeom prst="rect">
             <a:avLst/>
@@ -7295,7 +7283,7 @@
         <p:txBody>
           <a:bodyPr lIns="90000" rIns="90000" tIns="45000" bIns="45000"/>
           <a:p>
-            <a:pPr marL="343080" indent="-342360">
+            <a:pPr marL="343080" indent="-342000">
               <a:lnSpc>
                 <a:spcPct val="100000"/>
               </a:lnSpc>
@@ -7313,13 +7301,14 @@
                   </a:solidFill>
                 </a:uFill>
                 <a:latin typeface="Calibri"/>
+                <a:ea typeface="DejaVu Sans"/>
               </a:rPr>
               <a:t>Dispositif de prélèvement</a:t>
             </a:r>
             <a:endParaRPr/>
           </a:p>
           <a:p>
-            <a:pPr lvl="1" marL="743040" indent="-285120">
+            <a:pPr lvl="1" marL="743040" indent="-284760">
               <a:lnSpc>
                 <a:spcPct val="100000"/>
               </a:lnSpc>
@@ -7337,13 +7326,14 @@
                   </a:solidFill>
                 </a:uFill>
                 <a:latin typeface="Calibri"/>
+                <a:ea typeface="DejaVu Sans"/>
               </a:rPr>
               <a:t>Écouvillon</a:t>
             </a:r>
             <a:endParaRPr/>
           </a:p>
           <a:p>
-            <a:pPr lvl="1" marL="743040" indent="-285120">
+            <a:pPr lvl="1" marL="743040" indent="-284760">
               <a:lnSpc>
                 <a:spcPct val="100000"/>
               </a:lnSpc>
@@ -7361,13 +7351,14 @@
                   </a:solidFill>
                 </a:uFill>
                 <a:latin typeface="Calibri"/>
+                <a:ea typeface="DejaVu Sans"/>
               </a:rPr>
               <a:t>Boite de Pétri</a:t>
             </a:r>
             <a:endParaRPr/>
           </a:p>
           <a:p>
-            <a:pPr lvl="1" marL="743040" indent="-285120">
+            <a:pPr lvl="1" marL="743040" indent="-284760">
               <a:lnSpc>
                 <a:spcPct val="100000"/>
               </a:lnSpc>
@@ -7385,13 +7376,14 @@
                   </a:solidFill>
                 </a:uFill>
                 <a:latin typeface="Calibri"/>
+                <a:ea typeface="DejaVu Sans"/>
               </a:rPr>
               <a:t>Biocollecteur Sampl’R</a:t>
             </a:r>
             <a:endParaRPr/>
           </a:p>
           <a:p>
-            <a:pPr lvl="1" marL="743040" indent="-285120">
+            <a:pPr lvl="1" marL="743040" indent="-284760">
               <a:lnSpc>
                 <a:spcPct val="100000"/>
               </a:lnSpc>
@@ -7409,13 +7401,14 @@
                   </a:solidFill>
                 </a:uFill>
                 <a:latin typeface="Calibri"/>
+                <a:ea typeface="DejaVu Sans"/>
               </a:rPr>
               <a:t>Countact</a:t>
             </a:r>
             <a:endParaRPr/>
           </a:p>
           <a:p>
-            <a:pPr marL="343080" indent="-342360">
+            <a:pPr marL="343080" indent="-342000">
               <a:lnSpc>
                 <a:spcPct val="100000"/>
               </a:lnSpc>
@@ -7433,13 +7426,14 @@
                   </a:solidFill>
                 </a:uFill>
                 <a:latin typeface="Calibri"/>
+                <a:ea typeface="DejaVu Sans"/>
               </a:rPr>
               <a:t>Limites par classe selon BPP (UFC)</a:t>
             </a:r>
             <a:endParaRPr/>
           </a:p>
           <a:p>
-            <a:pPr lvl="1" marL="743040" indent="-285120">
+            <a:pPr lvl="1" marL="743040" indent="-284760">
               <a:lnSpc>
                 <a:spcPct val="100000"/>
               </a:lnSpc>
@@ -7457,13 +7451,14 @@
                   </a:solidFill>
                 </a:uFill>
                 <a:latin typeface="Calibri"/>
+                <a:ea typeface="DejaVu Sans"/>
               </a:rPr>
               <a:t>Classe A : </a:t>
             </a:r>
             <a:endParaRPr/>
           </a:p>
           <a:p>
-            <a:pPr lvl="2" marL="1143000" indent="-227880">
+            <a:pPr lvl="2" marL="1143000" indent="-227520">
               <a:lnSpc>
                 <a:spcPct val="100000"/>
               </a:lnSpc>
@@ -7481,13 +7476,14 @@
                   </a:solidFill>
                 </a:uFill>
                 <a:latin typeface="Calibri"/>
+                <a:ea typeface="DejaVu Sans"/>
               </a:rPr>
               <a:t>Air : &lt;1</a:t>
             </a:r>
             <a:endParaRPr/>
           </a:p>
           <a:p>
-            <a:pPr lvl="2" marL="1143000" indent="-227880">
+            <a:pPr lvl="2" marL="1143000" indent="-227520">
               <a:lnSpc>
                 <a:spcPct val="100000"/>
               </a:lnSpc>
@@ -7505,13 +7501,14 @@
                   </a:solidFill>
                 </a:uFill>
                 <a:latin typeface="Calibri"/>
+                <a:ea typeface="DejaVu Sans"/>
               </a:rPr>
               <a:t>Surface :  &lt;1</a:t>
             </a:r>
             <a:endParaRPr/>
           </a:p>
           <a:p>
-            <a:pPr lvl="2" marL="1143000" indent="-227880">
+            <a:pPr lvl="2" marL="1143000" indent="-227520">
               <a:lnSpc>
                 <a:spcPct val="100000"/>
               </a:lnSpc>
@@ -7529,13 +7526,14 @@
                   </a:solidFill>
                 </a:uFill>
                 <a:latin typeface="Calibri"/>
+                <a:ea typeface="DejaVu Sans"/>
               </a:rPr>
               <a:t>Gants  : &lt;1</a:t>
             </a:r>
             <a:endParaRPr/>
           </a:p>
           <a:p>
-            <a:pPr lvl="1" marL="743040" indent="-285120">
+            <a:pPr lvl="1" marL="743040" indent="-284760">
               <a:lnSpc>
                 <a:spcPct val="100000"/>
               </a:lnSpc>
@@ -7553,13 +7551,14 @@
                   </a:solidFill>
                 </a:uFill>
                 <a:latin typeface="Calibri"/>
+                <a:ea typeface="DejaVu Sans"/>
               </a:rPr>
               <a:t>Classe D : </a:t>
             </a:r>
             <a:endParaRPr/>
           </a:p>
           <a:p>
-            <a:pPr lvl="2" marL="1143000" indent="-227880">
+            <a:pPr lvl="2" marL="1143000" indent="-227520">
               <a:lnSpc>
                 <a:spcPct val="100000"/>
               </a:lnSpc>
@@ -7577,13 +7576,14 @@
                   </a:solidFill>
                 </a:uFill>
                 <a:latin typeface="Calibri"/>
+                <a:ea typeface="DejaVu Sans"/>
               </a:rPr>
               <a:t>Air :  &lt;100</a:t>
             </a:r>
             <a:endParaRPr/>
           </a:p>
           <a:p>
-            <a:pPr lvl="2" marL="1143000" indent="-227880">
+            <a:pPr lvl="2" marL="1143000" indent="-227520">
               <a:lnSpc>
                 <a:spcPct val="100000"/>
               </a:lnSpc>
@@ -7601,6 +7601,7 @@
                   </a:solidFill>
                 </a:uFill>
                 <a:latin typeface="Calibri"/>
+                <a:ea typeface="DejaVu Sans"/>
               </a:rPr>
               <a:t>Surface : &lt; 50</a:t>
             </a:r>
@@ -7675,14 +7676,14 @@
       </p:grpSpPr>
       <p:sp>
         <p:nvSpPr>
-          <p:cNvPr id="79" name="CustomShape 1"/>
+          <p:cNvPr id="78" name="CustomShape 1"/>
           <p:cNvSpPr/>
           <p:nvPr/>
         </p:nvSpPr>
         <p:spPr>
           <a:xfrm>
             <a:off x="457200" y="274680"/>
-            <a:ext cx="8228880" cy="1142280"/>
+            <a:ext cx="8228520" cy="1141920"/>
           </a:xfrm>
           <a:prstGeom prst="rect">
             <a:avLst/>
@@ -7717,6 +7718,7 @@
                   </a:solidFill>
                 </a:uFill>
                 <a:latin typeface="Calibri"/>
+                <a:ea typeface="DejaVu Sans"/>
               </a:rPr>
               <a:t>Données</a:t>
             </a:r>
@@ -7726,14 +7728,14 @@
       </p:sp>
       <p:sp>
         <p:nvSpPr>
-          <p:cNvPr id="80" name="CustomShape 2"/>
+          <p:cNvPr id="79" name="CustomShape 2"/>
           <p:cNvSpPr/>
           <p:nvPr/>
         </p:nvSpPr>
         <p:spPr>
           <a:xfrm>
             <a:off x="457200" y="1600200"/>
-            <a:ext cx="8228880" cy="4525200"/>
+            <a:ext cx="8228520" cy="4524840"/>
           </a:xfrm>
           <a:prstGeom prst="rect">
             <a:avLst/>
@@ -7752,7 +7754,7 @@
         <p:txBody>
           <a:bodyPr lIns="90000" rIns="90000" tIns="45000" bIns="45000"/>
           <a:p>
-            <a:pPr marL="343080" indent="-342360">
+            <a:pPr marL="343080" indent="-342000">
               <a:lnSpc>
                 <a:spcPct val="100000"/>
               </a:lnSpc>
@@ -7770,13 +7772,14 @@
                   </a:solidFill>
                 </a:uFill>
                 <a:latin typeface="Calibri"/>
+                <a:ea typeface="DejaVu Sans"/>
               </a:rPr>
               <a:t>Points de prélèvement</a:t>
             </a:r>
             <a:endParaRPr/>
           </a:p>
           <a:p>
-            <a:pPr lvl="1" marL="743040" indent="-285120">
+            <a:pPr lvl="1" marL="743040" indent="-284760">
               <a:lnSpc>
                 <a:spcPct val="100000"/>
               </a:lnSpc>
@@ -7794,13 +7797,14 @@
                   </a:solidFill>
                 </a:uFill>
                 <a:latin typeface="Calibri"/>
+                <a:ea typeface="DejaVu Sans"/>
               </a:rPr>
               <a:t>Isolateur – classe A</a:t>
             </a:r>
             <a:endParaRPr/>
           </a:p>
           <a:p>
-            <a:pPr lvl="2" marL="1143000" indent="-227880">
+            <a:pPr lvl="2" marL="1143000" indent="-227520">
               <a:lnSpc>
                 <a:spcPct val="100000"/>
               </a:lnSpc>
@@ -7818,13 +7822,14 @@
                   </a:solidFill>
                 </a:uFill>
                 <a:latin typeface="Calibri"/>
+                <a:ea typeface="DejaVu Sans"/>
               </a:rPr>
               <a:t>Zone de travail</a:t>
             </a:r>
             <a:endParaRPr/>
           </a:p>
           <a:p>
-            <a:pPr lvl="3" marL="1600200" indent="-227880">
+            <a:pPr lvl="3" marL="1600200" indent="-227520">
               <a:lnSpc>
                 <a:spcPct val="100000"/>
               </a:lnSpc>
@@ -7842,13 +7847,14 @@
                   </a:solidFill>
                 </a:uFill>
                 <a:latin typeface="Calibri"/>
+                <a:ea typeface="DejaVu Sans"/>
               </a:rPr>
               <a:t>Gants – Countact</a:t>
             </a:r>
             <a:endParaRPr/>
           </a:p>
           <a:p>
-            <a:pPr lvl="3" marL="1600200" indent="-227880">
+            <a:pPr lvl="3" marL="1600200" indent="-227520">
               <a:lnSpc>
                 <a:spcPct val="100000"/>
               </a:lnSpc>
@@ -7866,13 +7872,14 @@
                   </a:solidFill>
                 </a:uFill>
                 <a:latin typeface="Calibri"/>
+                <a:ea typeface="DejaVu Sans"/>
               </a:rPr>
               <a:t>Manchettes - Ecouvillons</a:t>
             </a:r>
             <a:endParaRPr/>
           </a:p>
           <a:p>
-            <a:pPr lvl="3" marL="1600200" indent="-227880">
+            <a:pPr lvl="3" marL="1600200" indent="-227520">
               <a:lnSpc>
                 <a:spcPct val="100000"/>
               </a:lnSpc>
@@ -7890,13 +7897,14 @@
                   </a:solidFill>
                 </a:uFill>
                 <a:latin typeface="Calibri"/>
+                <a:ea typeface="DejaVu Sans"/>
               </a:rPr>
               <a:t>Air - Pétri</a:t>
             </a:r>
             <a:endParaRPr/>
           </a:p>
           <a:p>
-            <a:pPr lvl="3" marL="1600200" indent="-227880">
+            <a:pPr lvl="3" marL="1600200" indent="-227520">
               <a:lnSpc>
                 <a:spcPct val="100000"/>
               </a:lnSpc>
@@ -7914,13 +7922,14 @@
                   </a:solidFill>
                 </a:uFill>
                 <a:latin typeface="Calibri"/>
+                <a:ea typeface="DejaVu Sans"/>
               </a:rPr>
               <a:t>Plan de travail – Ecouvillons</a:t>
             </a:r>
             <a:endParaRPr/>
           </a:p>
           <a:p>
-            <a:pPr lvl="3" marL="1600200" indent="-227880">
+            <a:pPr lvl="3" marL="1600200" indent="-227520">
               <a:lnSpc>
                 <a:spcPct val="100000"/>
               </a:lnSpc>
@@ -7938,13 +7947,14 @@
                   </a:solidFill>
                 </a:uFill>
                 <a:latin typeface="Calibri"/>
+                <a:ea typeface="DejaVu Sans"/>
               </a:rPr>
               <a:t>Rail, DPTE, Bouton, poignée – Ecouvillons</a:t>
             </a:r>
             <a:endParaRPr/>
           </a:p>
           <a:p>
-            <a:pPr lvl="3" marL="1600200" indent="-227880">
+            <a:pPr lvl="3" marL="1600200" indent="-227520">
               <a:lnSpc>
                 <a:spcPct val="100000"/>
               </a:lnSpc>
@@ -7962,13 +7972,14 @@
                   </a:solidFill>
                 </a:uFill>
                 <a:latin typeface="Calibri"/>
+                <a:ea typeface="DejaVu Sans"/>
               </a:rPr>
               <a:t>Automate -  Ecouvillons</a:t>
             </a:r>
             <a:endParaRPr/>
           </a:p>
           <a:p>
-            <a:pPr lvl="2" marL="1143000" indent="-227880">
+            <a:pPr lvl="2" marL="1143000" indent="-227520">
               <a:lnSpc>
                 <a:spcPct val="100000"/>
               </a:lnSpc>
@@ -7986,13 +7997,14 @@
                   </a:solidFill>
                 </a:uFill>
                 <a:latin typeface="Calibri"/>
+                <a:ea typeface="DejaVu Sans"/>
               </a:rPr>
               <a:t>Sas de stockage</a:t>
             </a:r>
             <a:endParaRPr/>
           </a:p>
           <a:p>
-            <a:pPr lvl="3" marL="1600200" indent="-227880">
+            <a:pPr lvl="3" marL="1600200" indent="-227520">
               <a:lnSpc>
                 <a:spcPct val="100000"/>
               </a:lnSpc>
@@ -8010,13 +8022,14 @@
                   </a:solidFill>
                 </a:uFill>
                 <a:latin typeface="Calibri"/>
+                <a:ea typeface="DejaVu Sans"/>
               </a:rPr>
               <a:t>Etagères – Ecouvillon</a:t>
             </a:r>
             <a:endParaRPr/>
           </a:p>
           <a:p>
-            <a:pPr lvl="3" marL="1600200" indent="-227880">
+            <a:pPr lvl="3" marL="1600200" indent="-227520">
               <a:lnSpc>
                 <a:spcPct val="100000"/>
               </a:lnSpc>
@@ -8034,13 +8047,14 @@
                   </a:solidFill>
                 </a:uFill>
                 <a:latin typeface="Calibri"/>
+                <a:ea typeface="DejaVu Sans"/>
               </a:rPr>
               <a:t>Plan de travail – Ecouvillons</a:t>
             </a:r>
             <a:endParaRPr/>
           </a:p>
           <a:p>
-            <a:pPr lvl="3" marL="1600200" indent="-227880">
+            <a:pPr lvl="3" marL="1600200" indent="-227520">
               <a:lnSpc>
                 <a:spcPct val="100000"/>
               </a:lnSpc>
@@ -8058,13 +8072,14 @@
                   </a:solidFill>
                 </a:uFill>
                 <a:latin typeface="Calibri"/>
+                <a:ea typeface="DejaVu Sans"/>
               </a:rPr>
               <a:t>Gants – Countact</a:t>
             </a:r>
             <a:endParaRPr/>
           </a:p>
           <a:p>
-            <a:pPr lvl="1" marL="743040" indent="-285120">
+            <a:pPr lvl="1" marL="743040" indent="-284760">
               <a:lnSpc>
                 <a:spcPct val="100000"/>
               </a:lnSpc>
@@ -8082,13 +8097,14 @@
                   </a:solidFill>
                 </a:uFill>
                 <a:latin typeface="Calibri"/>
+                <a:ea typeface="DejaVu Sans"/>
               </a:rPr>
               <a:t>Salle classe D</a:t>
             </a:r>
             <a:endParaRPr/>
           </a:p>
           <a:p>
-            <a:pPr lvl="2" marL="1143000" indent="-227880">
+            <a:pPr lvl="2" marL="1143000" indent="-227520">
               <a:lnSpc>
                 <a:spcPct val="100000"/>
               </a:lnSpc>
@@ -8106,13 +8122,14 @@
                   </a:solidFill>
                 </a:uFill>
                 <a:latin typeface="Calibri"/>
+                <a:ea typeface="DejaVu Sans"/>
               </a:rPr>
               <a:t>Air – Pétri</a:t>
             </a:r>
             <a:endParaRPr/>
           </a:p>
           <a:p>
-            <a:pPr lvl="2" marL="1143000" indent="-227880">
+            <a:pPr lvl="2" marL="1143000" indent="-227520">
               <a:lnSpc>
                 <a:spcPct val="100000"/>
               </a:lnSpc>
@@ -8130,13 +8147,14 @@
                   </a:solidFill>
                 </a:uFill>
                 <a:latin typeface="Calibri"/>
+                <a:ea typeface="DejaVu Sans"/>
               </a:rPr>
               <a:t>Air – Biocollecteur Sampl’R</a:t>
             </a:r>
             <a:endParaRPr/>
           </a:p>
           <a:p>
-            <a:pPr lvl="2" marL="1143000" indent="-227880">
+            <a:pPr lvl="2" marL="1143000" indent="-227520">
               <a:lnSpc>
                 <a:spcPct val="100000"/>
               </a:lnSpc>
@@ -8154,13 +8172,14 @@
                   </a:solidFill>
                 </a:uFill>
                 <a:latin typeface="Calibri"/>
+                <a:ea typeface="DejaVu Sans"/>
               </a:rPr>
               <a:t>Surface – Countact</a:t>
             </a:r>
             <a:endParaRPr/>
           </a:p>
           <a:p>
-            <a:pPr lvl="1" marL="743040" indent="-285120">
+            <a:pPr lvl="1" marL="743040" indent="-284760">
               <a:lnSpc>
                 <a:spcPct val="100000"/>
               </a:lnSpc>
@@ -8178,13 +8197,14 @@
                   </a:solidFill>
                 </a:uFill>
                 <a:latin typeface="Calibri"/>
+                <a:ea typeface="DejaVu Sans"/>
               </a:rPr>
               <a:t>Ajouts de points supplémentaires  :</a:t>
             </a:r>
             <a:endParaRPr/>
           </a:p>
           <a:p>
-            <a:pPr lvl="2" marL="1143000" indent="-227880">
+            <a:pPr lvl="2" marL="1143000" indent="-227520">
               <a:lnSpc>
                 <a:spcPct val="100000"/>
               </a:lnSpc>
@@ -8202,13 +8222,14 @@
                   </a:solidFill>
                 </a:uFill>
                 <a:latin typeface="Calibri"/>
+                <a:ea typeface="DejaVu Sans"/>
               </a:rPr>
               <a:t>Autre Air classe A</a:t>
             </a:r>
             <a:endParaRPr/>
           </a:p>
           <a:p>
-            <a:pPr lvl="2" marL="1143000" indent="-227880">
+            <a:pPr lvl="2" marL="1143000" indent="-227520">
               <a:lnSpc>
                 <a:spcPct val="100000"/>
               </a:lnSpc>
@@ -8226,13 +8247,14 @@
                   </a:solidFill>
                 </a:uFill>
                 <a:latin typeface="Calibri"/>
+                <a:ea typeface="DejaVu Sans"/>
               </a:rPr>
               <a:t>Autre Surface classe A</a:t>
             </a:r>
             <a:endParaRPr/>
           </a:p>
           <a:p>
-            <a:pPr lvl="2" marL="1143000" indent="-227880">
+            <a:pPr lvl="2" marL="1143000" indent="-227520">
               <a:lnSpc>
                 <a:spcPct val="100000"/>
               </a:lnSpc>
@@ -8250,13 +8272,14 @@
                   </a:solidFill>
                 </a:uFill>
                 <a:latin typeface="Calibri"/>
+                <a:ea typeface="DejaVu Sans"/>
               </a:rPr>
               <a:t>Autre Air classe D</a:t>
             </a:r>
             <a:endParaRPr/>
           </a:p>
           <a:p>
-            <a:pPr lvl="2" marL="1143000" indent="-227880">
+            <a:pPr lvl="2" marL="1143000" indent="-227520">
               <a:lnSpc>
                 <a:spcPct val="100000"/>
               </a:lnSpc>
@@ -8274,6 +8297,7 @@
                   </a:solidFill>
                 </a:uFill>
                 <a:latin typeface="Calibri"/>
+                <a:ea typeface="DejaVu Sans"/>
               </a:rPr>
               <a:t>Autre Surface classe D</a:t>
             </a:r>
@@ -8340,14 +8364,14 @@
       </p:grpSpPr>
       <p:sp>
         <p:nvSpPr>
-          <p:cNvPr id="81" name="CustomShape 1"/>
+          <p:cNvPr id="80" name="CustomShape 1"/>
           <p:cNvSpPr/>
           <p:nvPr/>
         </p:nvSpPr>
         <p:spPr>
           <a:xfrm>
             <a:off x="457200" y="274680"/>
-            <a:ext cx="8228880" cy="1142280"/>
+            <a:ext cx="8228520" cy="1141920"/>
           </a:xfrm>
           <a:prstGeom prst="rect">
             <a:avLst/>
@@ -8382,6 +8406,7 @@
                   </a:solidFill>
                 </a:uFill>
                 <a:latin typeface="Calibri"/>
+                <a:ea typeface="DejaVu Sans"/>
               </a:rPr>
               <a:t>Données (suite)</a:t>
             </a:r>
@@ -8391,14 +8416,14 @@
       </p:sp>
       <p:sp>
         <p:nvSpPr>
-          <p:cNvPr id="82" name="CustomShape 2"/>
+          <p:cNvPr id="81" name="CustomShape 2"/>
           <p:cNvSpPr/>
           <p:nvPr/>
         </p:nvSpPr>
         <p:spPr>
           <a:xfrm>
             <a:off x="457200" y="1600200"/>
-            <a:ext cx="8228880" cy="4525200"/>
+            <a:ext cx="8228520" cy="4524840"/>
           </a:xfrm>
           <a:prstGeom prst="rect">
             <a:avLst/>
@@ -8417,7 +8442,7 @@
         <p:txBody>
           <a:bodyPr lIns="90000" rIns="90000" tIns="45000" bIns="45000"/>
           <a:p>
-            <a:pPr marL="343080" indent="-342360">
+            <a:pPr marL="343080" indent="-342000">
               <a:lnSpc>
                 <a:spcPct val="100000"/>
               </a:lnSpc>
@@ -8435,13 +8460,14 @@
                   </a:solidFill>
                 </a:uFill>
                 <a:latin typeface="Calibri"/>
+                <a:ea typeface="DejaVu Sans"/>
               </a:rPr>
               <a:t>Plan de prélèvement</a:t>
             </a:r>
             <a:endParaRPr/>
           </a:p>
           <a:p>
-            <a:pPr lvl="1" marL="743040" indent="-285120">
+            <a:pPr lvl="1" marL="743040" indent="-284760">
               <a:lnSpc>
                 <a:spcPct val="100000"/>
               </a:lnSpc>
@@ -8459,13 +8485,14 @@
                   </a:solidFill>
                 </a:uFill>
                 <a:latin typeface="Calibri"/>
+                <a:ea typeface="DejaVu Sans"/>
               </a:rPr>
               <a:t>Image de l’isolateur</a:t>
             </a:r>
             <a:endParaRPr/>
           </a:p>
           <a:p>
-            <a:pPr marL="343080" indent="-342360">
+            <a:pPr marL="343080" indent="-342000">
               <a:lnSpc>
                 <a:spcPct val="100000"/>
               </a:lnSpc>
@@ -8483,13 +8510,14 @@
                   </a:solidFill>
                 </a:uFill>
                 <a:latin typeface="Calibri"/>
+                <a:ea typeface="DejaVu Sans"/>
               </a:rPr>
               <a:t>Jours de prélèvement :</a:t>
             </a:r>
             <a:endParaRPr/>
           </a:p>
           <a:p>
-            <a:pPr lvl="1" marL="743040" indent="-285120">
+            <a:pPr lvl="1" marL="743040" indent="-284760">
               <a:lnSpc>
                 <a:spcPct val="100000"/>
               </a:lnSpc>
@@ -8507,6 +8535,7 @@
                   </a:solidFill>
                 </a:uFill>
                 <a:latin typeface="Calibri"/>
+                <a:ea typeface="DejaVu Sans"/>
               </a:rPr>
               <a:t>1</a:t>
             </a:r>
@@ -8521,6 +8550,7 @@
                   </a:solidFill>
                 </a:uFill>
                 <a:latin typeface="Calibri"/>
+                <a:ea typeface="DejaVu Sans"/>
               </a:rPr>
               <a:t>er</a:t>
             </a:r>
@@ -8535,6 +8565,7 @@
                   </a:solidFill>
                 </a:uFill>
                 <a:latin typeface="Calibri"/>
+                <a:ea typeface="DejaVu Sans"/>
               </a:rPr>
               <a:t> lundi, 2</a:t>
             </a:r>
@@ -8549,6 +8580,7 @@
                   </a:solidFill>
                 </a:uFill>
                 <a:latin typeface="Calibri"/>
+                <a:ea typeface="DejaVu Sans"/>
               </a:rPr>
               <a:t>ème</a:t>
             </a:r>
@@ -8563,13 +8595,14 @@
                   </a:solidFill>
                 </a:uFill>
                 <a:latin typeface="Calibri"/>
+                <a:ea typeface="DejaVu Sans"/>
               </a:rPr>
               <a:t> mardi…</a:t>
             </a:r>
             <a:endParaRPr/>
           </a:p>
           <a:p>
-            <a:pPr marL="343080" indent="-342360">
+            <a:pPr marL="343080" indent="-342000">
               <a:lnSpc>
                 <a:spcPct val="100000"/>
               </a:lnSpc>
@@ -8587,13 +8620,14 @@
                   </a:solidFill>
                 </a:uFill>
                 <a:latin typeface="Calibri"/>
+                <a:ea typeface="DejaVu Sans"/>
               </a:rPr>
               <a:t>Planning de prélèvement :</a:t>
             </a:r>
             <a:endParaRPr/>
           </a:p>
           <a:p>
-            <a:pPr lvl="1" marL="743040" indent="-285120">
+            <a:pPr lvl="1" marL="743040" indent="-284760">
               <a:lnSpc>
                 <a:spcPct val="100000"/>
               </a:lnSpc>
@@ -8611,13 +8645,14 @@
                   </a:solidFill>
                 </a:uFill>
                 <a:latin typeface="Calibri"/>
+                <a:ea typeface="DejaVu Sans"/>
               </a:rPr>
               <a:t>Hebdomadaire</a:t>
             </a:r>
             <a:endParaRPr/>
           </a:p>
           <a:p>
-            <a:pPr lvl="1" marL="743040" indent="-285120">
+            <a:pPr lvl="1" marL="743040" indent="-284760">
               <a:lnSpc>
                 <a:spcPct val="100000"/>
               </a:lnSpc>
@@ -8635,13 +8670,14 @@
                   </a:solidFill>
                 </a:uFill>
                 <a:latin typeface="Calibri"/>
+                <a:ea typeface="DejaVu Sans"/>
               </a:rPr>
               <a:t>Mensuel</a:t>
             </a:r>
             <a:endParaRPr/>
           </a:p>
           <a:p>
-            <a:pPr marL="343080" indent="-342360">
+            <a:pPr marL="343080" indent="-342000">
               <a:lnSpc>
                 <a:spcPct val="100000"/>
               </a:lnSpc>
@@ -8659,13 +8695,14 @@
                   </a:solidFill>
                 </a:uFill>
                 <a:latin typeface="Calibri"/>
+                <a:ea typeface="DejaVu Sans"/>
               </a:rPr>
               <a:t>Saisie des prélèvements</a:t>
             </a:r>
             <a:endParaRPr/>
           </a:p>
           <a:p>
-            <a:pPr marL="343080" indent="-342360">
+            <a:pPr marL="343080" indent="-342000">
               <a:lnSpc>
                 <a:spcPct val="100000"/>
               </a:lnSpc>
@@ -8683,6 +8720,7 @@
                   </a:solidFill>
                 </a:uFill>
                 <a:latin typeface="Calibri"/>
+                <a:ea typeface="DejaVu Sans"/>
               </a:rPr>
               <a:t>Saisie des résultats</a:t>
             </a:r>
@@ -8757,14 +8795,14 @@
       </p:grpSpPr>
       <p:sp>
         <p:nvSpPr>
-          <p:cNvPr id="83" name="CustomShape 1"/>
+          <p:cNvPr id="82" name="CustomShape 1"/>
           <p:cNvSpPr/>
           <p:nvPr/>
         </p:nvSpPr>
         <p:spPr>
           <a:xfrm>
             <a:off x="457200" y="274680"/>
-            <a:ext cx="8228880" cy="1142280"/>
+            <a:ext cx="8228520" cy="1141920"/>
           </a:xfrm>
           <a:prstGeom prst="rect">
             <a:avLst/>
@@ -8799,6 +8837,7 @@
                   </a:solidFill>
                 </a:uFill>
                 <a:latin typeface="Calibri"/>
+                <a:ea typeface="DejaVu Sans"/>
               </a:rPr>
               <a:t>Table des dispositifs de prélèvements</a:t>
             </a:r>
@@ -8808,13 +8847,13 @@
       </p:sp>
       <p:graphicFrame>
         <p:nvGraphicFramePr>
-          <p:cNvPr id="84" name="Table 2"/>
+          <p:cNvPr id="83" name="Table 2"/>
           <p:cNvGraphicFramePr/>
           <p:nvPr/>
         </p:nvGraphicFramePr>
         <p:xfrm>
           <a:off x="64440" y="1556640"/>
-          <a:ext cx="8899200" cy="1919880"/>
+          <a:ext cx="8899200" cy="1279800"/>
         </p:xfrm>
         <a:graphic>
           <a:graphicData uri="http://schemas.openxmlformats.org/drawingml/2006/table">
@@ -9537,858 +9576,11 @@
 </file>
 
 <file path=ppt/slides/slide7.xml><?xml version="1.0" encoding="UTF-8" standalone="yes"?>
-<p:sld xmlns:a="http://schemas.openxmlformats.org/drawingml/2006/main" xmlns:p="http://schemas.openxmlformats.org/presentationml/2006/main" xmlns:r="http://schemas.openxmlformats.org/officeDocument/2006/relationships"><p:cSld><p:spTree><p:nvGrpSpPr>        <p:cNvPr id="1" name=""/>        <p:cNvGrpSpPr/>        <p:nvPr/>      </p:nvGrpSpPr>      <p:grpSpPr>        <a:xfrm>          <a:off x="0" y="0"/>          <a:ext cx="0" cy="0"/>          <a:chOff x="0" y="0"/>          <a:chExt cx="0" cy="0"/>        </a:xfrm>      </p:grpSpPr><p:sp><p:nvSpPr><p:cNvPr id="85" name="CustomShape 1"></p:cNvPr><p:cNvSpPr/><p:nvPr/></p:nvSpPr><p:spPr><a:xfrm><a:off x="457200" y="274680"/><a:ext cx="8228880" cy="1142280"/></a:xfrm><a:prstGeom prst="rect"><a:avLst></a:avLst></a:prstGeom><a:noFill/><a:ln><a:noFill/></a:ln></p:spPr><p:style><a:lnRef idx="0"/><a:fillRef idx="0"/><a:effectRef idx="0"/><a:fontRef idx="minor"/></p:style><p:txBody><a:bodyPr lIns="90000" rIns="90000" tIns="45000" bIns="45000" anchor="ctr"></a:bodyPr><a:p><a:pPr algn="ctr"><a:lnSpc><a:spcPct val="100000"/></a:lnSpc></a:pPr><a:r><a:rPr lang="fr-FR" sz="4400" spc="-1" strike="noStrike"><a:solidFill><a:srgbClr val="000000"/></a:solidFill><a:uFill><a:solidFill><a:srgbClr val="ffffff"/></a:solidFill></a:uFill><a:latin typeface="Calibri"/></a:rPr><a:t>Table des limites microbiologiques par classe (en UFC)</a:t></a:r><a:endParaRPr/></a:p></p:txBody></p:sp><p:graphicFrame><p:nvGraphicFramePr><p:cNvPr id="86" name="Table 2"/><p:cNvGraphicFramePr/><p:nvPr/></p:nvGraphicFramePr><p:xfrm><a:off x="64440" y="1556640"/><a:ext cx="8899200" cy="2559960"/></p:xfrm><a:graphic><a:graphicData uri="http://schemas.openxmlformats.org/drawingml/2006/table"><a:tbl><a:tblPr/><a:tblGrid><a:gridCol w="2114280"/><a:gridCol w="1423800"/><a:gridCol w="1423800"/><a:gridCol w="1848960"/><a:gridCol w="998640"/><a:gridCol w="1090080"/></a:tblGrid><a:tr h="640080"><a:tc><a:txBody><a:bodyPr></a:bodyPr><a:p><a:pPr><a:lnSpc><a:spcPct val="100000"/></a:lnSpc></a:pPr><a:r><a:rPr b="1" lang="fr-FR" sz="1800" spc="-1" strike="noStrike"><a:solidFill><a:srgbClr val="ffffff"/></a:solidFill><a:uFill><a:solidFill><a:srgbClr val="ffffff"/></a:solidFill></a:uFill><a:latin typeface="Calibri"/></a:rPr><a:t>Etiquette</a:t></a:r><a:endParaRPr/></a:p></a:txBody><a:tcPr marL="91440" marR="91440"><a:lnL w="12240"><a:solidFill><a:srgbClr val="ffffff"/></a:solidFill></a:lnL><a:lnR w="12240"><a:solidFill><a:srgbClr val="ffffff"/></a:solidFill></a:lnR><a:lnT w="12240"><a:solidFill><a:srgbClr val="ffffff"/></a:solidFill></a:lnT><a:lnB w="38160"><a:solidFill><a:srgbClr val="ffffff"/></a:solidFill></a:lnB><a:solidFill><a:srgbClr val="4f81bd"/></a:solidFill></a:tcPr></a:tc><a:tc><a:txBody><a:bodyPr></a:bodyPr><a:p><a:pPr><a:lnSpc><a:spcPct val="100000"/></a:lnSpc></a:pPr><a:r><a:rPr b="1" lang="fr-FR" sz="1800" spc="-1" strike="noStrike"><a:solidFill><a:srgbClr val="ffffff"/></a:solidFill><a:uFill><a:solidFill><a:srgbClr val="ffffff"/></a:solidFill></a:uFill><a:latin typeface="Calibri"/></a:rPr><a:t>Nom de variable</a:t></a:r><a:endParaRPr/></a:p></a:txBody><a:tcPr marL="91440" marR="91440"><a:lnL w="12240"><a:solidFill><a:srgbClr val="ffffff"/></a:solidFill></a:lnL><a:lnR w="12240"><a:solidFill><a:srgbClr val="ffffff"/></a:solidFill></a:lnR><a:lnT w="12240"><a:solidFill><a:srgbClr val="ffffff"/></a:solidFill></a:lnT><a:lnB w="38160"><a:solidFill><a:srgbClr val="ffffff"/></a:solidFill></a:lnB><a:solidFill><a:srgbClr val="4f81bd"/></a:solidFill></a:tcPr></a:tc><a:tc><a:txBody><a:bodyPr></a:bodyPr><a:p><a:pPr><a:lnSpc><a:spcPct val="100000"/></a:lnSpc></a:pPr><a:r><a:rPr b="1" lang="fr-FR" sz="1800" spc="-1" strike="noStrike"><a:solidFill><a:srgbClr val="ffffff"/></a:solidFill><a:uFill><a:solidFill><a:srgbClr val="ffffff"/></a:solidFill></a:uFill><a:latin typeface="Calibri"/></a:rPr><a:t>Type</a:t></a:r><a:endParaRPr/></a:p></a:txBody><a:tcPr marL="91440" marR="91440"><a:lnL w="12240"><a:solidFill><a:srgbClr val="ffffff"/></a:solidFill></a:lnL><a:lnR w="12240"><a:solidFill><a:srgbClr val="ffffff"/></a:solidFill></a:lnR><a:lnT w="12240"><a:solidFill><a:srgbClr val="ffffff"/></a:solidFill></a:lnT><a:lnB w="38160"><a:solidFill><a:srgbClr val="ffffff"/></a:solidFill></a:lnB><a:solidFill><a:srgbClr val="4f81bd"/></a:solidFill></a:tcPr></a:tc><a:tc><a:txBody><a:bodyPr></a:bodyPr><a:p><a:pPr><a:lnSpc><a:spcPct val="100000"/></a:lnSpc></a:pPr><a:r><a:rPr b="1" lang="fr-FR" sz="1800" spc="-1" strike="noStrike"><a:solidFill><a:srgbClr val="ffffff"/></a:solidFill><a:uFill><a:solidFill><a:srgbClr val="ffffff"/></a:solidFill></a:uFill><a:latin typeface="Calibri"/></a:rPr><a:t>Table</a:t></a:r><a:endParaRPr/></a:p></a:txBody><a:tcPr marL="91440" marR="91440"><a:lnL w="12240"><a:solidFill><a:srgbClr val="ffffff"/></a:solidFill></a:lnL><a:lnR w="12240"><a:solidFill><a:srgbClr val="ffffff"/></a:solidFill></a:lnR><a:lnT w="12240"><a:solidFill><a:srgbClr val="ffffff"/></a:solidFill></a:lnT><a:lnB w="38160"><a:solidFill><a:srgbClr val="ffffff"/></a:solidFill></a:lnB><a:solidFill><a:srgbClr val="4f81bd"/></a:solidFill></a:tcPr></a:tc><a:tc><a:txBody><a:bodyPr></a:bodyPr><a:p><a:pPr><a:lnSpc><a:spcPct val="100000"/></a:lnSpc></a:pPr><a:r><a:rPr b="1" lang="fr-FR" sz="1800" spc="-1" strike="noStrike"><a:solidFill><a:srgbClr val="ffffff"/></a:solidFill><a:uFill><a:solidFill><a:srgbClr val="ffffff"/></a:solidFill></a:uFill><a:latin typeface="Calibri"/></a:rPr><a:t>Clé </a:t></a:r><a:endParaRPr/></a:p><a:p><a:pPr><a:lnSpc><a:spcPct val="100000"/></a:lnSpc></a:pPr><a:r><a:rPr b="1" lang="fr-FR" sz="1800" spc="-1" strike="noStrike"><a:solidFill><a:srgbClr val="ffffff"/></a:solidFill><a:uFill><a:solidFill><a:srgbClr val="ffffff"/></a:solidFill></a:uFill><a:latin typeface="Calibri"/></a:rPr><a:t>primaire</a:t></a:r><a:endParaRPr/></a:p></a:txBody><a:tcPr marL="91440" marR="91440"><a:lnL w="12240"><a:solidFill><a:srgbClr val="ffffff"/></a:solidFill></a:lnL><a:lnR w="12240"><a:solidFill><a:srgbClr val="ffffff"/></a:solidFill></a:lnR><a:lnT w="12240"><a:solidFill><a:srgbClr val="ffffff"/></a:solidFill></a:lnT><a:lnB w="38160"><a:solidFill><a:srgbClr val="ffffff"/></a:solidFill></a:lnB><a:solidFill><a:srgbClr val="4f81bd"/></a:solidFill></a:tcPr></a:tc><a:tc><a:txBody><a:bodyPr></a:bodyPr><a:p><a:pPr><a:lnSpc><a:spcPct val="100000"/></a:lnSpc></a:pPr><a:r><a:rPr b="1" lang="fr-FR" sz="1800" spc="-1" strike="noStrike"><a:solidFill><a:srgbClr val="ffffff"/></a:solidFill><a:uFill><a:solidFill><a:srgbClr val="ffffff"/></a:solidFill></a:uFill><a:latin typeface="Calibri"/></a:rPr><a:t>Clé étrangère</a:t></a:r><a:endParaRPr/></a:p></a:txBody><a:tcPr marL="91440" marR="91440"><a:lnL w="12240"><a:solidFill><a:srgbClr val="ffffff"/></a:solidFill></a:lnL><a:lnR w="12240"><a:solidFill><a:srgbClr val="ffffff"/></a:solidFill></a:lnR><a:lnT w="12240"><a:solidFill><a:srgbClr val="ffffff"/></a:solidFill></a:lnT><a:lnB w="38160"><a:solidFill><a:srgbClr val="ffffff"/></a:solidFill></a:lnB><a:solidFill><a:srgbClr val="4f81bd"/></a:solidFill></a:tcPr></a:tc></a:tr><a:tr h="640080"><a:tc><a:txBody><a:bodyPr></a:bodyPr><a:p><a:pPr><a:lnSpc><a:spcPct val="100000"/></a:lnSpc></a:pPr><a:r><a:rPr lang="fr-FR" sz="1800" spc="-1" strike="noStrike"><a:solidFill><a:srgbClr val="000000"/></a:solidFill><a:uFill><a:solidFill><a:srgbClr val="ffffff"/></a:solidFill></a:uFill><a:latin typeface="Calibri"/></a:rPr><a:t>Classe</a:t></a:r><a:endParaRPr/></a:p></a:txBody><a:tcPr marL="91440" marR="91440"><a:lnL w="12240"><a:solidFill><a:srgbClr val="ffffff"/></a:solidFill></a:lnL><a:lnR w="12240"><a:solidFill><a:srgbClr val="ffffff"/></a:solidFill></a:lnR><a:lnT w="12240"><a:solidFill><a:srgbClr val="ffffff"/></a:solidFill></a:lnT><a:lnB w="12240"><a:solidFill><a:srgbClr val="ffffff"/></a:solidFill></a:lnB><a:solidFill><a:srgbClr val="d0d8e7"/></a:solidFill></a:tcPr></a:tc><a:tc><a:txBody><a:bodyPr></a:bodyPr><a:p><a:pPr><a:lnSpc><a:spcPct val="100000"/></a:lnSpc></a:pPr><a:r><a:rPr lang="fr-FR" sz="1800" spc="-1" strike="noStrike"><a:solidFill><a:srgbClr val="000000"/></a:solidFill><a:uFill><a:solidFill><a:srgbClr val="ffffff"/></a:solidFill></a:uFill><a:latin typeface="Calibri"/></a:rPr><a:t>Classe</a:t></a:r><a:endParaRPr/></a:p></a:txBody><a:tcPr marL="91440" marR="91440"><a:lnL w="12240"><a:solidFill><a:srgbClr val="ffffff"/></a:solidFill></a:lnL><a:lnR w="12240"><a:solidFill><a:srgbClr val="ffffff"/></a:solidFill></a:lnR><a:lnT w="12240"><a:solidFill><a:srgbClr val="ffffff"/></a:solidFill></a:lnT><a:lnB w="12240"><a:solidFill><a:srgbClr val="ffffff"/></a:solidFill></a:lnB><a:solidFill><a:srgbClr val="d0d8e7"/></a:solidFill></a:tcPr></a:tc><a:tc><a:txBody><a:bodyPr></a:bodyPr><a:p><a:pPr><a:lnSpc><a:spcPct val="100000"/></a:lnSpc></a:pPr><a:r><a:rPr lang="fr-FR" sz="1800" spc="-1" strike="noStrike"><a:solidFill><a:srgbClr val="000000"/></a:solidFill><a:uFill><a:solidFill><a:srgbClr val="ffffff"/></a:solidFill></a:uFill><a:latin typeface="Calibri"/></a:rPr><a:t>Text</a:t></a:r><a:endParaRPr/></a:p></a:txBody><a:tcPr marL="91440" marR="91440"><a:lnL w="12240"><a:solidFill><a:srgbClr val="ffffff"/></a:solidFill></a:lnL><a:lnR w="12240"><a:solidFill><a:srgbClr val="ffffff"/></a:solidFill></a:lnR><a:lnT w="12240"><a:solidFill><a:srgbClr val="ffffff"/></a:solidFill></a:lnT><a:lnB w="12240"><a:solidFill><a:srgbClr val="ffffff"/></a:solidFill></a:lnB><a:solidFill><a:srgbClr val="d0d8e7"/></a:solidFill></a:tcPr></a:tc><a:tc rowSpan="3"><a:txBody><a:bodyPr></a:bodyPr><a:p><a:pPr><a:lnSpc><a:spcPct val="100000"/></a:lnSpc></a:pPr><a:r><a:rPr lang="fr-FR" sz="1800" spc="-1" strike="noStrike"><a:solidFill><a:srgbClr val="000000"/></a:solidFill><a:uFill><a:solidFill><a:srgbClr val="ffffff"/></a:solidFill></a:uFill><a:latin typeface="Calibri"/></a:rPr><a:t>Class_limites</a:t></a:r><a:endParaRPr/></a:p></a:txBody><a:tcPr marL="91440" marR="91440"><a:lnL w="12240"><a:solidFill><a:srgbClr val="ffffff"/></a:solidFill></a:lnL><a:lnR w="12240"><a:solidFill><a:srgbClr val="ffffff"/></a:solidFill></a:lnR><a:lnT w="12240"><a:solidFill><a:srgbClr val="ffffff"/></a:solidFill></a:lnT><a:lnB w="12240"><a:solidFill><a:srgbClr val="ffffff"/></a:solidFill></a:lnB><a:solidFill><a:srgbClr val="d0d8e7"/></a:solidFill></a:tcPr></a:tc><a:tc rowSpan="3"><a:txBody><a:bodyPr></a:bodyPr><a:p><a:pPr><a:lnSpc><a:spcPct val="100000"/></a:lnSpc></a:pPr><a:r><a:rPr lang="fr-FR" sz="1800" spc="-1" strike="noStrike"><a:solidFill><a:srgbClr val="000000"/></a:solidFill><a:uFill><a:solidFill><a:srgbClr val="ffffff"/></a:solidFill></a:uFill><a:latin typeface="Calibri"/></a:rPr><a:t>ID</a:t></a:r><a:endParaRPr/></a:p></a:txBody><a:tcPr marL="91440" marR="91440"><a:lnL w="12240"><a:solidFill><a:srgbClr val="ffffff"/></a:solidFill></a:lnL><a:lnR w="12240"><a:solidFill><a:srgbClr val="ffffff"/></a:solidFill></a:lnR><a:lnT w="12240"><a:solidFill><a:srgbClr val="ffffff"/></a:solidFill></a:lnT><a:lnB w="12240"><a:solidFill><a:srgbClr val="ffffff"/></a:solidFill></a:lnB><a:solidFill><a:srgbClr val="d0d8e7"/></a:solidFill></a:tcPr></a:tc><a:tc rowSpan="3"><a:txBody><a:bodyPr></a:bodyPr><a:p><a:pPr><a:lnSpc><a:spcPct val="100000"/></a:lnSpc></a:pPr><a:r><a:rPr lang="fr-FR" sz="1800" spc="-1" strike="noStrike"><a:solidFill><a:srgbClr val="000000"/></a:solidFill><a:uFill><a:solidFill><a:srgbClr val="ffffff"/></a:solidFill></a:uFill><a:latin typeface="Calibri"/></a:rPr><a:t>N/A</a:t></a:r><a:endParaRPr/></a:p></a:txBody><a:tcPr marL="91440" marR="91440"><a:lnL w="12240"><a:solidFill><a:srgbClr val="ffffff"/></a:solidFill></a:lnL><a:lnR w="12240"><a:solidFill><a:srgbClr val="ffffff"/></a:solidFill></a:lnR><a:lnT w="12240"><a:solidFill><a:srgbClr val="ffffff"/></a:solidFill></a:lnT><a:lnB w="12240"><a:solidFill><a:srgbClr val="ffffff"/></a:solidFill></a:lnB><a:solidFill><a:srgbClr val="d0d8e7"/></a:solidFill></a:tcPr></a:tc></a:tr><a:tr h="640080"><a:tc><a:txBody><a:bodyPr></a:bodyPr><a:p><a:pPr><a:lnSpc><a:spcPct val="100000"/></a:lnSpc></a:pPr><a:r><a:rPr lang="fr-FR" sz="1800" spc="-1" strike="noStrike"><a:solidFill><a:srgbClr val="000000"/></a:solidFill><a:uFill><a:solidFill><a:srgbClr val="ffffff"/></a:solidFill></a:uFill><a:latin typeface="Calibri"/></a:rPr><a:t>Type</a:t></a:r><a:endParaRPr/></a:p></a:txBody><a:tcPr marL="91440" marR="91440"><a:lnL w="12240"><a:solidFill><a:srgbClr val="ffffff"/></a:solidFill></a:lnL><a:lnR w="12240"><a:solidFill><a:srgbClr val="ffffff"/></a:solidFill></a:lnR><a:lnT w="12240"><a:solidFill><a:srgbClr val="ffffff"/></a:solidFill></a:lnT><a:lnB w="12240"><a:solidFill><a:srgbClr val="ffffff"/></a:solidFill></a:lnB><a:solidFill><a:srgbClr val="e9ecf3"/></a:solidFill></a:tcPr></a:tc><a:tc><a:txBody><a:bodyPr></a:bodyPr><a:p><a:pPr><a:lnSpc><a:spcPct val="100000"/></a:lnSpc></a:pPr><a:r><a:rPr lang="fr-FR" sz="1800" spc="-1" strike="noStrike"><a:solidFill><a:srgbClr val="000000"/></a:solidFill><a:uFill><a:solidFill><a:srgbClr val="ffffff"/></a:solidFill></a:uFill><a:latin typeface="Calibri"/></a:rPr><a:t>Type</a:t></a:r><a:endParaRPr/></a:p></a:txBody><a:tcPr marL="91440" marR="91440"><a:lnL w="12240"><a:solidFill><a:srgbClr val="ffffff"/></a:solidFill></a:lnL><a:lnR w="12240"><a:solidFill><a:srgbClr val="ffffff"/></a:solidFill></a:lnR><a:lnT w="12240"><a:solidFill><a:srgbClr val="ffffff"/></a:solidFill></a:lnT><a:lnB w="12240"><a:solidFill><a:srgbClr val="ffffff"/></a:solidFill></a:lnB><a:solidFill><a:srgbClr val="e9ecf3"/></a:solidFill></a:tcPr></a:tc><a:tc><a:txBody><a:bodyPr></a:bodyPr><a:p><a:pPr><a:lnSpc><a:spcPct val="100000"/></a:lnSpc></a:pPr><a:r><a:rPr lang="fr-FR" sz="1800" spc="-1" strike="noStrike"><a:solidFill><a:srgbClr val="000000"/></a:solidFill><a:uFill><a:solidFill><a:srgbClr val="ffffff"/></a:solidFill></a:uFill><a:latin typeface="Calibri"/></a:rPr><a:t>Text</a:t></a:r><a:endParaRPr/></a:p></a:txBody><a:tcPr marL="91440" marR="91440"><a:lnL w="12240"><a:solidFill><a:srgbClr val="ffffff"/></a:solidFill></a:lnL><a:lnR w="12240"><a:solidFill><a:srgbClr val="ffffff"/></a:solidFill></a:lnR><a:lnT w="12240"><a:solidFill><a:srgbClr val="ffffff"/></a:solidFill></a:lnT><a:lnB w="12240"><a:solidFill><a:srgbClr val="ffffff"/></a:solidFill></a:lnB><a:solidFill><a:srgbClr val="e9ecf3"/></a:solidFill></a:tcPr></a:tc><a:tc vMerge="1"><a:tcPr><a:solidFill><a:srgbClr val="729fcf"/></a:solidFill></a:tcPr></a:tc><a:tc vMerge="1"><a:tcPr><a:solidFill><a:srgbClr val="729fcf"/></a:solidFill></a:tcPr></a:tc><a:tc vMerge="1"><a:tcPr><a:solidFill><a:srgbClr val="729fcf"/></a:solidFill></a:tcPr></a:tc></a:tr><a:tr h="640080"><a:tc><a:txBody><a:bodyPr></a:bodyPr><a:p><a:pPr><a:lnSpc><a:spcPct val="100000"/></a:lnSpc></a:pPr><a:r><a:rPr lang="fr-FR" sz="1800" spc="-1" strike="noStrike"><a:solidFill><a:srgbClr val="000000"/></a:solidFill><a:uFill><a:solidFill><a:srgbClr val="ffffff"/></a:solidFill></a:uFill><a:latin typeface="Calibri"/></a:rPr><a:t>Limite</a:t></a:r><a:endParaRPr/></a:p></a:txBody><a:tcPr marL="91440" marR="91440"><a:lnL w="12240"><a:solidFill><a:srgbClr val="ffffff"/></a:solidFill></a:lnL><a:lnR w="12240"><a:solidFill><a:srgbClr val="ffffff"/></a:solidFill></a:lnR><a:lnT w="12240"><a:solidFill><a:srgbClr val="ffffff"/></a:solidFill></a:lnT><a:lnB w="12240"><a:solidFill><a:srgbClr val="ffffff"/></a:solidFill></a:lnB><a:solidFill><a:srgbClr val="d0d8e7"/></a:solidFill></a:tcPr></a:tc><a:tc><a:txBody><a:bodyPr></a:bodyPr><a:p><a:pPr><a:lnSpc><a:spcPct val="100000"/></a:lnSpc></a:pPr><a:r><a:rPr lang="fr-FR" sz="1800" spc="-1" strike="noStrike"><a:solidFill><a:srgbClr val="000000"/></a:solidFill><a:uFill><a:solidFill><a:srgbClr val="ffffff"/></a:solidFill></a:uFill><a:latin typeface="Calibri"/></a:rPr><a:t>Limite</a:t></a:r><a:endParaRPr/></a:p></a:txBody><a:tcPr marL="91440" marR="91440"><a:lnL w="12240"><a:solidFill><a:srgbClr val="ffffff"/></a:solidFill></a:lnL><a:lnR w="12240"><a:solidFill><a:srgbClr val="ffffff"/></a:solidFill></a:lnR><a:lnT w="12240"><a:solidFill><a:srgbClr val="ffffff"/></a:solidFill></a:lnT><a:lnB w="12240"><a:solidFill><a:srgbClr val="ffffff"/></a:solidFill></a:lnB><a:solidFill><a:srgbClr val="d0d8e7"/></a:solidFill></a:tcPr></a:tc><a:tc><a:txBody><a:bodyPr></a:bodyPr><a:p><a:pPr><a:lnSpc><a:spcPct val="100000"/></a:lnSpc></a:pPr><a:r><a:rPr lang="fr-FR" sz="1800" spc="-1" strike="noStrike"><a:solidFill><a:srgbClr val="000000"/></a:solidFill><a:uFill><a:solidFill><a:srgbClr val="ffffff"/></a:solidFill></a:uFill><a:latin typeface="Calibri"/></a:rPr><a:t>Integer</a:t></a:r><a:endParaRPr/></a:p></a:txBody><a:tcPr marL="91440" marR="91440"><a:lnL w="12240"><a:solidFill><a:srgbClr val="ffffff"/></a:solidFill></a:lnL><a:lnR w="12240"><a:solidFill><a:srgbClr val="ffffff"/></a:solidFill></a:lnR><a:lnT w="12240"><a:solidFill><a:srgbClr val="ffffff"/></a:solidFill></a:lnT><a:lnB w="12240"><a:solidFill><a:srgbClr val="ffffff"/></a:solidFill></a:lnB><a:solidFill><a:srgbClr val="d0d8e7"/></a:solidFill></a:tcPr></a:tc><a:tcPr><a:solidFill><a:srgbClr val="729fcf"/></a:solidFill></a:tcPr></a:tc><a:tcPr><a:solidFill><a:srgbClr val="729fcf"/></a:solidFill></a:tcPr></a:tc><a:tcPr><a:solidFill><a:srgbClr val="729fcf"/></a:solidFill></a:tcPr></a:tc></a:tr></a:tbl></a:graphicData></a:graphic></p:graphicFrame></p:spTree></p:cSld><p:timing><p:tnLst><p:par><p:cTn id="13" dur="indefinite" restart="never" nodeType="tmRoot"><p:childTnLst><p:seq><p:cTn id="14" nodeType="mainSeq"></p:cTn><p:prevCondLst><p:cond delay="0" evt="onPrev"><p:tgtEl><p:sldTgt/></p:tgtEl></p:cond></p:prevCondLst><p:nextCondLst><p:cond delay="0" evt="onNext"><p:tgtEl><p:sldTgt/></p:tgtEl></p:cond></p:nextCondLst></p:seq></p:childTnLst></p:cTn></p:par></p:tnLst></p:timing></p:sld>
+<p:sld xmlns:a="http://schemas.openxmlformats.org/drawingml/2006/main" xmlns:p="http://schemas.openxmlformats.org/presentationml/2006/main" xmlns:r="http://schemas.openxmlformats.org/officeDocument/2006/relationships"><p:cSld><p:spTree><p:nvGrpSpPr>        <p:cNvPr id="1" name=""/>        <p:cNvGrpSpPr/>        <p:nvPr/>      </p:nvGrpSpPr>      <p:grpSpPr>        <a:xfrm>          <a:off x="0" y="0"/>          <a:ext cx="0" cy="0"/>          <a:chOff x="0" y="0"/>          <a:chExt cx="0" cy="0"/>        </a:xfrm>      </p:grpSpPr><p:sp><p:nvSpPr><p:cNvPr id="84" name="CustomShape 1"></p:cNvPr><p:cNvSpPr/><p:nvPr/></p:nvSpPr><p:spPr><a:xfrm><a:off x="457200" y="274680"/><a:ext cx="8228520" cy="1141920"/></a:xfrm><a:prstGeom prst="rect"><a:avLst></a:avLst></a:prstGeom><a:noFill/><a:ln><a:noFill/></a:ln></p:spPr><p:style><a:lnRef idx="0"></a:lnRef><a:fillRef idx="0"/><a:effectRef idx="0"></a:effectRef><a:fontRef idx="minor"/></p:style><p:txBody><a:bodyPr lIns="90000" rIns="90000" tIns="45000" bIns="45000" anchor="ctr"></a:bodyPr><a:p><a:pPr algn="ctr"><a:lnSpc><a:spcPct val="100000"/></a:lnSpc></a:pPr><a:r><a:rPr lang="fr-FR" sz="4400" spc="-1" strike="noStrike"><a:solidFill><a:srgbClr val="000000"/></a:solidFill><a:uFill><a:solidFill><a:srgbClr val="ffffff"/></a:solidFill></a:uFill><a:latin typeface="Calibri"/><a:ea typeface="DejaVu Sans"/></a:rPr><a:t>Table des limites microbiologiques par classe (en UFC)</a:t></a:r><a:endParaRPr/></a:p></p:txBody></p:sp><p:graphicFrame><p:nvGraphicFramePr><p:cNvPr id="85" name="Table 2"/><p:cNvGraphicFramePr/><p:nvPr/></p:nvGraphicFramePr><p:xfrm><a:off x="64440" y="1556640"/><a:ext cx="8899200" cy="2559960"/></p:xfrm><a:graphic><a:graphicData uri="http://schemas.openxmlformats.org/drawingml/2006/table"><a:tbl><a:tblPr/><a:tblGrid><a:gridCol w="2114280"/><a:gridCol w="1423800"/><a:gridCol w="1423800"/><a:gridCol w="1848960"/><a:gridCol w="998640"/><a:gridCol w="1090080"/></a:tblGrid><a:tr h="640080"><a:tc><a:txBody><a:bodyPr></a:bodyPr><a:p><a:pPr><a:lnSpc><a:spcPct val="100000"/></a:lnSpc></a:pPr><a:r><a:rPr b="1" lang="fr-FR" sz="1800" spc="-1" strike="noStrike"><a:solidFill><a:srgbClr val="ffffff"/></a:solidFill><a:uFill><a:solidFill><a:srgbClr val="ffffff"/></a:solidFill></a:uFill><a:latin typeface="Calibri"/></a:rPr><a:t>Etiquette</a:t></a:r><a:endParaRPr/></a:p></a:txBody><a:tcPr marL="91440" marR="91440"><a:lnL w="12240"><a:solidFill><a:srgbClr val="ffffff"/></a:solidFill></a:lnL><a:lnR w="12240"><a:solidFill><a:srgbClr val="ffffff"/></a:solidFill></a:lnR><a:lnT w="12240"><a:solidFill><a:srgbClr val="ffffff"/></a:solidFill></a:lnT><a:lnB w="38160"><a:solidFill><a:srgbClr val="ffffff"/></a:solidFill></a:lnB><a:solidFill><a:srgbClr val="4f81bd"/></a:solidFill></a:tcPr></a:tc><a:tc><a:txBody><a:bodyPr></a:bodyPr><a:p><a:pPr><a:lnSpc><a:spcPct val="100000"/></a:lnSpc></a:pPr><a:r><a:rPr b="1" lang="fr-FR" sz="1800" spc="-1" strike="noStrike"><a:solidFill><a:srgbClr val="ffffff"/></a:solidFill><a:uFill><a:solidFill><a:srgbClr val="ffffff"/></a:solidFill></a:uFill><a:latin typeface="Calibri"/></a:rPr><a:t>Nom de variable</a:t></a:r><a:endParaRPr/></a:p></a:txBody><a:tcPr marL="91440" marR="91440"><a:lnL w="12240"><a:solidFill><a:srgbClr val="ffffff"/></a:solidFill></a:lnL><a:lnR w="12240"><a:solidFill><a:srgbClr val="ffffff"/></a:solidFill></a:lnR><a:lnT w="12240"><a:solidFill><a:srgbClr val="ffffff"/></a:solidFill></a:lnT><a:lnB w="38160"><a:solidFill><a:srgbClr val="ffffff"/></a:solidFill></a:lnB><a:solidFill><a:srgbClr val="4f81bd"/></a:solidFill></a:tcPr></a:tc><a:tc><a:txBody><a:bodyPr></a:bodyPr><a:p><a:pPr><a:lnSpc><a:spcPct val="100000"/></a:lnSpc></a:pPr><a:r><a:rPr b="1" lang="fr-FR" sz="1800" spc="-1" strike="noStrike"><a:solidFill><a:srgbClr val="ffffff"/></a:solidFill><a:uFill><a:solidFill><a:srgbClr val="ffffff"/></a:solidFill></a:uFill><a:latin typeface="Calibri"/></a:rPr><a:t>Type</a:t></a:r><a:endParaRPr/></a:p></a:txBody><a:tcPr marL="91440" marR="91440"><a:lnL w="12240"><a:solidFill><a:srgbClr val="ffffff"/></a:solidFill></a:lnL><a:lnR w="12240"><a:solidFill><a:srgbClr val="ffffff"/></a:solidFill></a:lnR><a:lnT w="12240"><a:solidFill><a:srgbClr val="ffffff"/></a:solidFill></a:lnT><a:lnB w="38160"><a:solidFill><a:srgbClr val="ffffff"/></a:solidFill></a:lnB><a:solidFill><a:srgbClr val="4f81bd"/></a:solidFill></a:tcPr></a:tc><a:tc><a:txBody><a:bodyPr></a:bodyPr><a:p><a:pPr><a:lnSpc><a:spcPct val="100000"/></a:lnSpc></a:pPr><a:r><a:rPr b="1" lang="fr-FR" sz="1800" spc="-1" strike="noStrike"><a:solidFill><a:srgbClr val="ffffff"/></a:solidFill><a:uFill><a:solidFill><a:srgbClr val="ffffff"/></a:solidFill></a:uFill><a:latin typeface="Calibri"/></a:rPr><a:t>Table</a:t></a:r><a:endParaRPr/></a:p></a:txBody><a:tcPr marL="91440" marR="91440"><a:lnL w="12240"><a:solidFill><a:srgbClr val="ffffff"/></a:solidFill></a:lnL><a:lnR w="12240"><a:solidFill><a:srgbClr val="ffffff"/></a:solidFill></a:lnR><a:lnT w="12240"><a:solidFill><a:srgbClr val="ffffff"/></a:solidFill></a:lnT><a:lnB w="38160"><a:solidFill><a:srgbClr val="ffffff"/></a:solidFill></a:lnB><a:solidFill><a:srgbClr val="4f81bd"/></a:solidFill></a:tcPr></a:tc><a:tc><a:txBody><a:bodyPr></a:bodyPr><a:p><a:pPr><a:lnSpc><a:spcPct val="100000"/></a:lnSpc></a:pPr><a:r><a:rPr b="1" lang="fr-FR" sz="1800" spc="-1" strike="noStrike"><a:solidFill><a:srgbClr val="ffffff"/></a:solidFill><a:uFill><a:solidFill><a:srgbClr val="ffffff"/></a:solidFill></a:uFill><a:latin typeface="Calibri"/></a:rPr><a:t>Clé </a:t></a:r><a:endParaRPr/></a:p><a:p><a:pPr><a:lnSpc><a:spcPct val="100000"/></a:lnSpc></a:pPr><a:r><a:rPr b="1" lang="fr-FR" sz="1800" spc="-1" strike="noStrike"><a:solidFill><a:srgbClr val="ffffff"/></a:solidFill><a:uFill><a:solidFill><a:srgbClr val="ffffff"/></a:solidFill></a:uFill><a:latin typeface="Calibri"/></a:rPr><a:t>primaire</a:t></a:r><a:endParaRPr/></a:p></a:txBody><a:tcPr marL="91440" marR="91440"><a:lnL w="12240"><a:solidFill><a:srgbClr val="ffffff"/></a:solidFill></a:lnL><a:lnR w="12240"><a:solidFill><a:srgbClr val="ffffff"/></a:solidFill></a:lnR><a:lnT w="12240"><a:solidFill><a:srgbClr val="ffffff"/></a:solidFill></a:lnT><a:lnB w="38160"><a:solidFill><a:srgbClr val="ffffff"/></a:solidFill></a:lnB><a:solidFill><a:srgbClr val="4f81bd"/></a:solidFill></a:tcPr></a:tc><a:tc><a:txBody><a:bodyPr></a:bodyPr><a:p><a:pPr><a:lnSpc><a:spcPct val="100000"/></a:lnSpc></a:pPr><a:r><a:rPr b="1" lang="fr-FR" sz="1800" spc="-1" strike="noStrike"><a:solidFill><a:srgbClr val="ffffff"/></a:solidFill><a:uFill><a:solidFill><a:srgbClr val="ffffff"/></a:solidFill></a:uFill><a:latin typeface="Calibri"/></a:rPr><a:t>Clé étrangère</a:t></a:r><a:endParaRPr/></a:p></a:txBody><a:tcPr marL="91440" marR="91440"><a:lnL w="12240"><a:solidFill><a:srgbClr val="ffffff"/></a:solidFill></a:lnL><a:lnR w="12240"><a:solidFill><a:srgbClr val="ffffff"/></a:solidFill></a:lnR><a:lnT w="12240"><a:solidFill><a:srgbClr val="ffffff"/></a:solidFill></a:lnT><a:lnB w="38160"><a:solidFill><a:srgbClr val="ffffff"/></a:solidFill></a:lnB><a:solidFill><a:srgbClr val="4f81bd"/></a:solidFill></a:tcPr></a:tc></a:tr><a:tr h="640080"><a:tc><a:txBody><a:bodyPr></a:bodyPr><a:p><a:pPr><a:lnSpc><a:spcPct val="100000"/></a:lnSpc></a:pPr><a:r><a:rPr lang="fr-FR" sz="1800" spc="-1" strike="noStrike"><a:solidFill><a:srgbClr val="000000"/></a:solidFill><a:uFill><a:solidFill><a:srgbClr val="ffffff"/></a:solidFill></a:uFill><a:latin typeface="Calibri"/></a:rPr><a:t>Classe</a:t></a:r><a:endParaRPr/></a:p></a:txBody><a:tcPr marL="91440" marR="91440"><a:lnL w="12240"><a:solidFill><a:srgbClr val="ffffff"/></a:solidFill></a:lnL><a:lnR w="12240"><a:solidFill><a:srgbClr val="ffffff"/></a:solidFill></a:lnR><a:lnT w="12240"><a:solidFill><a:srgbClr val="ffffff"/></a:solidFill></a:lnT><a:lnB w="12240"><a:solidFill><a:srgbClr val="ffffff"/></a:solidFill></a:lnB><a:solidFill><a:srgbClr val="d0d8e7"/></a:solidFill></a:tcPr></a:tc><a:tc><a:txBody><a:bodyPr></a:bodyPr><a:p><a:pPr><a:lnSpc><a:spcPct val="100000"/></a:lnSpc></a:pPr><a:r><a:rPr lang="fr-FR" sz="1800" spc="-1" strike="noStrike"><a:solidFill><a:srgbClr val="000000"/></a:solidFill><a:uFill><a:solidFill><a:srgbClr val="ffffff"/></a:solidFill></a:uFill><a:latin typeface="Calibri"/></a:rPr><a:t>Classe</a:t></a:r><a:endParaRPr/></a:p></a:txBody><a:tcPr marL="91440" marR="91440"><a:lnL w="12240"><a:solidFill><a:srgbClr val="ffffff"/></a:solidFill></a:lnL><a:lnR w="12240"><a:solidFill><a:srgbClr val="ffffff"/></a:solidFill></a:lnR><a:lnT w="12240"><a:solidFill><a:srgbClr val="ffffff"/></a:solidFill></a:lnT><a:lnB w="12240"><a:solidFill><a:srgbClr val="ffffff"/></a:solidFill></a:lnB><a:solidFill><a:srgbClr val="d0d8e7"/></a:solidFill></a:tcPr></a:tc><a:tc><a:txBody><a:bodyPr></a:bodyPr><a:p><a:pPr><a:lnSpc><a:spcPct val="100000"/></a:lnSpc></a:pPr><a:r><a:rPr lang="fr-FR" sz="1800" spc="-1" strike="noStrike"><a:solidFill><a:srgbClr val="000000"/></a:solidFill><a:uFill><a:solidFill><a:srgbClr val="ffffff"/></a:solidFill></a:uFill><a:latin typeface="Calibri"/></a:rPr><a:t>Text</a:t></a:r><a:endParaRPr/></a:p></a:txBody><a:tcPr marL="91440" marR="91440"><a:lnL w="12240"><a:solidFill><a:srgbClr val="ffffff"/></a:solidFill></a:lnL><a:lnR w="12240"><a:solidFill><a:srgbClr val="ffffff"/></a:solidFill></a:lnR><a:lnT w="12240"><a:solidFill><a:srgbClr val="ffffff"/></a:solidFill></a:lnT><a:lnB w="12240"><a:solidFill><a:srgbClr val="ffffff"/></a:solidFill></a:lnB><a:solidFill><a:srgbClr val="d0d8e7"/></a:solidFill></a:tcPr></a:tc><a:tc rowSpan="3"><a:txBody><a:bodyPr></a:bodyPr><a:p><a:pPr><a:lnSpc><a:spcPct val="100000"/></a:lnSpc></a:pPr><a:r><a:rPr lang="fr-FR" sz="1800" spc="-1" strike="noStrike"><a:solidFill><a:srgbClr val="000000"/></a:solidFill><a:uFill><a:solidFill><a:srgbClr val="ffffff"/></a:solidFill></a:uFill><a:latin typeface="Calibri"/></a:rPr><a:t>Class_limites</a:t></a:r><a:endParaRPr/></a:p></a:txBody><a:tcPr marL="91440" marR="91440"><a:lnL w="12240"><a:solidFill><a:srgbClr val="ffffff"/></a:solidFill></a:lnL><a:lnR w="12240"><a:solidFill><a:srgbClr val="ffffff"/></a:solidFill></a:lnR><a:lnT w="12240"><a:solidFill><a:srgbClr val="ffffff"/></a:solidFill></a:lnT><a:lnB w="12240"><a:solidFill><a:srgbClr val="ffffff"/></a:solidFill></a:lnB><a:solidFill><a:srgbClr val="d0d8e7"/></a:solidFill></a:tcPr></a:tc><a:tc rowSpan="3"><a:txBody><a:bodyPr></a:bodyPr><a:p><a:pPr><a:lnSpc><a:spcPct val="100000"/></a:lnSpc></a:pPr><a:r><a:rPr lang="fr-FR" sz="1800" spc="-1" strike="noStrike"><a:solidFill><a:srgbClr val="000000"/></a:solidFill><a:uFill><a:solidFill><a:srgbClr val="ffffff"/></a:solidFill></a:uFill><a:latin typeface="Calibri"/></a:rPr><a:t>ID</a:t></a:r><a:endParaRPr/></a:p></a:txBody><a:tcPr marL="91440" marR="91440"><a:lnL w="12240"><a:solidFill><a:srgbClr val="ffffff"/></a:solidFill></a:lnL><a:lnR w="12240"><a:solidFill><a:srgbClr val="ffffff"/></a:solidFill></a:lnR><a:lnT w="12240"><a:solidFill><a:srgbClr val="ffffff"/></a:solidFill></a:lnT><a:lnB w="12240"><a:solidFill><a:srgbClr val="ffffff"/></a:solidFill></a:lnB><a:solidFill><a:srgbClr val="d0d8e7"/></a:solidFill></a:tcPr></a:tc><a:tc rowSpan="3"><a:txBody><a:bodyPr></a:bodyPr><a:p><a:pPr><a:lnSpc><a:spcPct val="100000"/></a:lnSpc></a:pPr><a:r><a:rPr lang="fr-FR" sz="1800" spc="-1" strike="noStrike"><a:solidFill><a:srgbClr val="000000"/></a:solidFill><a:uFill><a:solidFill><a:srgbClr val="ffffff"/></a:solidFill></a:uFill><a:latin typeface="Calibri"/></a:rPr><a:t>N/A</a:t></a:r><a:endParaRPr/></a:p></a:txBody><a:tcPr marL="91440" marR="91440"><a:lnL w="12240"><a:solidFill><a:srgbClr val="ffffff"/></a:solidFill></a:lnL><a:lnR w="12240"><a:solidFill><a:srgbClr val="ffffff"/></a:solidFill></a:lnR><a:lnT w="12240"><a:solidFill><a:srgbClr val="ffffff"/></a:solidFill></a:lnT><a:lnB w="12240"><a:solidFill><a:srgbClr val="ffffff"/></a:solidFill></a:lnB><a:solidFill><a:srgbClr val="d0d8e7"/></a:solidFill></a:tcPr></a:tc></a:tr><a:tr h="640080"><a:tc><a:txBody><a:bodyPr></a:bodyPr><a:p><a:pPr><a:lnSpc><a:spcPct val="100000"/></a:lnSpc></a:pPr><a:r><a:rPr lang="fr-FR" sz="1800" spc="-1" strike="noStrike"><a:solidFill><a:srgbClr val="000000"/></a:solidFill><a:uFill><a:solidFill><a:srgbClr val="ffffff"/></a:solidFill></a:uFill><a:latin typeface="Calibri"/></a:rPr><a:t>Type</a:t></a:r><a:endParaRPr/></a:p></a:txBody><a:tcPr marL="91440" marR="91440"><a:lnL w="12240"><a:solidFill><a:srgbClr val="ffffff"/></a:solidFill></a:lnL><a:lnR w="12240"><a:solidFill><a:srgbClr val="ffffff"/></a:solidFill></a:lnR><a:lnT w="12240"><a:solidFill><a:srgbClr val="ffffff"/></a:solidFill></a:lnT><a:lnB w="12240"><a:solidFill><a:srgbClr val="ffffff"/></a:solidFill></a:lnB><a:solidFill><a:srgbClr val="e9ecf3"/></a:solidFill></a:tcPr></a:tc><a:tc><a:txBody><a:bodyPr></a:bodyPr><a:p><a:pPr><a:lnSpc><a:spcPct val="100000"/></a:lnSpc></a:pPr><a:r><a:rPr lang="fr-FR" sz="1800" spc="-1" strike="noStrike"><a:solidFill><a:srgbClr val="000000"/></a:solidFill><a:uFill><a:solidFill><a:srgbClr val="ffffff"/></a:solidFill></a:uFill><a:latin typeface="Calibri"/></a:rPr><a:t>Type</a:t></a:r><a:endParaRPr/></a:p></a:txBody><a:tcPr marL="91440" marR="91440"><a:lnL w="12240"><a:solidFill><a:srgbClr val="ffffff"/></a:solidFill></a:lnL><a:lnR w="12240"><a:solidFill><a:srgbClr val="ffffff"/></a:solidFill></a:lnR><a:lnT w="12240"><a:solidFill><a:srgbClr val="ffffff"/></a:solidFill></a:lnT><a:lnB w="12240"><a:solidFill><a:srgbClr val="ffffff"/></a:solidFill></a:lnB><a:solidFill><a:srgbClr val="e9ecf3"/></a:solidFill></a:tcPr></a:tc><a:tc><a:txBody><a:bodyPr></a:bodyPr><a:p><a:pPr><a:lnSpc><a:spcPct val="100000"/></a:lnSpc></a:pPr><a:r><a:rPr lang="fr-FR" sz="1800" spc="-1" strike="noStrike"><a:solidFill><a:srgbClr val="000000"/></a:solidFill><a:uFill><a:solidFill><a:srgbClr val="ffffff"/></a:solidFill></a:uFill><a:latin typeface="Calibri"/></a:rPr><a:t>Text</a:t></a:r><a:endParaRPr/></a:p></a:txBody><a:tcPr marL="91440" marR="91440"><a:lnL w="12240"><a:solidFill><a:srgbClr val="ffffff"/></a:solidFill></a:lnL><a:lnR w="12240"><a:solidFill><a:srgbClr val="ffffff"/></a:solidFill></a:lnR><a:lnT w="12240"><a:solidFill><a:srgbClr val="ffffff"/></a:solidFill></a:lnT><a:lnB w="12240"><a:solidFill><a:srgbClr val="ffffff"/></a:solidFill></a:lnB><a:solidFill><a:srgbClr val="e9ecf3"/></a:solidFill></a:tcPr></a:tc><a:tc vMerge="1"><a:tcPr><a:solidFill><a:srgbClr val="729fcf"/></a:solidFill></a:tcPr></a:tc><a:tc vMerge="1"><a:tcPr><a:solidFill><a:srgbClr val="729fcf"/></a:solidFill></a:tcPr></a:tc><a:tc vMerge="1"><a:tcPr><a:solidFill><a:srgbClr val="729fcf"/></a:solidFill></a:tcPr></a:tc></a:tr><a:tr h="640080"><a:tc><a:txBody><a:bodyPr></a:bodyPr><a:p><a:pPr><a:lnSpc><a:spcPct val="100000"/></a:lnSpc></a:pPr><a:r><a:rPr lang="fr-FR" sz="1800" spc="-1" strike="noStrike"><a:solidFill><a:srgbClr val="000000"/></a:solidFill><a:uFill><a:solidFill><a:srgbClr val="ffffff"/></a:solidFill></a:uFill><a:latin typeface="Calibri"/></a:rPr><a:t>Limite</a:t></a:r><a:endParaRPr/></a:p></a:txBody><a:tcPr marL="91440" marR="91440"><a:lnL w="12240"><a:solidFill><a:srgbClr val="ffffff"/></a:solidFill></a:lnL><a:lnR w="12240"><a:solidFill><a:srgbClr val="ffffff"/></a:solidFill></a:lnR><a:lnT w="12240"><a:solidFill><a:srgbClr val="ffffff"/></a:solidFill></a:lnT><a:lnB w="12240"><a:solidFill><a:srgbClr val="ffffff"/></a:solidFill></a:lnB><a:solidFill><a:srgbClr val="d0d8e7"/></a:solidFill></a:tcPr></a:tc><a:tc><a:txBody><a:bodyPr></a:bodyPr><a:p><a:pPr><a:lnSpc><a:spcPct val="100000"/></a:lnSpc></a:pPr><a:r><a:rPr lang="fr-FR" sz="1800" spc="-1" strike="noStrike"><a:solidFill><a:srgbClr val="000000"/></a:solidFill><a:uFill><a:solidFill><a:srgbClr val="ffffff"/></a:solidFill></a:uFill><a:latin typeface="Calibri"/></a:rPr><a:t>Limite</a:t></a:r><a:endParaRPr/></a:p></a:txBody><a:tcPr marL="91440" marR="91440"><a:lnL w="12240"><a:solidFill><a:srgbClr val="ffffff"/></a:solidFill></a:lnL><a:lnR w="12240"><a:solidFill><a:srgbClr val="ffffff"/></a:solidFill></a:lnR><a:lnT w="12240"><a:solidFill><a:srgbClr val="ffffff"/></a:solidFill></a:lnT><a:lnB w="12240"><a:solidFill><a:srgbClr val="ffffff"/></a:solidFill></a:lnB><a:solidFill><a:srgbClr val="d0d8e7"/></a:solidFill></a:tcPr></a:tc><a:tc><a:txBody><a:bodyPr></a:bodyPr><a:p><a:pPr><a:lnSpc><a:spcPct val="100000"/></a:lnSpc></a:pPr><a:r><a:rPr lang="fr-FR" sz="1800" spc="-1" strike="noStrike"><a:solidFill><a:srgbClr val="000000"/></a:solidFill><a:uFill><a:solidFill><a:srgbClr val="ffffff"/></a:solidFill></a:uFill><a:latin typeface="Calibri"/></a:rPr><a:t>Integer</a:t></a:r><a:endParaRPr/></a:p></a:txBody><a:tcPr marL="91440" marR="91440"><a:lnL w="12240"><a:solidFill><a:srgbClr val="ffffff"/></a:solidFill></a:lnL><a:lnR w="12240"><a:solidFill><a:srgbClr val="ffffff"/></a:solidFill></a:lnR><a:lnT w="12240"><a:solidFill><a:srgbClr val="ffffff"/></a:solidFill></a:lnT><a:lnB w="12240"><a:solidFill><a:srgbClr val="ffffff"/></a:solidFill></a:lnB><a:solidFill><a:srgbClr val="d0d8e7"/></a:solidFill></a:tcPr></a:tc><a:tcPr><a:solidFill><a:srgbClr val="729fcf"/></a:solidFill></a:tcPr></a:tc><a:tcPr><a:solidFill><a:srgbClr val="729fcf"/></a:solidFill></a:tcPr></a:tc><a:tcPr><a:solidFill><a:srgbClr val="729fcf"/></a:solidFill></a:tcPr></a:tc></a:tr></a:tbl></a:graphicData></a:graphic></p:graphicFrame></p:spTree></p:cSld><p:timing><p:tnLst><p:par><p:cTn id="13" dur="indefinite" restart="never" nodeType="tmRoot"><p:childTnLst><p:seq><p:cTn id="14" nodeType="mainSeq"></p:cTn><p:prevCondLst><p:cond delay="0" evt="onPrev"><p:tgtEl><p:sldTgt/></p:tgtEl></p:cond></p:prevCondLst><p:nextCondLst><p:cond delay="0" evt="onNext"><p:tgtEl><p:sldTgt/></p:tgtEl></p:cond></p:nextCondLst></p:seq></p:childTnLst></p:cTn></p:par></p:tnLst></p:timing></p:sld>
 </file>
 
-<file path=ppt/slides/slide8.xml><?xml version="1.0" encoding="utf-8"?>
-<p:sld xmlns:a="http://schemas.openxmlformats.org/drawingml/2006/main" xmlns:p="http://schemas.openxmlformats.org/presentationml/2006/main" xmlns:r="http://schemas.openxmlformats.org/officeDocument/2006/relationships">
-  <p:cSld>
-    <p:spTree>
-      <p:nvGrpSpPr>
-        <p:cNvPr id="1" name=""/>
-        <p:cNvGrpSpPr/>
-        <p:nvPr/>
-      </p:nvGrpSpPr>
-      <p:grpSpPr>
-        <a:xfrm>
-          <a:off x="0" y="0"/>
-          <a:ext cx="0" cy="0"/>
-          <a:chOff x="0" y="0"/>
-          <a:chExt cx="0" cy="0"/>
-        </a:xfrm>
-      </p:grpSpPr>
-      <p:sp>
-        <p:nvSpPr>
-          <p:cNvPr id="87" name="CustomShape 1"/>
-          <p:cNvSpPr/>
-          <p:nvPr/>
-        </p:nvSpPr>
-        <p:spPr>
-          <a:xfrm>
-            <a:off x="457200" y="274680"/>
-            <a:ext cx="8228880" cy="1142280"/>
-          </a:xfrm>
-          <a:prstGeom prst="rect">
-            <a:avLst/>
-          </a:prstGeom>
-          <a:noFill/>
-          <a:ln>
-            <a:noFill/>
-          </a:ln>
-        </p:spPr>
-        <p:style>
-          <a:lnRef idx="0"/>
-          <a:fillRef idx="0"/>
-          <a:effectRef idx="0"/>
-          <a:fontRef idx="minor"/>
-        </p:style>
-        <p:txBody>
-          <a:bodyPr lIns="90000" rIns="90000" tIns="45000" bIns="45000" anchor="ctr"/>
-          <a:p>
-            <a:pPr algn="ctr">
-              <a:lnSpc>
-                <a:spcPct val="100000"/>
-              </a:lnSpc>
-            </a:pPr>
-            <a:r>
-              <a:rPr lang="fr-FR" sz="4400" spc="-1" strike="noStrike">
-                <a:solidFill>
-                  <a:srgbClr val="000000"/>
-                </a:solidFill>
-                <a:uFill>
-                  <a:solidFill>
-                    <a:srgbClr val="ffffff"/>
-                  </a:solidFill>
-                </a:uFill>
-                <a:latin typeface="Calibri"/>
-              </a:rPr>
-              <a:t>Table des points de prélèvement</a:t>
-            </a:r>
-            <a:endParaRPr/>
-          </a:p>
-        </p:txBody>
-      </p:sp>
-      <p:graphicFrame>
-        <p:nvGraphicFramePr>
-          <p:cNvPr id="88" name="Table 2"/>
-          <p:cNvGraphicFramePr/>
-          <p:nvPr/>
-        </p:nvGraphicFramePr>
-        <p:xfrm>
-          <a:off x="64440" y="1418400"/>
-          <a:ext cx="8971200" cy="1076040"/>
-        </p:xfrm>
-        <a:graphic>
-          <a:graphicData uri="http://schemas.openxmlformats.org/drawingml/2006/table">
-            <a:tbl>
-              <a:tblPr/>
-              <a:tblGrid>
-                <a:gridCol w="2131200"/>
-                <a:gridCol w="1435320"/>
-                <a:gridCol w="796320"/>
-                <a:gridCol w="1152000"/>
-                <a:gridCol w="1440000"/>
-                <a:gridCol w="2016720"/>
-              </a:tblGrid>
-              <a:tr h="448920">
-                <a:tc>
-                  <a:txBody>
-                    <a:bodyPr/>
-                    <a:p>
-                      <a:pPr>
-                        <a:lnSpc>
-                          <a:spcPct val="100000"/>
-                        </a:lnSpc>
-                      </a:pPr>
-                      <a:r>
-                        <a:rPr b="1" lang="fr-FR" sz="1200" spc="-1" strike="noStrike">
-                          <a:solidFill>
-                            <a:srgbClr val="ffffff"/>
-                          </a:solidFill>
-                          <a:uFill>
-                            <a:solidFill>
-                              <a:srgbClr val="ffffff"/>
-                            </a:solidFill>
-                          </a:uFill>
-                          <a:latin typeface="Calibri"/>
-                        </a:rPr>
-                        <a:t>Etiquette</a:t>
-                      </a:r>
-                      <a:endParaRPr/>
-                    </a:p>
-                  </a:txBody>
-                  <a:tcPr marL="91440" marR="91440">
-                    <a:lnL w="12240">
-                      <a:solidFill>
-                        <a:srgbClr val="ffffff"/>
-                      </a:solidFill>
-                    </a:lnL>
-                    <a:lnR w="12240">
-                      <a:solidFill>
-                        <a:srgbClr val="ffffff"/>
-                      </a:solidFill>
-                    </a:lnR>
-                    <a:lnT w="12240">
-                      <a:solidFill>
-                        <a:srgbClr val="ffffff"/>
-                      </a:solidFill>
-                    </a:lnT>
-                    <a:lnB w="38160">
-                      <a:solidFill>
-                        <a:srgbClr val="ffffff"/>
-                      </a:solidFill>
-                    </a:lnB>
-                    <a:solidFill>
-                      <a:srgbClr val="4f81bd"/>
-                    </a:solidFill>
-                  </a:tcPr>
-                </a:tc>
-                <a:tc>
-                  <a:txBody>
-                    <a:bodyPr/>
-                    <a:p>
-                      <a:pPr>
-                        <a:lnSpc>
-                          <a:spcPct val="100000"/>
-                        </a:lnSpc>
-                      </a:pPr>
-                      <a:r>
-                        <a:rPr b="1" lang="fr-FR" sz="1200" spc="-1" strike="noStrike">
-                          <a:solidFill>
-                            <a:srgbClr val="ffffff"/>
-                          </a:solidFill>
-                          <a:uFill>
-                            <a:solidFill>
-                              <a:srgbClr val="ffffff"/>
-                            </a:solidFill>
-                          </a:uFill>
-                          <a:latin typeface="Calibri"/>
-                        </a:rPr>
-                        <a:t>Nom de variable</a:t>
-                      </a:r>
-                      <a:endParaRPr/>
-                    </a:p>
-                  </a:txBody>
-                  <a:tcPr marL="91440" marR="91440">
-                    <a:lnL w="12240">
-                      <a:solidFill>
-                        <a:srgbClr val="ffffff"/>
-                      </a:solidFill>
-                    </a:lnL>
-                    <a:lnR w="12240">
-                      <a:solidFill>
-                        <a:srgbClr val="ffffff"/>
-                      </a:solidFill>
-                    </a:lnR>
-                    <a:lnT w="12240">
-                      <a:solidFill>
-                        <a:srgbClr val="ffffff"/>
-                      </a:solidFill>
-                    </a:lnT>
-                    <a:lnB w="38160">
-                      <a:solidFill>
-                        <a:srgbClr val="ffffff"/>
-                      </a:solidFill>
-                    </a:lnB>
-                    <a:solidFill>
-                      <a:srgbClr val="4f81bd"/>
-                    </a:solidFill>
-                  </a:tcPr>
-                </a:tc>
-                <a:tc>
-                  <a:txBody>
-                    <a:bodyPr/>
-                    <a:p>
-                      <a:pPr>
-                        <a:lnSpc>
-                          <a:spcPct val="100000"/>
-                        </a:lnSpc>
-                      </a:pPr>
-                      <a:r>
-                        <a:rPr b="1" lang="fr-FR" sz="1200" spc="-1" strike="noStrike">
-                          <a:solidFill>
-                            <a:srgbClr val="ffffff"/>
-                          </a:solidFill>
-                          <a:uFill>
-                            <a:solidFill>
-                              <a:srgbClr val="ffffff"/>
-                            </a:solidFill>
-                          </a:uFill>
-                          <a:latin typeface="Calibri"/>
-                        </a:rPr>
-                        <a:t>Type</a:t>
-                      </a:r>
-                      <a:endParaRPr/>
-                    </a:p>
-                  </a:txBody>
-                  <a:tcPr marL="91440" marR="91440">
-                    <a:lnL w="12240">
-                      <a:solidFill>
-                        <a:srgbClr val="ffffff"/>
-                      </a:solidFill>
-                    </a:lnL>
-                    <a:lnR w="12240">
-                      <a:solidFill>
-                        <a:srgbClr val="ffffff"/>
-                      </a:solidFill>
-                    </a:lnR>
-                    <a:lnT w="12240">
-                      <a:solidFill>
-                        <a:srgbClr val="ffffff"/>
-                      </a:solidFill>
-                    </a:lnT>
-                    <a:lnB w="38160">
-                      <a:solidFill>
-                        <a:srgbClr val="ffffff"/>
-                      </a:solidFill>
-                    </a:lnB>
-                    <a:solidFill>
-                      <a:srgbClr val="4f81bd"/>
-                    </a:solidFill>
-                  </a:tcPr>
-                </a:tc>
-                <a:tc>
-                  <a:txBody>
-                    <a:bodyPr/>
-                    <a:p>
-                      <a:pPr>
-                        <a:lnSpc>
-                          <a:spcPct val="100000"/>
-                        </a:lnSpc>
-                      </a:pPr>
-                      <a:r>
-                        <a:rPr b="1" lang="fr-FR" sz="1200" spc="-1" strike="noStrike">
-                          <a:solidFill>
-                            <a:srgbClr val="ffffff"/>
-                          </a:solidFill>
-                          <a:uFill>
-                            <a:solidFill>
-                              <a:srgbClr val="ffffff"/>
-                            </a:solidFill>
-                          </a:uFill>
-                          <a:latin typeface="Calibri"/>
-                        </a:rPr>
-                        <a:t>Table</a:t>
-                      </a:r>
-                      <a:endParaRPr/>
-                    </a:p>
-                  </a:txBody>
-                  <a:tcPr marL="91440" marR="91440">
-                    <a:lnL w="12240">
-                      <a:solidFill>
-                        <a:srgbClr val="ffffff"/>
-                      </a:solidFill>
-                    </a:lnL>
-                    <a:lnR w="12240">
-                      <a:solidFill>
-                        <a:srgbClr val="ffffff"/>
-                      </a:solidFill>
-                    </a:lnR>
-                    <a:lnT w="12240">
-                      <a:solidFill>
-                        <a:srgbClr val="ffffff"/>
-                      </a:solidFill>
-                    </a:lnT>
-                    <a:lnB w="38160">
-                      <a:solidFill>
-                        <a:srgbClr val="ffffff"/>
-                      </a:solidFill>
-                    </a:lnB>
-                    <a:solidFill>
-                      <a:srgbClr val="4f81bd"/>
-                    </a:solidFill>
-                  </a:tcPr>
-                </a:tc>
-                <a:tc>
-                  <a:txBody>
-                    <a:bodyPr/>
-                    <a:p>
-                      <a:pPr>
-                        <a:lnSpc>
-                          <a:spcPct val="100000"/>
-                        </a:lnSpc>
-                      </a:pPr>
-                      <a:r>
-                        <a:rPr b="1" lang="fr-FR" sz="1200" spc="-1" strike="noStrike">
-                          <a:solidFill>
-                            <a:srgbClr val="ffffff"/>
-                          </a:solidFill>
-                          <a:uFill>
-                            <a:solidFill>
-                              <a:srgbClr val="ffffff"/>
-                            </a:solidFill>
-                          </a:uFill>
-                          <a:latin typeface="Calibri"/>
-                        </a:rPr>
-                        <a:t>Clé  primaire</a:t>
-                      </a:r>
-                      <a:endParaRPr/>
-                    </a:p>
-                  </a:txBody>
-                  <a:tcPr marL="91440" marR="91440">
-                    <a:lnL w="12240">
-                      <a:solidFill>
-                        <a:srgbClr val="ffffff"/>
-                      </a:solidFill>
-                    </a:lnL>
-                    <a:lnR w="12240">
-                      <a:solidFill>
-                        <a:srgbClr val="ffffff"/>
-                      </a:solidFill>
-                    </a:lnR>
-                    <a:lnT w="12240">
-                      <a:solidFill>
-                        <a:srgbClr val="ffffff"/>
-                      </a:solidFill>
-                    </a:lnT>
-                    <a:lnB w="38160">
-                      <a:solidFill>
-                        <a:srgbClr val="ffffff"/>
-                      </a:solidFill>
-                    </a:lnB>
-                    <a:solidFill>
-                      <a:srgbClr val="4f81bd"/>
-                    </a:solidFill>
-                  </a:tcPr>
-                </a:tc>
-                <a:tc>
-                  <a:txBody>
-                    <a:bodyPr/>
-                    <a:p>
-                      <a:pPr>
-                        <a:lnSpc>
-                          <a:spcPct val="100000"/>
-                        </a:lnSpc>
-                      </a:pPr>
-                      <a:r>
-                        <a:rPr b="1" lang="fr-FR" sz="1200" spc="-1" strike="noStrike">
-                          <a:solidFill>
-                            <a:srgbClr val="ffffff"/>
-                          </a:solidFill>
-                          <a:uFill>
-                            <a:solidFill>
-                              <a:srgbClr val="ffffff"/>
-                            </a:solidFill>
-                          </a:uFill>
-                          <a:latin typeface="Calibri"/>
-                        </a:rPr>
-                        <a:t>Clé étrangère</a:t>
-                      </a:r>
-                      <a:endParaRPr/>
-                    </a:p>
-                  </a:txBody>
-                  <a:tcPr marL="91440" marR="91440">
-                    <a:lnL w="12240">
-                      <a:solidFill>
-                        <a:srgbClr val="ffffff"/>
-                      </a:solidFill>
-                    </a:lnL>
-                    <a:lnR w="12240">
-                      <a:solidFill>
-                        <a:srgbClr val="ffffff"/>
-                      </a:solidFill>
-                    </a:lnR>
-                    <a:lnT w="12240">
-                      <a:solidFill>
-                        <a:srgbClr val="ffffff"/>
-                      </a:solidFill>
-                    </a:lnT>
-                    <a:lnB w="38160">
-                      <a:solidFill>
-                        <a:srgbClr val="ffffff"/>
-                      </a:solidFill>
-                    </a:lnB>
-                    <a:solidFill>
-                      <a:srgbClr val="4f81bd"/>
-                    </a:solidFill>
-                  </a:tcPr>
-                </a:tc>
-              </a:tr>
-              <a:tr h="627480">
-                <a:tc>
-                  <a:txBody>
-                    <a:bodyPr/>
-                    <a:p>
-                      <a:pPr>
-                        <a:lnSpc>
-                          <a:spcPct val="100000"/>
-                        </a:lnSpc>
-                      </a:pPr>
-                      <a:r>
-                        <a:rPr lang="fr-FR" sz="1200" spc="-1" strike="noStrike">
-                          <a:solidFill>
-                            <a:srgbClr val="000000"/>
-                          </a:solidFill>
-                          <a:uFill>
-                            <a:solidFill>
-                              <a:srgbClr val="ffffff"/>
-                            </a:solidFill>
-                          </a:uFill>
-                          <a:latin typeface="Calibri"/>
-                        </a:rPr>
-                        <a:t>Point</a:t>
-                      </a:r>
-                      <a:endParaRPr/>
-                    </a:p>
-                  </a:txBody>
-                  <a:tcPr marL="91440" marR="91440">
-                    <a:lnL w="12240">
-                      <a:solidFill>
-                        <a:srgbClr val="ffffff"/>
-                      </a:solidFill>
-                    </a:lnL>
-                    <a:lnR w="12240">
-                      <a:solidFill>
-                        <a:srgbClr val="ffffff"/>
-                      </a:solidFill>
-                    </a:lnR>
-                    <a:lnT w="12240">
-                      <a:solidFill>
-                        <a:srgbClr val="ffffff"/>
-                      </a:solidFill>
-                    </a:lnT>
-                    <a:lnB w="12240">
-                      <a:solidFill>
-                        <a:srgbClr val="ffffff"/>
-                      </a:solidFill>
-                    </a:lnB>
-                    <a:solidFill>
-                      <a:srgbClr val="d0d8e7"/>
-                    </a:solidFill>
-                  </a:tcPr>
-                </a:tc>
-                <a:tc>
-                  <a:txBody>
-                    <a:bodyPr/>
-                    <a:p>
-                      <a:pPr>
-                        <a:lnSpc>
-                          <a:spcPct val="100000"/>
-                        </a:lnSpc>
-                      </a:pPr>
-                      <a:r>
-                        <a:rPr lang="fr-FR" sz="1200" spc="-1" strike="noStrike">
-                          <a:solidFill>
-                            <a:srgbClr val="000000"/>
-                          </a:solidFill>
-                          <a:uFill>
-                            <a:solidFill>
-                              <a:srgbClr val="ffffff"/>
-                            </a:solidFill>
-                          </a:uFill>
-                          <a:latin typeface="Calibri"/>
-                        </a:rPr>
-                        <a:t>Point</a:t>
-                      </a:r>
-                      <a:endParaRPr/>
-                    </a:p>
-                  </a:txBody>
-                  <a:tcPr marL="91440" marR="91440">
-                    <a:lnL w="12240">
-                      <a:solidFill>
-                        <a:srgbClr val="ffffff"/>
-                      </a:solidFill>
-                    </a:lnL>
-                    <a:lnR w="12240">
-                      <a:solidFill>
-                        <a:srgbClr val="ffffff"/>
-                      </a:solidFill>
-                    </a:lnR>
-                    <a:lnT w="12240">
-                      <a:solidFill>
-                        <a:srgbClr val="ffffff"/>
-                      </a:solidFill>
-                    </a:lnT>
-                    <a:lnB w="12240">
-                      <a:solidFill>
-                        <a:srgbClr val="ffffff"/>
-                      </a:solidFill>
-                    </a:lnB>
-                    <a:solidFill>
-                      <a:srgbClr val="d0d8e7"/>
-                    </a:solidFill>
-                  </a:tcPr>
-                </a:tc>
-                <a:tc>
-                  <a:txBody>
-                    <a:bodyPr/>
-                    <a:p>
-                      <a:pPr>
-                        <a:lnSpc>
-                          <a:spcPct val="100000"/>
-                        </a:lnSpc>
-                      </a:pPr>
-                      <a:r>
-                        <a:rPr lang="fr-FR" sz="1200" spc="-1" strike="noStrike">
-                          <a:solidFill>
-                            <a:srgbClr val="000000"/>
-                          </a:solidFill>
-                          <a:uFill>
-                            <a:solidFill>
-                              <a:srgbClr val="ffffff"/>
-                            </a:solidFill>
-                          </a:uFill>
-                          <a:latin typeface="Calibri"/>
-                        </a:rPr>
-                        <a:t>Text</a:t>
-                      </a:r>
-                      <a:endParaRPr/>
-                    </a:p>
-                  </a:txBody>
-                  <a:tcPr marL="91440" marR="91440">
-                    <a:lnL w="12240">
-                      <a:solidFill>
-                        <a:srgbClr val="ffffff"/>
-                      </a:solidFill>
-                    </a:lnL>
-                    <a:lnR w="12240">
-                      <a:solidFill>
-                        <a:srgbClr val="ffffff"/>
-                      </a:solidFill>
-                    </a:lnR>
-                    <a:lnT w="12240">
-                      <a:solidFill>
-                        <a:srgbClr val="ffffff"/>
-                      </a:solidFill>
-                    </a:lnT>
-                    <a:lnB w="12240">
-                      <a:solidFill>
-                        <a:srgbClr val="ffffff"/>
-                      </a:solidFill>
-                    </a:lnB>
-                    <a:solidFill>
-                      <a:srgbClr val="d0d8e7"/>
-                    </a:solidFill>
-                  </a:tcPr>
-                </a:tc>
-                <a:tc>
-                  <a:txBody>
-                    <a:bodyPr/>
-                    <a:p>
-                      <a:pPr>
-                        <a:lnSpc>
-                          <a:spcPct val="100000"/>
-                        </a:lnSpc>
-                      </a:pPr>
-                      <a:r>
-                        <a:rPr lang="fr-FR" sz="1200" spc="-1" strike="noStrike">
-                          <a:solidFill>
-                            <a:srgbClr val="000000"/>
-                          </a:solidFill>
-                          <a:uFill>
-                            <a:solidFill>
-                              <a:srgbClr val="ffffff"/>
-                            </a:solidFill>
-                          </a:uFill>
-                          <a:latin typeface="Calibri"/>
-                        </a:rPr>
-                        <a:t>Points_prelev</a:t>
-                      </a:r>
-                      <a:endParaRPr/>
-                    </a:p>
-                  </a:txBody>
-                  <a:tcPr marL="91440" marR="91440">
-                    <a:lnL w="12240">
-                      <a:solidFill>
-                        <a:srgbClr val="ffffff"/>
-                      </a:solidFill>
-                    </a:lnL>
-                    <a:lnR w="12240">
-                      <a:solidFill>
-                        <a:srgbClr val="ffffff"/>
-                      </a:solidFill>
-                    </a:lnR>
-                    <a:lnT w="12240">
-                      <a:solidFill>
-                        <a:srgbClr val="ffffff"/>
-                      </a:solidFill>
-                    </a:lnT>
-                    <a:lnB w="12240">
-                      <a:solidFill>
-                        <a:srgbClr val="ffffff"/>
-                      </a:solidFill>
-                    </a:lnB>
-                    <a:solidFill>
-                      <a:srgbClr val="d0d8e7"/>
-                    </a:solidFill>
-                  </a:tcPr>
-                </a:tc>
-                <a:tc>
-                  <a:txBody>
-                    <a:bodyPr/>
-                    <a:p>
-                      <a:pPr>
-                        <a:lnSpc>
-                          <a:spcPct val="100000"/>
-                        </a:lnSpc>
-                      </a:pPr>
-                      <a:r>
-                        <a:rPr lang="fr-FR" sz="1200" spc="-1" strike="noStrike">
-                          <a:solidFill>
-                            <a:srgbClr val="000000"/>
-                          </a:solidFill>
-                          <a:uFill>
-                            <a:solidFill>
-                              <a:srgbClr val="ffffff"/>
-                            </a:solidFill>
-                          </a:uFill>
-                          <a:latin typeface="Calibri"/>
-                        </a:rPr>
-                        <a:t>ID</a:t>
-                      </a:r>
-                      <a:endParaRPr/>
-                    </a:p>
-                  </a:txBody>
-                  <a:tcPr marL="91440" marR="91440">
-                    <a:lnL w="12240">
-                      <a:solidFill>
-                        <a:srgbClr val="ffffff"/>
-                      </a:solidFill>
-                    </a:lnL>
-                    <a:lnR w="12240">
-                      <a:solidFill>
-                        <a:srgbClr val="ffffff"/>
-                      </a:solidFill>
-                    </a:lnR>
-                    <a:lnT w="12240">
-                      <a:solidFill>
-                        <a:srgbClr val="ffffff"/>
-                      </a:solidFill>
-                    </a:lnT>
-                    <a:lnB w="12240">
-                      <a:solidFill>
-                        <a:srgbClr val="ffffff"/>
-                      </a:solidFill>
-                    </a:lnB>
-                    <a:solidFill>
-                      <a:srgbClr val="d0d8e7"/>
-                    </a:solidFill>
-                  </a:tcPr>
-                </a:tc>
-                <a:tc>
-                  <a:txBody>
-                    <a:bodyPr/>
-                    <a:p>
-                      <a:pPr>
-                        <a:lnSpc>
-                          <a:spcPct val="100000"/>
-                        </a:lnSpc>
-                      </a:pPr>
-                      <a:r>
-                        <a:rPr lang="fr-FR" sz="1200" spc="-1" strike="noStrike">
-                          <a:solidFill>
-                            <a:srgbClr val="000000"/>
-                          </a:solidFill>
-                          <a:uFill>
-                            <a:solidFill>
-                              <a:srgbClr val="ffffff"/>
-                            </a:solidFill>
-                          </a:uFill>
-                          <a:latin typeface="Calibri"/>
-                        </a:rPr>
-                        <a:t>disp_prelev(ID)</a:t>
-                      </a:r>
-                      <a:endParaRPr/>
-                    </a:p>
-                    <a:p>
-                      <a:pPr>
-                        <a:lnSpc>
-                          <a:spcPct val="100000"/>
-                        </a:lnSpc>
-                      </a:pPr>
-                      <a:r>
-                        <a:rPr lang="fr-FR" sz="1200" spc="-1" strike="noStrike">
-                          <a:solidFill>
-                            <a:srgbClr val="000000"/>
-                          </a:solidFill>
-                          <a:uFill>
-                            <a:solidFill>
-                              <a:srgbClr val="ffffff"/>
-                            </a:solidFill>
-                          </a:uFill>
-                          <a:latin typeface="Calibri"/>
-                        </a:rPr>
-                        <a:t>limites_classes(ID)</a:t>
-                      </a:r>
-                      <a:endParaRPr/>
-                    </a:p>
-                  </a:txBody>
-                  <a:tcPr marL="91440" marR="91440">
-                    <a:lnL w="12240">
-                      <a:solidFill>
-                        <a:srgbClr val="ffffff"/>
-                      </a:solidFill>
-                    </a:lnL>
-                    <a:lnR w="12240">
-                      <a:solidFill>
-                        <a:srgbClr val="ffffff"/>
-                      </a:solidFill>
-                    </a:lnR>
-                    <a:lnT w="12240">
-                      <a:solidFill>
-                        <a:srgbClr val="ffffff"/>
-                      </a:solidFill>
-                    </a:lnT>
-                    <a:lnB w="12240">
-                      <a:solidFill>
-                        <a:srgbClr val="ffffff"/>
-                      </a:solidFill>
-                    </a:lnB>
-                    <a:solidFill>
-                      <a:srgbClr val="d0d8e7"/>
-                    </a:solidFill>
-                  </a:tcPr>
-                </a:tc>
-              </a:tr>
-            </a:tbl>
-          </a:graphicData>
-        </a:graphic>
-      </p:graphicFrame>
-      <p:sp>
-        <p:nvSpPr>
-          <p:cNvPr id="89" name="CustomShape 3"/>
-          <p:cNvSpPr/>
-          <p:nvPr/>
-        </p:nvSpPr>
-        <p:spPr>
-          <a:xfrm>
-            <a:off x="1907640" y="3501000"/>
-            <a:ext cx="5904000" cy="1460880"/>
-          </a:xfrm>
-          <a:prstGeom prst="rect">
-            <a:avLst/>
-          </a:prstGeom>
-          <a:noFill/>
-          <a:ln>
-            <a:noFill/>
-          </a:ln>
-        </p:spPr>
-        <p:style>
-          <a:lnRef idx="0"/>
-          <a:fillRef idx="0"/>
-          <a:effectRef idx="0"/>
-          <a:fontRef idx="minor"/>
-        </p:style>
-        <p:txBody>
-          <a:bodyPr lIns="90000" rIns="90000" tIns="45000" bIns="45000"/>
-          <a:p>
-            <a:pPr>
-              <a:lnSpc>
-                <a:spcPct val="100000"/>
-              </a:lnSpc>
-            </a:pPr>
-            <a:r>
-              <a:rPr lang="fr-FR" sz="1800" spc="-1" strike="noStrike">
-                <a:solidFill>
-                  <a:srgbClr val="000000"/>
-                </a:solidFill>
-                <a:uFill>
-                  <a:solidFill>
-                    <a:srgbClr val="ffffff"/>
-                  </a:solidFill>
-                </a:uFill>
-                <a:latin typeface="Calibri"/>
-                <a:ea typeface="DejaVu Sans"/>
-              </a:rPr>
-              <a:t>CREATE TABLE points_prelev (id SERIAL PRIMARY KEY , id_disp integer not null references disp_prelev(id), id_class integer not null references limites_classes(id)</a:t>
-            </a:r>
-            <a:endParaRPr/>
-          </a:p>
-          <a:p>
-            <a:pPr>
-              <a:lnSpc>
-                <a:spcPct val="100000"/>
-              </a:lnSpc>
-            </a:pPr>
-            <a:r>
-              <a:rPr lang="fr-FR" sz="1800" spc="-1" strike="noStrike">
-                <a:solidFill>
-                  <a:srgbClr val="000000"/>
-                </a:solidFill>
-                <a:uFill>
-                  <a:solidFill>
-                    <a:srgbClr val="ffffff"/>
-                  </a:solidFill>
-                </a:uFill>
-                <a:latin typeface="Calibri"/>
-                <a:ea typeface="DejaVu Sans"/>
-              </a:rPr>
-              <a:t>)</a:t>
-            </a:r>
-            <a:endParaRPr/>
-          </a:p>
-        </p:txBody>
-      </p:sp>
-    </p:spTree>
-  </p:cSld>
-  <p:timing>
-    <p:tnLst>
-      <p:par>
-        <p:cTn id="15" dur="indefinite" restart="never" nodeType="tmRoot">
-          <p:childTnLst>
-            <p:seq>
-              <p:cTn id="16" nodeType="mainSeq"/>
-              <p:prevCondLst>
-                <p:cond delay="0" evt="onPrev">
-                  <p:tgtEl>
-                    <p:sldTgt/>
-                  </p:tgtEl>
-                </p:cond>
-              </p:prevCondLst>
-              <p:nextCondLst>
-                <p:cond delay="0" evt="onNext">
-                  <p:tgtEl>
-                    <p:sldTgt/>
-                  </p:tgtEl>
-                </p:cond>
-              </p:nextCondLst>
-            </p:seq>
-          </p:childTnLst>
-        </p:cTn>
-      </p:par>
-    </p:tnLst>
-  </p:timing>
-</p:sld>
+<file path=ppt/slides/slide8.xml><?xml version="1.0" encoding="UTF-8" standalone="yes"?>
+<p:sld xmlns:a="http://schemas.openxmlformats.org/drawingml/2006/main" xmlns:p="http://schemas.openxmlformats.org/presentationml/2006/main" xmlns:r="http://schemas.openxmlformats.org/officeDocument/2006/relationships"><p:cSld><p:spTree><p:nvGrpSpPr>        <p:cNvPr id="1" name=""/>        <p:cNvGrpSpPr/>        <p:nvPr/>      </p:nvGrpSpPr>      <p:grpSpPr>        <a:xfrm>          <a:off x="0" y="0"/>          <a:ext cx="0" cy="0"/>          <a:chOff x="0" y="0"/>          <a:chExt cx="0" cy="0"/>        </a:xfrm>      </p:grpSpPr><p:sp><p:nvSpPr><p:cNvPr id="86" name="CustomShape 1"></p:cNvPr><p:cNvSpPr/><p:nvPr/></p:nvSpPr><p:spPr><a:xfrm><a:off x="457200" y="274680"/><a:ext cx="8228520" cy="1141920"/></a:xfrm><a:prstGeom prst="rect"><a:avLst></a:avLst></a:prstGeom><a:noFill/><a:ln><a:noFill/></a:ln></p:spPr><p:style><a:lnRef idx="0"></a:lnRef><a:fillRef idx="0"/><a:effectRef idx="0"></a:effectRef><a:fontRef idx="minor"/></p:style><p:txBody><a:bodyPr lIns="90000" rIns="90000" tIns="45000" bIns="45000" anchor="ctr"></a:bodyPr><a:p><a:pPr algn="ctr"><a:lnSpc><a:spcPct val="100000"/></a:lnSpc></a:pPr><a:r><a:rPr lang="fr-FR" sz="4400" spc="-1" strike="noStrike"><a:solidFill><a:srgbClr val="000000"/></a:solidFill><a:uFill><a:solidFill><a:srgbClr val="ffffff"/></a:solidFill></a:uFill><a:latin typeface="Calibri"/><a:ea typeface="DejaVu Sans"/></a:rPr><a:t>Table des points de prélèvement</a:t></a:r><a:endParaRPr/></a:p></p:txBody></p:sp><p:graphicFrame><p:nvGraphicFramePr><p:cNvPr id="87" name="Table 2"/><p:cNvGraphicFramePr/><p:nvPr/></p:nvGraphicFramePr><p:xfrm><a:off x="64440" y="1418400"/><a:ext cx="8971200" cy="1076040"/></p:xfrm><a:graphic><a:graphicData uri="http://schemas.openxmlformats.org/drawingml/2006/table"><a:tbl><a:tblPr/><a:tblGrid><a:gridCol w="2131200"/><a:gridCol w="1435320"/><a:gridCol w="796320"/><a:gridCol w="1152000"/><a:gridCol w="1440000"/><a:gridCol w="2016720"/></a:tblGrid><a:tr h="448920"><a:tc><a:txBody><a:bodyPr></a:bodyPr><a:p><a:pPr><a:lnSpc><a:spcPct val="100000"/></a:lnSpc></a:pPr><a:r><a:rPr b="1" lang="fr-FR" sz="1200" spc="-1" strike="noStrike"><a:solidFill><a:srgbClr val="ffffff"/></a:solidFill><a:uFill><a:solidFill><a:srgbClr val="ffffff"/></a:solidFill></a:uFill><a:latin typeface="Calibri"/></a:rPr><a:t>Etiquette</a:t></a:r><a:endParaRPr/></a:p></a:txBody><a:tcPr marL="91440" marR="91440"><a:lnL w="12240"><a:solidFill><a:srgbClr val="ffffff"/></a:solidFill></a:lnL><a:lnR w="12240"><a:solidFill><a:srgbClr val="ffffff"/></a:solidFill></a:lnR><a:lnT w="12240"><a:solidFill><a:srgbClr val="ffffff"/></a:solidFill></a:lnT><a:lnB w="38160"><a:solidFill><a:srgbClr val="ffffff"/></a:solidFill></a:lnB><a:solidFill><a:srgbClr val="4f81bd"/></a:solidFill></a:tcPr></a:tc><a:tc><a:txBody><a:bodyPr></a:bodyPr><a:p><a:pPr><a:lnSpc><a:spcPct val="100000"/></a:lnSpc></a:pPr><a:r><a:rPr b="1" lang="fr-FR" sz="1200" spc="-1" strike="noStrike"><a:solidFill><a:srgbClr val="ffffff"/></a:solidFill><a:uFill><a:solidFill><a:srgbClr val="ffffff"/></a:solidFill></a:uFill><a:latin typeface="Calibri"/></a:rPr><a:t>Nom de variable</a:t></a:r><a:endParaRPr/></a:p></a:txBody><a:tcPr marL="91440" marR="91440"><a:lnL w="12240"><a:solidFill><a:srgbClr val="ffffff"/></a:solidFill></a:lnL><a:lnR w="12240"><a:solidFill><a:srgbClr val="ffffff"/></a:solidFill></a:lnR><a:lnT w="12240"><a:solidFill><a:srgbClr val="ffffff"/></a:solidFill></a:lnT><a:lnB w="38160"><a:solidFill><a:srgbClr val="ffffff"/></a:solidFill></a:lnB><a:solidFill><a:srgbClr val="4f81bd"/></a:solidFill></a:tcPr></a:tc><a:tc><a:txBody><a:bodyPr></a:bodyPr><a:p><a:pPr><a:lnSpc><a:spcPct val="100000"/></a:lnSpc></a:pPr><a:r><a:rPr b="1" lang="fr-FR" sz="1200" spc="-1" strike="noStrike"><a:solidFill><a:srgbClr val="ffffff"/></a:solidFill><a:uFill><a:solidFill><a:srgbClr val="ffffff"/></a:solidFill></a:uFill><a:latin typeface="Calibri"/></a:rPr><a:t>Type</a:t></a:r><a:endParaRPr/></a:p></a:txBody><a:tcPr marL="91440" marR="91440"><a:lnL w="12240"><a:solidFill><a:srgbClr val="ffffff"/></a:solidFill></a:lnL><a:lnR w="12240"><a:solidFill><a:srgbClr val="ffffff"/></a:solidFill></a:lnR><a:lnT w="12240"><a:solidFill><a:srgbClr val="ffffff"/></a:solidFill></a:lnT><a:lnB w="38160"><a:solidFill><a:srgbClr val="ffffff"/></a:solidFill></a:lnB><a:solidFill><a:srgbClr val="4f81bd"/></a:solidFill></a:tcPr></a:tc><a:tc><a:txBody><a:bodyPr></a:bodyPr><a:p><a:pPr><a:lnSpc><a:spcPct val="100000"/></a:lnSpc></a:pPr><a:r><a:rPr b="1" lang="fr-FR" sz="1200" spc="-1" strike="noStrike"><a:solidFill><a:srgbClr val="ffffff"/></a:solidFill><a:uFill><a:solidFill><a:srgbClr val="ffffff"/></a:solidFill></a:uFill><a:latin typeface="Calibri"/></a:rPr><a:t>Table</a:t></a:r><a:endParaRPr/></a:p></a:txBody><a:tcPr marL="91440" marR="91440"><a:lnL w="12240"><a:solidFill><a:srgbClr val="ffffff"/></a:solidFill></a:lnL><a:lnR w="12240"><a:solidFill><a:srgbClr val="ffffff"/></a:solidFill></a:lnR><a:lnT w="12240"><a:solidFill><a:srgbClr val="ffffff"/></a:solidFill></a:lnT><a:lnB w="38160"><a:solidFill><a:srgbClr val="ffffff"/></a:solidFill></a:lnB><a:solidFill><a:srgbClr val="4f81bd"/></a:solidFill></a:tcPr></a:tc><a:tc><a:txBody><a:bodyPr></a:bodyPr><a:p><a:pPr><a:lnSpc><a:spcPct val="100000"/></a:lnSpc></a:pPr><a:r><a:rPr b="1" lang="fr-FR" sz="1200" spc="-1" strike="noStrike"><a:solidFill><a:srgbClr val="ffffff"/></a:solidFill><a:uFill><a:solidFill><a:srgbClr val="ffffff"/></a:solidFill></a:uFill><a:latin typeface="Calibri"/></a:rPr><a:t>Clé  primaire</a:t></a:r><a:endParaRPr/></a:p></a:txBody><a:tcPr marL="91440" marR="91440"><a:lnL w="12240"><a:solidFill><a:srgbClr val="ffffff"/></a:solidFill></a:lnL><a:lnR w="12240"><a:solidFill><a:srgbClr val="ffffff"/></a:solidFill></a:lnR><a:lnT w="12240"><a:solidFill><a:srgbClr val="ffffff"/></a:solidFill></a:lnT><a:lnB w="38160"><a:solidFill><a:srgbClr val="ffffff"/></a:solidFill></a:lnB><a:solidFill><a:srgbClr val="4f81bd"/></a:solidFill></a:tcPr></a:tc><a:tc><a:txBody><a:bodyPr></a:bodyPr><a:p><a:pPr><a:lnSpc><a:spcPct val="100000"/></a:lnSpc></a:pPr><a:r><a:rPr b="1" lang="fr-FR" sz="1200" spc="-1" strike="noStrike"><a:solidFill><a:srgbClr val="ffffff"/></a:solidFill><a:uFill><a:solidFill><a:srgbClr val="ffffff"/></a:solidFill></a:uFill><a:latin typeface="Calibri"/></a:rPr><a:t>Clé étrangère</a:t></a:r><a:endParaRPr/></a:p></a:txBody><a:tcPr marL="91440" marR="91440"><a:lnL w="12240"><a:solidFill><a:srgbClr val="ffffff"/></a:solidFill></a:lnL><a:lnR w="12240"><a:solidFill><a:srgbClr val="ffffff"/></a:solidFill></a:lnR><a:lnT w="12240"><a:solidFill><a:srgbClr val="ffffff"/></a:solidFill></a:lnT><a:lnB w="38160"><a:solidFill><a:srgbClr val="ffffff"/></a:solidFill></a:lnB><a:solidFill><a:srgbClr val="4f81bd"/></a:solidFill></a:tcPr></a:tc></a:tr><a:tr h="627480"><a:tc><a:txBody><a:bodyPr></a:bodyPr><a:p><a:pPr><a:lnSpc><a:spcPct val="100000"/></a:lnSpc></a:pPr><a:r><a:rPr lang="fr-FR" sz="1200" spc="-1" strike="noStrike"><a:solidFill><a:srgbClr val="000000"/></a:solidFill><a:uFill><a:solidFill><a:srgbClr val="ffffff"/></a:solidFill></a:uFill><a:latin typeface="Calibri"/></a:rPr><a:t>Point</a:t></a:r><a:endParaRPr/></a:p></a:txBody><a:tcPr marL="91440" marR="91440"><a:lnL w="12240"><a:solidFill><a:srgbClr val="ffffff"/></a:solidFill></a:lnL><a:lnR w="12240"><a:solidFill><a:srgbClr val="ffffff"/></a:solidFill></a:lnR><a:lnT w="12240"><a:solidFill><a:srgbClr val="ffffff"/></a:solidFill></a:lnT><a:lnB w="12240"><a:solidFill><a:srgbClr val="ffffff"/></a:solidFill></a:lnB><a:solidFill><a:srgbClr val="d0d8e7"/></a:solidFill></a:tcPr></a:tc><a:tc><a:txBody><a:bodyPr></a:bodyPr><a:p><a:pPr><a:lnSpc><a:spcPct val="100000"/></a:lnSpc></a:pPr><a:r><a:rPr lang="fr-FR" sz="1200" spc="-1" strike="noStrike"><a:solidFill><a:srgbClr val="000000"/></a:solidFill><a:uFill><a:solidFill><a:srgbClr val="ffffff"/></a:solidFill></a:uFill><a:latin typeface="Calibri"/></a:rPr><a:t>Point</a:t></a:r><a:endParaRPr/></a:p></a:txBody><a:tcPr marL="91440" marR="91440"><a:lnL w="12240"><a:solidFill><a:srgbClr val="ffffff"/></a:solidFill></a:lnL><a:lnR w="12240"><a:solidFill><a:srgbClr val="ffffff"/></a:solidFill></a:lnR><a:lnT w="12240"><a:solidFill><a:srgbClr val="ffffff"/></a:solidFill></a:lnT><a:lnB w="12240"><a:solidFill><a:srgbClr val="ffffff"/></a:solidFill></a:lnB><a:solidFill><a:srgbClr val="d0d8e7"/></a:solidFill></a:tcPr></a:tc><a:tc><a:txBody><a:bodyPr></a:bodyPr><a:p><a:pPr><a:lnSpc><a:spcPct val="100000"/></a:lnSpc></a:pPr><a:r><a:rPr lang="fr-FR" sz="1200" spc="-1" strike="noStrike"><a:solidFill><a:srgbClr val="000000"/></a:solidFill><a:uFill><a:solidFill><a:srgbClr val="ffffff"/></a:solidFill></a:uFill><a:latin typeface="Calibri"/></a:rPr><a:t>Text</a:t></a:r><a:endParaRPr/></a:p></a:txBody><a:tcPr marL="91440" marR="91440"><a:lnL w="12240"><a:solidFill><a:srgbClr val="ffffff"/></a:solidFill></a:lnL><a:lnR w="12240"><a:solidFill><a:srgbClr val="ffffff"/></a:solidFill></a:lnR><a:lnT w="12240"><a:solidFill><a:srgbClr val="ffffff"/></a:solidFill></a:lnT><a:lnB w="12240"><a:solidFill><a:srgbClr val="ffffff"/></a:solidFill></a:lnB><a:solidFill><a:srgbClr val="d0d8e7"/></a:solidFill></a:tcPr></a:tc><a:tc rowSpan="2"><a:txBody><a:bodyPr></a:bodyPr><a:p><a:pPr><a:lnSpc><a:spcPct val="100000"/></a:lnSpc></a:pPr><a:r><a:rPr lang="fr-FR" sz="1200" spc="-1" strike="noStrike"><a:solidFill><a:srgbClr val="000000"/></a:solidFill><a:uFill><a:solidFill><a:srgbClr val="ffffff"/></a:solidFill></a:uFill><a:latin typeface="Calibri"/></a:rPr><a:t>Points_prelev</a:t></a:r><a:endParaRPr/></a:p></a:txBody><a:tcPr marL="91440" marR="91440"><a:lnL w="12240"><a:solidFill><a:srgbClr val="ffffff"/></a:solidFill></a:lnL><a:lnR w="12240"><a:solidFill><a:srgbClr val="ffffff"/></a:solidFill></a:lnR><a:lnT w="12240"><a:solidFill><a:srgbClr val="ffffff"/></a:solidFill></a:lnT><a:lnB w="12240"><a:solidFill><a:srgbClr val="ffffff"/></a:solidFill></a:lnB><a:solidFill><a:srgbClr val="d0d8e7"/></a:solidFill></a:tcPr></a:tc><a:tc rowSpan="2"><a:txBody><a:bodyPr></a:bodyPr><a:p><a:pPr><a:lnSpc><a:spcPct val="100000"/></a:lnSpc></a:pPr><a:r><a:rPr lang="fr-FR" sz="1200" spc="-1" strike="noStrike"><a:solidFill><a:srgbClr val="000000"/></a:solidFill><a:uFill><a:solidFill><a:srgbClr val="ffffff"/></a:solidFill></a:uFill><a:latin typeface="Calibri"/></a:rPr><a:t>ID</a:t></a:r><a:endParaRPr/></a:p></a:txBody><a:tcPr marL="91440" marR="91440"><a:lnL w="12240"><a:solidFill><a:srgbClr val="ffffff"/></a:solidFill></a:lnL><a:lnR w="12240"><a:solidFill><a:srgbClr val="ffffff"/></a:solidFill></a:lnR><a:lnT w="12240"><a:solidFill><a:srgbClr val="ffffff"/></a:solidFill></a:lnT><a:lnB w="12240"><a:solidFill><a:srgbClr val="ffffff"/></a:solidFill></a:lnB><a:solidFill><a:srgbClr val="d0d8e7"/></a:solidFill></a:tcPr></a:tc><a:tc rowSpan="2"><a:txBody><a:bodyPr></a:bodyPr><a:p><a:pPr><a:lnSpc><a:spcPct val="100000"/></a:lnSpc></a:pPr><a:r><a:rPr lang="fr-FR" sz="1200" spc="-1" strike="noStrike"><a:solidFill><a:srgbClr val="000000"/></a:solidFill><a:uFill><a:solidFill><a:srgbClr val="ffffff"/></a:solidFill></a:uFill><a:latin typeface="Calibri"/></a:rPr><a:t>disp_prelev(ID)</a:t></a:r><a:endParaRPr/></a:p><a:p><a:pPr><a:lnSpc><a:spcPct val="100000"/></a:lnSpc></a:pPr><a:r><a:rPr lang="fr-FR" sz="1200" spc="-1" strike="noStrike"><a:solidFill><a:srgbClr val="000000"/></a:solidFill><a:uFill><a:solidFill><a:srgbClr val="ffffff"/></a:solidFill></a:uFill><a:latin typeface="Calibri"/></a:rPr><a:t>limites_classes(ID)</a:t></a:r><a:endParaRPr/></a:p></a:txBody><a:tcPr marL="91440" marR="91440"><a:lnL w="12240"><a:solidFill><a:srgbClr val="ffffff"/></a:solidFill></a:lnL><a:lnR w="12240"><a:solidFill><a:srgbClr val="ffffff"/></a:solidFill></a:lnR><a:lnT w="12240"><a:solidFill><a:srgbClr val="ffffff"/></a:solidFill></a:lnT><a:lnB w="12240"><a:solidFill><a:srgbClr val="ffffff"/></a:solidFill></a:lnB><a:solidFill><a:srgbClr val="d0d8e7"/></a:solidFill></a:tcPr></a:tc></a:tr><a:tr h="627480"><a:tc><a:txBody><a:bodyPr></a:bodyPr><a:p><a:r><a:rPr lang="fr-FR" sz="1200" spc="-1"><a:solidFill><a:srgbClr val="000000"/></a:solidFill><a:latin typeface="Calibri"/><a:ea typeface="Droid Sans Fallback"/></a:rPr><a:t>Description</a:t></a:r><a:endParaRPr/></a:p></a:txBody><a:tcPr marL="91440" marR="91440"><a:lnL w="12240"><a:solidFill><a:srgbClr val="ffffff"/></a:solidFill></a:lnL><a:lnR w="12240"><a:solidFill><a:srgbClr val="ffffff"/></a:solidFill></a:lnR><a:lnT w="12240"><a:solidFill><a:srgbClr val="ffffff"/></a:solidFill></a:lnT><a:lnB w="12240"><a:solidFill><a:srgbClr val="ffffff"/></a:solidFill></a:lnB><a:solidFill><a:srgbClr val="d0d8e7"/></a:solidFill></a:tcPr></a:tc><a:tc><a:txBody><a:bodyPr></a:bodyPr><a:p><a:r><a:rPr lang="fr-FR" sz="1200" spc="-1"><a:solidFill><a:srgbClr val="000000"/></a:solidFill><a:latin typeface="Calibri"/><a:ea typeface="Droid Sans Fallback"/></a:rPr><a:t>description</a:t></a:r><a:endParaRPr/></a:p></a:txBody><a:tcPr marL="91440" marR="91440"><a:lnL w="12240"><a:solidFill><a:srgbClr val="ffffff"/></a:solidFill></a:lnL><a:lnR w="12240"><a:solidFill><a:srgbClr val="ffffff"/></a:solidFill></a:lnR><a:lnT w="12240"><a:solidFill><a:srgbClr val="ffffff"/></a:solidFill></a:lnT><a:lnB w="12240"><a:solidFill><a:srgbClr val="ffffff"/></a:solidFill></a:lnB><a:solidFill><a:srgbClr val="d0d8e7"/></a:solidFill></a:tcPr></a:tc><a:tc><a:txBody><a:bodyPr></a:bodyPr><a:p><a:r><a:rPr lang="fr-FR" sz="1200" spc="-1"><a:latin typeface="Calibri"/></a:rPr><a:t>Text</a:t></a:r><a:endParaRPr/></a:p></a:txBody><a:tcPr marL="91440" marR="91440"><a:lnL w="12240"><a:solidFill><a:srgbClr val="ffffff"/></a:solidFill></a:lnL><a:lnR w="12240"><a:solidFill><a:srgbClr val="ffffff"/></a:solidFill></a:lnR><a:lnT w="12240"><a:solidFill><a:srgbClr val="ffffff"/></a:solidFill></a:lnT><a:lnB w="12240"><a:solidFill><a:srgbClr val="ffffff"/></a:solidFill></a:lnB><a:solidFill><a:srgbClr val="d0d8e7"/></a:solidFill></a:tcPr></a:tc><a:tcPr marL="91440" marR="91440"><a:lnL w="12240"><a:solidFill><a:srgbClr val="ffffff"/></a:solidFill></a:lnL><a:lnR w="12240"><a:solidFill><a:srgbClr val="ffffff"/></a:solidFill></a:lnR><a:lnT w="12240"><a:solidFill><a:srgbClr val="ffffff"/></a:solidFill></a:lnT><a:lnB w="12240"><a:solidFill><a:srgbClr val="ffffff"/></a:solidFill></a:lnB><a:solidFill><a:srgbClr val="d0d8e7"/></a:solidFill></a:tcPr></a:tc><a:tcPr marL="91440" marR="91440"><a:lnL w="12240"><a:solidFill><a:srgbClr val="ffffff"/></a:solidFill></a:lnL><a:lnR w="12240"><a:solidFill><a:srgbClr val="ffffff"/></a:solidFill></a:lnR><a:lnT w="12240"><a:solidFill><a:srgbClr val="ffffff"/></a:solidFill></a:lnT><a:lnB w="12240"><a:solidFill><a:srgbClr val="ffffff"/></a:solidFill></a:lnB><a:solidFill><a:srgbClr val="d0d8e7"/></a:solidFill></a:tcPr></a:tc><a:tcPr marL="91440" marR="91440"><a:lnL w="12240"><a:solidFill><a:srgbClr val="ffffff"/></a:solidFill></a:lnL><a:lnR w="12240"><a:solidFill><a:srgbClr val="ffffff"/></a:solidFill></a:lnR><a:lnT w="12240"><a:solidFill><a:srgbClr val="ffffff"/></a:solidFill></a:lnT><a:lnB w="12240"><a:solidFill><a:srgbClr val="ffffff"/></a:solidFill></a:lnB><a:solidFill><a:srgbClr val="d0d8e7"/></a:solidFill></a:tcPr></a:tc></a:tr></a:tbl></a:graphicData></a:graphic></p:graphicFrame><p:sp><p:nvSpPr><p:cNvPr id="88" name="CustomShape 3"></p:cNvPr><p:cNvSpPr/><p:nvPr/></p:nvSpPr><p:spPr><a:xfrm><a:off x="1907640" y="3501000"/><a:ext cx="5903640" cy="1460520"/></a:xfrm><a:prstGeom prst="rect"><a:avLst></a:avLst></a:prstGeom><a:noFill/><a:ln><a:noFill/></a:ln></p:spPr><p:style><a:lnRef idx="0"></a:lnRef><a:fillRef idx="0"/><a:effectRef idx="0"></a:effectRef><a:fontRef idx="minor"/></p:style><p:txBody><a:bodyPr lIns="90000" rIns="90000" tIns="45000" bIns="45000"></a:bodyPr><a:p><a:pPr><a:lnSpc><a:spcPct val="100000"/></a:lnSpc></a:pPr><a:r><a:rPr lang="fr-FR" sz="1800" spc="-1" strike="noStrike"><a:solidFill><a:srgbClr val="000000"/></a:solidFill><a:uFill><a:solidFill><a:srgbClr val="ffffff"/></a:solidFill></a:uFill><a:latin typeface="Calibri"/><a:ea typeface="DejaVu Sans"/></a:rPr><a:t>CREATE TABLE points_prelev (id SERIAL PRIMARY KEY , point VARCHAR(2) NOT NULL, description VARCHAR(50), id_disp integer not null references disp_prelev(id), id_class integer not null references limites_classes(id)</a:t></a:r><a:endParaRPr/></a:p><a:p><a:pPr><a:lnSpc><a:spcPct val="100000"/></a:lnSpc></a:pPr><a:r><a:rPr lang="fr-FR" sz="1800" spc="-1" strike="noStrike"><a:solidFill><a:srgbClr val="000000"/></a:solidFill><a:uFill><a:solidFill><a:srgbClr val="ffffff"/></a:solidFill></a:uFill><a:latin typeface="Calibri"/><a:ea typeface="DejaVu Sans"/></a:rPr><a:t>)</a:t></a:r><a:endParaRPr/></a:p></p:txBody></p:sp></p:spTree></p:cSld><p:timing><p:tnLst><p:par><p:cTn id="15" dur="indefinite" restart="never" nodeType="tmRoot"><p:childTnLst><p:seq><p:cTn id="16" nodeType="mainSeq"></p:cTn><p:prevCondLst><p:cond delay="0" evt="onPrev"><p:tgtEl><p:sldTgt/></p:tgtEl></p:cond></p:prevCondLst><p:nextCondLst><p:cond delay="0" evt="onNext"><p:tgtEl><p:sldTgt/></p:tgtEl></p:cond></p:nextCondLst></p:seq></p:childTnLst></p:cTn></p:par></p:tnLst></p:timing></p:sld>
 </file>
 
 <file path=ppt/slides/slide9.xml><?xml version="1.0" encoding="utf-8"?>
@@ -10410,14 +9602,14 @@
       </p:grpSpPr>
       <p:sp>
         <p:nvSpPr>
-          <p:cNvPr id="90" name="CustomShape 1"/>
+          <p:cNvPr id="89" name="CustomShape 1"/>
           <p:cNvSpPr/>
           <p:nvPr/>
         </p:nvSpPr>
         <p:spPr>
           <a:xfrm>
             <a:off x="457200" y="274680"/>
-            <a:ext cx="8228880" cy="1142280"/>
+            <a:ext cx="8228520" cy="1141920"/>
           </a:xfrm>
           <a:prstGeom prst="rect">
             <a:avLst/>
@@ -10452,6 +9644,7 @@
                   </a:solidFill>
                 </a:uFill>
                 <a:latin typeface="Calibri"/>
+                <a:ea typeface="DejaVu Sans"/>
               </a:rPr>
               <a:t>Table des jours de prélèvement</a:t>
             </a:r>
@@ -10461,7 +9654,7 @@
       </p:sp>
       <p:graphicFrame>
         <p:nvGraphicFramePr>
-          <p:cNvPr id="91" name="Table 2"/>
+          <p:cNvPr id="90" name="Table 2"/>
           <p:cNvGraphicFramePr/>
           <p:nvPr/>
         </p:nvGraphicFramePr>
@@ -11137,14 +10330,14 @@
       </p:graphicFrame>
       <p:sp>
         <p:nvSpPr>
-          <p:cNvPr id="92" name="CustomShape 3"/>
+          <p:cNvPr id="91" name="CustomShape 3"/>
           <p:cNvSpPr/>
           <p:nvPr/>
         </p:nvSpPr>
         <p:spPr>
           <a:xfrm>
             <a:off x="2339640" y="3429000"/>
-            <a:ext cx="4679640" cy="912240"/>
+            <a:ext cx="4679280" cy="911880"/>
           </a:xfrm>
           <a:prstGeom prst="rect">
             <a:avLst/>

</xml_diff>

<commit_message>
finalisation de la bdd avec prelevements et resultats
</commit_message>
<xml_diff>
--- a/php.pptx
+++ b/php.pptx
@@ -20,7 +20,6 @@
     <p:sldId id="267" r:id="rId15"/>
     <p:sldId id="268" r:id="rId16"/>
     <p:sldId id="269" r:id="rId17"/>
-    <p:sldId id="270" r:id="rId18"/>
   </p:sldIdLst>
   <p:sldSz cx="9144000" cy="6858000"/>
   <p:notesSz cx="7559675" cy="10691812"/>
@@ -2372,7 +2371,7 @@
         <p:spPr>
           <a:xfrm>
             <a:off x="457200" y="273600"/>
-            <a:ext cx="8228880" cy="1144440"/>
+            <a:ext cx="8229240" cy="1144800"/>
           </a:xfrm>
           <a:prstGeom prst="rect">
             <a:avLst/>
@@ -2382,6 +2381,12 @@
           <a:bodyPr lIns="0" rIns="0" tIns="0" bIns="0" anchor="ctr"/>
           <a:p>
             <a:pPr algn="ctr"/>
+            <a:r>
+              <a:rPr lang="fr-FR" sz="4400" spc="-1">
+                <a:latin typeface="Arial"/>
+              </a:rPr>
+              <a:t>Cliquez pour éditer le format du texte-titre</a:t>
+            </a:r>
             <a:endParaRPr/>
           </a:p>
         </p:txBody>
@@ -2399,7 +2404,7 @@
         <p:spPr>
           <a:xfrm>
             <a:off x="457200" y="1604520"/>
-            <a:ext cx="8228880" cy="3976560"/>
+            <a:ext cx="8229240" cy="3976920"/>
           </a:xfrm>
           <a:prstGeom prst="rect">
             <a:avLst/>
@@ -2417,7 +2422,7 @@
               <a:buChar char=""/>
             </a:pPr>
             <a:r>
-              <a:rPr lang="fr-FR" sz="1800" spc="-1">
+              <a:rPr lang="fr-FR" sz="3200" spc="-1">
                 <a:latin typeface="Arial"/>
               </a:rPr>
               <a:t>Cliquez pour éditer le format du plan de texte</a:t>
@@ -2434,7 +2439,7 @@
               <a:buChar char=""/>
             </a:pPr>
             <a:r>
-              <a:rPr lang="fr-FR" sz="1800" spc="-1">
+              <a:rPr lang="fr-FR" sz="2800" spc="-1">
                 <a:latin typeface="Arial"/>
               </a:rPr>
               <a:t>Second niveau de plan</a:t>
@@ -2451,7 +2456,7 @@
               <a:buChar char=""/>
             </a:pPr>
             <a:r>
-              <a:rPr lang="fr-FR" sz="1800" spc="-1">
+              <a:rPr lang="fr-FR" sz="2400" spc="-1">
                 <a:latin typeface="Arial"/>
               </a:rPr>
               <a:t>Troisième niveau de plan</a:t>
@@ -2468,7 +2473,7 @@
               <a:buChar char=""/>
             </a:pPr>
             <a:r>
-              <a:rPr lang="fr-FR" sz="1800" spc="-1">
+              <a:rPr lang="fr-FR" sz="2000" spc="-1">
                 <a:latin typeface="Arial"/>
               </a:rPr>
               <a:t>Quatrième niveau de plan</a:t>
@@ -2485,7 +2490,7 @@
               <a:buChar char=""/>
             </a:pPr>
             <a:r>
-              <a:rPr lang="fr-FR" sz="1800" spc="-1">
+              <a:rPr lang="fr-FR" sz="2000" spc="-1">
                 <a:latin typeface="Arial"/>
               </a:rPr>
               <a:t>Cinquième niveau de plan</a:t>
@@ -2502,7 +2507,7 @@
               <a:buChar char=""/>
             </a:pPr>
             <a:r>
-              <a:rPr lang="fr-FR" sz="1800" spc="-1">
+              <a:rPr lang="fr-FR" sz="2000" spc="-1">
                 <a:latin typeface="Arial"/>
               </a:rPr>
               <a:t>Sixième niveau de plan</a:t>
@@ -2519,7 +2524,7 @@
               <a:buChar char=""/>
             </a:pPr>
             <a:r>
-              <a:rPr lang="fr-FR" sz="1800" spc="-1">
+              <a:rPr lang="fr-FR" sz="2000" spc="-1">
                 <a:latin typeface="Arial"/>
               </a:rPr>
               <a:t>Septième niveau de plan</a:t>
@@ -2793,7 +2798,7 @@
         <p:spPr>
           <a:xfrm>
             <a:off x="685800" y="2130480"/>
-            <a:ext cx="7771320" cy="1468800"/>
+            <a:ext cx="7770960" cy="1468440"/>
           </a:xfrm>
           <a:prstGeom prst="rect">
             <a:avLst/>
@@ -2845,7 +2850,7 @@
         <p:spPr>
           <a:xfrm>
             <a:off x="1371600" y="3886200"/>
-            <a:ext cx="6399720" cy="1751400"/>
+            <a:ext cx="6399360" cy="1751040"/>
           </a:xfrm>
           <a:prstGeom prst="rect">
             <a:avLst/>
@@ -2985,14 +2990,14 @@
       </p:grpSpPr>
       <p:sp>
         <p:nvSpPr>
-          <p:cNvPr id="92" name="CustomShape 1"/>
+          <p:cNvPr id="91" name="CustomShape 1"/>
           <p:cNvSpPr/>
           <p:nvPr/>
         </p:nvSpPr>
         <p:spPr>
           <a:xfrm>
             <a:off x="457200" y="274680"/>
-            <a:ext cx="8228520" cy="1141920"/>
+            <a:ext cx="8228160" cy="1141560"/>
           </a:xfrm>
           <a:prstGeom prst="rect">
             <a:avLst/>
@@ -3037,7 +3042,7 @@
       </p:sp>
       <p:graphicFrame>
         <p:nvGraphicFramePr>
-          <p:cNvPr id="93" name="Table 2"/>
+          <p:cNvPr id="92" name="Table 2"/>
           <p:cNvGraphicFramePr/>
           <p:nvPr/>
         </p:nvGraphicFramePr>
@@ -3635,14 +3640,14 @@
       </p:graphicFrame>
       <p:sp>
         <p:nvSpPr>
-          <p:cNvPr id="94" name="CustomShape 3"/>
+          <p:cNvPr id="93" name="CustomShape 3"/>
           <p:cNvSpPr/>
           <p:nvPr/>
         </p:nvSpPr>
         <p:spPr>
           <a:xfrm>
             <a:off x="1619640" y="3645000"/>
-            <a:ext cx="4823280" cy="2009880"/>
+            <a:ext cx="4822920" cy="2009520"/>
           </a:xfrm>
           <a:prstGeom prst="rect">
             <a:avLst/>
@@ -3809,15 +3814,7 @@
 </p:sld>
 </file>
 
-<file path=ppt/slides/slide11.xml><?xml version="1.0" encoding="UTF-8" standalone="yes"?>
-<p:sld xmlns:a="http://schemas.openxmlformats.org/drawingml/2006/main" xmlns:p="http://schemas.openxmlformats.org/presentationml/2006/main" xmlns:r="http://schemas.openxmlformats.org/officeDocument/2006/relationships"><p:cSld><p:spTree><p:nvGrpSpPr>        <p:cNvPr id="1" name=""/>        <p:cNvGrpSpPr/>        <p:nvPr/>      </p:nvGrpSpPr>      <p:grpSpPr>        <a:xfrm>          <a:off x="0" y="0"/>          <a:ext cx="0" cy="0"/>          <a:chOff x="0" y="0"/>          <a:chExt cx="0" cy="0"/>        </a:xfrm>      </p:grpSpPr><p:sp><p:nvSpPr><p:cNvPr id="95" name="CustomShape 1"></p:cNvPr><p:cNvSpPr/><p:nvPr/></p:nvSpPr><p:spPr><a:xfrm><a:off x="457200" y="274680"/><a:ext cx="8228520" cy="1141920"/></a:xfrm><a:prstGeom prst="rect"><a:avLst></a:avLst></a:prstGeom><a:noFill/><a:ln><a:noFill/></a:ln></p:spPr><p:style><a:lnRef idx="0"></a:lnRef><a:fillRef idx="0"/><a:effectRef idx="0"></a:effectRef><a:fontRef idx="minor"/></p:style><p:txBody><a:bodyPr lIns="90000" rIns="90000" tIns="45000" bIns="45000" anchor="ctr"></a:bodyPr><a:p><a:pPr algn="ctr"><a:lnSpc><a:spcPct val="100000"/></a:lnSpc></a:pPr><a:r><a:rPr lang="fr-FR" sz="4400" spc="-1" strike="noStrike"><a:solidFill><a:srgbClr val="000000"/></a:solidFill><a:uFill><a:solidFill><a:srgbClr val="ffffff"/></a:solidFill></a:uFill><a:latin typeface="Calibri"/><a:ea typeface="DejaVu Sans"/></a:rPr><a:t>Prélèvements</a:t></a:r><a:endParaRPr/></a:p></p:txBody></p:sp><p:graphicFrame><p:nvGraphicFramePr><p:cNvPr id="96" name="Table 2"/><p:cNvGraphicFramePr/><p:nvPr/></p:nvGraphicFramePr><p:xfrm><a:off x="64440" y="1556640"/><a:ext cx="8899200" cy="2176200"/></p:xfrm><a:graphic><a:graphicData uri="http://schemas.openxmlformats.org/drawingml/2006/table"><a:tbl><a:tblPr/><a:tblGrid><a:gridCol w="2114280"/><a:gridCol w="1168920"/><a:gridCol w="1152000"/><a:gridCol w="1152000"/><a:gridCol w="1080000"/><a:gridCol w="2232360"/></a:tblGrid><a:tr h="896400"><a:tc><a:txBody><a:bodyPr></a:bodyPr><a:p><a:pPr><a:lnSpc><a:spcPct val="100000"/></a:lnSpc></a:pPr><a:r><a:rPr b="1" lang="fr-FR" sz="1800" spc="-1" strike="noStrike"><a:solidFill><a:srgbClr val="ffffff"/></a:solidFill><a:uFill><a:solidFill><a:srgbClr val="ffffff"/></a:solidFill></a:uFill><a:latin typeface="Calibri"/></a:rPr><a:t>Etiquette</a:t></a:r><a:endParaRPr/></a:p></a:txBody><a:tcPr marL="91440" marR="91440"><a:lnL w="12240"><a:solidFill><a:srgbClr val="ffffff"/></a:solidFill></a:lnL><a:lnR w="12240"><a:solidFill><a:srgbClr val="ffffff"/></a:solidFill></a:lnR><a:lnT w="12240"><a:solidFill><a:srgbClr val="ffffff"/></a:solidFill></a:lnT><a:lnB w="38160"><a:solidFill><a:srgbClr val="ffffff"/></a:solidFill></a:lnB><a:solidFill><a:srgbClr val="4f81bd"/></a:solidFill></a:tcPr></a:tc><a:tc><a:txBody><a:bodyPr></a:bodyPr><a:p><a:pPr><a:lnSpc><a:spcPct val="100000"/></a:lnSpc></a:pPr><a:r><a:rPr b="1" lang="fr-FR" sz="1800" spc="-1" strike="noStrike"><a:solidFill><a:srgbClr val="ffffff"/></a:solidFill><a:uFill><a:solidFill><a:srgbClr val="ffffff"/></a:solidFill></a:uFill><a:latin typeface="Calibri"/></a:rPr><a:t>Nom de variable</a:t></a:r><a:endParaRPr/></a:p></a:txBody><a:tcPr marL="91440" marR="91440"><a:lnL w="12240"><a:solidFill><a:srgbClr val="ffffff"/></a:solidFill></a:lnL><a:lnR w="12240"><a:solidFill><a:srgbClr val="ffffff"/></a:solidFill></a:lnR><a:lnT w="12240"><a:solidFill><a:srgbClr val="ffffff"/></a:solidFill></a:lnT><a:lnB w="38160"><a:solidFill><a:srgbClr val="ffffff"/></a:solidFill></a:lnB><a:solidFill><a:srgbClr val="4f81bd"/></a:solidFill></a:tcPr></a:tc><a:tc><a:txBody><a:bodyPr></a:bodyPr><a:p><a:pPr><a:lnSpc><a:spcPct val="100000"/></a:lnSpc></a:pPr><a:r><a:rPr b="1" lang="fr-FR" sz="1800" spc="-1" strike="noStrike"><a:solidFill><a:srgbClr val="ffffff"/></a:solidFill><a:uFill><a:solidFill><a:srgbClr val="ffffff"/></a:solidFill></a:uFill><a:latin typeface="Calibri"/></a:rPr><a:t>Type</a:t></a:r><a:endParaRPr/></a:p></a:txBody><a:tcPr marL="91440" marR="91440"><a:lnL w="12240"><a:solidFill><a:srgbClr val="ffffff"/></a:solidFill></a:lnL><a:lnR w="12240"><a:solidFill><a:srgbClr val="ffffff"/></a:solidFill></a:lnR><a:lnT w="12240"><a:solidFill><a:srgbClr val="ffffff"/></a:solidFill></a:lnT><a:lnB w="38160"><a:solidFill><a:srgbClr val="ffffff"/></a:solidFill></a:lnB><a:solidFill><a:srgbClr val="4f81bd"/></a:solidFill></a:tcPr></a:tc><a:tc><a:txBody><a:bodyPr></a:bodyPr><a:p><a:pPr><a:lnSpc><a:spcPct val="100000"/></a:lnSpc></a:pPr><a:r><a:rPr b="1" lang="fr-FR" sz="1800" spc="-1" strike="noStrike"><a:solidFill><a:srgbClr val="ffffff"/></a:solidFill><a:uFill><a:solidFill><a:srgbClr val="ffffff"/></a:solidFill></a:uFill><a:latin typeface="Calibri"/></a:rPr><a:t>Table</a:t></a:r><a:endParaRPr/></a:p></a:txBody><a:tcPr marL="91440" marR="91440"><a:lnL w="12240"><a:solidFill><a:srgbClr val="ffffff"/></a:solidFill></a:lnL><a:lnR w="12240"><a:solidFill><a:srgbClr val="ffffff"/></a:solidFill></a:lnR><a:lnT w="12240"><a:solidFill><a:srgbClr val="ffffff"/></a:solidFill></a:lnT><a:lnB w="38160"><a:solidFill><a:srgbClr val="ffffff"/></a:solidFill></a:lnB><a:solidFill><a:srgbClr val="4f81bd"/></a:solidFill></a:tcPr></a:tc><a:tc><a:txBody><a:bodyPr></a:bodyPr><a:p><a:pPr><a:lnSpc><a:spcPct val="100000"/></a:lnSpc></a:pPr><a:r><a:rPr b="1" lang="fr-FR" sz="1800" spc="-1" strike="noStrike"><a:solidFill><a:srgbClr val="ffffff"/></a:solidFill><a:uFill><a:solidFill><a:srgbClr val="ffffff"/></a:solidFill></a:uFill><a:latin typeface="Calibri"/></a:rPr><a:t>Clé </a:t></a:r><a:endParaRPr/></a:p><a:p><a:pPr><a:lnSpc><a:spcPct val="100000"/></a:lnSpc></a:pPr><a:r><a:rPr b="1" lang="fr-FR" sz="1800" spc="-1" strike="noStrike"><a:solidFill><a:srgbClr val="ffffff"/></a:solidFill><a:uFill><a:solidFill><a:srgbClr val="ffffff"/></a:solidFill></a:uFill><a:latin typeface="Calibri"/></a:rPr><a:t>primaire</a:t></a:r><a:endParaRPr/></a:p></a:txBody><a:tcPr marL="91440" marR="91440"><a:lnL w="12240"><a:solidFill><a:srgbClr val="ffffff"/></a:solidFill></a:lnL><a:lnR w="12240"><a:solidFill><a:srgbClr val="ffffff"/></a:solidFill></a:lnR><a:lnT w="12240"><a:solidFill><a:srgbClr val="ffffff"/></a:solidFill></a:lnT><a:lnB w="38160"><a:solidFill><a:srgbClr val="ffffff"/></a:solidFill></a:lnB><a:solidFill><a:srgbClr val="4f81bd"/></a:solidFill></a:tcPr></a:tc><a:tc><a:txBody><a:bodyPr></a:bodyPr><a:p><a:pPr><a:lnSpc><a:spcPct val="100000"/></a:lnSpc></a:pPr><a:r><a:rPr b="1" lang="fr-FR" sz="1800" spc="-1" strike="noStrike"><a:solidFill><a:srgbClr val="ffffff"/></a:solidFill><a:uFill><a:solidFill><a:srgbClr val="ffffff"/></a:solidFill></a:uFill><a:latin typeface="Calibri"/></a:rPr><a:t>Clé étrangère</a:t></a:r><a:endParaRPr/></a:p></a:txBody><a:tcPr marL="91440" marR="91440"><a:lnL w="12240"><a:solidFill><a:srgbClr val="ffffff"/></a:solidFill></a:lnL><a:lnR w="12240"><a:solidFill><a:srgbClr val="ffffff"/></a:solidFill></a:lnR><a:lnT w="12240"><a:solidFill><a:srgbClr val="ffffff"/></a:solidFill></a:lnT><a:lnB w="38160"><a:solidFill><a:srgbClr val="ffffff"/></a:solidFill></a:lnB><a:solidFill><a:srgbClr val="4f81bd"/></a:solidFill></a:tcPr></a:tc></a:tr><a:tr h="640080"><a:tc><a:txBody><a:bodyPr></a:bodyPr><a:p><a:pPr><a:lnSpc><a:spcPct val="100000"/></a:lnSpc></a:pPr><a:r><a:rPr lang="fr-FR" sz="1800" spc="-1" strike="noStrike"><a:solidFill><a:srgbClr val="000000"/></a:solidFill><a:uFill><a:solidFill><a:srgbClr val="ffffff"/></a:solidFill></a:uFill><a:latin typeface="Calibri"/></a:rPr><a:t>Prelevement fait</a:t></a:r><a:endParaRPr/></a:p></a:txBody><a:tcPr marL="91440" marR="91440"><a:lnL w="12240"><a:solidFill><a:srgbClr val="ffffff"/></a:solidFill></a:lnL><a:lnR w="12240"><a:solidFill><a:srgbClr val="ffffff"/></a:solidFill></a:lnR><a:lnT w="12240"><a:solidFill><a:srgbClr val="ffffff"/></a:solidFill></a:lnT><a:lnB w="12240"><a:solidFill><a:srgbClr val="ffffff"/></a:solidFill></a:lnB><a:solidFill><a:srgbClr val="d0d8e7"/></a:solidFill></a:tcPr></a:tc><a:tc><a:txBody><a:bodyPr></a:bodyPr><a:p><a:pPr><a:lnSpc><a:spcPct val="100000"/></a:lnSpc></a:pPr><a:r><a:rPr lang="fr-FR" sz="1800" spc="-1" strike="noStrike"><a:solidFill><a:srgbClr val="000000"/></a:solidFill><a:uFill><a:solidFill><a:srgbClr val="ffffff"/></a:solidFill></a:uFill><a:latin typeface="Calibri"/></a:rPr><a:t>Fait</a:t></a:r><a:endParaRPr/></a:p></a:txBody><a:tcPr marL="91440" marR="91440"><a:lnL w="12240"><a:solidFill><a:srgbClr val="ffffff"/></a:solidFill></a:lnL><a:lnR w="12240"><a:solidFill><a:srgbClr val="ffffff"/></a:solidFill></a:lnR><a:lnT w="12240"><a:solidFill><a:srgbClr val="ffffff"/></a:solidFill></a:lnT><a:lnB w="12240"><a:solidFill><a:srgbClr val="ffffff"/></a:solidFill></a:lnB><a:solidFill><a:srgbClr val="d0d8e7"/></a:solidFill></a:tcPr></a:tc><a:tc><a:txBody><a:bodyPr></a:bodyPr><a:p><a:pPr><a:lnSpc><a:spcPct val="100000"/></a:lnSpc></a:pPr><a:r><a:rPr lang="fr-FR" sz="1800" spc="-1" strike="noStrike"><a:solidFill><a:srgbClr val="000000"/></a:solidFill><a:uFill><a:solidFill><a:srgbClr val="ffffff"/></a:solidFill></a:uFill><a:latin typeface="Calibri"/></a:rPr><a:t>Bool</a:t></a:r><a:endParaRPr/></a:p></a:txBody><a:tcPr marL="91440" marR="91440"><a:lnL w="12240"><a:solidFill><a:srgbClr val="ffffff"/></a:solidFill></a:lnL><a:lnR w="12240"><a:solidFill><a:srgbClr val="ffffff"/></a:solidFill></a:lnR><a:lnT w="12240"><a:solidFill><a:srgbClr val="ffffff"/></a:solidFill></a:lnT><a:lnB w="12240"><a:solidFill><a:srgbClr val="ffffff"/></a:solidFill></a:lnB><a:solidFill><a:srgbClr val="d0d8e7"/></a:solidFill></a:tcPr></a:tc><a:tc rowSpan="2"><a:txBody><a:bodyPr></a:bodyPr><a:p><a:pPr><a:lnSpc><a:spcPct val="100000"/></a:lnSpc></a:pPr><a:r><a:rPr lang="fr-FR" sz="1800" spc="-1" strike="noStrike"><a:solidFill><a:srgbClr val="000000"/></a:solidFill><a:uFill><a:solidFill><a:srgbClr val="ffffff"/></a:solidFill></a:uFill><a:latin typeface="Calibri"/></a:rPr><a:t>Prélèvements</a:t></a:r><a:endParaRPr/></a:p></a:txBody><a:tcPr marL="91440" marR="91440"><a:lnL w="12240"><a:solidFill><a:srgbClr val="ffffff"/></a:solidFill></a:lnL><a:lnR w="12240"><a:solidFill><a:srgbClr val="ffffff"/></a:solidFill></a:lnR><a:lnT w="12240"><a:solidFill><a:srgbClr val="ffffff"/></a:solidFill></a:lnT><a:lnB w="12240"><a:solidFill><a:srgbClr val="ffffff"/></a:solidFill></a:lnB><a:solidFill><a:srgbClr val="d0d8e7"/></a:solidFill></a:tcPr></a:tc><a:tc rowSpan="2"><a:txBody><a:bodyPr></a:bodyPr><a:p><a:pPr><a:lnSpc><a:spcPct val="100000"/></a:lnSpc></a:pPr><a:r><a:rPr lang="fr-FR" sz="1800" spc="-1" strike="noStrike"><a:solidFill><a:srgbClr val="000000"/></a:solidFill><a:uFill><a:solidFill><a:srgbClr val="ffffff"/></a:solidFill></a:uFill><a:latin typeface="Calibri"/></a:rPr><a:t>ID</a:t></a:r><a:endParaRPr/></a:p></a:txBody><a:tcPr marL="91440" marR="91440"><a:lnL w="12240"><a:solidFill><a:srgbClr val="ffffff"/></a:solidFill></a:lnL><a:lnR w="12240"><a:solidFill><a:srgbClr val="ffffff"/></a:solidFill></a:lnR><a:lnT w="12240"><a:solidFill><a:srgbClr val="ffffff"/></a:solidFill></a:lnT><a:lnB w="12240"><a:solidFill><a:srgbClr val="ffffff"/></a:solidFill></a:lnB><a:solidFill><a:srgbClr val="d0d8e7"/></a:solidFill></a:tcPr></a:tc><a:tc rowSpan="2"><a:txBody><a:bodyPr></a:bodyPr><a:p><a:pPr><a:lnSpc><a:spcPct val="100000"/></a:lnSpc></a:pPr><a:r><a:rPr lang="fr-FR" sz="1800" spc="-1" strike="noStrike"><a:solidFill><a:srgbClr val="000000"/></a:solidFill><a:uFill><a:solidFill><a:srgbClr val="ffffff"/></a:solidFill></a:uFill><a:latin typeface="Calibri"/></a:rPr><a:t>Points-prelev(ID)</a:t></a:r><a:endParaRPr/></a:p><a:p><a:pPr><a:lnSpc><a:spcPct val="100000"/></a:lnSpc></a:pPr><a:endParaRPr/></a:p></a:txBody><a:tcPr marL="91440" marR="91440"><a:lnL w="12240"><a:solidFill><a:srgbClr val="ffffff"/></a:solidFill></a:lnL><a:lnR w="12240"><a:solidFill><a:srgbClr val="ffffff"/></a:solidFill></a:lnR><a:lnT w="12240"><a:solidFill><a:srgbClr val="ffffff"/></a:solidFill></a:lnT><a:lnB w="12240"><a:solidFill><a:srgbClr val="ffffff"/></a:solidFill></a:lnB><a:solidFill><a:srgbClr val="d0d8e7"/></a:solidFill></a:tcPr></a:tc></a:tr><a:tr h="640080"><a:tc><a:txBody><a:bodyPr></a:bodyPr><a:p><a:pPr><a:lnSpc><a:spcPct val="100000"/></a:lnSpc></a:pPr><a:r><a:rPr lang="fr-FR" sz="1800" spc="-1" strike="noStrike"><a:solidFill><a:srgbClr val="000000"/></a:solidFill><a:uFill><a:solidFill><a:srgbClr val="ffffff"/></a:solidFill></a:uFill><a:latin typeface="Calibri"/></a:rPr><a:t>Date prélèvement</a:t></a:r><a:endParaRPr/></a:p></a:txBody><a:tcPr marL="91440" marR="91440"><a:lnL w="12240"><a:solidFill><a:srgbClr val="ffffff"/></a:solidFill></a:lnL><a:lnR w="12240"><a:solidFill><a:srgbClr val="ffffff"/></a:solidFill></a:lnR><a:lnT w="12240"><a:solidFill><a:srgbClr val="ffffff"/></a:solidFill></a:lnT><a:lnB w="12240"><a:solidFill><a:srgbClr val="ffffff"/></a:solidFill></a:lnB><a:solidFill><a:srgbClr val="e9ecf3"/></a:solidFill></a:tcPr></a:tc><a:tc><a:txBody><a:bodyPr></a:bodyPr><a:p><a:pPr><a:lnSpc><a:spcPct val="100000"/></a:lnSpc></a:pPr><a:r><a:rPr lang="fr-FR" sz="1800" spc="-1" strike="noStrike"><a:solidFill><a:srgbClr val="000000"/></a:solidFill><a:uFill><a:solidFill><a:srgbClr val="ffffff"/></a:solidFill></a:uFill><a:latin typeface="Calibri"/></a:rPr><a:t>Date_prel</a:t></a:r><a:endParaRPr/></a:p></a:txBody><a:tcPr marL="91440" marR="91440"><a:lnL w="12240"><a:solidFill><a:srgbClr val="ffffff"/></a:solidFill></a:lnL><a:lnR w="12240"><a:solidFill><a:srgbClr val="ffffff"/></a:solidFill></a:lnR><a:lnT w="12240"><a:solidFill><a:srgbClr val="ffffff"/></a:solidFill></a:lnT><a:lnB w="12240"><a:solidFill><a:srgbClr val="ffffff"/></a:solidFill></a:lnB><a:solidFill><a:srgbClr val="e9ecf3"/></a:solidFill></a:tcPr></a:tc><a:tc><a:txBody><a:bodyPr></a:bodyPr><a:p><a:pPr><a:lnSpc><a:spcPct val="100000"/></a:lnSpc></a:pPr><a:r><a:rPr lang="fr-FR" sz="1800" spc="-1" strike="noStrike"><a:solidFill><a:srgbClr val="000000"/></a:solidFill><a:uFill><a:solidFill><a:srgbClr val="ffffff"/></a:solidFill></a:uFill><a:latin typeface="Calibri"/></a:rPr><a:t>Datetime</a:t></a:r><a:endParaRPr/></a:p></a:txBody><a:tcPr marL="91440" marR="91440"><a:lnL w="12240"><a:solidFill><a:srgbClr val="ffffff"/></a:solidFill></a:lnL><a:lnR w="12240"><a:solidFill><a:srgbClr val="ffffff"/></a:solidFill></a:lnR><a:lnT w="12240"><a:solidFill><a:srgbClr val="ffffff"/></a:solidFill></a:lnT><a:lnB w="12240"><a:solidFill><a:srgbClr val="ffffff"/></a:solidFill></a:lnB><a:solidFill><a:srgbClr val="e9ecf3"/></a:solidFill></a:tcPr></a:tc><a:tcPr><a:solidFill><a:srgbClr val="729fcf"/></a:solidFill></a:tcPr></a:tc><a:tcPr><a:solidFill><a:srgbClr val="729fcf"/></a:solidFill></a:tcPr></a:tc><a:tcPr><a:solidFill><a:srgbClr val="729fcf"/></a:solidFill></a:tcPr></a:tc></a:tr></a:tbl></a:graphicData></a:graphic></p:graphicFrame></p:spTree></p:cSld></p:sld>
-</file>
-
-<file path=ppt/slides/slide12.xml><?xml version="1.0" encoding="UTF-8" standalone="yes"?>
-<p:sld xmlns:a="http://schemas.openxmlformats.org/drawingml/2006/main" xmlns:p="http://schemas.openxmlformats.org/presentationml/2006/main" xmlns:r="http://schemas.openxmlformats.org/officeDocument/2006/relationships"><p:cSld><p:spTree><p:nvGrpSpPr>        <p:cNvPr id="1" name=""/>        <p:cNvGrpSpPr/>        <p:nvPr/>      </p:nvGrpSpPr>      <p:grpSpPr>        <a:xfrm>          <a:off x="0" y="0"/>          <a:ext cx="0" cy="0"/>          <a:chOff x="0" y="0"/>          <a:chExt cx="0" cy="0"/>        </a:xfrm>      </p:grpSpPr><p:sp><p:nvSpPr><p:cNvPr id="97" name="CustomShape 1"></p:cNvPr><p:cNvSpPr/><p:nvPr/></p:nvSpPr><p:spPr><a:xfrm><a:off x="457200" y="274680"/><a:ext cx="8228520" cy="1141920"/></a:xfrm><a:prstGeom prst="rect"><a:avLst></a:avLst></a:prstGeom><a:noFill/><a:ln><a:noFill/></a:ln></p:spPr><p:style><a:lnRef idx="0"></a:lnRef><a:fillRef idx="0"/><a:effectRef idx="0"></a:effectRef><a:fontRef idx="minor"/></p:style><p:txBody><a:bodyPr lIns="90000" rIns="90000" tIns="45000" bIns="45000" anchor="ctr"></a:bodyPr><a:p><a:pPr algn="ctr"><a:lnSpc><a:spcPct val="100000"/></a:lnSpc></a:pPr><a:r><a:rPr lang="fr-FR" sz="4400" spc="-1" strike="noStrike"><a:solidFill><a:srgbClr val="000000"/></a:solidFill><a:uFill><a:solidFill><a:srgbClr val="ffffff"/></a:solidFill></a:uFill><a:latin typeface="Calibri"/><a:ea typeface="DejaVu Sans"/></a:rPr><a:t>Resultats</a:t></a:r><a:endParaRPr/></a:p></p:txBody></p:sp><p:graphicFrame><p:nvGraphicFramePr><p:cNvPr id="98" name="Table 2"/><p:cNvGraphicFramePr/><p:nvPr/></p:nvGraphicFramePr><p:xfrm><a:off x="64440" y="1556640"/><a:ext cx="8899200" cy="2815560"/></p:xfrm><a:graphic><a:graphicData uri="http://schemas.openxmlformats.org/drawingml/2006/table"><a:tbl><a:tblPr/><a:tblGrid><a:gridCol w="2114280"/><a:gridCol w="1168920"/><a:gridCol w="1152000"/><a:gridCol w="1152000"/><a:gridCol w="1080000"/><a:gridCol w="2232360"/></a:tblGrid><a:tr h="896400"><a:tc><a:txBody><a:bodyPr></a:bodyPr><a:p><a:pPr><a:lnSpc><a:spcPct val="100000"/></a:lnSpc></a:pPr><a:r><a:rPr b="1" lang="fr-FR" sz="1800" spc="-1" strike="noStrike"><a:solidFill><a:srgbClr val="ffffff"/></a:solidFill><a:uFill><a:solidFill><a:srgbClr val="ffffff"/></a:solidFill></a:uFill><a:latin typeface="Calibri"/></a:rPr><a:t>Etiquette</a:t></a:r><a:endParaRPr/></a:p></a:txBody><a:tcPr marL="91440" marR="91440"><a:lnL w="12240"><a:solidFill><a:srgbClr val="ffffff"/></a:solidFill></a:lnL><a:lnR w="12240"><a:solidFill><a:srgbClr val="ffffff"/></a:solidFill></a:lnR><a:lnT w="12240"><a:solidFill><a:srgbClr val="ffffff"/></a:solidFill></a:lnT><a:lnB w="38160"><a:solidFill><a:srgbClr val="ffffff"/></a:solidFill></a:lnB><a:solidFill><a:srgbClr val="4f81bd"/></a:solidFill></a:tcPr></a:tc><a:tc><a:txBody><a:bodyPr></a:bodyPr><a:p><a:pPr><a:lnSpc><a:spcPct val="100000"/></a:lnSpc></a:pPr><a:r><a:rPr b="1" lang="fr-FR" sz="1800" spc="-1" strike="noStrike"><a:solidFill><a:srgbClr val="ffffff"/></a:solidFill><a:uFill><a:solidFill><a:srgbClr val="ffffff"/></a:solidFill></a:uFill><a:latin typeface="Calibri"/></a:rPr><a:t>Nom de variable</a:t></a:r><a:endParaRPr/></a:p></a:txBody><a:tcPr marL="91440" marR="91440"><a:lnL w="12240"><a:solidFill><a:srgbClr val="ffffff"/></a:solidFill></a:lnL><a:lnR w="12240"><a:solidFill><a:srgbClr val="ffffff"/></a:solidFill></a:lnR><a:lnT w="12240"><a:solidFill><a:srgbClr val="ffffff"/></a:solidFill></a:lnT><a:lnB w="38160"><a:solidFill><a:srgbClr val="ffffff"/></a:solidFill></a:lnB><a:solidFill><a:srgbClr val="4f81bd"/></a:solidFill></a:tcPr></a:tc><a:tc><a:txBody><a:bodyPr></a:bodyPr><a:p><a:pPr><a:lnSpc><a:spcPct val="100000"/></a:lnSpc></a:pPr><a:r><a:rPr b="1" lang="fr-FR" sz="1800" spc="-1" strike="noStrike"><a:solidFill><a:srgbClr val="ffffff"/></a:solidFill><a:uFill><a:solidFill><a:srgbClr val="ffffff"/></a:solidFill></a:uFill><a:latin typeface="Calibri"/></a:rPr><a:t>Type</a:t></a:r><a:endParaRPr/></a:p></a:txBody><a:tcPr marL="91440" marR="91440"><a:lnL w="12240"><a:solidFill><a:srgbClr val="ffffff"/></a:solidFill></a:lnL><a:lnR w="12240"><a:solidFill><a:srgbClr val="ffffff"/></a:solidFill></a:lnR><a:lnT w="12240"><a:solidFill><a:srgbClr val="ffffff"/></a:solidFill></a:lnT><a:lnB w="38160"><a:solidFill><a:srgbClr val="ffffff"/></a:solidFill></a:lnB><a:solidFill><a:srgbClr val="4f81bd"/></a:solidFill></a:tcPr></a:tc><a:tc><a:txBody><a:bodyPr></a:bodyPr><a:p><a:pPr><a:lnSpc><a:spcPct val="100000"/></a:lnSpc></a:pPr><a:r><a:rPr b="1" lang="fr-FR" sz="1800" spc="-1" strike="noStrike"><a:solidFill><a:srgbClr val="ffffff"/></a:solidFill><a:uFill><a:solidFill><a:srgbClr val="ffffff"/></a:solidFill></a:uFill><a:latin typeface="Calibri"/></a:rPr><a:t>Table</a:t></a:r><a:endParaRPr/></a:p></a:txBody><a:tcPr marL="91440" marR="91440"><a:lnL w="12240"><a:solidFill><a:srgbClr val="ffffff"/></a:solidFill></a:lnL><a:lnR w="12240"><a:solidFill><a:srgbClr val="ffffff"/></a:solidFill></a:lnR><a:lnT w="12240"><a:solidFill><a:srgbClr val="ffffff"/></a:solidFill></a:lnT><a:lnB w="38160"><a:solidFill><a:srgbClr val="ffffff"/></a:solidFill></a:lnB><a:solidFill><a:srgbClr val="4f81bd"/></a:solidFill></a:tcPr></a:tc><a:tc><a:txBody><a:bodyPr></a:bodyPr><a:p><a:pPr><a:lnSpc><a:spcPct val="100000"/></a:lnSpc></a:pPr><a:r><a:rPr b="1" lang="fr-FR" sz="1800" spc="-1" strike="noStrike"><a:solidFill><a:srgbClr val="ffffff"/></a:solidFill><a:uFill><a:solidFill><a:srgbClr val="ffffff"/></a:solidFill></a:uFill><a:latin typeface="Calibri"/></a:rPr><a:t>Clé </a:t></a:r><a:endParaRPr/></a:p><a:p><a:pPr><a:lnSpc><a:spcPct val="100000"/></a:lnSpc></a:pPr><a:r><a:rPr b="1" lang="fr-FR" sz="1800" spc="-1" strike="noStrike"><a:solidFill><a:srgbClr val="ffffff"/></a:solidFill><a:uFill><a:solidFill><a:srgbClr val="ffffff"/></a:solidFill></a:uFill><a:latin typeface="Calibri"/></a:rPr><a:t>primaire</a:t></a:r><a:endParaRPr/></a:p></a:txBody><a:tcPr marL="91440" marR="91440"><a:lnL w="12240"><a:solidFill><a:srgbClr val="ffffff"/></a:solidFill></a:lnL><a:lnR w="12240"><a:solidFill><a:srgbClr val="ffffff"/></a:solidFill></a:lnR><a:lnT w="12240"><a:solidFill><a:srgbClr val="ffffff"/></a:solidFill></a:lnT><a:lnB w="38160"><a:solidFill><a:srgbClr val="ffffff"/></a:solidFill></a:lnB><a:solidFill><a:srgbClr val="4f81bd"/></a:solidFill></a:tcPr></a:tc><a:tc><a:txBody><a:bodyPr></a:bodyPr><a:p><a:pPr><a:lnSpc><a:spcPct val="100000"/></a:lnSpc></a:pPr><a:r><a:rPr b="1" lang="fr-FR" sz="1800" spc="-1" strike="noStrike"><a:solidFill><a:srgbClr val="ffffff"/></a:solidFill><a:uFill><a:solidFill><a:srgbClr val="ffffff"/></a:solidFill></a:uFill><a:latin typeface="Calibri"/></a:rPr><a:t>Clé étrangère</a:t></a:r><a:endParaRPr/></a:p></a:txBody><a:tcPr marL="91440" marR="91440"><a:lnL w="12240"><a:solidFill><a:srgbClr val="ffffff"/></a:solidFill></a:lnL><a:lnR w="12240"><a:solidFill><a:srgbClr val="ffffff"/></a:solidFill></a:lnR><a:lnT w="12240"><a:solidFill><a:srgbClr val="ffffff"/></a:solidFill></a:lnT><a:lnB w="38160"><a:solidFill><a:srgbClr val="ffffff"/></a:solidFill></a:lnB><a:solidFill><a:srgbClr val="4f81bd"/></a:solidFill></a:tcPr></a:tc></a:tr><a:tr h="640080"><a:tc><a:txBody><a:bodyPr></a:bodyPr><a:p><a:pPr><a:lnSpc><a:spcPct val="100000"/></a:lnSpc></a:pPr><a:r><a:rPr lang="fr-FR" sz="1800" spc="-1" strike="noStrike"><a:solidFill><a:srgbClr val="000000"/></a:solidFill><a:uFill><a:solidFill><a:srgbClr val="ffffff"/></a:solidFill></a:uFill><a:latin typeface="Calibri"/></a:rPr><a:t>Nombre microorganismes</a:t></a:r><a:endParaRPr/></a:p></a:txBody><a:tcPr marL="91440" marR="91440"><a:lnL w="12240"><a:solidFill><a:srgbClr val="ffffff"/></a:solidFill></a:lnL><a:lnR w="12240"><a:solidFill><a:srgbClr val="ffffff"/></a:solidFill></a:lnR><a:lnT w="12240"><a:solidFill><a:srgbClr val="ffffff"/></a:solidFill></a:lnT><a:lnB w="12240"><a:solidFill><a:srgbClr val="ffffff"/></a:solidFill></a:lnB><a:solidFill><a:srgbClr val="d0d8e7"/></a:solidFill></a:tcPr></a:tc><a:tc><a:txBody><a:bodyPr></a:bodyPr><a:p><a:pPr><a:lnSpc><a:spcPct val="100000"/></a:lnSpc></a:pPr><a:r><a:rPr lang="fr-FR" sz="1800" spc="-1" strike="noStrike"><a:solidFill><a:srgbClr val="000000"/></a:solidFill><a:uFill><a:solidFill><a:srgbClr val="ffffff"/></a:solidFill></a:uFill><a:latin typeface="Calibri"/></a:rPr><a:t>Nb</a:t></a:r><a:endParaRPr/></a:p></a:txBody><a:tcPr marL="91440" marR="91440"><a:lnL w="12240"><a:solidFill><a:srgbClr val="ffffff"/></a:solidFill></a:lnL><a:lnR w="12240"><a:solidFill><a:srgbClr val="ffffff"/></a:solidFill></a:lnR><a:lnT w="12240"><a:solidFill><a:srgbClr val="ffffff"/></a:solidFill></a:lnT><a:lnB w="12240"><a:solidFill><a:srgbClr val="ffffff"/></a:solidFill></a:lnB><a:solidFill><a:srgbClr val="d0d8e7"/></a:solidFill></a:tcPr></a:tc><a:tc><a:txBody><a:bodyPr></a:bodyPr><a:p><a:pPr><a:lnSpc><a:spcPct val="100000"/></a:lnSpc></a:pPr><a:r><a:rPr lang="fr-FR" sz="1800" spc="-1" strike="noStrike"><a:solidFill><a:srgbClr val="000000"/></a:solidFill><a:uFill><a:solidFill><a:srgbClr val="ffffff"/></a:solidFill></a:uFill><a:latin typeface="Calibri"/></a:rPr><a:t>Integer</a:t></a:r><a:endParaRPr/></a:p></a:txBody><a:tcPr marL="91440" marR="91440"><a:lnL w="12240"><a:solidFill><a:srgbClr val="ffffff"/></a:solidFill></a:lnL><a:lnR w="12240"><a:solidFill><a:srgbClr val="ffffff"/></a:solidFill></a:lnR><a:lnT w="12240"><a:solidFill><a:srgbClr val="ffffff"/></a:solidFill></a:lnT><a:lnB w="12240"><a:solidFill><a:srgbClr val="ffffff"/></a:solidFill></a:lnB><a:solidFill><a:srgbClr val="d0d8e7"/></a:solidFill></a:tcPr></a:tc><a:tc rowSpan="3"><a:txBody><a:bodyPr></a:bodyPr><a:p><a:pPr><a:lnSpc><a:spcPct val="100000"/></a:lnSpc></a:pPr><a:r><a:rPr lang="fr-FR" sz="1800" spc="-1" strike="noStrike"><a:solidFill><a:srgbClr val="000000"/></a:solidFill><a:uFill><a:solidFill><a:srgbClr val="ffffff"/></a:solidFill></a:uFill><a:latin typeface="Calibri"/></a:rPr><a:t>Resultats</a:t></a:r><a:endParaRPr/></a:p></a:txBody><a:tcPr marL="91440" marR="91440"><a:lnL w="12240"><a:solidFill><a:srgbClr val="ffffff"/></a:solidFill></a:lnL><a:lnR w="12240"><a:solidFill><a:srgbClr val="ffffff"/></a:solidFill></a:lnR><a:lnT w="12240"><a:solidFill><a:srgbClr val="ffffff"/></a:solidFill></a:lnT><a:lnB w="12240"><a:solidFill><a:srgbClr val="ffffff"/></a:solidFill></a:lnB><a:solidFill><a:srgbClr val="d0d8e7"/></a:solidFill></a:tcPr></a:tc><a:tc rowSpan="3"><a:txBody><a:bodyPr></a:bodyPr><a:p><a:pPr><a:lnSpc><a:spcPct val="100000"/></a:lnSpc></a:pPr><a:r><a:rPr lang="fr-FR" sz="1800" spc="-1" strike="noStrike"><a:solidFill><a:srgbClr val="000000"/></a:solidFill><a:uFill><a:solidFill><a:srgbClr val="ffffff"/></a:solidFill></a:uFill><a:latin typeface="Calibri"/></a:rPr><a:t>ID</a:t></a:r><a:endParaRPr/></a:p></a:txBody><a:tcPr marL="91440" marR="91440"><a:lnL w="12240"><a:solidFill><a:srgbClr val="ffffff"/></a:solidFill></a:lnL><a:lnR w="12240"><a:solidFill><a:srgbClr val="ffffff"/></a:solidFill></a:lnR><a:lnT w="12240"><a:solidFill><a:srgbClr val="ffffff"/></a:solidFill></a:lnT><a:lnB w="12240"><a:solidFill><a:srgbClr val="ffffff"/></a:solidFill></a:lnB><a:solidFill><a:srgbClr val="d0d8e7"/></a:solidFill></a:tcPr></a:tc><a:tc rowSpan="3"><a:txBody><a:bodyPr></a:bodyPr><a:p><a:pPr><a:lnSpc><a:spcPct val="100000"/></a:lnSpc></a:pPr><a:r><a:rPr lang="fr-FR" sz="1800" spc="-1" strike="noStrike"><a:solidFill><a:srgbClr val="000000"/></a:solidFill><a:uFill><a:solidFill><a:srgbClr val="ffffff"/></a:solidFill></a:uFill><a:latin typeface="Calibri"/></a:rPr><a:t>Prélèvements(ID)</a:t></a:r><a:endParaRPr/></a:p><a:p><a:pPr><a:lnSpc><a:spcPct val="100000"/></a:lnSpc></a:pPr><a:endParaRPr/></a:p></a:txBody><a:tcPr marL="91440" marR="91440"><a:lnL w="12240"><a:solidFill><a:srgbClr val="ffffff"/></a:solidFill></a:lnL><a:lnR w="12240"><a:solidFill><a:srgbClr val="ffffff"/></a:solidFill></a:lnR><a:lnT w="12240"><a:solidFill><a:srgbClr val="ffffff"/></a:solidFill></a:lnT><a:lnB w="12240"><a:solidFill><a:srgbClr val="ffffff"/></a:solidFill></a:lnB><a:solidFill><a:srgbClr val="d0d8e7"/></a:solidFill></a:tcPr></a:tc></a:tr><a:tr h="639360"><a:tc><a:txBody><a:bodyPr></a:bodyPr><a:p><a:pPr><a:lnSpc><a:spcPct val="100000"/></a:lnSpc></a:pPr><a:r><a:rPr lang="fr-FR" sz="1800" spc="-1" strike="noStrike"><a:solidFill><a:srgbClr val="000000"/></a:solidFill><a:uFill><a:solidFill><a:srgbClr val="ffffff"/></a:solidFill></a:uFill><a:latin typeface="Calibri"/></a:rPr><a:t>Date résultat</a:t></a:r><a:endParaRPr/></a:p></a:txBody><a:tcPr marL="91440" marR="91440"><a:lnL w="12240"><a:solidFill><a:srgbClr val="ffffff"/></a:solidFill></a:lnL><a:lnR w="12240"><a:solidFill><a:srgbClr val="ffffff"/></a:solidFill></a:lnR><a:lnT w="12240"><a:solidFill><a:srgbClr val="ffffff"/></a:solidFill></a:lnT><a:lnB w="12240"><a:solidFill><a:srgbClr val="ffffff"/></a:solidFill></a:lnB><a:solidFill><a:srgbClr val="e9ecf3"/></a:solidFill></a:tcPr></a:tc><a:tc><a:txBody><a:bodyPr></a:bodyPr><a:p><a:pPr><a:lnSpc><a:spcPct val="100000"/></a:lnSpc></a:pPr><a:r><a:rPr lang="fr-FR" sz="1800" spc="-1" strike="noStrike"><a:solidFill><a:srgbClr val="000000"/></a:solidFill><a:uFill><a:solidFill><a:srgbClr val="ffffff"/></a:solidFill></a:uFill><a:latin typeface="Calibri"/></a:rPr><a:t>Date_res</a:t></a:r><a:endParaRPr/></a:p></a:txBody><a:tcPr marL="91440" marR="91440"><a:lnL w="12240"><a:solidFill><a:srgbClr val="ffffff"/></a:solidFill></a:lnL><a:lnR w="12240"><a:solidFill><a:srgbClr val="ffffff"/></a:solidFill></a:lnR><a:lnT w="12240"><a:solidFill><a:srgbClr val="ffffff"/></a:solidFill></a:lnT><a:lnB w="12240"><a:solidFill><a:srgbClr val="ffffff"/></a:solidFill></a:lnB><a:solidFill><a:srgbClr val="e9ecf3"/></a:solidFill></a:tcPr></a:tc><a:tc><a:txBody><a:bodyPr></a:bodyPr><a:p><a:pPr><a:lnSpc><a:spcPct val="100000"/></a:lnSpc></a:pPr><a:r><a:rPr lang="fr-FR" sz="1800" spc="-1" strike="noStrike"><a:solidFill><a:srgbClr val="000000"/></a:solidFill><a:uFill><a:solidFill><a:srgbClr val="ffffff"/></a:solidFill></a:uFill><a:latin typeface="Calibri"/></a:rPr><a:t>Datetime</a:t></a:r><a:endParaRPr/></a:p></a:txBody><a:tcPr marL="91440" marR="91440"><a:lnL w="12240"><a:solidFill><a:srgbClr val="ffffff"/></a:solidFill></a:lnL><a:lnR w="12240"><a:solidFill><a:srgbClr val="ffffff"/></a:solidFill></a:lnR><a:lnT w="12240"><a:solidFill><a:srgbClr val="ffffff"/></a:solidFill></a:lnT><a:lnB w="12240"><a:solidFill><a:srgbClr val="ffffff"/></a:solidFill></a:lnB><a:solidFill><a:srgbClr val="e9ecf3"/></a:solidFill></a:tcPr></a:tc><a:tc vMerge="1"><a:tcPr><a:solidFill><a:srgbClr val="729fcf"/></a:solidFill></a:tcPr></a:tc><a:tc vMerge="1"><a:tcPr><a:solidFill><a:srgbClr val="729fcf"/></a:solidFill></a:tcPr></a:tc><a:tc vMerge="1"><a:tcPr><a:solidFill><a:srgbClr val="729fcf"/></a:solidFill></a:tcPr></a:tc></a:tr><a:tr h="640080"><a:tc><a:txBody><a:bodyPr></a:bodyPr><a:p><a:r><a:rPr lang="fr-FR" sz="1800" spc="-1" strike="noStrike"><a:uFill><a:solidFill><a:srgbClr val="ffffff"/></a:solidFill></a:uFill><a:latin typeface="Calibri"/></a:rPr><a:t>Micro-organisme</a:t></a:r><a:endParaRPr/></a:p></a:txBody><a:tcPr marL="91440" marR="91440"><a:lnL w="12240"><a:solidFill><a:srgbClr val="ffffff"/></a:solidFill></a:lnL><a:lnR w="12240"><a:solidFill><a:srgbClr val="ffffff"/></a:solidFill></a:lnR><a:lnT w="12240"><a:solidFill><a:srgbClr val="ffffff"/></a:solidFill></a:lnT><a:lnB w="12240"><a:solidFill><a:srgbClr val="ffffff"/></a:solidFill></a:lnB><a:solidFill><a:srgbClr val="e9ecf3"/></a:solidFill></a:tcPr></a:tc><a:tc><a:txBody><a:bodyPr></a:bodyPr><a:p><a:r><a:rPr lang="fr-FR" sz="1800" spc="-1" strike="noStrike"><a:uFill><a:solidFill><a:srgbClr val="ffffff"/></a:solidFill></a:uFill><a:latin typeface="Calibri"/></a:rPr><a:t>micro</a:t></a:r><a:endParaRPr/></a:p></a:txBody><a:tcPr marL="91440" marR="91440"><a:lnL w="12240"><a:solidFill><a:srgbClr val="ffffff"/></a:solidFill></a:lnL><a:lnR w="12240"><a:solidFill><a:srgbClr val="ffffff"/></a:solidFill></a:lnR><a:lnT w="12240"><a:solidFill><a:srgbClr val="ffffff"/></a:solidFill></a:lnT><a:lnB w="12240"><a:solidFill><a:srgbClr val="ffffff"/></a:solidFill></a:lnB><a:solidFill><a:srgbClr val="e9ecf3"/></a:solidFill></a:tcPr></a:tc><a:tc><a:txBody><a:bodyPr></a:bodyPr><a:p><a:r><a:rPr lang="fr-FR" sz="1800" spc="-1" strike="noStrike"><a:solidFill><a:srgbClr val="000000"/></a:solidFill><a:uFill><a:solidFill><a:srgbClr val="ffffff"/></a:solidFill></a:uFill><a:latin typeface="Calibri"/><a:ea typeface="Droid Sans Fallback"/></a:rPr><a:t>text</a:t></a:r><a:endParaRPr/></a:p></a:txBody><a:tcPr marL="91440" marR="91440"><a:lnL w="12240"><a:solidFill><a:srgbClr val="ffffff"/></a:solidFill></a:lnL><a:lnR w="12240"><a:solidFill><a:srgbClr val="ffffff"/></a:solidFill></a:lnR><a:lnT w="12240"><a:solidFill><a:srgbClr val="ffffff"/></a:solidFill></a:lnT><a:lnB w="12240"><a:solidFill><a:srgbClr val="ffffff"/></a:solidFill></a:lnB><a:solidFill><a:srgbClr val="e9ecf3"/></a:solidFill></a:tcPr></a:tc><a:tcPr><a:solidFill><a:srgbClr val="729fcf"/></a:solidFill></a:tcPr></a:tc><a:tcPr><a:solidFill><a:srgbClr val="729fcf"/></a:solidFill></a:tcPr></a:tc><a:tcPr><a:solidFill><a:srgbClr val="729fcf"/></a:solidFill></a:tcPr></a:tc></a:tr></a:tbl></a:graphicData></a:graphic></p:graphicFrame></p:spTree></p:cSld></p:sld>
-</file>
-
-<file path=ppt/slides/slide13.xml><?xml version="1.0" encoding="utf-8"?>
+<file path=ppt/slides/slide11.xml><?xml version="1.0" encoding="utf-8"?>
 <p:sld xmlns:a="http://schemas.openxmlformats.org/drawingml/2006/main" xmlns:p="http://schemas.openxmlformats.org/presentationml/2006/main" xmlns:r="http://schemas.openxmlformats.org/officeDocument/2006/relationships">
   <p:cSld>
     <p:spTree>
@@ -3836,14 +3833,1591 @@
       </p:grpSpPr>
       <p:sp>
         <p:nvSpPr>
-          <p:cNvPr id="99" name="CustomShape 1"/>
+          <p:cNvPr id="94" name="CustomShape 1"/>
           <p:cNvSpPr/>
           <p:nvPr/>
         </p:nvSpPr>
         <p:spPr>
           <a:xfrm>
+            <a:off x="457200" y="274680"/>
+            <a:ext cx="8228160" cy="1141560"/>
+          </a:xfrm>
+          <a:prstGeom prst="rect">
+            <a:avLst/>
+          </a:prstGeom>
+          <a:noFill/>
+          <a:ln>
+            <a:noFill/>
+          </a:ln>
+        </p:spPr>
+        <p:style>
+          <a:lnRef idx="0"/>
+          <a:fillRef idx="0"/>
+          <a:effectRef idx="0"/>
+          <a:fontRef idx="minor"/>
+        </p:style>
+        <p:txBody>
+          <a:bodyPr lIns="90000" rIns="90000" tIns="45000" bIns="45000" anchor="ctr"/>
+          <a:p>
+            <a:pPr algn="ctr">
+              <a:lnSpc>
+                <a:spcPct val="100000"/>
+              </a:lnSpc>
+            </a:pPr>
+            <a:r>
+              <a:rPr lang="fr-FR" sz="4400" spc="-1" strike="noStrike">
+                <a:solidFill>
+                  <a:srgbClr val="000000"/>
+                </a:solidFill>
+                <a:uFill>
+                  <a:solidFill>
+                    <a:srgbClr val="ffffff"/>
+                  </a:solidFill>
+                </a:uFill>
+                <a:latin typeface="Calibri"/>
+                <a:ea typeface="DejaVu Sans"/>
+              </a:rPr>
+              <a:t>Prélèvements</a:t>
+            </a:r>
+            <a:endParaRPr/>
+          </a:p>
+        </p:txBody>
+      </p:sp>
+      <p:graphicFrame>
+        <p:nvGraphicFramePr>
+          <p:cNvPr id="95" name="Table 2"/>
+          <p:cNvGraphicFramePr/>
+          <p:nvPr/>
+        </p:nvGraphicFramePr>
+        <p:xfrm>
+          <a:off x="64440" y="1556640"/>
+          <a:ext cx="8899200" cy="1536120"/>
+        </p:xfrm>
+        <a:graphic>
+          <a:graphicData uri="http://schemas.openxmlformats.org/drawingml/2006/table">
+            <a:tbl>
+              <a:tblPr/>
+              <a:tblGrid>
+                <a:gridCol w="2114280"/>
+                <a:gridCol w="1168920"/>
+                <a:gridCol w="1152000"/>
+                <a:gridCol w="1152000"/>
+                <a:gridCol w="1080000"/>
+                <a:gridCol w="2232360"/>
+              </a:tblGrid>
+              <a:tr h="896400">
+                <a:tc>
+                  <a:txBody>
+                    <a:bodyPr/>
+                    <a:p>
+                      <a:pPr>
+                        <a:lnSpc>
+                          <a:spcPct val="100000"/>
+                        </a:lnSpc>
+                      </a:pPr>
+                      <a:r>
+                        <a:rPr b="1" lang="fr-FR" sz="1800" spc="-1" strike="noStrike">
+                          <a:solidFill>
+                            <a:srgbClr val="ffffff"/>
+                          </a:solidFill>
+                          <a:uFill>
+                            <a:solidFill>
+                              <a:srgbClr val="ffffff"/>
+                            </a:solidFill>
+                          </a:uFill>
+                          <a:latin typeface="Calibri"/>
+                        </a:rPr>
+                        <a:t>Etiquette</a:t>
+                      </a:r>
+                      <a:endParaRPr/>
+                    </a:p>
+                  </a:txBody>
+                  <a:tcPr marL="91440" marR="91440">
+                    <a:lnL w="12240">
+                      <a:solidFill>
+                        <a:srgbClr val="ffffff"/>
+                      </a:solidFill>
+                    </a:lnL>
+                    <a:lnR w="12240">
+                      <a:solidFill>
+                        <a:srgbClr val="ffffff"/>
+                      </a:solidFill>
+                    </a:lnR>
+                    <a:lnT w="12240">
+                      <a:solidFill>
+                        <a:srgbClr val="ffffff"/>
+                      </a:solidFill>
+                    </a:lnT>
+                    <a:lnB w="38160">
+                      <a:solidFill>
+                        <a:srgbClr val="ffffff"/>
+                      </a:solidFill>
+                    </a:lnB>
+                    <a:solidFill>
+                      <a:srgbClr val="4f81bd"/>
+                    </a:solidFill>
+                  </a:tcPr>
+                </a:tc>
+                <a:tc>
+                  <a:txBody>
+                    <a:bodyPr/>
+                    <a:p>
+                      <a:pPr>
+                        <a:lnSpc>
+                          <a:spcPct val="100000"/>
+                        </a:lnSpc>
+                      </a:pPr>
+                      <a:r>
+                        <a:rPr b="1" lang="fr-FR" sz="1800" spc="-1" strike="noStrike">
+                          <a:solidFill>
+                            <a:srgbClr val="ffffff"/>
+                          </a:solidFill>
+                          <a:uFill>
+                            <a:solidFill>
+                              <a:srgbClr val="ffffff"/>
+                            </a:solidFill>
+                          </a:uFill>
+                          <a:latin typeface="Calibri"/>
+                        </a:rPr>
+                        <a:t>Nom de variable</a:t>
+                      </a:r>
+                      <a:endParaRPr/>
+                    </a:p>
+                  </a:txBody>
+                  <a:tcPr marL="91440" marR="91440">
+                    <a:lnL w="12240">
+                      <a:solidFill>
+                        <a:srgbClr val="ffffff"/>
+                      </a:solidFill>
+                    </a:lnL>
+                    <a:lnR w="12240">
+                      <a:solidFill>
+                        <a:srgbClr val="ffffff"/>
+                      </a:solidFill>
+                    </a:lnR>
+                    <a:lnT w="12240">
+                      <a:solidFill>
+                        <a:srgbClr val="ffffff"/>
+                      </a:solidFill>
+                    </a:lnT>
+                    <a:lnB w="38160">
+                      <a:solidFill>
+                        <a:srgbClr val="ffffff"/>
+                      </a:solidFill>
+                    </a:lnB>
+                    <a:solidFill>
+                      <a:srgbClr val="4f81bd"/>
+                    </a:solidFill>
+                  </a:tcPr>
+                </a:tc>
+                <a:tc>
+                  <a:txBody>
+                    <a:bodyPr/>
+                    <a:p>
+                      <a:pPr>
+                        <a:lnSpc>
+                          <a:spcPct val="100000"/>
+                        </a:lnSpc>
+                      </a:pPr>
+                      <a:r>
+                        <a:rPr b="1" lang="fr-FR" sz="1800" spc="-1" strike="noStrike">
+                          <a:solidFill>
+                            <a:srgbClr val="ffffff"/>
+                          </a:solidFill>
+                          <a:uFill>
+                            <a:solidFill>
+                              <a:srgbClr val="ffffff"/>
+                            </a:solidFill>
+                          </a:uFill>
+                          <a:latin typeface="Calibri"/>
+                        </a:rPr>
+                        <a:t>Type</a:t>
+                      </a:r>
+                      <a:endParaRPr/>
+                    </a:p>
+                  </a:txBody>
+                  <a:tcPr marL="91440" marR="91440">
+                    <a:lnL w="12240">
+                      <a:solidFill>
+                        <a:srgbClr val="ffffff"/>
+                      </a:solidFill>
+                    </a:lnL>
+                    <a:lnR w="12240">
+                      <a:solidFill>
+                        <a:srgbClr val="ffffff"/>
+                      </a:solidFill>
+                    </a:lnR>
+                    <a:lnT w="12240">
+                      <a:solidFill>
+                        <a:srgbClr val="ffffff"/>
+                      </a:solidFill>
+                    </a:lnT>
+                    <a:lnB w="38160">
+                      <a:solidFill>
+                        <a:srgbClr val="ffffff"/>
+                      </a:solidFill>
+                    </a:lnB>
+                    <a:solidFill>
+                      <a:srgbClr val="4f81bd"/>
+                    </a:solidFill>
+                  </a:tcPr>
+                </a:tc>
+                <a:tc>
+                  <a:txBody>
+                    <a:bodyPr/>
+                    <a:p>
+                      <a:pPr>
+                        <a:lnSpc>
+                          <a:spcPct val="100000"/>
+                        </a:lnSpc>
+                      </a:pPr>
+                      <a:r>
+                        <a:rPr b="1" lang="fr-FR" sz="1800" spc="-1" strike="noStrike">
+                          <a:solidFill>
+                            <a:srgbClr val="ffffff"/>
+                          </a:solidFill>
+                          <a:uFill>
+                            <a:solidFill>
+                              <a:srgbClr val="ffffff"/>
+                            </a:solidFill>
+                          </a:uFill>
+                          <a:latin typeface="Calibri"/>
+                        </a:rPr>
+                        <a:t>Table</a:t>
+                      </a:r>
+                      <a:endParaRPr/>
+                    </a:p>
+                  </a:txBody>
+                  <a:tcPr marL="91440" marR="91440">
+                    <a:lnL w="12240">
+                      <a:solidFill>
+                        <a:srgbClr val="ffffff"/>
+                      </a:solidFill>
+                    </a:lnL>
+                    <a:lnR w="12240">
+                      <a:solidFill>
+                        <a:srgbClr val="ffffff"/>
+                      </a:solidFill>
+                    </a:lnR>
+                    <a:lnT w="12240">
+                      <a:solidFill>
+                        <a:srgbClr val="ffffff"/>
+                      </a:solidFill>
+                    </a:lnT>
+                    <a:lnB w="38160">
+                      <a:solidFill>
+                        <a:srgbClr val="ffffff"/>
+                      </a:solidFill>
+                    </a:lnB>
+                    <a:solidFill>
+                      <a:srgbClr val="4f81bd"/>
+                    </a:solidFill>
+                  </a:tcPr>
+                </a:tc>
+                <a:tc>
+                  <a:txBody>
+                    <a:bodyPr/>
+                    <a:p>
+                      <a:pPr>
+                        <a:lnSpc>
+                          <a:spcPct val="100000"/>
+                        </a:lnSpc>
+                      </a:pPr>
+                      <a:r>
+                        <a:rPr b="1" lang="fr-FR" sz="1800" spc="-1" strike="noStrike">
+                          <a:solidFill>
+                            <a:srgbClr val="ffffff"/>
+                          </a:solidFill>
+                          <a:uFill>
+                            <a:solidFill>
+                              <a:srgbClr val="ffffff"/>
+                            </a:solidFill>
+                          </a:uFill>
+                          <a:latin typeface="Calibri"/>
+                        </a:rPr>
+                        <a:t>Clé </a:t>
+                      </a:r>
+                      <a:endParaRPr/>
+                    </a:p>
+                    <a:p>
+                      <a:pPr>
+                        <a:lnSpc>
+                          <a:spcPct val="100000"/>
+                        </a:lnSpc>
+                      </a:pPr>
+                      <a:r>
+                        <a:rPr b="1" lang="fr-FR" sz="1800" spc="-1" strike="noStrike">
+                          <a:solidFill>
+                            <a:srgbClr val="ffffff"/>
+                          </a:solidFill>
+                          <a:uFill>
+                            <a:solidFill>
+                              <a:srgbClr val="ffffff"/>
+                            </a:solidFill>
+                          </a:uFill>
+                          <a:latin typeface="Calibri"/>
+                        </a:rPr>
+                        <a:t>primaire</a:t>
+                      </a:r>
+                      <a:endParaRPr/>
+                    </a:p>
+                  </a:txBody>
+                  <a:tcPr marL="91440" marR="91440">
+                    <a:lnL w="12240">
+                      <a:solidFill>
+                        <a:srgbClr val="ffffff"/>
+                      </a:solidFill>
+                    </a:lnL>
+                    <a:lnR w="12240">
+                      <a:solidFill>
+                        <a:srgbClr val="ffffff"/>
+                      </a:solidFill>
+                    </a:lnR>
+                    <a:lnT w="12240">
+                      <a:solidFill>
+                        <a:srgbClr val="ffffff"/>
+                      </a:solidFill>
+                    </a:lnT>
+                    <a:lnB w="38160">
+                      <a:solidFill>
+                        <a:srgbClr val="ffffff"/>
+                      </a:solidFill>
+                    </a:lnB>
+                    <a:solidFill>
+                      <a:srgbClr val="4f81bd"/>
+                    </a:solidFill>
+                  </a:tcPr>
+                </a:tc>
+                <a:tc>
+                  <a:txBody>
+                    <a:bodyPr/>
+                    <a:p>
+                      <a:pPr>
+                        <a:lnSpc>
+                          <a:spcPct val="100000"/>
+                        </a:lnSpc>
+                      </a:pPr>
+                      <a:r>
+                        <a:rPr b="1" lang="fr-FR" sz="1800" spc="-1" strike="noStrike">
+                          <a:solidFill>
+                            <a:srgbClr val="ffffff"/>
+                          </a:solidFill>
+                          <a:uFill>
+                            <a:solidFill>
+                              <a:srgbClr val="ffffff"/>
+                            </a:solidFill>
+                          </a:uFill>
+                          <a:latin typeface="Calibri"/>
+                        </a:rPr>
+                        <a:t>Clé étrangère</a:t>
+                      </a:r>
+                      <a:endParaRPr/>
+                    </a:p>
+                  </a:txBody>
+                  <a:tcPr marL="91440" marR="91440">
+                    <a:lnL w="12240">
+                      <a:solidFill>
+                        <a:srgbClr val="ffffff"/>
+                      </a:solidFill>
+                    </a:lnL>
+                    <a:lnR w="12240">
+                      <a:solidFill>
+                        <a:srgbClr val="ffffff"/>
+                      </a:solidFill>
+                    </a:lnR>
+                    <a:lnT w="12240">
+                      <a:solidFill>
+                        <a:srgbClr val="ffffff"/>
+                      </a:solidFill>
+                    </a:lnT>
+                    <a:lnB w="38160">
+                      <a:solidFill>
+                        <a:srgbClr val="ffffff"/>
+                      </a:solidFill>
+                    </a:lnB>
+                    <a:solidFill>
+                      <a:srgbClr val="4f81bd"/>
+                    </a:solidFill>
+                  </a:tcPr>
+                </a:tc>
+              </a:tr>
+              <a:tr h="640080">
+                <a:tc>
+                  <a:txBody>
+                    <a:bodyPr/>
+                    <a:p>
+                      <a:pPr>
+                        <a:lnSpc>
+                          <a:spcPct val="100000"/>
+                        </a:lnSpc>
+                      </a:pPr>
+                      <a:r>
+                        <a:rPr lang="fr-FR" sz="1800" spc="-1" strike="noStrike">
+                          <a:solidFill>
+                            <a:srgbClr val="000000"/>
+                          </a:solidFill>
+                          <a:uFill>
+                            <a:solidFill>
+                              <a:srgbClr val="ffffff"/>
+                            </a:solidFill>
+                          </a:uFill>
+                          <a:latin typeface="Calibri"/>
+                        </a:rPr>
+                        <a:t>Date prélèvement</a:t>
+                      </a:r>
+                      <a:endParaRPr/>
+                    </a:p>
+                  </a:txBody>
+                  <a:tcPr marL="91440" marR="91440">
+                    <a:lnL w="12240">
+                      <a:solidFill>
+                        <a:srgbClr val="ffffff"/>
+                      </a:solidFill>
+                    </a:lnL>
+                    <a:lnR w="12240">
+                      <a:solidFill>
+                        <a:srgbClr val="ffffff"/>
+                      </a:solidFill>
+                    </a:lnR>
+                    <a:lnT w="12240">
+                      <a:solidFill>
+                        <a:srgbClr val="ffffff"/>
+                      </a:solidFill>
+                    </a:lnT>
+                    <a:lnB w="12240">
+                      <a:solidFill>
+                        <a:srgbClr val="ffffff"/>
+                      </a:solidFill>
+                    </a:lnB>
+                    <a:solidFill>
+                      <a:srgbClr val="e9ecf3"/>
+                    </a:solidFill>
+                  </a:tcPr>
+                </a:tc>
+                <a:tc>
+                  <a:txBody>
+                    <a:bodyPr/>
+                    <a:p>
+                      <a:pPr>
+                        <a:lnSpc>
+                          <a:spcPct val="100000"/>
+                        </a:lnSpc>
+                      </a:pPr>
+                      <a:r>
+                        <a:rPr lang="fr-FR" sz="1800" spc="-1" strike="noStrike">
+                          <a:solidFill>
+                            <a:srgbClr val="000000"/>
+                          </a:solidFill>
+                          <a:uFill>
+                            <a:solidFill>
+                              <a:srgbClr val="ffffff"/>
+                            </a:solidFill>
+                          </a:uFill>
+                          <a:latin typeface="Calibri"/>
+                        </a:rPr>
+                        <a:t>Date_prel</a:t>
+                      </a:r>
+                      <a:endParaRPr/>
+                    </a:p>
+                  </a:txBody>
+                  <a:tcPr marL="91440" marR="91440">
+                    <a:lnL w="12240">
+                      <a:solidFill>
+                        <a:srgbClr val="ffffff"/>
+                      </a:solidFill>
+                    </a:lnL>
+                    <a:lnR w="12240">
+                      <a:solidFill>
+                        <a:srgbClr val="ffffff"/>
+                      </a:solidFill>
+                    </a:lnR>
+                    <a:lnT w="12240">
+                      <a:solidFill>
+                        <a:srgbClr val="ffffff"/>
+                      </a:solidFill>
+                    </a:lnT>
+                    <a:lnB w="12240">
+                      <a:solidFill>
+                        <a:srgbClr val="ffffff"/>
+                      </a:solidFill>
+                    </a:lnB>
+                    <a:solidFill>
+                      <a:srgbClr val="e9ecf3"/>
+                    </a:solidFill>
+                  </a:tcPr>
+                </a:tc>
+                <a:tc>
+                  <a:txBody>
+                    <a:bodyPr/>
+                    <a:p>
+                      <a:pPr>
+                        <a:lnSpc>
+                          <a:spcPct val="100000"/>
+                        </a:lnSpc>
+                      </a:pPr>
+                      <a:r>
+                        <a:rPr lang="fr-FR" sz="1800" spc="-1" strike="noStrike">
+                          <a:solidFill>
+                            <a:srgbClr val="000000"/>
+                          </a:solidFill>
+                          <a:uFill>
+                            <a:solidFill>
+                              <a:srgbClr val="ffffff"/>
+                            </a:solidFill>
+                          </a:uFill>
+                          <a:latin typeface="Calibri"/>
+                        </a:rPr>
+                        <a:t>Datetime</a:t>
+                      </a:r>
+                      <a:endParaRPr/>
+                    </a:p>
+                  </a:txBody>
+                  <a:tcPr marL="91440" marR="91440">
+                    <a:lnL w="12240">
+                      <a:solidFill>
+                        <a:srgbClr val="ffffff"/>
+                      </a:solidFill>
+                    </a:lnL>
+                    <a:lnR w="12240">
+                      <a:solidFill>
+                        <a:srgbClr val="ffffff"/>
+                      </a:solidFill>
+                    </a:lnR>
+                    <a:lnT w="12240">
+                      <a:solidFill>
+                        <a:srgbClr val="ffffff"/>
+                      </a:solidFill>
+                    </a:lnT>
+                    <a:lnB w="12240">
+                      <a:solidFill>
+                        <a:srgbClr val="ffffff"/>
+                      </a:solidFill>
+                    </a:lnB>
+                    <a:solidFill>
+                      <a:srgbClr val="e9ecf3"/>
+                    </a:solidFill>
+                  </a:tcPr>
+                </a:tc>
+                <a:tc>
+                  <a:txBody>
+                    <a:bodyPr/>
+                    <a:p>
+                      <a:pPr>
+                        <a:lnSpc>
+                          <a:spcPct val="100000"/>
+                        </a:lnSpc>
+                      </a:pPr>
+                      <a:r>
+                        <a:rPr lang="fr-FR" sz="1800" spc="-1" strike="noStrike">
+                          <a:solidFill>
+                            <a:srgbClr val="000000"/>
+                          </a:solidFill>
+                          <a:uFill>
+                            <a:solidFill>
+                              <a:srgbClr val="ffffff"/>
+                            </a:solidFill>
+                          </a:uFill>
+                          <a:latin typeface="Calibri"/>
+                        </a:rPr>
+                        <a:t>Prélèvements</a:t>
+                      </a:r>
+                      <a:endParaRPr/>
+                    </a:p>
+                  </a:txBody>
+                  <a:tcPr marL="91440" marR="91440">
+                    <a:lnL w="12240">
+                      <a:solidFill>
+                        <a:srgbClr val="ffffff"/>
+                      </a:solidFill>
+                    </a:lnL>
+                    <a:lnR w="12240">
+                      <a:solidFill>
+                        <a:srgbClr val="ffffff"/>
+                      </a:solidFill>
+                    </a:lnR>
+                    <a:lnT w="12240">
+                      <a:solidFill>
+                        <a:srgbClr val="ffffff"/>
+                      </a:solidFill>
+                    </a:lnT>
+                    <a:lnB w="12240">
+                      <a:solidFill>
+                        <a:srgbClr val="ffffff"/>
+                      </a:solidFill>
+                    </a:lnB>
+                    <a:solidFill>
+                      <a:srgbClr val="d0d8e7"/>
+                    </a:solidFill>
+                  </a:tcPr>
+                </a:tc>
+                <a:tc>
+                  <a:txBody>
+                    <a:bodyPr/>
+                    <a:p>
+                      <a:pPr>
+                        <a:lnSpc>
+                          <a:spcPct val="100000"/>
+                        </a:lnSpc>
+                      </a:pPr>
+                      <a:r>
+                        <a:rPr lang="fr-FR" sz="1800" spc="-1" strike="noStrike">
+                          <a:solidFill>
+                            <a:srgbClr val="000000"/>
+                          </a:solidFill>
+                          <a:uFill>
+                            <a:solidFill>
+                              <a:srgbClr val="ffffff"/>
+                            </a:solidFill>
+                          </a:uFill>
+                          <a:latin typeface="Calibri"/>
+                        </a:rPr>
+                        <a:t>ID</a:t>
+                      </a:r>
+                      <a:endParaRPr/>
+                    </a:p>
+                  </a:txBody>
+                  <a:tcPr marL="91440" marR="91440">
+                    <a:lnL w="12240">
+                      <a:solidFill>
+                        <a:srgbClr val="ffffff"/>
+                      </a:solidFill>
+                    </a:lnL>
+                    <a:lnR w="12240">
+                      <a:solidFill>
+                        <a:srgbClr val="ffffff"/>
+                      </a:solidFill>
+                    </a:lnR>
+                    <a:lnT w="12240">
+                      <a:solidFill>
+                        <a:srgbClr val="ffffff"/>
+                      </a:solidFill>
+                    </a:lnT>
+                    <a:lnB w="12240">
+                      <a:solidFill>
+                        <a:srgbClr val="ffffff"/>
+                      </a:solidFill>
+                    </a:lnB>
+                    <a:solidFill>
+                      <a:srgbClr val="d0d8e7"/>
+                    </a:solidFill>
+                  </a:tcPr>
+                </a:tc>
+                <a:tc>
+                  <a:txBody>
+                    <a:bodyPr/>
+                    <a:p>
+                      <a:pPr>
+                        <a:lnSpc>
+                          <a:spcPct val="100000"/>
+                        </a:lnSpc>
+                      </a:pPr>
+                      <a:r>
+                        <a:rPr lang="fr-FR" sz="1800" spc="-1" strike="noStrike">
+                          <a:solidFill>
+                            <a:srgbClr val="000000"/>
+                          </a:solidFill>
+                          <a:uFill>
+                            <a:solidFill>
+                              <a:srgbClr val="ffffff"/>
+                            </a:solidFill>
+                          </a:uFill>
+                          <a:latin typeface="Calibri"/>
+                        </a:rPr>
+                        <a:t>Points-prelev(ID)</a:t>
+                      </a:r>
+                      <a:endParaRPr/>
+                    </a:p>
+                    <a:p>
+                      <a:pPr>
+                        <a:lnSpc>
+                          <a:spcPct val="100000"/>
+                        </a:lnSpc>
+                      </a:pPr>
+                      <a:endParaRPr/>
+                    </a:p>
+                  </a:txBody>
+                  <a:tcPr marL="91440" marR="91440">
+                    <a:lnL w="12240">
+                      <a:solidFill>
+                        <a:srgbClr val="ffffff"/>
+                      </a:solidFill>
+                    </a:lnL>
+                    <a:lnR w="12240">
+                      <a:solidFill>
+                        <a:srgbClr val="ffffff"/>
+                      </a:solidFill>
+                    </a:lnR>
+                    <a:lnT w="12240">
+                      <a:solidFill>
+                        <a:srgbClr val="ffffff"/>
+                      </a:solidFill>
+                    </a:lnT>
+                    <a:lnB w="12240">
+                      <a:solidFill>
+                        <a:srgbClr val="ffffff"/>
+                      </a:solidFill>
+                    </a:lnB>
+                    <a:solidFill>
+                      <a:srgbClr val="d0d8e7"/>
+                    </a:solidFill>
+                  </a:tcPr>
+                </a:tc>
+              </a:tr>
+              <a:tr h="640080">
+                <a:tc>
+                  <a:txBody>
+                    <a:bodyPr/>
+                    <a:p>
+                      <a:pPr>
+                        <a:lnSpc>
+                          <a:spcPct val="100000"/>
+                        </a:lnSpc>
+                      </a:pPr>
+                      <a:r>
+                        <a:rPr lang="fr-FR" sz="1800" spc="-1" strike="noStrike">
+                          <a:solidFill>
+                            <a:srgbClr val="000000"/>
+                          </a:solidFill>
+                          <a:uFill>
+                            <a:solidFill>
+                              <a:srgbClr val="ffffff"/>
+                            </a:solidFill>
+                          </a:uFill>
+                          <a:latin typeface="Calibri"/>
+                        </a:rPr>
+                        <a:t>Date résultat</a:t>
+                      </a:r>
+                      <a:endParaRPr/>
+                    </a:p>
+                  </a:txBody>
+                  <a:tcPr marL="91440" marR="91440">
+                    <a:lnL w="12240">
+                      <a:solidFill>
+                        <a:srgbClr val="ffffff"/>
+                      </a:solidFill>
+                    </a:lnL>
+                    <a:lnR w="12240">
+                      <a:solidFill>
+                        <a:srgbClr val="ffffff"/>
+                      </a:solidFill>
+                    </a:lnR>
+                    <a:lnT w="12240">
+                      <a:solidFill>
+                        <a:srgbClr val="ffffff"/>
+                      </a:solidFill>
+                    </a:lnT>
+                    <a:lnB w="12240">
+                      <a:solidFill>
+                        <a:srgbClr val="ffffff"/>
+                      </a:solidFill>
+                    </a:lnB>
+                    <a:solidFill>
+                      <a:srgbClr val="e9ecf3"/>
+                    </a:solidFill>
+                  </a:tcPr>
+                </a:tc>
+                <a:tc>
+                  <a:txBody>
+                    <a:bodyPr/>
+                    <a:p>
+                      <a:pPr>
+                        <a:lnSpc>
+                          <a:spcPct val="100000"/>
+                        </a:lnSpc>
+                      </a:pPr>
+                      <a:r>
+                        <a:rPr lang="fr-FR" sz="1800" spc="-1" strike="noStrike">
+                          <a:solidFill>
+                            <a:srgbClr val="000000"/>
+                          </a:solidFill>
+                          <a:uFill>
+                            <a:solidFill>
+                              <a:srgbClr val="ffffff"/>
+                            </a:solidFill>
+                          </a:uFill>
+                          <a:latin typeface="Calibri"/>
+                        </a:rPr>
+                        <a:t>Date_res</a:t>
+                      </a:r>
+                      <a:endParaRPr/>
+                    </a:p>
+                  </a:txBody>
+                  <a:tcPr marL="91440" marR="91440">
+                    <a:lnL w="12240">
+                      <a:solidFill>
+                        <a:srgbClr val="ffffff"/>
+                      </a:solidFill>
+                    </a:lnL>
+                    <a:lnR w="12240">
+                      <a:solidFill>
+                        <a:srgbClr val="ffffff"/>
+                      </a:solidFill>
+                    </a:lnR>
+                    <a:lnT w="12240">
+                      <a:solidFill>
+                        <a:srgbClr val="ffffff"/>
+                      </a:solidFill>
+                    </a:lnT>
+                    <a:lnB w="12240">
+                      <a:solidFill>
+                        <a:srgbClr val="ffffff"/>
+                      </a:solidFill>
+                    </a:lnB>
+                    <a:solidFill>
+                      <a:srgbClr val="e9ecf3"/>
+                    </a:solidFill>
+                  </a:tcPr>
+                </a:tc>
+                <a:tc>
+                  <a:txBody>
+                    <a:bodyPr/>
+                    <a:p>
+                      <a:pPr>
+                        <a:lnSpc>
+                          <a:spcPct val="100000"/>
+                        </a:lnSpc>
+                      </a:pPr>
+                      <a:r>
+                        <a:rPr lang="fr-FR" sz="1800" spc="-1" strike="noStrike">
+                          <a:solidFill>
+                            <a:srgbClr val="000000"/>
+                          </a:solidFill>
+                          <a:uFill>
+                            <a:solidFill>
+                              <a:srgbClr val="ffffff"/>
+                            </a:solidFill>
+                          </a:uFill>
+                          <a:latin typeface="Calibri"/>
+                        </a:rPr>
+                        <a:t>Datetime</a:t>
+                      </a:r>
+                      <a:endParaRPr/>
+                    </a:p>
+                  </a:txBody>
+                  <a:tcPr marL="91440" marR="91440">
+                    <a:lnL w="12240">
+                      <a:solidFill>
+                        <a:srgbClr val="ffffff"/>
+                      </a:solidFill>
+                    </a:lnL>
+                    <a:lnR w="12240">
+                      <a:solidFill>
+                        <a:srgbClr val="ffffff"/>
+                      </a:solidFill>
+                    </a:lnR>
+                    <a:lnT w="12240">
+                      <a:solidFill>
+                        <a:srgbClr val="ffffff"/>
+                      </a:solidFill>
+                    </a:lnT>
+                    <a:lnB w="12240">
+                      <a:solidFill>
+                        <a:srgbClr val="ffffff"/>
+                      </a:solidFill>
+                    </a:lnB>
+                    <a:solidFill>
+                      <a:srgbClr val="e9ecf3"/>
+                    </a:solidFill>
+                  </a:tcPr>
+                </a:tc>
+                <a:tc>
+                  <a:tcPr marL="91440" marR="91440">
+                    <a:lnL w="12240">
+                      <a:solidFill>
+                        <a:srgbClr val="ffffff"/>
+                      </a:solidFill>
+                    </a:lnL>
+                    <a:lnR w="12240">
+                      <a:solidFill>
+                        <a:srgbClr val="ffffff"/>
+                      </a:solidFill>
+                    </a:lnR>
+                    <a:lnT w="12240">
+                      <a:solidFill>
+                        <a:srgbClr val="ffffff"/>
+                      </a:solidFill>
+                    </a:lnT>
+                    <a:lnB w="12240">
+                      <a:solidFill>
+                        <a:srgbClr val="ffffff"/>
+                      </a:solidFill>
+                    </a:lnB>
+                    <a:solidFill>
+                      <a:srgbClr val="d0d8e7"/>
+                    </a:solidFill>
+                  </a:tcPr>
+                </a:tc>
+                <a:tc>
+                  <a:tcPr marL="91440" marR="91440">
+                    <a:lnL w="12240">
+                      <a:solidFill>
+                        <a:srgbClr val="ffffff"/>
+                      </a:solidFill>
+                    </a:lnL>
+                    <a:lnR w="12240">
+                      <a:solidFill>
+                        <a:srgbClr val="ffffff"/>
+                      </a:solidFill>
+                    </a:lnR>
+                    <a:lnT w="12240">
+                      <a:solidFill>
+                        <a:srgbClr val="ffffff"/>
+                      </a:solidFill>
+                    </a:lnT>
+                    <a:lnB w="12240">
+                      <a:solidFill>
+                        <a:srgbClr val="ffffff"/>
+                      </a:solidFill>
+                    </a:lnB>
+                    <a:solidFill>
+                      <a:srgbClr val="d0d8e7"/>
+                    </a:solidFill>
+                  </a:tcPr>
+                </a:tc>
+                <a:tc>
+                  <a:tcPr marL="91440" marR="91440">
+                    <a:lnL w="12240">
+                      <a:solidFill>
+                        <a:srgbClr val="ffffff"/>
+                      </a:solidFill>
+                    </a:lnL>
+                    <a:lnR w="12240">
+                      <a:solidFill>
+                        <a:srgbClr val="ffffff"/>
+                      </a:solidFill>
+                    </a:lnR>
+                    <a:lnT w="12240">
+                      <a:solidFill>
+                        <a:srgbClr val="ffffff"/>
+                      </a:solidFill>
+                    </a:lnT>
+                    <a:lnB w="12240">
+                      <a:solidFill>
+                        <a:srgbClr val="ffffff"/>
+                      </a:solidFill>
+                    </a:lnB>
+                    <a:solidFill>
+                      <a:srgbClr val="d0d8e7"/>
+                    </a:solidFill>
+                  </a:tcPr>
+                </a:tc>
+              </a:tr>
+              <a:tr h="640080">
+                <a:tc>
+                  <a:txBody>
+                    <a:bodyPr/>
+                    <a:p>
+                      <a:pPr>
+                        <a:lnSpc>
+                          <a:spcPct val="100000"/>
+                        </a:lnSpc>
+                      </a:pPr>
+                      <a:r>
+                        <a:rPr lang="fr-FR" sz="1800" spc="-1" strike="noStrike">
+                          <a:solidFill>
+                            <a:srgbClr val="000000"/>
+                          </a:solidFill>
+                          <a:uFill>
+                            <a:solidFill>
+                              <a:srgbClr val="ffffff"/>
+                            </a:solidFill>
+                          </a:uFill>
+                          <a:latin typeface="Calibri"/>
+                        </a:rPr>
+                        <a:t>Nombre microorganismes</a:t>
+                      </a:r>
+                      <a:endParaRPr/>
+                    </a:p>
+                  </a:txBody>
+                  <a:tcPr marL="91440" marR="91440">
+                    <a:lnL w="12240">
+                      <a:solidFill>
+                        <a:srgbClr val="ffffff"/>
+                      </a:solidFill>
+                    </a:lnL>
+                    <a:lnR w="12240">
+                      <a:solidFill>
+                        <a:srgbClr val="ffffff"/>
+                      </a:solidFill>
+                    </a:lnR>
+                    <a:lnT w="12240">
+                      <a:solidFill>
+                        <a:srgbClr val="ffffff"/>
+                      </a:solidFill>
+                    </a:lnT>
+                    <a:lnB w="12240">
+                      <a:solidFill>
+                        <a:srgbClr val="ffffff"/>
+                      </a:solidFill>
+                    </a:lnB>
+                    <a:solidFill>
+                      <a:srgbClr val="d0d8e7"/>
+                    </a:solidFill>
+                  </a:tcPr>
+                </a:tc>
+                <a:tc>
+                  <a:txBody>
+                    <a:bodyPr/>
+                    <a:p>
+                      <a:pPr>
+                        <a:lnSpc>
+                          <a:spcPct val="100000"/>
+                        </a:lnSpc>
+                      </a:pPr>
+                      <a:r>
+                        <a:rPr lang="fr-FR" sz="1800" spc="-1" strike="noStrike">
+                          <a:solidFill>
+                            <a:srgbClr val="000000"/>
+                          </a:solidFill>
+                          <a:uFill>
+                            <a:solidFill>
+                              <a:srgbClr val="ffffff"/>
+                            </a:solidFill>
+                          </a:uFill>
+                          <a:latin typeface="Calibri"/>
+                        </a:rPr>
+                        <a:t>Nb</a:t>
+                      </a:r>
+                      <a:endParaRPr/>
+                    </a:p>
+                  </a:txBody>
+                  <a:tcPr marL="91440" marR="91440">
+                    <a:lnL w="12240">
+                      <a:solidFill>
+                        <a:srgbClr val="ffffff"/>
+                      </a:solidFill>
+                    </a:lnL>
+                    <a:lnR w="12240">
+                      <a:solidFill>
+                        <a:srgbClr val="ffffff"/>
+                      </a:solidFill>
+                    </a:lnR>
+                    <a:lnT w="12240">
+                      <a:solidFill>
+                        <a:srgbClr val="ffffff"/>
+                      </a:solidFill>
+                    </a:lnT>
+                    <a:lnB w="12240">
+                      <a:solidFill>
+                        <a:srgbClr val="ffffff"/>
+                      </a:solidFill>
+                    </a:lnB>
+                    <a:solidFill>
+                      <a:srgbClr val="d0d8e7"/>
+                    </a:solidFill>
+                  </a:tcPr>
+                </a:tc>
+                <a:tc>
+                  <a:txBody>
+                    <a:bodyPr/>
+                    <a:p>
+                      <a:pPr>
+                        <a:lnSpc>
+                          <a:spcPct val="100000"/>
+                        </a:lnSpc>
+                      </a:pPr>
+                      <a:r>
+                        <a:rPr lang="fr-FR" sz="1800" spc="-1" strike="noStrike">
+                          <a:solidFill>
+                            <a:srgbClr val="000000"/>
+                          </a:solidFill>
+                          <a:uFill>
+                            <a:solidFill>
+                              <a:srgbClr val="ffffff"/>
+                            </a:solidFill>
+                          </a:uFill>
+                          <a:latin typeface="Calibri"/>
+                        </a:rPr>
+                        <a:t>Integer</a:t>
+                      </a:r>
+                      <a:endParaRPr/>
+                    </a:p>
+                  </a:txBody>
+                  <a:tcPr marL="91440" marR="91440">
+                    <a:lnL w="12240">
+                      <a:solidFill>
+                        <a:srgbClr val="ffffff"/>
+                      </a:solidFill>
+                    </a:lnL>
+                    <a:lnR w="12240">
+                      <a:solidFill>
+                        <a:srgbClr val="ffffff"/>
+                      </a:solidFill>
+                    </a:lnR>
+                    <a:lnT w="12240">
+                      <a:solidFill>
+                        <a:srgbClr val="ffffff"/>
+                      </a:solidFill>
+                    </a:lnT>
+                    <a:lnB w="12240">
+                      <a:solidFill>
+                        <a:srgbClr val="ffffff"/>
+                      </a:solidFill>
+                    </a:lnB>
+                    <a:solidFill>
+                      <a:srgbClr val="d0d8e7"/>
+                    </a:solidFill>
+                  </a:tcPr>
+                </a:tc>
+                <a:tc>
+                  <a:tcPr marL="91440" marR="91440">
+                    <a:lnL w="12240">
+                      <a:solidFill>
+                        <a:srgbClr val="ffffff"/>
+                      </a:solidFill>
+                    </a:lnL>
+                    <a:lnR w="12240">
+                      <a:solidFill>
+                        <a:srgbClr val="ffffff"/>
+                      </a:solidFill>
+                    </a:lnR>
+                    <a:lnT w="12240">
+                      <a:solidFill>
+                        <a:srgbClr val="ffffff"/>
+                      </a:solidFill>
+                    </a:lnT>
+                    <a:lnB w="12240">
+                      <a:solidFill>
+                        <a:srgbClr val="ffffff"/>
+                      </a:solidFill>
+                    </a:lnB>
+                    <a:solidFill>
+                      <a:srgbClr val="d0d8e7"/>
+                    </a:solidFill>
+                  </a:tcPr>
+                </a:tc>
+                <a:tc>
+                  <a:tcPr marL="91440" marR="91440">
+                    <a:lnL w="12240">
+                      <a:solidFill>
+                        <a:srgbClr val="ffffff"/>
+                      </a:solidFill>
+                    </a:lnL>
+                    <a:lnR w="12240">
+                      <a:solidFill>
+                        <a:srgbClr val="ffffff"/>
+                      </a:solidFill>
+                    </a:lnR>
+                    <a:lnT w="12240">
+                      <a:solidFill>
+                        <a:srgbClr val="ffffff"/>
+                      </a:solidFill>
+                    </a:lnT>
+                    <a:lnB w="12240">
+                      <a:solidFill>
+                        <a:srgbClr val="ffffff"/>
+                      </a:solidFill>
+                    </a:lnB>
+                    <a:solidFill>
+                      <a:srgbClr val="d0d8e7"/>
+                    </a:solidFill>
+                  </a:tcPr>
+                </a:tc>
+                <a:tc>
+                  <a:tcPr marL="91440" marR="91440">
+                    <a:lnL w="12240">
+                      <a:solidFill>
+                        <a:srgbClr val="ffffff"/>
+                      </a:solidFill>
+                    </a:lnL>
+                    <a:lnR w="12240">
+                      <a:solidFill>
+                        <a:srgbClr val="ffffff"/>
+                      </a:solidFill>
+                    </a:lnR>
+                    <a:lnT w="12240">
+                      <a:solidFill>
+                        <a:srgbClr val="ffffff"/>
+                      </a:solidFill>
+                    </a:lnT>
+                    <a:lnB w="12240">
+                      <a:solidFill>
+                        <a:srgbClr val="ffffff"/>
+                      </a:solidFill>
+                    </a:lnB>
+                    <a:solidFill>
+                      <a:srgbClr val="d0d8e7"/>
+                    </a:solidFill>
+                  </a:tcPr>
+                </a:tc>
+              </a:tr>
+              <a:tr h="640080">
+                <a:tc>
+                  <a:txBody>
+                    <a:bodyPr/>
+                    <a:p>
+                      <a:r>
+                        <a:rPr lang="fr-FR" sz="1800" spc="-1" strike="noStrike">
+                          <a:uFill>
+                            <a:solidFill>
+                              <a:srgbClr val="ffffff"/>
+                            </a:solidFill>
+                          </a:uFill>
+                          <a:latin typeface="Calibri"/>
+                        </a:rPr>
+                        <a:t>Micro-organisme</a:t>
+                      </a:r>
+                      <a:endParaRPr/>
+                    </a:p>
+                  </a:txBody>
+                  <a:tcPr marL="91440" marR="91440">
+                    <a:lnL w="12240">
+                      <a:solidFill>
+                        <a:srgbClr val="ffffff"/>
+                      </a:solidFill>
+                    </a:lnL>
+                    <a:lnR w="12240">
+                      <a:solidFill>
+                        <a:srgbClr val="ffffff"/>
+                      </a:solidFill>
+                    </a:lnR>
+                    <a:lnT w="12240">
+                      <a:solidFill>
+                        <a:srgbClr val="ffffff"/>
+                      </a:solidFill>
+                    </a:lnT>
+                    <a:lnB w="12240">
+                      <a:solidFill>
+                        <a:srgbClr val="ffffff"/>
+                      </a:solidFill>
+                    </a:lnB>
+                    <a:solidFill>
+                      <a:srgbClr val="e9ecf3"/>
+                    </a:solidFill>
+                  </a:tcPr>
+                </a:tc>
+                <a:tc>
+                  <a:txBody>
+                    <a:bodyPr/>
+                    <a:p>
+                      <a:r>
+                        <a:rPr lang="fr-FR" sz="1800" spc="-1" strike="noStrike">
+                          <a:uFill>
+                            <a:solidFill>
+                              <a:srgbClr val="ffffff"/>
+                            </a:solidFill>
+                          </a:uFill>
+                          <a:latin typeface="Calibri"/>
+                        </a:rPr>
+                        <a:t>micro</a:t>
+                      </a:r>
+                      <a:endParaRPr/>
+                    </a:p>
+                  </a:txBody>
+                  <a:tcPr marL="91440" marR="91440">
+                    <a:lnL w="12240">
+                      <a:solidFill>
+                        <a:srgbClr val="ffffff"/>
+                      </a:solidFill>
+                    </a:lnL>
+                    <a:lnR w="12240">
+                      <a:solidFill>
+                        <a:srgbClr val="ffffff"/>
+                      </a:solidFill>
+                    </a:lnR>
+                    <a:lnT w="12240">
+                      <a:solidFill>
+                        <a:srgbClr val="ffffff"/>
+                      </a:solidFill>
+                    </a:lnT>
+                    <a:lnB w="12240">
+                      <a:solidFill>
+                        <a:srgbClr val="ffffff"/>
+                      </a:solidFill>
+                    </a:lnB>
+                    <a:solidFill>
+                      <a:srgbClr val="e9ecf3"/>
+                    </a:solidFill>
+                  </a:tcPr>
+                </a:tc>
+                <a:tc>
+                  <a:txBody>
+                    <a:bodyPr/>
+                    <a:p>
+                      <a:r>
+                        <a:rPr lang="fr-FR" sz="1800" spc="-1" strike="noStrike">
+                          <a:solidFill>
+                            <a:srgbClr val="000000"/>
+                          </a:solidFill>
+                          <a:uFill>
+                            <a:solidFill>
+                              <a:srgbClr val="ffffff"/>
+                            </a:solidFill>
+                          </a:uFill>
+                          <a:latin typeface="Calibri"/>
+                          <a:ea typeface="Droid Sans Fallback"/>
+                        </a:rPr>
+                        <a:t>text</a:t>
+                      </a:r>
+                      <a:endParaRPr/>
+                    </a:p>
+                  </a:txBody>
+                  <a:tcPr marL="91440" marR="91440">
+                    <a:lnL w="12240">
+                      <a:solidFill>
+                        <a:srgbClr val="ffffff"/>
+                      </a:solidFill>
+                    </a:lnL>
+                    <a:lnR w="12240">
+                      <a:solidFill>
+                        <a:srgbClr val="ffffff"/>
+                      </a:solidFill>
+                    </a:lnR>
+                    <a:lnT w="12240">
+                      <a:solidFill>
+                        <a:srgbClr val="ffffff"/>
+                      </a:solidFill>
+                    </a:lnT>
+                    <a:lnB w="12240">
+                      <a:solidFill>
+                        <a:srgbClr val="ffffff"/>
+                      </a:solidFill>
+                    </a:lnB>
+                    <a:solidFill>
+                      <a:srgbClr val="e9ecf3"/>
+                    </a:solidFill>
+                  </a:tcPr>
+                </a:tc>
+                <a:tc>
+                  <a:tcPr marL="91440" marR="91440">
+                    <a:lnL w="12240">
+                      <a:solidFill>
+                        <a:srgbClr val="ffffff"/>
+                      </a:solidFill>
+                    </a:lnL>
+                    <a:lnR w="12240">
+                      <a:solidFill>
+                        <a:srgbClr val="ffffff"/>
+                      </a:solidFill>
+                    </a:lnR>
+                    <a:lnT w="12240">
+                      <a:solidFill>
+                        <a:srgbClr val="ffffff"/>
+                      </a:solidFill>
+                    </a:lnT>
+                    <a:lnB w="12240">
+                      <a:solidFill>
+                        <a:srgbClr val="ffffff"/>
+                      </a:solidFill>
+                    </a:lnB>
+                    <a:solidFill>
+                      <a:srgbClr val="d0d8e7"/>
+                    </a:solidFill>
+                  </a:tcPr>
+                </a:tc>
+                <a:tc>
+                  <a:tcPr marL="91440" marR="91440">
+                    <a:lnL w="12240">
+                      <a:solidFill>
+                        <a:srgbClr val="ffffff"/>
+                      </a:solidFill>
+                    </a:lnL>
+                    <a:lnR w="12240">
+                      <a:solidFill>
+                        <a:srgbClr val="ffffff"/>
+                      </a:solidFill>
+                    </a:lnR>
+                    <a:lnT w="12240">
+                      <a:solidFill>
+                        <a:srgbClr val="ffffff"/>
+                      </a:solidFill>
+                    </a:lnT>
+                    <a:lnB w="12240">
+                      <a:solidFill>
+                        <a:srgbClr val="ffffff"/>
+                      </a:solidFill>
+                    </a:lnB>
+                    <a:solidFill>
+                      <a:srgbClr val="d0d8e7"/>
+                    </a:solidFill>
+                  </a:tcPr>
+                </a:tc>
+                <a:tc>
+                  <a:tcPr marL="91440" marR="91440">
+                    <a:lnL w="12240">
+                      <a:solidFill>
+                        <a:srgbClr val="ffffff"/>
+                      </a:solidFill>
+                    </a:lnL>
+                    <a:lnR w="12240">
+                      <a:solidFill>
+                        <a:srgbClr val="ffffff"/>
+                      </a:solidFill>
+                    </a:lnR>
+                    <a:lnT w="12240">
+                      <a:solidFill>
+                        <a:srgbClr val="ffffff"/>
+                      </a:solidFill>
+                    </a:lnT>
+                    <a:lnB w="12240">
+                      <a:solidFill>
+                        <a:srgbClr val="ffffff"/>
+                      </a:solidFill>
+                    </a:lnB>
+                    <a:solidFill>
+                      <a:srgbClr val="d0d8e7"/>
+                    </a:solidFill>
+                  </a:tcPr>
+                </a:tc>
+              </a:tr>
+            </a:tbl>
+          </a:graphicData>
+        </a:graphic>
+      </p:graphicFrame>
+      <p:sp>
+        <p:nvSpPr>
+          <p:cNvPr id="96" name="TextShape 3"/>
+          <p:cNvSpPr txBox="1"/>
+          <p:nvPr/>
+        </p:nvSpPr>
+        <p:spPr>
+          <a:xfrm>
+            <a:off x="576000" y="5184000"/>
+            <a:ext cx="7848000" cy="2138040"/>
+          </a:xfrm>
+          <a:prstGeom prst="rect">
+            <a:avLst/>
+          </a:prstGeom>
+          <a:noFill/>
+          <a:ln>
+            <a:noFill/>
+          </a:ln>
+        </p:spPr>
+        <p:txBody>
+          <a:bodyPr lIns="90000" rIns="90000" tIns="45000" bIns="45000"/>
+          <a:p>
+            <a:r>
+              <a:rPr lang="fr-FR" sz="1800" spc="-1">
+                <a:latin typeface="Arial"/>
+              </a:rPr>
+              <a:t>create table prelevements (</a:t>
+            </a:r>
+            <a:endParaRPr/>
+          </a:p>
+          <a:p>
+            <a:r>
+              <a:rPr lang="fr-FR" sz="1800" spc="-1">
+                <a:latin typeface="Arial"/>
+              </a:rPr>
+              <a:t>id serial primary key,</a:t>
+            </a:r>
+            <a:endParaRPr/>
+          </a:p>
+          <a:p>
+            <a:r>
+              <a:rPr lang="fr-FR" sz="1800" spc="-1">
+                <a:latin typeface="Arial"/>
+              </a:rPr>
+              <a:t>date_prelev date not null,</a:t>
+            </a:r>
+            <a:endParaRPr/>
+          </a:p>
+          <a:p>
+            <a:r>
+              <a:rPr lang="fr-FR" sz="1800" spc="-1">
+                <a:latin typeface="Arial"/>
+              </a:rPr>
+              <a:t>id_point integer not null references points_prelev(id),</a:t>
+            </a:r>
+            <a:endParaRPr/>
+          </a:p>
+          <a:p>
+            <a:r>
+              <a:rPr lang="fr-FR" sz="1800" spc="-1">
+                <a:latin typeface="Arial"/>
+              </a:rPr>
+              <a:t>date_res date not null,</a:t>
+            </a:r>
+            <a:endParaRPr/>
+          </a:p>
+          <a:p>
+            <a:r>
+              <a:rPr lang="fr-FR" sz="1800" spc="-1">
+                <a:latin typeface="Arial"/>
+              </a:rPr>
+              <a:t>n_ufc integer,</a:t>
+            </a:r>
+            <a:endParaRPr/>
+          </a:p>
+          <a:p>
+            <a:r>
+              <a:rPr lang="fr-FR" sz="1800" spc="-1">
+                <a:latin typeface="Arial"/>
+              </a:rPr>
+              <a:t>germe varchar(100),</a:t>
+            </a:r>
+            <a:endParaRPr/>
+          </a:p>
+          <a:p>
+            <a:r>
+              <a:rPr lang="fr-FR" sz="1800" spc="-1">
+                <a:latin typeface="Arial"/>
+              </a:rPr>
+              <a:t>);</a:t>
+            </a:r>
+            <a:endParaRPr/>
+          </a:p>
+        </p:txBody>
+      </p:sp>
+    </p:spTree>
+  </p:cSld>
+  <p:timing>
+    <p:tnLst>
+      <p:par>
+        <p:cTn id="21" dur="indefinite" restart="never" nodeType="tmRoot">
+          <p:childTnLst>
+            <p:seq>
+              <p:cTn id="22" nodeType="mainSeq"/>
+              <p:prevCondLst>
+                <p:cond delay="0" evt="onPrev">
+                  <p:tgtEl>
+                    <p:sldTgt/>
+                  </p:tgtEl>
+                </p:cond>
+              </p:prevCondLst>
+              <p:nextCondLst>
+                <p:cond delay="0" evt="onNext">
+                  <p:tgtEl>
+                    <p:sldTgt/>
+                  </p:tgtEl>
+                </p:cond>
+              </p:nextCondLst>
+            </p:seq>
+          </p:childTnLst>
+        </p:cTn>
+      </p:par>
+    </p:tnLst>
+  </p:timing>
+</p:sld>
+</file>
+
+<file path=ppt/slides/slide12.xml><?xml version="1.0" encoding="utf-8"?>
+<p:sld xmlns:a="http://schemas.openxmlformats.org/drawingml/2006/main" xmlns:p="http://schemas.openxmlformats.org/presentationml/2006/main" xmlns:r="http://schemas.openxmlformats.org/officeDocument/2006/relationships">
+  <p:cSld>
+    <p:spTree>
+      <p:nvGrpSpPr>
+        <p:cNvPr id="1" name=""/>
+        <p:cNvGrpSpPr/>
+        <p:nvPr/>
+      </p:nvGrpSpPr>
+      <p:grpSpPr>
+        <a:xfrm>
+          <a:off x="0" y="0"/>
+          <a:ext cx="0" cy="0"/>
+          <a:chOff x="0" y="0"/>
+          <a:chExt cx="0" cy="0"/>
+        </a:xfrm>
+      </p:grpSpPr>
+      <p:sp>
+        <p:nvSpPr>
+          <p:cNvPr id="97" name="CustomShape 1"/>
+          <p:cNvSpPr/>
+          <p:nvPr/>
+        </p:nvSpPr>
+        <p:spPr>
+          <a:xfrm>
             <a:off x="395640" y="201600"/>
-            <a:ext cx="7703640" cy="630720"/>
+            <a:ext cx="7703280" cy="630360"/>
           </a:xfrm>
           <a:prstGeom prst="rect">
             <a:avLst/>
@@ -3888,14 +5462,14 @@
       </p:sp>
       <p:sp>
         <p:nvSpPr>
-          <p:cNvPr id="100" name="CustomShape 2"/>
+          <p:cNvPr id="98" name="CustomShape 2"/>
           <p:cNvSpPr/>
           <p:nvPr/>
         </p:nvSpPr>
         <p:spPr>
           <a:xfrm>
             <a:off x="2517120" y="1366200"/>
-            <a:ext cx="1906920" cy="363960"/>
+            <a:ext cx="1906560" cy="363600"/>
           </a:xfrm>
           <a:prstGeom prst="rect">
             <a:avLst/>
@@ -3945,14 +5519,14 @@
       </p:sp>
       <p:sp>
         <p:nvSpPr>
-          <p:cNvPr id="101" name="CustomShape 3"/>
+          <p:cNvPr id="99" name="CustomShape 3"/>
           <p:cNvSpPr/>
           <p:nvPr/>
         </p:nvSpPr>
         <p:spPr>
           <a:xfrm>
             <a:off x="179640" y="2574360"/>
-            <a:ext cx="1440000" cy="637560"/>
+            <a:ext cx="1439640" cy="637200"/>
           </a:xfrm>
           <a:prstGeom prst="rect">
             <a:avLst/>
@@ -4002,14 +5576,14 @@
       </p:sp>
       <p:sp>
         <p:nvSpPr>
-          <p:cNvPr id="102" name="CustomShape 4"/>
+          <p:cNvPr id="100" name="CustomShape 4"/>
           <p:cNvSpPr/>
           <p:nvPr/>
         </p:nvSpPr>
         <p:spPr>
           <a:xfrm>
             <a:off x="5897520" y="1268640"/>
-            <a:ext cx="2004480" cy="363960"/>
+            <a:ext cx="2004120" cy="363600"/>
           </a:xfrm>
           <a:prstGeom prst="rect">
             <a:avLst/>
@@ -4059,14 +5633,14 @@
       </p:sp>
       <p:sp>
         <p:nvSpPr>
-          <p:cNvPr id="103" name="CustomShape 5"/>
+          <p:cNvPr id="101" name="CustomShape 5"/>
           <p:cNvSpPr/>
           <p:nvPr/>
         </p:nvSpPr>
         <p:spPr>
           <a:xfrm>
             <a:off x="3601800" y="5229360"/>
-            <a:ext cx="1941480" cy="363960"/>
+            <a:ext cx="1941120" cy="363600"/>
           </a:xfrm>
           <a:prstGeom prst="rect">
             <a:avLst/>
@@ -4116,14 +5690,14 @@
       </p:sp>
       <p:sp>
         <p:nvSpPr>
-          <p:cNvPr id="104" name="CustomShape 6"/>
+          <p:cNvPr id="102" name="CustomShape 6"/>
           <p:cNvSpPr/>
           <p:nvPr/>
         </p:nvSpPr>
         <p:spPr>
           <a:xfrm>
             <a:off x="2428200" y="2565720"/>
-            <a:ext cx="2084760" cy="363960"/>
+            <a:ext cx="2084400" cy="363600"/>
           </a:xfrm>
           <a:prstGeom prst="rect">
             <a:avLst/>
@@ -4173,14 +5747,14 @@
       </p:sp>
       <p:sp>
         <p:nvSpPr>
-          <p:cNvPr id="105" name="CustomShape 7"/>
+          <p:cNvPr id="103" name="CustomShape 7"/>
           <p:cNvSpPr/>
           <p:nvPr/>
         </p:nvSpPr>
         <p:spPr>
           <a:xfrm>
             <a:off x="6292080" y="2542320"/>
-            <a:ext cx="1222920" cy="363960"/>
+            <a:ext cx="1222560" cy="363600"/>
           </a:xfrm>
           <a:prstGeom prst="rect">
             <a:avLst/>
@@ -4230,7 +5804,7 @@
       </p:sp>
       <p:sp>
         <p:nvSpPr>
-          <p:cNvPr id="106" name="Line 8"/>
+          <p:cNvPr id="104" name="Line 8"/>
           <p:cNvSpPr/>
           <p:nvPr/>
         </p:nvSpPr>
@@ -4264,7 +5838,7 @@
       </p:sp>
       <p:sp>
         <p:nvSpPr>
-          <p:cNvPr id="107" name="Line 9"/>
+          <p:cNvPr id="105" name="Line 9"/>
           <p:cNvSpPr/>
           <p:nvPr/>
         </p:nvSpPr>
@@ -4298,7 +5872,7 @@
       </p:sp>
       <p:sp>
         <p:nvSpPr>
-          <p:cNvPr id="108" name="Line 10"/>
+          <p:cNvPr id="106" name="Line 10"/>
           <p:cNvSpPr/>
           <p:nvPr/>
         </p:nvSpPr>
@@ -4332,7 +5906,7 @@
       </p:sp>
       <p:sp>
         <p:nvSpPr>
-          <p:cNvPr id="109" name="Line 11"/>
+          <p:cNvPr id="107" name="Line 11"/>
           <p:cNvSpPr/>
           <p:nvPr/>
         </p:nvSpPr>
@@ -4366,7 +5940,7 @@
       </p:sp>
       <p:sp>
         <p:nvSpPr>
-          <p:cNvPr id="110" name="Line 12"/>
+          <p:cNvPr id="108" name="Line 12"/>
           <p:cNvSpPr/>
           <p:nvPr/>
         </p:nvSpPr>
@@ -4400,7 +5974,7 @@
       </p:sp>
       <p:sp>
         <p:nvSpPr>
-          <p:cNvPr id="111" name="Line 13"/>
+          <p:cNvPr id="109" name="Line 13"/>
           <p:cNvSpPr/>
           <p:nvPr/>
         </p:nvSpPr>
@@ -4434,7 +6008,7 @@
       </p:sp>
       <p:sp>
         <p:nvSpPr>
-          <p:cNvPr id="112" name="Line 14"/>
+          <p:cNvPr id="110" name="Line 14"/>
           <p:cNvSpPr/>
           <p:nvPr/>
         </p:nvSpPr>
@@ -4468,7 +6042,7 @@
       </p:sp>
       <p:sp>
         <p:nvSpPr>
-          <p:cNvPr id="113" name="Line 15"/>
+          <p:cNvPr id="111" name="Line 15"/>
           <p:cNvSpPr/>
           <p:nvPr/>
         </p:nvSpPr>
@@ -4502,7 +6076,7 @@
       </p:sp>
       <p:sp>
         <p:nvSpPr>
-          <p:cNvPr id="114" name="Line 16"/>
+          <p:cNvPr id="112" name="Line 16"/>
           <p:cNvSpPr/>
           <p:nvPr/>
         </p:nvSpPr>
@@ -4536,7 +6110,7 @@
       </p:sp>
       <p:sp>
         <p:nvSpPr>
-          <p:cNvPr id="115" name="Line 17"/>
+          <p:cNvPr id="113" name="Line 17"/>
           <p:cNvSpPr/>
           <p:nvPr/>
         </p:nvSpPr>
@@ -4570,7 +6144,7 @@
       </p:sp>
       <p:sp>
         <p:nvSpPr>
-          <p:cNvPr id="116" name="Line 18"/>
+          <p:cNvPr id="114" name="Line 18"/>
           <p:cNvSpPr/>
           <p:nvPr/>
         </p:nvSpPr>
@@ -4604,7 +6178,7 @@
       </p:sp>
       <p:sp>
         <p:nvSpPr>
-          <p:cNvPr id="117" name="Line 19"/>
+          <p:cNvPr id="115" name="Line 19"/>
           <p:cNvSpPr/>
           <p:nvPr/>
         </p:nvSpPr>
@@ -4638,7 +6212,7 @@
       </p:sp>
       <p:sp>
         <p:nvSpPr>
-          <p:cNvPr id="118" name="Line 20"/>
+          <p:cNvPr id="116" name="Line 20"/>
           <p:cNvSpPr/>
           <p:nvPr/>
         </p:nvSpPr>
@@ -4672,7 +6246,7 @@
       </p:sp>
       <p:sp>
         <p:nvSpPr>
-          <p:cNvPr id="119" name="Line 21"/>
+          <p:cNvPr id="117" name="Line 21"/>
           <p:cNvSpPr/>
           <p:nvPr/>
         </p:nvSpPr>
@@ -4706,7 +6280,7 @@
       </p:sp>
       <p:sp>
         <p:nvSpPr>
-          <p:cNvPr id="120" name="Line 22"/>
+          <p:cNvPr id="118" name="Line 22"/>
           <p:cNvSpPr/>
           <p:nvPr/>
         </p:nvSpPr>
@@ -4740,14 +6314,14 @@
       </p:sp>
       <p:sp>
         <p:nvSpPr>
-          <p:cNvPr id="121" name="Line 23"/>
+          <p:cNvPr id="119" name="Line 23"/>
           <p:cNvSpPr/>
           <p:nvPr/>
         </p:nvSpPr>
         <p:spPr>
           <a:xfrm flipV="1">
-            <a:off x="4559400" y="5594040"/>
-            <a:ext cx="0" cy="665280"/>
+            <a:off x="4138200" y="2955240"/>
+            <a:ext cx="0" cy="2273760"/>
           </a:xfrm>
           <a:prstGeom prst="line">
             <a:avLst/>
@@ -4774,14 +6348,14 @@
       </p:sp>
       <p:sp>
         <p:nvSpPr>
-          <p:cNvPr id="122" name="Line 24"/>
+          <p:cNvPr id="120" name="Line 24"/>
           <p:cNvSpPr/>
           <p:nvPr/>
         </p:nvSpPr>
         <p:spPr>
-          <a:xfrm flipV="1">
-            <a:off x="4392000" y="5658840"/>
-            <a:ext cx="334800" cy="2880"/>
+          <a:xfrm>
+            <a:off x="4138200" y="4863960"/>
+            <a:ext cx="153000" cy="365040"/>
           </a:xfrm>
           <a:prstGeom prst="line">
             <a:avLst/>
@@ -4808,14 +6382,14 @@
       </p:sp>
       <p:sp>
         <p:nvSpPr>
-          <p:cNvPr id="123" name="Line 25"/>
+          <p:cNvPr id="121" name="Line 25"/>
           <p:cNvSpPr/>
           <p:nvPr/>
         </p:nvSpPr>
         <p:spPr>
-          <a:xfrm flipV="1">
-            <a:off x="4392000" y="5693040"/>
-            <a:ext cx="334800" cy="2880"/>
+          <a:xfrm flipH="1">
+            <a:off x="3985200" y="4836600"/>
+            <a:ext cx="153000" cy="392400"/>
           </a:xfrm>
           <a:prstGeom prst="line">
             <a:avLst/>
@@ -4842,14 +6416,14 @@
       </p:sp>
       <p:sp>
         <p:nvSpPr>
-          <p:cNvPr id="124" name="Line 26"/>
+          <p:cNvPr id="122" name="Line 26"/>
           <p:cNvSpPr/>
           <p:nvPr/>
         </p:nvSpPr>
         <p:spPr>
           <a:xfrm flipV="1">
-            <a:off x="4138200" y="2955240"/>
-            <a:ext cx="0" cy="2273760"/>
+            <a:off x="3970800" y="3176640"/>
+            <a:ext cx="334800" cy="9720"/>
           </a:xfrm>
           <a:prstGeom prst="line">
             <a:avLst/>
@@ -4876,14 +6450,14 @@
       </p:sp>
       <p:sp>
         <p:nvSpPr>
-          <p:cNvPr id="125" name="Line 27"/>
+          <p:cNvPr id="123" name="Line 27"/>
           <p:cNvSpPr/>
           <p:nvPr/>
         </p:nvSpPr>
         <p:spPr>
-          <a:xfrm>
-            <a:off x="4138200" y="4863960"/>
-            <a:ext cx="153000" cy="365040"/>
+          <a:xfrm flipV="1">
+            <a:off x="3970800" y="3292920"/>
+            <a:ext cx="334800" cy="10080"/>
           </a:xfrm>
           <a:prstGeom prst="line">
             <a:avLst/>
@@ -4910,14 +6484,14 @@
       </p:sp>
       <p:sp>
         <p:nvSpPr>
-          <p:cNvPr id="126" name="Line 28"/>
+          <p:cNvPr id="124" name="Line 28"/>
           <p:cNvSpPr/>
           <p:nvPr/>
         </p:nvSpPr>
         <p:spPr>
-          <a:xfrm flipH="1">
-            <a:off x="3985200" y="4836600"/>
-            <a:ext cx="153000" cy="392400"/>
+          <a:xfrm flipH="1" flipV="1">
+            <a:off x="5868000" y="2588400"/>
+            <a:ext cx="7560" cy="285840"/>
           </a:xfrm>
           <a:prstGeom prst="line">
             <a:avLst/>
@@ -4944,14 +6518,14 @@
       </p:sp>
       <p:sp>
         <p:nvSpPr>
-          <p:cNvPr id="127" name="Line 29"/>
+          <p:cNvPr id="125" name="Line 29"/>
           <p:cNvSpPr/>
           <p:nvPr/>
         </p:nvSpPr>
         <p:spPr>
-          <a:xfrm flipV="1">
-            <a:off x="3970800" y="3176640"/>
-            <a:ext cx="334800" cy="9720"/>
+          <a:xfrm flipH="1" flipV="1">
+            <a:off x="2195640" y="2625840"/>
+            <a:ext cx="7560" cy="285480"/>
           </a:xfrm>
           <a:prstGeom prst="line">
             <a:avLst/>
@@ -4978,14 +6552,14 @@
       </p:sp>
       <p:sp>
         <p:nvSpPr>
-          <p:cNvPr id="128" name="Line 30"/>
+          <p:cNvPr id="126" name="Line 30"/>
           <p:cNvSpPr/>
           <p:nvPr/>
         </p:nvSpPr>
         <p:spPr>
           <a:xfrm flipV="1">
-            <a:off x="3970800" y="3292920"/>
-            <a:ext cx="334800" cy="10080"/>
+            <a:off x="6782040" y="2276640"/>
+            <a:ext cx="285480" cy="7920"/>
           </a:xfrm>
           <a:prstGeom prst="line">
             <a:avLst/>
@@ -5012,14 +6586,14 @@
       </p:sp>
       <p:sp>
         <p:nvSpPr>
-          <p:cNvPr id="129" name="Line 31"/>
+          <p:cNvPr id="127" name="Line 31"/>
           <p:cNvSpPr/>
           <p:nvPr/>
         </p:nvSpPr>
         <p:spPr>
-          <a:xfrm flipH="1" flipV="1">
-            <a:off x="5868000" y="2588400"/>
-            <a:ext cx="7560" cy="285840"/>
+          <a:xfrm flipV="1">
+            <a:off x="3341880" y="2284560"/>
+            <a:ext cx="285480" cy="7560"/>
           </a:xfrm>
           <a:prstGeom prst="line">
             <a:avLst/>
@@ -5046,14 +6620,14 @@
       </p:sp>
       <p:sp>
         <p:nvSpPr>
-          <p:cNvPr id="130" name="Line 32"/>
+          <p:cNvPr id="128" name="Line 32"/>
           <p:cNvSpPr/>
           <p:nvPr/>
         </p:nvSpPr>
         <p:spPr>
-          <a:xfrm flipH="1" flipV="1">
-            <a:off x="2195640" y="2625840"/>
-            <a:ext cx="7560" cy="285480"/>
+          <a:xfrm flipV="1">
+            <a:off x="6935400" y="1631160"/>
+            <a:ext cx="0" cy="911160"/>
           </a:xfrm>
           <a:prstGeom prst="line">
             <a:avLst/>
@@ -5080,14 +6654,14 @@
       </p:sp>
       <p:sp>
         <p:nvSpPr>
-          <p:cNvPr id="131" name="Line 33"/>
+          <p:cNvPr id="129" name="Line 33"/>
           <p:cNvSpPr/>
           <p:nvPr/>
         </p:nvSpPr>
         <p:spPr>
-          <a:xfrm flipV="1">
-            <a:off x="6782040" y="2276640"/>
-            <a:ext cx="285480" cy="7920"/>
+          <a:xfrm>
+            <a:off x="6935400" y="2396160"/>
+            <a:ext cx="153360" cy="146160"/>
           </a:xfrm>
           <a:prstGeom prst="line">
             <a:avLst/>
@@ -5114,14 +6688,14 @@
       </p:sp>
       <p:sp>
         <p:nvSpPr>
-          <p:cNvPr id="132" name="Line 34"/>
+          <p:cNvPr id="130" name="Line 34"/>
           <p:cNvSpPr/>
           <p:nvPr/>
         </p:nvSpPr>
         <p:spPr>
-          <a:xfrm flipV="1">
-            <a:off x="3341880" y="2284560"/>
-            <a:ext cx="285480" cy="7560"/>
+          <a:xfrm flipH="1">
+            <a:off x="6782400" y="2385000"/>
+            <a:ext cx="153000" cy="157320"/>
           </a:xfrm>
           <a:prstGeom prst="line">
             <a:avLst/>
@@ -5148,71 +6722,14 @@
       </p:sp>
       <p:sp>
         <p:nvSpPr>
-          <p:cNvPr id="133" name="CustomShape 35"/>
+          <p:cNvPr id="131" name="Line 35"/>
           <p:cNvSpPr/>
           <p:nvPr/>
         </p:nvSpPr>
         <p:spPr>
-          <a:xfrm>
-            <a:off x="3600000" y="6259320"/>
-            <a:ext cx="1941480" cy="363960"/>
-          </a:xfrm>
-          <a:prstGeom prst="rect">
-            <a:avLst/>
-          </a:prstGeom>
-          <a:solidFill>
-            <a:srgbClr val="fffd78"/>
-          </a:solidFill>
-          <a:ln w="38160">
-            <a:solidFill>
-              <a:schemeClr val="tx1"/>
-            </a:solidFill>
-            <a:round/>
-          </a:ln>
-        </p:spPr>
-        <p:style>
-          <a:lnRef idx="0"/>
-          <a:fillRef idx="0"/>
-          <a:effectRef idx="0"/>
-          <a:fontRef idx="minor"/>
-        </p:style>
-        <p:txBody>
-          <a:bodyPr lIns="90000" rIns="90000" tIns="45000" bIns="45000"/>
-          <a:p>
-            <a:pPr algn="ctr">
-              <a:lnSpc>
-                <a:spcPct val="100000"/>
-              </a:lnSpc>
-            </a:pPr>
-            <a:r>
-              <a:rPr lang="fr-FR" sz="1800" spc="-1" strike="noStrike">
-                <a:solidFill>
-                  <a:srgbClr val="000000"/>
-                </a:solidFill>
-                <a:uFill>
-                  <a:solidFill>
-                    <a:srgbClr val="ffffff"/>
-                  </a:solidFill>
-                </a:uFill>
-                <a:latin typeface="Calibri"/>
-                <a:ea typeface="DejaVu Sans"/>
-              </a:rPr>
-              <a:t>Résultats</a:t>
-            </a:r>
-            <a:endParaRPr/>
-          </a:p>
-        </p:txBody>
-      </p:sp>
-      <p:sp>
-        <p:nvSpPr>
-          <p:cNvPr id="134" name="Line 36"/>
-          <p:cNvSpPr/>
-          <p:nvPr/>
-        </p:nvSpPr>
-        <p:spPr>
           <a:xfrm flipV="1">
-            <a:off x="6935400" y="1631160"/>
-            <a:ext cx="0" cy="911160"/>
+            <a:off x="6768000" y="1719720"/>
+            <a:ext cx="334800" cy="3960"/>
           </a:xfrm>
           <a:prstGeom prst="line">
             <a:avLst/>
@@ -5239,14 +6756,14 @@
       </p:sp>
       <p:sp>
         <p:nvSpPr>
-          <p:cNvPr id="135" name="Line 37"/>
+          <p:cNvPr id="132" name="Line 36"/>
           <p:cNvSpPr/>
           <p:nvPr/>
         </p:nvSpPr>
         <p:spPr>
-          <a:xfrm>
-            <a:off x="6935400" y="2396160"/>
-            <a:ext cx="153360" cy="146160"/>
+          <a:xfrm flipV="1">
+            <a:off x="6768000" y="1766520"/>
+            <a:ext cx="334800" cy="3960"/>
           </a:xfrm>
           <a:prstGeom prst="line">
             <a:avLst/>
@@ -5271,185 +6788,142 @@
           <a:fontRef idx="minor"/>
         </p:style>
       </p:sp>
-      <p:sp>
-        <p:nvSpPr>
-          <p:cNvPr id="136" name="Line 38"/>
-          <p:cNvSpPr/>
-          <p:nvPr/>
-        </p:nvSpPr>
-        <p:spPr>
-          <a:xfrm flipH="1">
-            <a:off x="6782400" y="2385000"/>
-            <a:ext cx="153000" cy="157320"/>
-          </a:xfrm>
-          <a:prstGeom prst="line">
-            <a:avLst/>
-          </a:prstGeom>
-          <a:ln w="25560">
-            <a:solidFill>
-              <a:schemeClr val="tx1"/>
-            </a:solidFill>
-            <a:round/>
-          </a:ln>
-        </p:spPr>
-        <p:style>
-          <a:lnRef idx="1">
-            <a:schemeClr val="accent1"/>
-          </a:lnRef>
-          <a:fillRef idx="0">
-            <a:schemeClr val="accent1"/>
-          </a:fillRef>
-          <a:effectRef idx="0">
-            <a:schemeClr val="accent1"/>
-          </a:effectRef>
-          <a:fontRef idx="minor"/>
-        </p:style>
-      </p:sp>
-      <p:sp>
-        <p:nvSpPr>
-          <p:cNvPr id="137" name="Line 39"/>
-          <p:cNvSpPr/>
-          <p:nvPr/>
-        </p:nvSpPr>
-        <p:spPr>
-          <a:xfrm flipV="1">
-            <a:off x="6768000" y="1719720"/>
-            <a:ext cx="334800" cy="3960"/>
-          </a:xfrm>
-          <a:prstGeom prst="line">
-            <a:avLst/>
-          </a:prstGeom>
-          <a:ln w="25560">
-            <a:solidFill>
-              <a:schemeClr val="tx1"/>
-            </a:solidFill>
-            <a:round/>
-          </a:ln>
-        </p:spPr>
-        <p:style>
-          <a:lnRef idx="1">
-            <a:schemeClr val="accent1"/>
-          </a:lnRef>
-          <a:fillRef idx="0">
-            <a:schemeClr val="accent1"/>
-          </a:fillRef>
-          <a:effectRef idx="0">
-            <a:schemeClr val="accent1"/>
-          </a:effectRef>
-          <a:fontRef idx="minor"/>
-        </p:style>
-      </p:sp>
-      <p:sp>
-        <p:nvSpPr>
-          <p:cNvPr id="138" name="Line 40"/>
-          <p:cNvSpPr/>
-          <p:nvPr/>
-        </p:nvSpPr>
-        <p:spPr>
-          <a:xfrm flipV="1">
-            <a:off x="6768000" y="1766520"/>
-            <a:ext cx="334800" cy="3960"/>
-          </a:xfrm>
-          <a:prstGeom prst="line">
-            <a:avLst/>
-          </a:prstGeom>
-          <a:ln w="25560">
-            <a:solidFill>
-              <a:schemeClr val="tx1"/>
-            </a:solidFill>
-            <a:round/>
-          </a:ln>
-        </p:spPr>
-        <p:style>
-          <a:lnRef idx="1">
-            <a:schemeClr val="accent1"/>
-          </a:lnRef>
-          <a:fillRef idx="0">
-            <a:schemeClr val="accent1"/>
-          </a:fillRef>
-          <a:effectRef idx="0">
-            <a:schemeClr val="accent1"/>
-          </a:effectRef>
-          <a:fontRef idx="minor"/>
-        </p:style>
-      </p:sp>
-      <p:sp>
-        <p:nvSpPr>
-          <p:cNvPr id="139" name="Line 41"/>
-          <p:cNvSpPr/>
-          <p:nvPr/>
-        </p:nvSpPr>
-        <p:spPr>
-          <a:xfrm flipV="1">
-            <a:off x="4392000" y="6189120"/>
-            <a:ext cx="334800" cy="2880"/>
-          </a:xfrm>
-          <a:prstGeom prst="line">
-            <a:avLst/>
-          </a:prstGeom>
-          <a:ln w="25560">
-            <a:solidFill>
-              <a:schemeClr val="tx1"/>
-            </a:solidFill>
-            <a:round/>
-          </a:ln>
-        </p:spPr>
-        <p:style>
-          <a:lnRef idx="1">
-            <a:schemeClr val="accent1"/>
-          </a:lnRef>
-          <a:fillRef idx="0">
-            <a:schemeClr val="accent1"/>
-          </a:fillRef>
-          <a:effectRef idx="0">
-            <a:schemeClr val="accent1"/>
-          </a:effectRef>
-          <a:fontRef idx="minor"/>
-        </p:style>
-      </p:sp>
-      <p:sp>
-        <p:nvSpPr>
-          <p:cNvPr id="140" name="Line 42"/>
-          <p:cNvSpPr/>
-          <p:nvPr/>
-        </p:nvSpPr>
-        <p:spPr>
-          <a:xfrm flipV="1">
-            <a:off x="4392000" y="6120000"/>
-            <a:ext cx="334800" cy="2880"/>
-          </a:xfrm>
-          <a:prstGeom prst="line">
-            <a:avLst/>
-          </a:prstGeom>
-          <a:ln w="25560">
-            <a:solidFill>
-              <a:schemeClr val="tx1"/>
-            </a:solidFill>
-            <a:round/>
-          </a:ln>
-        </p:spPr>
-        <p:style>
-          <a:lnRef idx="1">
-            <a:schemeClr val="accent1"/>
-          </a:lnRef>
-          <a:fillRef idx="0">
-            <a:schemeClr val="accent1"/>
-          </a:fillRef>
-          <a:effectRef idx="0">
-            <a:schemeClr val="accent1"/>
-          </a:effectRef>
-          <a:fontRef idx="minor"/>
-        </p:style>
-      </p:sp>
     </p:spTree>
   </p:cSld>
   <p:timing>
     <p:tnLst>
       <p:par>
-        <p:cTn id="21" dur="indefinite" restart="never" nodeType="tmRoot">
+        <p:cTn id="23" dur="indefinite" restart="never" nodeType="tmRoot">
           <p:childTnLst>
             <p:seq>
-              <p:cTn id="22" nodeType="mainSeq"/>
+              <p:cTn id="24" nodeType="mainSeq"/>
+              <p:prevCondLst>
+                <p:cond delay="0" evt="onPrev">
+                  <p:tgtEl>
+                    <p:sldTgt/>
+                  </p:tgtEl>
+                </p:cond>
+              </p:prevCondLst>
+              <p:nextCondLst>
+                <p:cond delay="0" evt="onNext">
+                  <p:tgtEl>
+                    <p:sldTgt/>
+                  </p:tgtEl>
+                </p:cond>
+              </p:nextCondLst>
+            </p:seq>
+          </p:childTnLst>
+        </p:cTn>
+      </p:par>
+    </p:tnLst>
+  </p:timing>
+</p:sld>
+</file>
+
+<file path=ppt/slides/slide13.xml><?xml version="1.0" encoding="utf-8"?>
+<p:sld xmlns:a="http://schemas.openxmlformats.org/drawingml/2006/main" xmlns:p="http://schemas.openxmlformats.org/presentationml/2006/main" xmlns:r="http://schemas.openxmlformats.org/officeDocument/2006/relationships">
+  <p:cSld>
+    <p:spTree>
+      <p:nvGrpSpPr>
+        <p:cNvPr id="1" name=""/>
+        <p:cNvGrpSpPr/>
+        <p:nvPr/>
+      </p:nvGrpSpPr>
+      <p:grpSpPr>
+        <a:xfrm>
+          <a:off x="0" y="0"/>
+          <a:ext cx="0" cy="0"/>
+          <a:chOff x="0" y="0"/>
+          <a:chExt cx="0" cy="0"/>
+        </a:xfrm>
+      </p:grpSpPr>
+      <p:sp>
+        <p:nvSpPr>
+          <p:cNvPr id="133" name="CustomShape 1"/>
+          <p:cNvSpPr/>
+          <p:nvPr/>
+        </p:nvSpPr>
+        <p:spPr>
+          <a:xfrm>
+            <a:off x="457200" y="274680"/>
+            <a:ext cx="8228160" cy="1141560"/>
+          </a:xfrm>
+          <a:prstGeom prst="rect">
+            <a:avLst/>
+          </a:prstGeom>
+          <a:noFill/>
+          <a:ln>
+            <a:noFill/>
+          </a:ln>
+        </p:spPr>
+        <p:style>
+          <a:lnRef idx="0"/>
+          <a:fillRef idx="0"/>
+          <a:effectRef idx="0"/>
+          <a:fontRef idx="minor"/>
+        </p:style>
+        <p:txBody>
+          <a:bodyPr lIns="90000" rIns="90000" tIns="45000" bIns="45000" anchor="ctr"/>
+          <a:p>
+            <a:pPr algn="ctr">
+              <a:lnSpc>
+                <a:spcPct val="100000"/>
+              </a:lnSpc>
+            </a:pPr>
+            <a:r>
+              <a:rPr lang="fr-FR" sz="4400" spc="-1" strike="noStrike">
+                <a:solidFill>
+                  <a:srgbClr val="000000"/>
+                </a:solidFill>
+                <a:uFill>
+                  <a:solidFill>
+                    <a:srgbClr val="ffffff"/>
+                  </a:solidFill>
+                </a:uFill>
+                <a:latin typeface="Calibri"/>
+                <a:ea typeface="DejaVu Sans"/>
+              </a:rPr>
+              <a:t>ERM</a:t>
+            </a:r>
+            <a:endParaRPr/>
+          </a:p>
+        </p:txBody>
+      </p:sp>
+      <p:sp>
+        <p:nvSpPr>
+          <p:cNvPr id="134" name="CustomShape 2"/>
+          <p:cNvSpPr/>
+          <p:nvPr/>
+        </p:nvSpPr>
+        <p:spPr>
+          <a:xfrm>
+            <a:off x="457200" y="1600200"/>
+            <a:ext cx="8228160" cy="4524480"/>
+          </a:xfrm>
+          <a:prstGeom prst="rect">
+            <a:avLst/>
+          </a:prstGeom>
+          <a:noFill/>
+          <a:ln>
+            <a:noFill/>
+          </a:ln>
+        </p:spPr>
+        <p:style>
+          <a:lnRef idx="0"/>
+          <a:fillRef idx="0"/>
+          <a:effectRef idx="0"/>
+          <a:fontRef idx="minor"/>
+        </p:style>
+      </p:sp>
+    </p:spTree>
+  </p:cSld>
+  <p:timing>
+    <p:tnLst>
+      <p:par>
+        <p:cTn id="25" dur="indefinite" restart="never" nodeType="tmRoot">
+          <p:childTnLst>
+            <p:seq>
+              <p:cTn id="26" nodeType="mainSeq"/>
               <p:prevCondLst>
                 <p:cond delay="0" evt="onPrev">
                   <p:tgtEl>
@@ -5492,141 +6966,14 @@
       </p:grpSpPr>
       <p:sp>
         <p:nvSpPr>
-          <p:cNvPr id="141" name="CustomShape 1"/>
+          <p:cNvPr id="135" name="CustomShape 1"/>
           <p:cNvSpPr/>
           <p:nvPr/>
         </p:nvSpPr>
         <p:spPr>
           <a:xfrm>
             <a:off x="457200" y="274680"/>
-            <a:ext cx="8228520" cy="1141920"/>
-          </a:xfrm>
-          <a:prstGeom prst="rect">
-            <a:avLst/>
-          </a:prstGeom>
-          <a:noFill/>
-          <a:ln>
-            <a:noFill/>
-          </a:ln>
-        </p:spPr>
-        <p:style>
-          <a:lnRef idx="0"/>
-          <a:fillRef idx="0"/>
-          <a:effectRef idx="0"/>
-          <a:fontRef idx="minor"/>
-        </p:style>
-        <p:txBody>
-          <a:bodyPr lIns="90000" rIns="90000" tIns="45000" bIns="45000" anchor="ctr"/>
-          <a:p>
-            <a:pPr algn="ctr">
-              <a:lnSpc>
-                <a:spcPct val="100000"/>
-              </a:lnSpc>
-            </a:pPr>
-            <a:r>
-              <a:rPr lang="fr-FR" sz="4400" spc="-1" strike="noStrike">
-                <a:solidFill>
-                  <a:srgbClr val="000000"/>
-                </a:solidFill>
-                <a:uFill>
-                  <a:solidFill>
-                    <a:srgbClr val="ffffff"/>
-                  </a:solidFill>
-                </a:uFill>
-                <a:latin typeface="Calibri"/>
-                <a:ea typeface="DejaVu Sans"/>
-              </a:rPr>
-              <a:t>ERM</a:t>
-            </a:r>
-            <a:endParaRPr/>
-          </a:p>
-        </p:txBody>
-      </p:sp>
-      <p:sp>
-        <p:nvSpPr>
-          <p:cNvPr id="142" name="CustomShape 2"/>
-          <p:cNvSpPr/>
-          <p:nvPr/>
-        </p:nvSpPr>
-        <p:spPr>
-          <a:xfrm>
-            <a:off x="457200" y="1600200"/>
-            <a:ext cx="8228520" cy="4524840"/>
-          </a:xfrm>
-          <a:prstGeom prst="rect">
-            <a:avLst/>
-          </a:prstGeom>
-          <a:noFill/>
-          <a:ln>
-            <a:noFill/>
-          </a:ln>
-        </p:spPr>
-        <p:style>
-          <a:lnRef idx="0"/>
-          <a:fillRef idx="0"/>
-          <a:effectRef idx="0"/>
-          <a:fontRef idx="minor"/>
-        </p:style>
-      </p:sp>
-    </p:spTree>
-  </p:cSld>
-  <p:timing>
-    <p:tnLst>
-      <p:par>
-        <p:cTn id="23" dur="indefinite" restart="never" nodeType="tmRoot">
-          <p:childTnLst>
-            <p:seq>
-              <p:cTn id="24" nodeType="mainSeq"/>
-              <p:prevCondLst>
-                <p:cond delay="0" evt="onPrev">
-                  <p:tgtEl>
-                    <p:sldTgt/>
-                  </p:tgtEl>
-                </p:cond>
-              </p:prevCondLst>
-              <p:nextCondLst>
-                <p:cond delay="0" evt="onNext">
-                  <p:tgtEl>
-                    <p:sldTgt/>
-                  </p:tgtEl>
-                </p:cond>
-              </p:nextCondLst>
-            </p:seq>
-          </p:childTnLst>
-        </p:cTn>
-      </p:par>
-    </p:tnLst>
-  </p:timing>
-</p:sld>
-</file>
-
-<file path=ppt/slides/slide15.xml><?xml version="1.0" encoding="utf-8"?>
-<p:sld xmlns:a="http://schemas.openxmlformats.org/drawingml/2006/main" xmlns:p="http://schemas.openxmlformats.org/presentationml/2006/main" xmlns:r="http://schemas.openxmlformats.org/officeDocument/2006/relationships">
-  <p:cSld>
-    <p:spTree>
-      <p:nvGrpSpPr>
-        <p:cNvPr id="1" name=""/>
-        <p:cNvGrpSpPr/>
-        <p:nvPr/>
-      </p:nvGrpSpPr>
-      <p:grpSpPr>
-        <a:xfrm>
-          <a:off x="0" y="0"/>
-          <a:ext cx="0" cy="0"/>
-          <a:chOff x="0" y="0"/>
-          <a:chExt cx="0" cy="0"/>
-        </a:xfrm>
-      </p:grpSpPr>
-      <p:sp>
-        <p:nvSpPr>
-          <p:cNvPr id="143" name="CustomShape 1"/>
-          <p:cNvSpPr/>
-          <p:nvPr/>
-        </p:nvSpPr>
-        <p:spPr>
-          <a:xfrm>
-            <a:off x="457200" y="274680"/>
-            <a:ext cx="8228520" cy="1141920"/>
+            <a:ext cx="8228160" cy="1141560"/>
           </a:xfrm>
           <a:prstGeom prst="rect">
             <a:avLst/>
@@ -5671,14 +7018,14 @@
       </p:sp>
       <p:sp>
         <p:nvSpPr>
-          <p:cNvPr id="144" name="CustomShape 2"/>
+          <p:cNvPr id="136" name="CustomShape 2"/>
           <p:cNvSpPr/>
           <p:nvPr/>
         </p:nvSpPr>
         <p:spPr>
           <a:xfrm>
             <a:off x="1506960" y="3747600"/>
-            <a:ext cx="4967640" cy="2087280"/>
+            <a:ext cx="4967280" cy="2086920"/>
           </a:xfrm>
           <a:prstGeom prst="rect">
             <a:avLst/>
@@ -5704,14 +7051,14 @@
       </p:sp>
       <p:sp>
         <p:nvSpPr>
-          <p:cNvPr id="145" name="CustomShape 3"/>
+          <p:cNvPr id="137" name="CustomShape 3"/>
           <p:cNvSpPr/>
           <p:nvPr/>
         </p:nvSpPr>
         <p:spPr>
           <a:xfrm>
             <a:off x="1711440" y="3819600"/>
-            <a:ext cx="1319400" cy="453960"/>
+            <a:ext cx="1319040" cy="453600"/>
           </a:xfrm>
           <a:prstGeom prst="rect">
             <a:avLst/>
@@ -5758,14 +7105,14 @@
       </p:sp>
       <p:sp>
         <p:nvSpPr>
-          <p:cNvPr id="146" name="CustomShape 4"/>
+          <p:cNvPr id="138" name="CustomShape 4"/>
           <p:cNvSpPr/>
           <p:nvPr/>
         </p:nvSpPr>
         <p:spPr>
           <a:xfrm>
             <a:off x="3282840" y="3819600"/>
-            <a:ext cx="1455840" cy="453960"/>
+            <a:ext cx="1455480" cy="453600"/>
           </a:xfrm>
           <a:prstGeom prst="rect">
             <a:avLst/>
@@ -5812,14 +7159,14 @@
       </p:sp>
       <p:sp>
         <p:nvSpPr>
-          <p:cNvPr id="147" name="CustomShape 5"/>
+          <p:cNvPr id="139" name="CustomShape 5"/>
           <p:cNvSpPr/>
           <p:nvPr/>
         </p:nvSpPr>
         <p:spPr>
           <a:xfrm>
             <a:off x="1683720" y="4611600"/>
-            <a:ext cx="659160" cy="453960"/>
+            <a:ext cx="658800" cy="453600"/>
           </a:xfrm>
           <a:prstGeom prst="rect">
             <a:avLst/>
@@ -5866,14 +7213,14 @@
       </p:sp>
       <p:sp>
         <p:nvSpPr>
-          <p:cNvPr id="148" name="CustomShape 6"/>
+          <p:cNvPr id="140" name="CustomShape 6"/>
           <p:cNvSpPr/>
           <p:nvPr/>
         </p:nvSpPr>
         <p:spPr>
           <a:xfrm>
             <a:off x="1683720" y="5035680"/>
-            <a:ext cx="659160" cy="453960"/>
+            <a:ext cx="658800" cy="453600"/>
           </a:xfrm>
           <a:prstGeom prst="rect">
             <a:avLst/>
@@ -5920,14 +7267,14 @@
       </p:sp>
       <p:sp>
         <p:nvSpPr>
-          <p:cNvPr id="149" name="CustomShape 7"/>
+          <p:cNvPr id="141" name="CustomShape 7"/>
           <p:cNvSpPr/>
           <p:nvPr/>
         </p:nvSpPr>
         <p:spPr>
           <a:xfrm>
             <a:off x="3208680" y="4251600"/>
-            <a:ext cx="1063080" cy="453960"/>
+            <a:ext cx="1062720" cy="453600"/>
           </a:xfrm>
           <a:prstGeom prst="rect">
             <a:avLst/>
@@ -5974,14 +7321,14 @@
       </p:sp>
       <p:sp>
         <p:nvSpPr>
-          <p:cNvPr id="150" name="CustomShape 8"/>
+          <p:cNvPr id="142" name="CustomShape 8"/>
           <p:cNvSpPr/>
           <p:nvPr/>
         </p:nvSpPr>
         <p:spPr>
           <a:xfrm>
             <a:off x="4438080" y="4251600"/>
-            <a:ext cx="721800" cy="453960"/>
+            <a:ext cx="721440" cy="453600"/>
           </a:xfrm>
           <a:prstGeom prst="rect">
             <a:avLst/>
@@ -6028,14 +7375,14 @@
       </p:sp>
       <p:sp>
         <p:nvSpPr>
-          <p:cNvPr id="151" name="CustomShape 9"/>
+          <p:cNvPr id="143" name="CustomShape 9"/>
           <p:cNvSpPr/>
           <p:nvPr/>
         </p:nvSpPr>
         <p:spPr>
           <a:xfrm>
             <a:off x="5343840" y="4251600"/>
-            <a:ext cx="572040" cy="453960"/>
+            <a:ext cx="571680" cy="453600"/>
           </a:xfrm>
           <a:prstGeom prst="rect">
             <a:avLst/>
@@ -6082,14 +7429,14 @@
       </p:sp>
       <p:sp>
         <p:nvSpPr>
-          <p:cNvPr id="152" name="CustomShape 10"/>
+          <p:cNvPr id="144" name="CustomShape 10"/>
           <p:cNvSpPr/>
           <p:nvPr/>
         </p:nvSpPr>
         <p:spPr>
           <a:xfrm>
             <a:off x="3448080" y="4653000"/>
-            <a:ext cx="659160" cy="275760"/>
+            <a:ext cx="658800" cy="275400"/>
           </a:xfrm>
           <a:prstGeom prst="rect">
             <a:avLst/>
@@ -6110,14 +7457,14 @@
       </p:sp>
       <p:sp>
         <p:nvSpPr>
-          <p:cNvPr id="153" name="CustomShape 11"/>
+          <p:cNvPr id="145" name="CustomShape 11"/>
           <p:cNvSpPr/>
           <p:nvPr/>
         </p:nvSpPr>
         <p:spPr>
           <a:xfrm>
             <a:off x="3448080" y="5035680"/>
-            <a:ext cx="659160" cy="275760"/>
+            <a:ext cx="658800" cy="275400"/>
           </a:xfrm>
           <a:prstGeom prst="rect">
             <a:avLst/>
@@ -6138,14 +7485,14 @@
       </p:sp>
       <p:sp>
         <p:nvSpPr>
-          <p:cNvPr id="154" name="CustomShape 12"/>
+          <p:cNvPr id="146" name="CustomShape 12"/>
           <p:cNvSpPr/>
           <p:nvPr/>
         </p:nvSpPr>
         <p:spPr>
           <a:xfrm>
             <a:off x="4468320" y="4653000"/>
-            <a:ext cx="659160" cy="275760"/>
+            <a:ext cx="658800" cy="275400"/>
           </a:xfrm>
           <a:prstGeom prst="rect">
             <a:avLst/>
@@ -6166,14 +7513,14 @@
       </p:sp>
       <p:sp>
         <p:nvSpPr>
-          <p:cNvPr id="155" name="CustomShape 13"/>
+          <p:cNvPr id="147" name="CustomShape 13"/>
           <p:cNvSpPr/>
           <p:nvPr/>
         </p:nvSpPr>
         <p:spPr>
           <a:xfrm>
             <a:off x="4468320" y="5035680"/>
-            <a:ext cx="659160" cy="275760"/>
+            <a:ext cx="658800" cy="275400"/>
           </a:xfrm>
           <a:prstGeom prst="rect">
             <a:avLst/>
@@ -6194,14 +7541,14 @@
       </p:sp>
       <p:sp>
         <p:nvSpPr>
-          <p:cNvPr id="156" name="CustomShape 14"/>
+          <p:cNvPr id="148" name="CustomShape 14"/>
           <p:cNvSpPr/>
           <p:nvPr/>
         </p:nvSpPr>
         <p:spPr>
           <a:xfrm>
             <a:off x="5319360" y="4653000"/>
-            <a:ext cx="659160" cy="275760"/>
+            <a:ext cx="658800" cy="275400"/>
           </a:xfrm>
           <a:prstGeom prst="rect">
             <a:avLst/>
@@ -6222,14 +7569,14 @@
       </p:sp>
       <p:sp>
         <p:nvSpPr>
-          <p:cNvPr id="157" name="CustomShape 15"/>
+          <p:cNvPr id="149" name="CustomShape 15"/>
           <p:cNvSpPr/>
           <p:nvPr/>
         </p:nvSpPr>
         <p:spPr>
           <a:xfrm>
             <a:off x="5319360" y="5035680"/>
-            <a:ext cx="659160" cy="275760"/>
+            <a:ext cx="658800" cy="275400"/>
           </a:xfrm>
           <a:prstGeom prst="rect">
             <a:avLst/>
@@ -6250,14 +7597,14 @@
       </p:sp>
       <p:sp>
         <p:nvSpPr>
-          <p:cNvPr id="158" name="CustomShape 16"/>
+          <p:cNvPr id="150" name="CustomShape 16"/>
           <p:cNvSpPr/>
           <p:nvPr/>
         </p:nvSpPr>
         <p:spPr>
           <a:xfrm>
             <a:off x="1527120" y="1340640"/>
-            <a:ext cx="3475800" cy="2087280"/>
+            <a:ext cx="3475440" cy="2086920"/>
           </a:xfrm>
           <a:prstGeom prst="rect">
             <a:avLst/>
@@ -6283,14 +7630,14 @@
       </p:sp>
       <p:sp>
         <p:nvSpPr>
-          <p:cNvPr id="159" name="CustomShape 17"/>
+          <p:cNvPr id="151" name="CustomShape 17"/>
           <p:cNvSpPr/>
           <p:nvPr/>
         </p:nvSpPr>
         <p:spPr>
           <a:xfrm>
             <a:off x="1731600" y="1412640"/>
-            <a:ext cx="1319400" cy="453960"/>
+            <a:ext cx="1319040" cy="453600"/>
           </a:xfrm>
           <a:prstGeom prst="rect">
             <a:avLst/>
@@ -6337,14 +7684,14 @@
       </p:sp>
       <p:sp>
         <p:nvSpPr>
-          <p:cNvPr id="160" name="CustomShape 18"/>
+          <p:cNvPr id="152" name="CustomShape 18"/>
           <p:cNvSpPr/>
           <p:nvPr/>
         </p:nvSpPr>
         <p:spPr>
           <a:xfrm>
             <a:off x="3303000" y="1412640"/>
-            <a:ext cx="1455840" cy="453960"/>
+            <a:ext cx="1455480" cy="453600"/>
           </a:xfrm>
           <a:prstGeom prst="rect">
             <a:avLst/>
@@ -6391,14 +7738,14 @@
       </p:sp>
       <p:sp>
         <p:nvSpPr>
-          <p:cNvPr id="161" name="CustomShape 19"/>
+          <p:cNvPr id="153" name="CustomShape 19"/>
           <p:cNvSpPr/>
           <p:nvPr/>
         </p:nvSpPr>
         <p:spPr>
           <a:xfrm>
             <a:off x="1703880" y="2205000"/>
-            <a:ext cx="659160" cy="453960"/>
+            <a:ext cx="658800" cy="453600"/>
           </a:xfrm>
           <a:prstGeom prst="rect">
             <a:avLst/>
@@ -6445,14 +7792,14 @@
       </p:sp>
       <p:sp>
         <p:nvSpPr>
-          <p:cNvPr id="162" name="CustomShape 20"/>
+          <p:cNvPr id="154" name="CustomShape 20"/>
           <p:cNvSpPr/>
           <p:nvPr/>
         </p:nvSpPr>
         <p:spPr>
           <a:xfrm>
             <a:off x="1703880" y="2628720"/>
-            <a:ext cx="659160" cy="453960"/>
+            <a:ext cx="658800" cy="453600"/>
           </a:xfrm>
           <a:prstGeom prst="rect">
             <a:avLst/>
@@ -6499,14 +7846,14 @@
       </p:sp>
       <p:sp>
         <p:nvSpPr>
-          <p:cNvPr id="163" name="CustomShape 21"/>
+          <p:cNvPr id="155" name="CustomShape 21"/>
           <p:cNvSpPr/>
           <p:nvPr/>
         </p:nvSpPr>
         <p:spPr>
           <a:xfrm>
             <a:off x="1703880" y="3036600"/>
-            <a:ext cx="659160" cy="453960"/>
+            <a:ext cx="658800" cy="453600"/>
           </a:xfrm>
           <a:prstGeom prst="rect">
             <a:avLst/>
@@ -6553,14 +7900,14 @@
       </p:sp>
       <p:sp>
         <p:nvSpPr>
-          <p:cNvPr id="164" name="CustomShape 22"/>
+          <p:cNvPr id="156" name="CustomShape 22"/>
           <p:cNvSpPr/>
           <p:nvPr/>
         </p:nvSpPr>
         <p:spPr>
           <a:xfrm>
             <a:off x="2555280" y="1845000"/>
-            <a:ext cx="891720" cy="272160"/>
+            <a:ext cx="891360" cy="271800"/>
           </a:xfrm>
           <a:prstGeom prst="rect">
             <a:avLst/>
@@ -6607,14 +7954,14 @@
       </p:sp>
       <p:sp>
         <p:nvSpPr>
-          <p:cNvPr id="165" name="CustomShape 23"/>
+          <p:cNvPr id="157" name="CustomShape 23"/>
           <p:cNvSpPr/>
           <p:nvPr/>
         </p:nvSpPr>
         <p:spPr>
           <a:xfrm>
             <a:off x="2690640" y="2274120"/>
-            <a:ext cx="140040" cy="137520"/>
+            <a:ext cx="139680" cy="137160"/>
           </a:xfrm>
           <a:prstGeom prst="ellipse">
             <a:avLst/>
@@ -6643,14 +7990,14 @@
       </p:sp>
       <p:sp>
         <p:nvSpPr>
-          <p:cNvPr id="166" name="CustomShape 24"/>
+          <p:cNvPr id="158" name="CustomShape 24"/>
           <p:cNvSpPr/>
           <p:nvPr/>
         </p:nvSpPr>
         <p:spPr>
           <a:xfrm>
             <a:off x="2690640" y="2698200"/>
-            <a:ext cx="140040" cy="137520"/>
+            <a:ext cx="139680" cy="137160"/>
           </a:xfrm>
           <a:prstGeom prst="ellipse">
             <a:avLst/>
@@ -6679,14 +8026,14 @@
       </p:sp>
       <p:sp>
         <p:nvSpPr>
-          <p:cNvPr id="167" name="CustomShape 25"/>
+          <p:cNvPr id="159" name="CustomShape 25"/>
           <p:cNvSpPr/>
           <p:nvPr/>
         </p:nvSpPr>
         <p:spPr>
           <a:xfrm>
             <a:off x="2690640" y="3105720"/>
-            <a:ext cx="140040" cy="137520"/>
+            <a:ext cx="139680" cy="137160"/>
           </a:xfrm>
           <a:prstGeom prst="ellipse">
             <a:avLst/>
@@ -6715,14 +8062,14 @@
       </p:sp>
       <p:sp>
         <p:nvSpPr>
-          <p:cNvPr id="168" name="CustomShape 26"/>
+          <p:cNvPr id="160" name="CustomShape 26"/>
           <p:cNvSpPr/>
           <p:nvPr/>
         </p:nvSpPr>
         <p:spPr>
           <a:xfrm>
             <a:off x="2727360" y="2310840"/>
-            <a:ext cx="69480" cy="68040"/>
+            <a:ext cx="69120" cy="67680"/>
           </a:xfrm>
           <a:prstGeom prst="ellipse">
             <a:avLst/>
@@ -6754,14 +8101,14 @@
       </p:sp>
       <p:sp>
         <p:nvSpPr>
-          <p:cNvPr id="169" name="CustomShape 27"/>
+          <p:cNvPr id="161" name="CustomShape 27"/>
           <p:cNvSpPr/>
           <p:nvPr/>
         </p:nvSpPr>
         <p:spPr>
           <a:xfrm>
             <a:off x="2727360" y="2734200"/>
-            <a:ext cx="69480" cy="68040"/>
+            <a:ext cx="69120" cy="67680"/>
           </a:xfrm>
           <a:prstGeom prst="ellipse">
             <a:avLst/>
@@ -6793,14 +8140,14 @@
       </p:sp>
       <p:sp>
         <p:nvSpPr>
-          <p:cNvPr id="170" name="CustomShape 28"/>
+          <p:cNvPr id="162" name="CustomShape 28"/>
           <p:cNvSpPr/>
           <p:nvPr/>
         </p:nvSpPr>
         <p:spPr>
           <a:xfrm>
             <a:off x="1693800" y="5445360"/>
-            <a:ext cx="659160" cy="453960"/>
+            <a:ext cx="658800" cy="453600"/>
           </a:xfrm>
           <a:prstGeom prst="rect">
             <a:avLst/>
@@ -6847,14 +8194,14 @@
       </p:sp>
       <p:sp>
         <p:nvSpPr>
-          <p:cNvPr id="171" name="CustomShape 29"/>
+          <p:cNvPr id="163" name="CustomShape 29"/>
           <p:cNvSpPr/>
           <p:nvPr/>
         </p:nvSpPr>
         <p:spPr>
           <a:xfrm>
             <a:off x="3450240" y="5445360"/>
-            <a:ext cx="1017360" cy="453960"/>
+            <a:ext cx="1017000" cy="453600"/>
           </a:xfrm>
           <a:prstGeom prst="rect">
             <a:avLst/>
@@ -6904,10 +8251,10 @@
   <p:timing>
     <p:tnLst>
       <p:par>
-        <p:cTn id="25" dur="indefinite" restart="never" nodeType="tmRoot">
+        <p:cTn id="27" dur="indefinite" restart="never" nodeType="tmRoot">
           <p:childTnLst>
             <p:seq>
-              <p:cTn id="26" nodeType="mainSeq"/>
+              <p:cTn id="28" nodeType="mainSeq"/>
               <p:prevCondLst>
                 <p:cond delay="0" evt="onPrev">
                   <p:tgtEl>
@@ -6957,7 +8304,7 @@
         <p:spPr>
           <a:xfrm>
             <a:off x="457200" y="274680"/>
-            <a:ext cx="8228520" cy="1141920"/>
+            <a:ext cx="8228160" cy="1141560"/>
           </a:xfrm>
           <a:prstGeom prst="rect">
             <a:avLst/>
@@ -7009,7 +8356,7 @@
         <p:spPr>
           <a:xfrm>
             <a:off x="457200" y="1600200"/>
-            <a:ext cx="8228520" cy="4524840"/>
+            <a:ext cx="8228160" cy="4524480"/>
           </a:xfrm>
           <a:prstGeom prst="rect">
             <a:avLst/>
@@ -7028,7 +8375,7 @@
         <p:txBody>
           <a:bodyPr lIns="90000" rIns="90000" tIns="45000" bIns="45000"/>
           <a:p>
-            <a:pPr marL="343080" indent="-342000">
+            <a:pPr marL="343080" indent="-341640">
               <a:lnSpc>
                 <a:spcPct val="100000"/>
               </a:lnSpc>
@@ -7053,7 +8400,7 @@
             <a:endParaRPr/>
           </a:p>
           <a:p>
-            <a:pPr marL="343080" indent="-342000">
+            <a:pPr marL="343080" indent="-341640">
               <a:lnSpc>
                 <a:spcPct val="100000"/>
               </a:lnSpc>
@@ -7078,7 +8425,7 @@
             <a:endParaRPr/>
           </a:p>
           <a:p>
-            <a:pPr marL="343080" indent="-342000">
+            <a:pPr marL="343080" indent="-341640">
               <a:lnSpc>
                 <a:spcPct val="100000"/>
               </a:lnSpc>
@@ -7103,7 +8450,7 @@
             <a:endParaRPr/>
           </a:p>
           <a:p>
-            <a:pPr marL="343080" indent="-342000">
+            <a:pPr marL="343080" indent="-341640">
               <a:lnSpc>
                 <a:spcPct val="100000"/>
               </a:lnSpc>
@@ -7128,7 +8475,7 @@
             <a:endParaRPr/>
           </a:p>
           <a:p>
-            <a:pPr marL="343080" indent="-342000">
+            <a:pPr marL="343080" indent="-341640">
               <a:lnSpc>
                 <a:spcPct val="100000"/>
               </a:lnSpc>
@@ -7212,7 +8559,7 @@
         <p:spPr>
           <a:xfrm>
             <a:off x="457200" y="274680"/>
-            <a:ext cx="8228520" cy="1141920"/>
+            <a:ext cx="8228160" cy="1141560"/>
           </a:xfrm>
           <a:prstGeom prst="rect">
             <a:avLst/>
@@ -7264,7 +8611,7 @@
         <p:spPr>
           <a:xfrm>
             <a:off x="457200" y="1600200"/>
-            <a:ext cx="8228520" cy="4524840"/>
+            <a:ext cx="8228160" cy="4524480"/>
           </a:xfrm>
           <a:prstGeom prst="rect">
             <a:avLst/>
@@ -7283,7 +8630,7 @@
         <p:txBody>
           <a:bodyPr lIns="90000" rIns="90000" tIns="45000" bIns="45000"/>
           <a:p>
-            <a:pPr marL="343080" indent="-342000">
+            <a:pPr marL="343080" indent="-341640">
               <a:lnSpc>
                 <a:spcPct val="100000"/>
               </a:lnSpc>
@@ -7308,7 +8655,7 @@
             <a:endParaRPr/>
           </a:p>
           <a:p>
-            <a:pPr lvl="1" marL="743040" indent="-284760">
+            <a:pPr lvl="1" marL="743040" indent="-284400">
               <a:lnSpc>
                 <a:spcPct val="100000"/>
               </a:lnSpc>
@@ -7333,7 +8680,7 @@
             <a:endParaRPr/>
           </a:p>
           <a:p>
-            <a:pPr lvl="1" marL="743040" indent="-284760">
+            <a:pPr lvl="1" marL="743040" indent="-284400">
               <a:lnSpc>
                 <a:spcPct val="100000"/>
               </a:lnSpc>
@@ -7358,7 +8705,7 @@
             <a:endParaRPr/>
           </a:p>
           <a:p>
-            <a:pPr lvl="1" marL="743040" indent="-284760">
+            <a:pPr lvl="1" marL="743040" indent="-284400">
               <a:lnSpc>
                 <a:spcPct val="100000"/>
               </a:lnSpc>
@@ -7383,7 +8730,7 @@
             <a:endParaRPr/>
           </a:p>
           <a:p>
-            <a:pPr lvl="1" marL="743040" indent="-284760">
+            <a:pPr lvl="1" marL="743040" indent="-284400">
               <a:lnSpc>
                 <a:spcPct val="100000"/>
               </a:lnSpc>
@@ -7408,7 +8755,7 @@
             <a:endParaRPr/>
           </a:p>
           <a:p>
-            <a:pPr marL="343080" indent="-342000">
+            <a:pPr marL="343080" indent="-341640">
               <a:lnSpc>
                 <a:spcPct val="100000"/>
               </a:lnSpc>
@@ -7433,7 +8780,7 @@
             <a:endParaRPr/>
           </a:p>
           <a:p>
-            <a:pPr lvl="1" marL="743040" indent="-284760">
+            <a:pPr lvl="1" marL="743040" indent="-284400">
               <a:lnSpc>
                 <a:spcPct val="100000"/>
               </a:lnSpc>
@@ -7458,7 +8805,7 @@
             <a:endParaRPr/>
           </a:p>
           <a:p>
-            <a:pPr lvl="2" marL="1143000" indent="-227520">
+            <a:pPr lvl="2" marL="1143000" indent="-227160">
               <a:lnSpc>
                 <a:spcPct val="100000"/>
               </a:lnSpc>
@@ -7483,7 +8830,7 @@
             <a:endParaRPr/>
           </a:p>
           <a:p>
-            <a:pPr lvl="2" marL="1143000" indent="-227520">
+            <a:pPr lvl="2" marL="1143000" indent="-227160">
               <a:lnSpc>
                 <a:spcPct val="100000"/>
               </a:lnSpc>
@@ -7508,7 +8855,7 @@
             <a:endParaRPr/>
           </a:p>
           <a:p>
-            <a:pPr lvl="2" marL="1143000" indent="-227520">
+            <a:pPr lvl="2" marL="1143000" indent="-227160">
               <a:lnSpc>
                 <a:spcPct val="100000"/>
               </a:lnSpc>
@@ -7533,7 +8880,7 @@
             <a:endParaRPr/>
           </a:p>
           <a:p>
-            <a:pPr lvl="1" marL="743040" indent="-284760">
+            <a:pPr lvl="1" marL="743040" indent="-284400">
               <a:lnSpc>
                 <a:spcPct val="100000"/>
               </a:lnSpc>
@@ -7558,7 +8905,7 @@
             <a:endParaRPr/>
           </a:p>
           <a:p>
-            <a:pPr lvl="2" marL="1143000" indent="-227520">
+            <a:pPr lvl="2" marL="1143000" indent="-227160">
               <a:lnSpc>
                 <a:spcPct val="100000"/>
               </a:lnSpc>
@@ -7583,7 +8930,7 @@
             <a:endParaRPr/>
           </a:p>
           <a:p>
-            <a:pPr lvl="2" marL="1143000" indent="-227520">
+            <a:pPr lvl="2" marL="1143000" indent="-227160">
               <a:lnSpc>
                 <a:spcPct val="100000"/>
               </a:lnSpc>
@@ -7683,7 +9030,7 @@
         <p:spPr>
           <a:xfrm>
             <a:off x="457200" y="274680"/>
-            <a:ext cx="8228520" cy="1141920"/>
+            <a:ext cx="8228160" cy="1141560"/>
           </a:xfrm>
           <a:prstGeom prst="rect">
             <a:avLst/>
@@ -7735,7 +9082,7 @@
         <p:spPr>
           <a:xfrm>
             <a:off x="457200" y="1600200"/>
-            <a:ext cx="8228520" cy="4524840"/>
+            <a:ext cx="8228160" cy="4524480"/>
           </a:xfrm>
           <a:prstGeom prst="rect">
             <a:avLst/>
@@ -7754,7 +9101,7 @@
         <p:txBody>
           <a:bodyPr lIns="90000" rIns="90000" tIns="45000" bIns="45000"/>
           <a:p>
-            <a:pPr marL="343080" indent="-342000">
+            <a:pPr marL="343080" indent="-341640">
               <a:lnSpc>
                 <a:spcPct val="100000"/>
               </a:lnSpc>
@@ -7779,7 +9126,7 @@
             <a:endParaRPr/>
           </a:p>
           <a:p>
-            <a:pPr lvl="1" marL="743040" indent="-284760">
+            <a:pPr lvl="1" marL="743040" indent="-284400">
               <a:lnSpc>
                 <a:spcPct val="100000"/>
               </a:lnSpc>
@@ -7804,7 +9151,7 @@
             <a:endParaRPr/>
           </a:p>
           <a:p>
-            <a:pPr lvl="2" marL="1143000" indent="-227520">
+            <a:pPr lvl="2" marL="1143000" indent="-227160">
               <a:lnSpc>
                 <a:spcPct val="100000"/>
               </a:lnSpc>
@@ -7829,7 +9176,7 @@
             <a:endParaRPr/>
           </a:p>
           <a:p>
-            <a:pPr lvl="3" marL="1600200" indent="-227520">
+            <a:pPr lvl="3" marL="1600200" indent="-227160">
               <a:lnSpc>
                 <a:spcPct val="100000"/>
               </a:lnSpc>
@@ -7854,7 +9201,7 @@
             <a:endParaRPr/>
           </a:p>
           <a:p>
-            <a:pPr lvl="3" marL="1600200" indent="-227520">
+            <a:pPr lvl="3" marL="1600200" indent="-227160">
               <a:lnSpc>
                 <a:spcPct val="100000"/>
               </a:lnSpc>
@@ -7879,7 +9226,7 @@
             <a:endParaRPr/>
           </a:p>
           <a:p>
-            <a:pPr lvl="3" marL="1600200" indent="-227520">
+            <a:pPr lvl="3" marL="1600200" indent="-227160">
               <a:lnSpc>
                 <a:spcPct val="100000"/>
               </a:lnSpc>
@@ -7904,7 +9251,7 @@
             <a:endParaRPr/>
           </a:p>
           <a:p>
-            <a:pPr lvl="3" marL="1600200" indent="-227520">
+            <a:pPr lvl="3" marL="1600200" indent="-227160">
               <a:lnSpc>
                 <a:spcPct val="100000"/>
               </a:lnSpc>
@@ -7929,7 +9276,7 @@
             <a:endParaRPr/>
           </a:p>
           <a:p>
-            <a:pPr lvl="3" marL="1600200" indent="-227520">
+            <a:pPr lvl="3" marL="1600200" indent="-227160">
               <a:lnSpc>
                 <a:spcPct val="100000"/>
               </a:lnSpc>
@@ -7954,7 +9301,7 @@
             <a:endParaRPr/>
           </a:p>
           <a:p>
-            <a:pPr lvl="3" marL="1600200" indent="-227520">
+            <a:pPr lvl="3" marL="1600200" indent="-227160">
               <a:lnSpc>
                 <a:spcPct val="100000"/>
               </a:lnSpc>
@@ -7979,7 +9326,7 @@
             <a:endParaRPr/>
           </a:p>
           <a:p>
-            <a:pPr lvl="2" marL="1143000" indent="-227520">
+            <a:pPr lvl="2" marL="1143000" indent="-227160">
               <a:lnSpc>
                 <a:spcPct val="100000"/>
               </a:lnSpc>
@@ -8004,7 +9351,7 @@
             <a:endParaRPr/>
           </a:p>
           <a:p>
-            <a:pPr lvl="3" marL="1600200" indent="-227520">
+            <a:pPr lvl="3" marL="1600200" indent="-227160">
               <a:lnSpc>
                 <a:spcPct val="100000"/>
               </a:lnSpc>
@@ -8029,7 +9376,7 @@
             <a:endParaRPr/>
           </a:p>
           <a:p>
-            <a:pPr lvl="3" marL="1600200" indent="-227520">
+            <a:pPr lvl="3" marL="1600200" indent="-227160">
               <a:lnSpc>
                 <a:spcPct val="100000"/>
               </a:lnSpc>
@@ -8054,7 +9401,7 @@
             <a:endParaRPr/>
           </a:p>
           <a:p>
-            <a:pPr lvl="3" marL="1600200" indent="-227520">
+            <a:pPr lvl="3" marL="1600200" indent="-227160">
               <a:lnSpc>
                 <a:spcPct val="100000"/>
               </a:lnSpc>
@@ -8079,7 +9426,7 @@
             <a:endParaRPr/>
           </a:p>
           <a:p>
-            <a:pPr lvl="1" marL="743040" indent="-284760">
+            <a:pPr lvl="1" marL="743040" indent="-284400">
               <a:lnSpc>
                 <a:spcPct val="100000"/>
               </a:lnSpc>
@@ -8104,7 +9451,7 @@
             <a:endParaRPr/>
           </a:p>
           <a:p>
-            <a:pPr lvl="2" marL="1143000" indent="-227520">
+            <a:pPr lvl="2" marL="1143000" indent="-227160">
               <a:lnSpc>
                 <a:spcPct val="100000"/>
               </a:lnSpc>
@@ -8129,7 +9476,7 @@
             <a:endParaRPr/>
           </a:p>
           <a:p>
-            <a:pPr lvl="2" marL="1143000" indent="-227520">
+            <a:pPr lvl="2" marL="1143000" indent="-227160">
               <a:lnSpc>
                 <a:spcPct val="100000"/>
               </a:lnSpc>
@@ -8154,7 +9501,7 @@
             <a:endParaRPr/>
           </a:p>
           <a:p>
-            <a:pPr lvl="2" marL="1143000" indent="-227520">
+            <a:pPr lvl="2" marL="1143000" indent="-227160">
               <a:lnSpc>
                 <a:spcPct val="100000"/>
               </a:lnSpc>
@@ -8179,7 +9526,7 @@
             <a:endParaRPr/>
           </a:p>
           <a:p>
-            <a:pPr lvl="1" marL="743040" indent="-284760">
+            <a:pPr lvl="1" marL="743040" indent="-284400">
               <a:lnSpc>
                 <a:spcPct val="100000"/>
               </a:lnSpc>
@@ -8204,7 +9551,7 @@
             <a:endParaRPr/>
           </a:p>
           <a:p>
-            <a:pPr lvl="2" marL="1143000" indent="-227520">
+            <a:pPr lvl="2" marL="1143000" indent="-227160">
               <a:lnSpc>
                 <a:spcPct val="100000"/>
               </a:lnSpc>
@@ -8229,7 +9576,7 @@
             <a:endParaRPr/>
           </a:p>
           <a:p>
-            <a:pPr lvl="2" marL="1143000" indent="-227520">
+            <a:pPr lvl="2" marL="1143000" indent="-227160">
               <a:lnSpc>
                 <a:spcPct val="100000"/>
               </a:lnSpc>
@@ -8254,7 +9601,7 @@
             <a:endParaRPr/>
           </a:p>
           <a:p>
-            <a:pPr lvl="2" marL="1143000" indent="-227520">
+            <a:pPr lvl="2" marL="1143000" indent="-227160">
               <a:lnSpc>
                 <a:spcPct val="100000"/>
               </a:lnSpc>
@@ -8279,7 +9626,7 @@
             <a:endParaRPr/>
           </a:p>
           <a:p>
-            <a:pPr lvl="2" marL="1143000" indent="-227520">
+            <a:pPr lvl="2" marL="1143000" indent="-227160">
               <a:lnSpc>
                 <a:spcPct val="100000"/>
               </a:lnSpc>
@@ -8371,7 +9718,7 @@
         <p:spPr>
           <a:xfrm>
             <a:off x="457200" y="274680"/>
-            <a:ext cx="8228520" cy="1141920"/>
+            <a:ext cx="8228160" cy="1141560"/>
           </a:xfrm>
           <a:prstGeom prst="rect">
             <a:avLst/>
@@ -8423,7 +9770,7 @@
         <p:spPr>
           <a:xfrm>
             <a:off x="457200" y="1600200"/>
-            <a:ext cx="8228520" cy="4524840"/>
+            <a:ext cx="8228160" cy="4524480"/>
           </a:xfrm>
           <a:prstGeom prst="rect">
             <a:avLst/>
@@ -8442,7 +9789,7 @@
         <p:txBody>
           <a:bodyPr lIns="90000" rIns="90000" tIns="45000" bIns="45000"/>
           <a:p>
-            <a:pPr marL="343080" indent="-342000">
+            <a:pPr marL="343080" indent="-341640">
               <a:lnSpc>
                 <a:spcPct val="100000"/>
               </a:lnSpc>
@@ -8467,7 +9814,7 @@
             <a:endParaRPr/>
           </a:p>
           <a:p>
-            <a:pPr lvl="1" marL="743040" indent="-284760">
+            <a:pPr lvl="1" marL="743040" indent="-284400">
               <a:lnSpc>
                 <a:spcPct val="100000"/>
               </a:lnSpc>
@@ -8492,7 +9839,7 @@
             <a:endParaRPr/>
           </a:p>
           <a:p>
-            <a:pPr marL="343080" indent="-342000">
+            <a:pPr marL="343080" indent="-341640">
               <a:lnSpc>
                 <a:spcPct val="100000"/>
               </a:lnSpc>
@@ -8517,7 +9864,7 @@
             <a:endParaRPr/>
           </a:p>
           <a:p>
-            <a:pPr lvl="1" marL="743040" indent="-284760">
+            <a:pPr lvl="1" marL="743040" indent="-284400">
               <a:lnSpc>
                 <a:spcPct val="100000"/>
               </a:lnSpc>
@@ -8602,7 +9949,7 @@
             <a:endParaRPr/>
           </a:p>
           <a:p>
-            <a:pPr marL="343080" indent="-342000">
+            <a:pPr marL="343080" indent="-341640">
               <a:lnSpc>
                 <a:spcPct val="100000"/>
               </a:lnSpc>
@@ -8627,7 +9974,7 @@
             <a:endParaRPr/>
           </a:p>
           <a:p>
-            <a:pPr lvl="1" marL="743040" indent="-284760">
+            <a:pPr lvl="1" marL="743040" indent="-284400">
               <a:lnSpc>
                 <a:spcPct val="100000"/>
               </a:lnSpc>
@@ -8652,7 +9999,7 @@
             <a:endParaRPr/>
           </a:p>
           <a:p>
-            <a:pPr lvl="1" marL="743040" indent="-284760">
+            <a:pPr lvl="1" marL="743040" indent="-284400">
               <a:lnSpc>
                 <a:spcPct val="100000"/>
               </a:lnSpc>
@@ -8677,7 +10024,7 @@
             <a:endParaRPr/>
           </a:p>
           <a:p>
-            <a:pPr marL="343080" indent="-342000">
+            <a:pPr marL="343080" indent="-341640">
               <a:lnSpc>
                 <a:spcPct val="100000"/>
               </a:lnSpc>
@@ -8702,7 +10049,7 @@
             <a:endParaRPr/>
           </a:p>
           <a:p>
-            <a:pPr marL="343080" indent="-342000">
+            <a:pPr marL="343080" indent="-341640">
               <a:lnSpc>
                 <a:spcPct val="100000"/>
               </a:lnSpc>
@@ -8802,7 +10149,7 @@
         <p:spPr>
           <a:xfrm>
             <a:off x="457200" y="274680"/>
-            <a:ext cx="8228520" cy="1141920"/>
+            <a:ext cx="8228160" cy="1141560"/>
           </a:xfrm>
           <a:prstGeom prst="rect">
             <a:avLst/>
@@ -9576,11 +10923,11 @@
 </file>
 
 <file path=ppt/slides/slide7.xml><?xml version="1.0" encoding="UTF-8" standalone="yes"?>
-<p:sld xmlns:a="http://schemas.openxmlformats.org/drawingml/2006/main" xmlns:p="http://schemas.openxmlformats.org/presentationml/2006/main" xmlns:r="http://schemas.openxmlformats.org/officeDocument/2006/relationships"><p:cSld><p:spTree><p:nvGrpSpPr>        <p:cNvPr id="1" name=""/>        <p:cNvGrpSpPr/>        <p:nvPr/>      </p:nvGrpSpPr>      <p:grpSpPr>        <a:xfrm>          <a:off x="0" y="0"/>          <a:ext cx="0" cy="0"/>          <a:chOff x="0" y="0"/>          <a:chExt cx="0" cy="0"/>        </a:xfrm>      </p:grpSpPr><p:sp><p:nvSpPr><p:cNvPr id="84" name="CustomShape 1"></p:cNvPr><p:cNvSpPr/><p:nvPr/></p:nvSpPr><p:spPr><a:xfrm><a:off x="457200" y="274680"/><a:ext cx="8228520" cy="1141920"/></a:xfrm><a:prstGeom prst="rect"><a:avLst></a:avLst></a:prstGeom><a:noFill/><a:ln><a:noFill/></a:ln></p:spPr><p:style><a:lnRef idx="0"></a:lnRef><a:fillRef idx="0"/><a:effectRef idx="0"></a:effectRef><a:fontRef idx="minor"/></p:style><p:txBody><a:bodyPr lIns="90000" rIns="90000" tIns="45000" bIns="45000" anchor="ctr"></a:bodyPr><a:p><a:pPr algn="ctr"><a:lnSpc><a:spcPct val="100000"/></a:lnSpc></a:pPr><a:r><a:rPr lang="fr-FR" sz="4400" spc="-1" strike="noStrike"><a:solidFill><a:srgbClr val="000000"/></a:solidFill><a:uFill><a:solidFill><a:srgbClr val="ffffff"/></a:solidFill></a:uFill><a:latin typeface="Calibri"/><a:ea typeface="DejaVu Sans"/></a:rPr><a:t>Table des limites microbiologiques par classe (en UFC)</a:t></a:r><a:endParaRPr/></a:p></p:txBody></p:sp><p:graphicFrame><p:nvGraphicFramePr><p:cNvPr id="85" name="Table 2"/><p:cNvGraphicFramePr/><p:nvPr/></p:nvGraphicFramePr><p:xfrm><a:off x="64440" y="1556640"/><a:ext cx="8899200" cy="2559960"/></p:xfrm><a:graphic><a:graphicData uri="http://schemas.openxmlformats.org/drawingml/2006/table"><a:tbl><a:tblPr/><a:tblGrid><a:gridCol w="2114280"/><a:gridCol w="1423800"/><a:gridCol w="1423800"/><a:gridCol w="1848960"/><a:gridCol w="998640"/><a:gridCol w="1090080"/></a:tblGrid><a:tr h="640080"><a:tc><a:txBody><a:bodyPr></a:bodyPr><a:p><a:pPr><a:lnSpc><a:spcPct val="100000"/></a:lnSpc></a:pPr><a:r><a:rPr b="1" lang="fr-FR" sz="1800" spc="-1" strike="noStrike"><a:solidFill><a:srgbClr val="ffffff"/></a:solidFill><a:uFill><a:solidFill><a:srgbClr val="ffffff"/></a:solidFill></a:uFill><a:latin typeface="Calibri"/></a:rPr><a:t>Etiquette</a:t></a:r><a:endParaRPr/></a:p></a:txBody><a:tcPr marL="91440" marR="91440"><a:lnL w="12240"><a:solidFill><a:srgbClr val="ffffff"/></a:solidFill></a:lnL><a:lnR w="12240"><a:solidFill><a:srgbClr val="ffffff"/></a:solidFill></a:lnR><a:lnT w="12240"><a:solidFill><a:srgbClr val="ffffff"/></a:solidFill></a:lnT><a:lnB w="38160"><a:solidFill><a:srgbClr val="ffffff"/></a:solidFill></a:lnB><a:solidFill><a:srgbClr val="4f81bd"/></a:solidFill></a:tcPr></a:tc><a:tc><a:txBody><a:bodyPr></a:bodyPr><a:p><a:pPr><a:lnSpc><a:spcPct val="100000"/></a:lnSpc></a:pPr><a:r><a:rPr b="1" lang="fr-FR" sz="1800" spc="-1" strike="noStrike"><a:solidFill><a:srgbClr val="ffffff"/></a:solidFill><a:uFill><a:solidFill><a:srgbClr val="ffffff"/></a:solidFill></a:uFill><a:latin typeface="Calibri"/></a:rPr><a:t>Nom de variable</a:t></a:r><a:endParaRPr/></a:p></a:txBody><a:tcPr marL="91440" marR="91440"><a:lnL w="12240"><a:solidFill><a:srgbClr val="ffffff"/></a:solidFill></a:lnL><a:lnR w="12240"><a:solidFill><a:srgbClr val="ffffff"/></a:solidFill></a:lnR><a:lnT w="12240"><a:solidFill><a:srgbClr val="ffffff"/></a:solidFill></a:lnT><a:lnB w="38160"><a:solidFill><a:srgbClr val="ffffff"/></a:solidFill></a:lnB><a:solidFill><a:srgbClr val="4f81bd"/></a:solidFill></a:tcPr></a:tc><a:tc><a:txBody><a:bodyPr></a:bodyPr><a:p><a:pPr><a:lnSpc><a:spcPct val="100000"/></a:lnSpc></a:pPr><a:r><a:rPr b="1" lang="fr-FR" sz="1800" spc="-1" strike="noStrike"><a:solidFill><a:srgbClr val="ffffff"/></a:solidFill><a:uFill><a:solidFill><a:srgbClr val="ffffff"/></a:solidFill></a:uFill><a:latin typeface="Calibri"/></a:rPr><a:t>Type</a:t></a:r><a:endParaRPr/></a:p></a:txBody><a:tcPr marL="91440" marR="91440"><a:lnL w="12240"><a:solidFill><a:srgbClr val="ffffff"/></a:solidFill></a:lnL><a:lnR w="12240"><a:solidFill><a:srgbClr val="ffffff"/></a:solidFill></a:lnR><a:lnT w="12240"><a:solidFill><a:srgbClr val="ffffff"/></a:solidFill></a:lnT><a:lnB w="38160"><a:solidFill><a:srgbClr val="ffffff"/></a:solidFill></a:lnB><a:solidFill><a:srgbClr val="4f81bd"/></a:solidFill></a:tcPr></a:tc><a:tc><a:txBody><a:bodyPr></a:bodyPr><a:p><a:pPr><a:lnSpc><a:spcPct val="100000"/></a:lnSpc></a:pPr><a:r><a:rPr b="1" lang="fr-FR" sz="1800" spc="-1" strike="noStrike"><a:solidFill><a:srgbClr val="ffffff"/></a:solidFill><a:uFill><a:solidFill><a:srgbClr val="ffffff"/></a:solidFill></a:uFill><a:latin typeface="Calibri"/></a:rPr><a:t>Table</a:t></a:r><a:endParaRPr/></a:p></a:txBody><a:tcPr marL="91440" marR="91440"><a:lnL w="12240"><a:solidFill><a:srgbClr val="ffffff"/></a:solidFill></a:lnL><a:lnR w="12240"><a:solidFill><a:srgbClr val="ffffff"/></a:solidFill></a:lnR><a:lnT w="12240"><a:solidFill><a:srgbClr val="ffffff"/></a:solidFill></a:lnT><a:lnB w="38160"><a:solidFill><a:srgbClr val="ffffff"/></a:solidFill></a:lnB><a:solidFill><a:srgbClr val="4f81bd"/></a:solidFill></a:tcPr></a:tc><a:tc><a:txBody><a:bodyPr></a:bodyPr><a:p><a:pPr><a:lnSpc><a:spcPct val="100000"/></a:lnSpc></a:pPr><a:r><a:rPr b="1" lang="fr-FR" sz="1800" spc="-1" strike="noStrike"><a:solidFill><a:srgbClr val="ffffff"/></a:solidFill><a:uFill><a:solidFill><a:srgbClr val="ffffff"/></a:solidFill></a:uFill><a:latin typeface="Calibri"/></a:rPr><a:t>Clé </a:t></a:r><a:endParaRPr/></a:p><a:p><a:pPr><a:lnSpc><a:spcPct val="100000"/></a:lnSpc></a:pPr><a:r><a:rPr b="1" lang="fr-FR" sz="1800" spc="-1" strike="noStrike"><a:solidFill><a:srgbClr val="ffffff"/></a:solidFill><a:uFill><a:solidFill><a:srgbClr val="ffffff"/></a:solidFill></a:uFill><a:latin typeface="Calibri"/></a:rPr><a:t>primaire</a:t></a:r><a:endParaRPr/></a:p></a:txBody><a:tcPr marL="91440" marR="91440"><a:lnL w="12240"><a:solidFill><a:srgbClr val="ffffff"/></a:solidFill></a:lnL><a:lnR w="12240"><a:solidFill><a:srgbClr val="ffffff"/></a:solidFill></a:lnR><a:lnT w="12240"><a:solidFill><a:srgbClr val="ffffff"/></a:solidFill></a:lnT><a:lnB w="38160"><a:solidFill><a:srgbClr val="ffffff"/></a:solidFill></a:lnB><a:solidFill><a:srgbClr val="4f81bd"/></a:solidFill></a:tcPr></a:tc><a:tc><a:txBody><a:bodyPr></a:bodyPr><a:p><a:pPr><a:lnSpc><a:spcPct val="100000"/></a:lnSpc></a:pPr><a:r><a:rPr b="1" lang="fr-FR" sz="1800" spc="-1" strike="noStrike"><a:solidFill><a:srgbClr val="ffffff"/></a:solidFill><a:uFill><a:solidFill><a:srgbClr val="ffffff"/></a:solidFill></a:uFill><a:latin typeface="Calibri"/></a:rPr><a:t>Clé étrangère</a:t></a:r><a:endParaRPr/></a:p></a:txBody><a:tcPr marL="91440" marR="91440"><a:lnL w="12240"><a:solidFill><a:srgbClr val="ffffff"/></a:solidFill></a:lnL><a:lnR w="12240"><a:solidFill><a:srgbClr val="ffffff"/></a:solidFill></a:lnR><a:lnT w="12240"><a:solidFill><a:srgbClr val="ffffff"/></a:solidFill></a:lnT><a:lnB w="38160"><a:solidFill><a:srgbClr val="ffffff"/></a:solidFill></a:lnB><a:solidFill><a:srgbClr val="4f81bd"/></a:solidFill></a:tcPr></a:tc></a:tr><a:tr h="640080"><a:tc><a:txBody><a:bodyPr></a:bodyPr><a:p><a:pPr><a:lnSpc><a:spcPct val="100000"/></a:lnSpc></a:pPr><a:r><a:rPr lang="fr-FR" sz="1800" spc="-1" strike="noStrike"><a:solidFill><a:srgbClr val="000000"/></a:solidFill><a:uFill><a:solidFill><a:srgbClr val="ffffff"/></a:solidFill></a:uFill><a:latin typeface="Calibri"/></a:rPr><a:t>Classe</a:t></a:r><a:endParaRPr/></a:p></a:txBody><a:tcPr marL="91440" marR="91440"><a:lnL w="12240"><a:solidFill><a:srgbClr val="ffffff"/></a:solidFill></a:lnL><a:lnR w="12240"><a:solidFill><a:srgbClr val="ffffff"/></a:solidFill></a:lnR><a:lnT w="12240"><a:solidFill><a:srgbClr val="ffffff"/></a:solidFill></a:lnT><a:lnB w="12240"><a:solidFill><a:srgbClr val="ffffff"/></a:solidFill></a:lnB><a:solidFill><a:srgbClr val="d0d8e7"/></a:solidFill></a:tcPr></a:tc><a:tc><a:txBody><a:bodyPr></a:bodyPr><a:p><a:pPr><a:lnSpc><a:spcPct val="100000"/></a:lnSpc></a:pPr><a:r><a:rPr lang="fr-FR" sz="1800" spc="-1" strike="noStrike"><a:solidFill><a:srgbClr val="000000"/></a:solidFill><a:uFill><a:solidFill><a:srgbClr val="ffffff"/></a:solidFill></a:uFill><a:latin typeface="Calibri"/></a:rPr><a:t>Classe</a:t></a:r><a:endParaRPr/></a:p></a:txBody><a:tcPr marL="91440" marR="91440"><a:lnL w="12240"><a:solidFill><a:srgbClr val="ffffff"/></a:solidFill></a:lnL><a:lnR w="12240"><a:solidFill><a:srgbClr val="ffffff"/></a:solidFill></a:lnR><a:lnT w="12240"><a:solidFill><a:srgbClr val="ffffff"/></a:solidFill></a:lnT><a:lnB w="12240"><a:solidFill><a:srgbClr val="ffffff"/></a:solidFill></a:lnB><a:solidFill><a:srgbClr val="d0d8e7"/></a:solidFill></a:tcPr></a:tc><a:tc><a:txBody><a:bodyPr></a:bodyPr><a:p><a:pPr><a:lnSpc><a:spcPct val="100000"/></a:lnSpc></a:pPr><a:r><a:rPr lang="fr-FR" sz="1800" spc="-1" strike="noStrike"><a:solidFill><a:srgbClr val="000000"/></a:solidFill><a:uFill><a:solidFill><a:srgbClr val="ffffff"/></a:solidFill></a:uFill><a:latin typeface="Calibri"/></a:rPr><a:t>Text</a:t></a:r><a:endParaRPr/></a:p></a:txBody><a:tcPr marL="91440" marR="91440"><a:lnL w="12240"><a:solidFill><a:srgbClr val="ffffff"/></a:solidFill></a:lnL><a:lnR w="12240"><a:solidFill><a:srgbClr val="ffffff"/></a:solidFill></a:lnR><a:lnT w="12240"><a:solidFill><a:srgbClr val="ffffff"/></a:solidFill></a:lnT><a:lnB w="12240"><a:solidFill><a:srgbClr val="ffffff"/></a:solidFill></a:lnB><a:solidFill><a:srgbClr val="d0d8e7"/></a:solidFill></a:tcPr></a:tc><a:tc rowSpan="3"><a:txBody><a:bodyPr></a:bodyPr><a:p><a:pPr><a:lnSpc><a:spcPct val="100000"/></a:lnSpc></a:pPr><a:r><a:rPr lang="fr-FR" sz="1800" spc="-1" strike="noStrike"><a:solidFill><a:srgbClr val="000000"/></a:solidFill><a:uFill><a:solidFill><a:srgbClr val="ffffff"/></a:solidFill></a:uFill><a:latin typeface="Calibri"/></a:rPr><a:t>Class_limites</a:t></a:r><a:endParaRPr/></a:p></a:txBody><a:tcPr marL="91440" marR="91440"><a:lnL w="12240"><a:solidFill><a:srgbClr val="ffffff"/></a:solidFill></a:lnL><a:lnR w="12240"><a:solidFill><a:srgbClr val="ffffff"/></a:solidFill></a:lnR><a:lnT w="12240"><a:solidFill><a:srgbClr val="ffffff"/></a:solidFill></a:lnT><a:lnB w="12240"><a:solidFill><a:srgbClr val="ffffff"/></a:solidFill></a:lnB><a:solidFill><a:srgbClr val="d0d8e7"/></a:solidFill></a:tcPr></a:tc><a:tc rowSpan="3"><a:txBody><a:bodyPr></a:bodyPr><a:p><a:pPr><a:lnSpc><a:spcPct val="100000"/></a:lnSpc></a:pPr><a:r><a:rPr lang="fr-FR" sz="1800" spc="-1" strike="noStrike"><a:solidFill><a:srgbClr val="000000"/></a:solidFill><a:uFill><a:solidFill><a:srgbClr val="ffffff"/></a:solidFill></a:uFill><a:latin typeface="Calibri"/></a:rPr><a:t>ID</a:t></a:r><a:endParaRPr/></a:p></a:txBody><a:tcPr marL="91440" marR="91440"><a:lnL w="12240"><a:solidFill><a:srgbClr val="ffffff"/></a:solidFill></a:lnL><a:lnR w="12240"><a:solidFill><a:srgbClr val="ffffff"/></a:solidFill></a:lnR><a:lnT w="12240"><a:solidFill><a:srgbClr val="ffffff"/></a:solidFill></a:lnT><a:lnB w="12240"><a:solidFill><a:srgbClr val="ffffff"/></a:solidFill></a:lnB><a:solidFill><a:srgbClr val="d0d8e7"/></a:solidFill></a:tcPr></a:tc><a:tc rowSpan="3"><a:txBody><a:bodyPr></a:bodyPr><a:p><a:pPr><a:lnSpc><a:spcPct val="100000"/></a:lnSpc></a:pPr><a:r><a:rPr lang="fr-FR" sz="1800" spc="-1" strike="noStrike"><a:solidFill><a:srgbClr val="000000"/></a:solidFill><a:uFill><a:solidFill><a:srgbClr val="ffffff"/></a:solidFill></a:uFill><a:latin typeface="Calibri"/></a:rPr><a:t>N/A</a:t></a:r><a:endParaRPr/></a:p></a:txBody><a:tcPr marL="91440" marR="91440"><a:lnL w="12240"><a:solidFill><a:srgbClr val="ffffff"/></a:solidFill></a:lnL><a:lnR w="12240"><a:solidFill><a:srgbClr val="ffffff"/></a:solidFill></a:lnR><a:lnT w="12240"><a:solidFill><a:srgbClr val="ffffff"/></a:solidFill></a:lnT><a:lnB w="12240"><a:solidFill><a:srgbClr val="ffffff"/></a:solidFill></a:lnB><a:solidFill><a:srgbClr val="d0d8e7"/></a:solidFill></a:tcPr></a:tc></a:tr><a:tr h="640080"><a:tc><a:txBody><a:bodyPr></a:bodyPr><a:p><a:pPr><a:lnSpc><a:spcPct val="100000"/></a:lnSpc></a:pPr><a:r><a:rPr lang="fr-FR" sz="1800" spc="-1" strike="noStrike"><a:solidFill><a:srgbClr val="000000"/></a:solidFill><a:uFill><a:solidFill><a:srgbClr val="ffffff"/></a:solidFill></a:uFill><a:latin typeface="Calibri"/></a:rPr><a:t>Type</a:t></a:r><a:endParaRPr/></a:p></a:txBody><a:tcPr marL="91440" marR="91440"><a:lnL w="12240"><a:solidFill><a:srgbClr val="ffffff"/></a:solidFill></a:lnL><a:lnR w="12240"><a:solidFill><a:srgbClr val="ffffff"/></a:solidFill></a:lnR><a:lnT w="12240"><a:solidFill><a:srgbClr val="ffffff"/></a:solidFill></a:lnT><a:lnB w="12240"><a:solidFill><a:srgbClr val="ffffff"/></a:solidFill></a:lnB><a:solidFill><a:srgbClr val="e9ecf3"/></a:solidFill></a:tcPr></a:tc><a:tc><a:txBody><a:bodyPr></a:bodyPr><a:p><a:pPr><a:lnSpc><a:spcPct val="100000"/></a:lnSpc></a:pPr><a:r><a:rPr lang="fr-FR" sz="1800" spc="-1" strike="noStrike"><a:solidFill><a:srgbClr val="000000"/></a:solidFill><a:uFill><a:solidFill><a:srgbClr val="ffffff"/></a:solidFill></a:uFill><a:latin typeface="Calibri"/></a:rPr><a:t>Type</a:t></a:r><a:endParaRPr/></a:p></a:txBody><a:tcPr marL="91440" marR="91440"><a:lnL w="12240"><a:solidFill><a:srgbClr val="ffffff"/></a:solidFill></a:lnL><a:lnR w="12240"><a:solidFill><a:srgbClr val="ffffff"/></a:solidFill></a:lnR><a:lnT w="12240"><a:solidFill><a:srgbClr val="ffffff"/></a:solidFill></a:lnT><a:lnB w="12240"><a:solidFill><a:srgbClr val="ffffff"/></a:solidFill></a:lnB><a:solidFill><a:srgbClr val="e9ecf3"/></a:solidFill></a:tcPr></a:tc><a:tc><a:txBody><a:bodyPr></a:bodyPr><a:p><a:pPr><a:lnSpc><a:spcPct val="100000"/></a:lnSpc></a:pPr><a:r><a:rPr lang="fr-FR" sz="1800" spc="-1" strike="noStrike"><a:solidFill><a:srgbClr val="000000"/></a:solidFill><a:uFill><a:solidFill><a:srgbClr val="ffffff"/></a:solidFill></a:uFill><a:latin typeface="Calibri"/></a:rPr><a:t>Text</a:t></a:r><a:endParaRPr/></a:p></a:txBody><a:tcPr marL="91440" marR="91440"><a:lnL w="12240"><a:solidFill><a:srgbClr val="ffffff"/></a:solidFill></a:lnL><a:lnR w="12240"><a:solidFill><a:srgbClr val="ffffff"/></a:solidFill></a:lnR><a:lnT w="12240"><a:solidFill><a:srgbClr val="ffffff"/></a:solidFill></a:lnT><a:lnB w="12240"><a:solidFill><a:srgbClr val="ffffff"/></a:solidFill></a:lnB><a:solidFill><a:srgbClr val="e9ecf3"/></a:solidFill></a:tcPr></a:tc><a:tc vMerge="1"><a:tcPr><a:solidFill><a:srgbClr val="729fcf"/></a:solidFill></a:tcPr></a:tc><a:tc vMerge="1"><a:tcPr><a:solidFill><a:srgbClr val="729fcf"/></a:solidFill></a:tcPr></a:tc><a:tc vMerge="1"><a:tcPr><a:solidFill><a:srgbClr val="729fcf"/></a:solidFill></a:tcPr></a:tc></a:tr><a:tr h="640080"><a:tc><a:txBody><a:bodyPr></a:bodyPr><a:p><a:pPr><a:lnSpc><a:spcPct val="100000"/></a:lnSpc></a:pPr><a:r><a:rPr lang="fr-FR" sz="1800" spc="-1" strike="noStrike"><a:solidFill><a:srgbClr val="000000"/></a:solidFill><a:uFill><a:solidFill><a:srgbClr val="ffffff"/></a:solidFill></a:uFill><a:latin typeface="Calibri"/></a:rPr><a:t>Limite</a:t></a:r><a:endParaRPr/></a:p></a:txBody><a:tcPr marL="91440" marR="91440"><a:lnL w="12240"><a:solidFill><a:srgbClr val="ffffff"/></a:solidFill></a:lnL><a:lnR w="12240"><a:solidFill><a:srgbClr val="ffffff"/></a:solidFill></a:lnR><a:lnT w="12240"><a:solidFill><a:srgbClr val="ffffff"/></a:solidFill></a:lnT><a:lnB w="12240"><a:solidFill><a:srgbClr val="ffffff"/></a:solidFill></a:lnB><a:solidFill><a:srgbClr val="d0d8e7"/></a:solidFill></a:tcPr></a:tc><a:tc><a:txBody><a:bodyPr></a:bodyPr><a:p><a:pPr><a:lnSpc><a:spcPct val="100000"/></a:lnSpc></a:pPr><a:r><a:rPr lang="fr-FR" sz="1800" spc="-1" strike="noStrike"><a:solidFill><a:srgbClr val="000000"/></a:solidFill><a:uFill><a:solidFill><a:srgbClr val="ffffff"/></a:solidFill></a:uFill><a:latin typeface="Calibri"/></a:rPr><a:t>Limite</a:t></a:r><a:endParaRPr/></a:p></a:txBody><a:tcPr marL="91440" marR="91440"><a:lnL w="12240"><a:solidFill><a:srgbClr val="ffffff"/></a:solidFill></a:lnL><a:lnR w="12240"><a:solidFill><a:srgbClr val="ffffff"/></a:solidFill></a:lnR><a:lnT w="12240"><a:solidFill><a:srgbClr val="ffffff"/></a:solidFill></a:lnT><a:lnB w="12240"><a:solidFill><a:srgbClr val="ffffff"/></a:solidFill></a:lnB><a:solidFill><a:srgbClr val="d0d8e7"/></a:solidFill></a:tcPr></a:tc><a:tc><a:txBody><a:bodyPr></a:bodyPr><a:p><a:pPr><a:lnSpc><a:spcPct val="100000"/></a:lnSpc></a:pPr><a:r><a:rPr lang="fr-FR" sz="1800" spc="-1" strike="noStrike"><a:solidFill><a:srgbClr val="000000"/></a:solidFill><a:uFill><a:solidFill><a:srgbClr val="ffffff"/></a:solidFill></a:uFill><a:latin typeface="Calibri"/></a:rPr><a:t>Integer</a:t></a:r><a:endParaRPr/></a:p></a:txBody><a:tcPr marL="91440" marR="91440"><a:lnL w="12240"><a:solidFill><a:srgbClr val="ffffff"/></a:solidFill></a:lnL><a:lnR w="12240"><a:solidFill><a:srgbClr val="ffffff"/></a:solidFill></a:lnR><a:lnT w="12240"><a:solidFill><a:srgbClr val="ffffff"/></a:solidFill></a:lnT><a:lnB w="12240"><a:solidFill><a:srgbClr val="ffffff"/></a:solidFill></a:lnB><a:solidFill><a:srgbClr val="d0d8e7"/></a:solidFill></a:tcPr></a:tc><a:tcPr><a:solidFill><a:srgbClr val="729fcf"/></a:solidFill></a:tcPr></a:tc><a:tcPr><a:solidFill><a:srgbClr val="729fcf"/></a:solidFill></a:tcPr></a:tc><a:tcPr><a:solidFill><a:srgbClr val="729fcf"/></a:solidFill></a:tcPr></a:tc></a:tr></a:tbl></a:graphicData></a:graphic></p:graphicFrame></p:spTree></p:cSld><p:timing><p:tnLst><p:par><p:cTn id="13" dur="indefinite" restart="never" nodeType="tmRoot"><p:childTnLst><p:seq><p:cTn id="14" nodeType="mainSeq"></p:cTn><p:prevCondLst><p:cond delay="0" evt="onPrev"><p:tgtEl><p:sldTgt/></p:tgtEl></p:cond></p:prevCondLst><p:nextCondLst><p:cond delay="0" evt="onNext"><p:tgtEl><p:sldTgt/></p:tgtEl></p:cond></p:nextCondLst></p:seq></p:childTnLst></p:cTn></p:par></p:tnLst></p:timing></p:sld>
+<p:sld xmlns:a="http://schemas.openxmlformats.org/drawingml/2006/main" xmlns:p="http://schemas.openxmlformats.org/presentationml/2006/main" xmlns:r="http://schemas.openxmlformats.org/officeDocument/2006/relationships"><p:cSld><p:spTree><p:nvGrpSpPr>        <p:cNvPr id="1" name=""/>        <p:cNvGrpSpPr/>        <p:nvPr/>      </p:nvGrpSpPr>      <p:grpSpPr>        <a:xfrm>          <a:off x="0" y="0"/>          <a:ext cx="0" cy="0"/>          <a:chOff x="0" y="0"/>          <a:chExt cx="0" cy="0"/>        </a:xfrm>      </p:grpSpPr><p:sp><p:nvSpPr><p:cNvPr id="84" name="CustomShape 1"></p:cNvPr><p:cNvSpPr/><p:nvPr/></p:nvSpPr><p:spPr><a:xfrm><a:off x="457200" y="274680"/><a:ext cx="8228160" cy="1141560"/></a:xfrm><a:prstGeom prst="rect"><a:avLst></a:avLst></a:prstGeom><a:noFill/><a:ln><a:noFill/></a:ln></p:spPr><p:style><a:lnRef idx="0"></a:lnRef><a:fillRef idx="0"/><a:effectRef idx="0"></a:effectRef><a:fontRef idx="minor"/></p:style><p:txBody><a:bodyPr lIns="90000" rIns="90000" tIns="45000" bIns="45000" anchor="ctr"></a:bodyPr><a:p><a:pPr algn="ctr"><a:lnSpc><a:spcPct val="100000"/></a:lnSpc></a:pPr><a:r><a:rPr lang="fr-FR" sz="4400" spc="-1" strike="noStrike"><a:solidFill><a:srgbClr val="000000"/></a:solidFill><a:uFill><a:solidFill><a:srgbClr val="ffffff"/></a:solidFill></a:uFill><a:latin typeface="Calibri"/><a:ea typeface="DejaVu Sans"/></a:rPr><a:t>Table des limites microbiologiques par classe (en UFC)</a:t></a:r><a:endParaRPr/></a:p></p:txBody></p:sp><p:graphicFrame><p:nvGraphicFramePr><p:cNvPr id="85" name="Table 2"/><p:cNvGraphicFramePr/><p:nvPr/></p:nvGraphicFramePr><p:xfrm><a:off x="64440" y="1556640"/><a:ext cx="8899200" cy="2559960"/></p:xfrm><a:graphic><a:graphicData uri="http://schemas.openxmlformats.org/drawingml/2006/table"><a:tbl><a:tblPr/><a:tblGrid><a:gridCol w="2114280"/><a:gridCol w="1423800"/><a:gridCol w="1423800"/><a:gridCol w="1848960"/><a:gridCol w="998640"/><a:gridCol w="1090080"/></a:tblGrid><a:tr h="640080"><a:tc><a:txBody><a:bodyPr></a:bodyPr><a:p><a:pPr><a:lnSpc><a:spcPct val="100000"/></a:lnSpc></a:pPr><a:r><a:rPr b="1" lang="fr-FR" sz="1800" spc="-1" strike="noStrike"><a:solidFill><a:srgbClr val="ffffff"/></a:solidFill><a:uFill><a:solidFill><a:srgbClr val="ffffff"/></a:solidFill></a:uFill><a:latin typeface="Calibri"/></a:rPr><a:t>Etiquette</a:t></a:r><a:endParaRPr/></a:p></a:txBody><a:tcPr marL="91440" marR="91440"><a:lnL w="12240"><a:solidFill><a:srgbClr val="ffffff"/></a:solidFill></a:lnL><a:lnR w="12240"><a:solidFill><a:srgbClr val="ffffff"/></a:solidFill></a:lnR><a:lnT w="12240"><a:solidFill><a:srgbClr val="ffffff"/></a:solidFill></a:lnT><a:lnB w="38160"><a:solidFill><a:srgbClr val="ffffff"/></a:solidFill></a:lnB><a:solidFill><a:srgbClr val="4f81bd"/></a:solidFill></a:tcPr></a:tc><a:tc><a:txBody><a:bodyPr></a:bodyPr><a:p><a:pPr><a:lnSpc><a:spcPct val="100000"/></a:lnSpc></a:pPr><a:r><a:rPr b="1" lang="fr-FR" sz="1800" spc="-1" strike="noStrike"><a:solidFill><a:srgbClr val="ffffff"/></a:solidFill><a:uFill><a:solidFill><a:srgbClr val="ffffff"/></a:solidFill></a:uFill><a:latin typeface="Calibri"/></a:rPr><a:t>Nom de variable</a:t></a:r><a:endParaRPr/></a:p></a:txBody><a:tcPr marL="91440" marR="91440"><a:lnL w="12240"><a:solidFill><a:srgbClr val="ffffff"/></a:solidFill></a:lnL><a:lnR w="12240"><a:solidFill><a:srgbClr val="ffffff"/></a:solidFill></a:lnR><a:lnT w="12240"><a:solidFill><a:srgbClr val="ffffff"/></a:solidFill></a:lnT><a:lnB w="38160"><a:solidFill><a:srgbClr val="ffffff"/></a:solidFill></a:lnB><a:solidFill><a:srgbClr val="4f81bd"/></a:solidFill></a:tcPr></a:tc><a:tc><a:txBody><a:bodyPr></a:bodyPr><a:p><a:pPr><a:lnSpc><a:spcPct val="100000"/></a:lnSpc></a:pPr><a:r><a:rPr b="1" lang="fr-FR" sz="1800" spc="-1" strike="noStrike"><a:solidFill><a:srgbClr val="ffffff"/></a:solidFill><a:uFill><a:solidFill><a:srgbClr val="ffffff"/></a:solidFill></a:uFill><a:latin typeface="Calibri"/></a:rPr><a:t>Type</a:t></a:r><a:endParaRPr/></a:p></a:txBody><a:tcPr marL="91440" marR="91440"><a:lnL w="12240"><a:solidFill><a:srgbClr val="ffffff"/></a:solidFill></a:lnL><a:lnR w="12240"><a:solidFill><a:srgbClr val="ffffff"/></a:solidFill></a:lnR><a:lnT w="12240"><a:solidFill><a:srgbClr val="ffffff"/></a:solidFill></a:lnT><a:lnB w="38160"><a:solidFill><a:srgbClr val="ffffff"/></a:solidFill></a:lnB><a:solidFill><a:srgbClr val="4f81bd"/></a:solidFill></a:tcPr></a:tc><a:tc><a:txBody><a:bodyPr></a:bodyPr><a:p><a:pPr><a:lnSpc><a:spcPct val="100000"/></a:lnSpc></a:pPr><a:r><a:rPr b="1" lang="fr-FR" sz="1800" spc="-1" strike="noStrike"><a:solidFill><a:srgbClr val="ffffff"/></a:solidFill><a:uFill><a:solidFill><a:srgbClr val="ffffff"/></a:solidFill></a:uFill><a:latin typeface="Calibri"/></a:rPr><a:t>Table</a:t></a:r><a:endParaRPr/></a:p></a:txBody><a:tcPr marL="91440" marR="91440"><a:lnL w="12240"><a:solidFill><a:srgbClr val="ffffff"/></a:solidFill></a:lnL><a:lnR w="12240"><a:solidFill><a:srgbClr val="ffffff"/></a:solidFill></a:lnR><a:lnT w="12240"><a:solidFill><a:srgbClr val="ffffff"/></a:solidFill></a:lnT><a:lnB w="38160"><a:solidFill><a:srgbClr val="ffffff"/></a:solidFill></a:lnB><a:solidFill><a:srgbClr val="4f81bd"/></a:solidFill></a:tcPr></a:tc><a:tc><a:txBody><a:bodyPr></a:bodyPr><a:p><a:pPr><a:lnSpc><a:spcPct val="100000"/></a:lnSpc></a:pPr><a:r><a:rPr b="1" lang="fr-FR" sz="1800" spc="-1" strike="noStrike"><a:solidFill><a:srgbClr val="ffffff"/></a:solidFill><a:uFill><a:solidFill><a:srgbClr val="ffffff"/></a:solidFill></a:uFill><a:latin typeface="Calibri"/></a:rPr><a:t>Clé </a:t></a:r><a:endParaRPr/></a:p><a:p><a:pPr><a:lnSpc><a:spcPct val="100000"/></a:lnSpc></a:pPr><a:r><a:rPr b="1" lang="fr-FR" sz="1800" spc="-1" strike="noStrike"><a:solidFill><a:srgbClr val="ffffff"/></a:solidFill><a:uFill><a:solidFill><a:srgbClr val="ffffff"/></a:solidFill></a:uFill><a:latin typeface="Calibri"/></a:rPr><a:t>primaire</a:t></a:r><a:endParaRPr/></a:p></a:txBody><a:tcPr marL="91440" marR="91440"><a:lnL w="12240"><a:solidFill><a:srgbClr val="ffffff"/></a:solidFill></a:lnL><a:lnR w="12240"><a:solidFill><a:srgbClr val="ffffff"/></a:solidFill></a:lnR><a:lnT w="12240"><a:solidFill><a:srgbClr val="ffffff"/></a:solidFill></a:lnT><a:lnB w="38160"><a:solidFill><a:srgbClr val="ffffff"/></a:solidFill></a:lnB><a:solidFill><a:srgbClr val="4f81bd"/></a:solidFill></a:tcPr></a:tc><a:tc><a:txBody><a:bodyPr></a:bodyPr><a:p><a:pPr><a:lnSpc><a:spcPct val="100000"/></a:lnSpc></a:pPr><a:r><a:rPr b="1" lang="fr-FR" sz="1800" spc="-1" strike="noStrike"><a:solidFill><a:srgbClr val="ffffff"/></a:solidFill><a:uFill><a:solidFill><a:srgbClr val="ffffff"/></a:solidFill></a:uFill><a:latin typeface="Calibri"/></a:rPr><a:t>Clé étrangère</a:t></a:r><a:endParaRPr/></a:p></a:txBody><a:tcPr marL="91440" marR="91440"><a:lnL w="12240"><a:solidFill><a:srgbClr val="ffffff"/></a:solidFill></a:lnL><a:lnR w="12240"><a:solidFill><a:srgbClr val="ffffff"/></a:solidFill></a:lnR><a:lnT w="12240"><a:solidFill><a:srgbClr val="ffffff"/></a:solidFill></a:lnT><a:lnB w="38160"><a:solidFill><a:srgbClr val="ffffff"/></a:solidFill></a:lnB><a:solidFill><a:srgbClr val="4f81bd"/></a:solidFill></a:tcPr></a:tc></a:tr><a:tr h="640080"><a:tc><a:txBody><a:bodyPr></a:bodyPr><a:p><a:pPr><a:lnSpc><a:spcPct val="100000"/></a:lnSpc></a:pPr><a:r><a:rPr lang="fr-FR" sz="1800" spc="-1" strike="noStrike"><a:solidFill><a:srgbClr val="000000"/></a:solidFill><a:uFill><a:solidFill><a:srgbClr val="ffffff"/></a:solidFill></a:uFill><a:latin typeface="Calibri"/></a:rPr><a:t>Classe</a:t></a:r><a:endParaRPr/></a:p></a:txBody><a:tcPr marL="91440" marR="91440"><a:lnL w="12240"><a:solidFill><a:srgbClr val="ffffff"/></a:solidFill></a:lnL><a:lnR w="12240"><a:solidFill><a:srgbClr val="ffffff"/></a:solidFill></a:lnR><a:lnT w="12240"><a:solidFill><a:srgbClr val="ffffff"/></a:solidFill></a:lnT><a:lnB w="12240"><a:solidFill><a:srgbClr val="ffffff"/></a:solidFill></a:lnB><a:solidFill><a:srgbClr val="d0d8e7"/></a:solidFill></a:tcPr></a:tc><a:tc><a:txBody><a:bodyPr></a:bodyPr><a:p><a:pPr><a:lnSpc><a:spcPct val="100000"/></a:lnSpc></a:pPr><a:r><a:rPr lang="fr-FR" sz="1800" spc="-1" strike="noStrike"><a:solidFill><a:srgbClr val="000000"/></a:solidFill><a:uFill><a:solidFill><a:srgbClr val="ffffff"/></a:solidFill></a:uFill><a:latin typeface="Calibri"/></a:rPr><a:t>Classe</a:t></a:r><a:endParaRPr/></a:p></a:txBody><a:tcPr marL="91440" marR="91440"><a:lnL w="12240"><a:solidFill><a:srgbClr val="ffffff"/></a:solidFill></a:lnL><a:lnR w="12240"><a:solidFill><a:srgbClr val="ffffff"/></a:solidFill></a:lnR><a:lnT w="12240"><a:solidFill><a:srgbClr val="ffffff"/></a:solidFill></a:lnT><a:lnB w="12240"><a:solidFill><a:srgbClr val="ffffff"/></a:solidFill></a:lnB><a:solidFill><a:srgbClr val="d0d8e7"/></a:solidFill></a:tcPr></a:tc><a:tc><a:txBody><a:bodyPr></a:bodyPr><a:p><a:pPr><a:lnSpc><a:spcPct val="100000"/></a:lnSpc></a:pPr><a:r><a:rPr lang="fr-FR" sz="1800" spc="-1" strike="noStrike"><a:solidFill><a:srgbClr val="000000"/></a:solidFill><a:uFill><a:solidFill><a:srgbClr val="ffffff"/></a:solidFill></a:uFill><a:latin typeface="Calibri"/></a:rPr><a:t>Text</a:t></a:r><a:endParaRPr/></a:p></a:txBody><a:tcPr marL="91440" marR="91440"><a:lnL w="12240"><a:solidFill><a:srgbClr val="ffffff"/></a:solidFill></a:lnL><a:lnR w="12240"><a:solidFill><a:srgbClr val="ffffff"/></a:solidFill></a:lnR><a:lnT w="12240"><a:solidFill><a:srgbClr val="ffffff"/></a:solidFill></a:lnT><a:lnB w="12240"><a:solidFill><a:srgbClr val="ffffff"/></a:solidFill></a:lnB><a:solidFill><a:srgbClr val="d0d8e7"/></a:solidFill></a:tcPr></a:tc><a:tc rowSpan="3"><a:txBody><a:bodyPr></a:bodyPr><a:p><a:pPr><a:lnSpc><a:spcPct val="100000"/></a:lnSpc></a:pPr><a:r><a:rPr lang="fr-FR" sz="1800" spc="-1" strike="noStrike"><a:solidFill><a:srgbClr val="000000"/></a:solidFill><a:uFill><a:solidFill><a:srgbClr val="ffffff"/></a:solidFill></a:uFill><a:latin typeface="Calibri"/></a:rPr><a:t>Class_limites</a:t></a:r><a:endParaRPr/></a:p></a:txBody><a:tcPr marL="91440" marR="91440"><a:lnL w="12240"><a:solidFill><a:srgbClr val="ffffff"/></a:solidFill></a:lnL><a:lnR w="12240"><a:solidFill><a:srgbClr val="ffffff"/></a:solidFill></a:lnR><a:lnT w="12240"><a:solidFill><a:srgbClr val="ffffff"/></a:solidFill></a:lnT><a:lnB w="12240"><a:solidFill><a:srgbClr val="ffffff"/></a:solidFill></a:lnB><a:solidFill><a:srgbClr val="d0d8e7"/></a:solidFill></a:tcPr></a:tc><a:tc rowSpan="3"><a:txBody><a:bodyPr></a:bodyPr><a:p><a:pPr><a:lnSpc><a:spcPct val="100000"/></a:lnSpc></a:pPr><a:r><a:rPr lang="fr-FR" sz="1800" spc="-1" strike="noStrike"><a:solidFill><a:srgbClr val="000000"/></a:solidFill><a:uFill><a:solidFill><a:srgbClr val="ffffff"/></a:solidFill></a:uFill><a:latin typeface="Calibri"/></a:rPr><a:t>ID</a:t></a:r><a:endParaRPr/></a:p></a:txBody><a:tcPr marL="91440" marR="91440"><a:lnL w="12240"><a:solidFill><a:srgbClr val="ffffff"/></a:solidFill></a:lnL><a:lnR w="12240"><a:solidFill><a:srgbClr val="ffffff"/></a:solidFill></a:lnR><a:lnT w="12240"><a:solidFill><a:srgbClr val="ffffff"/></a:solidFill></a:lnT><a:lnB w="12240"><a:solidFill><a:srgbClr val="ffffff"/></a:solidFill></a:lnB><a:solidFill><a:srgbClr val="d0d8e7"/></a:solidFill></a:tcPr></a:tc><a:tc rowSpan="3"><a:txBody><a:bodyPr></a:bodyPr><a:p><a:pPr><a:lnSpc><a:spcPct val="100000"/></a:lnSpc></a:pPr><a:r><a:rPr lang="fr-FR" sz="1800" spc="-1" strike="noStrike"><a:solidFill><a:srgbClr val="000000"/></a:solidFill><a:uFill><a:solidFill><a:srgbClr val="ffffff"/></a:solidFill></a:uFill><a:latin typeface="Calibri"/></a:rPr><a:t>N/A</a:t></a:r><a:endParaRPr/></a:p></a:txBody><a:tcPr marL="91440" marR="91440"><a:lnL w="12240"><a:solidFill><a:srgbClr val="ffffff"/></a:solidFill></a:lnL><a:lnR w="12240"><a:solidFill><a:srgbClr val="ffffff"/></a:solidFill></a:lnR><a:lnT w="12240"><a:solidFill><a:srgbClr val="ffffff"/></a:solidFill></a:lnT><a:lnB w="12240"><a:solidFill><a:srgbClr val="ffffff"/></a:solidFill></a:lnB><a:solidFill><a:srgbClr val="d0d8e7"/></a:solidFill></a:tcPr></a:tc></a:tr><a:tr h="640080"><a:tc><a:txBody><a:bodyPr></a:bodyPr><a:p><a:pPr><a:lnSpc><a:spcPct val="100000"/></a:lnSpc></a:pPr><a:r><a:rPr lang="fr-FR" sz="1800" spc="-1" strike="noStrike"><a:solidFill><a:srgbClr val="000000"/></a:solidFill><a:uFill><a:solidFill><a:srgbClr val="ffffff"/></a:solidFill></a:uFill><a:latin typeface="Calibri"/></a:rPr><a:t>Type</a:t></a:r><a:endParaRPr/></a:p></a:txBody><a:tcPr marL="91440" marR="91440"><a:lnL w="12240"><a:solidFill><a:srgbClr val="ffffff"/></a:solidFill></a:lnL><a:lnR w="12240"><a:solidFill><a:srgbClr val="ffffff"/></a:solidFill></a:lnR><a:lnT w="12240"><a:solidFill><a:srgbClr val="ffffff"/></a:solidFill></a:lnT><a:lnB w="12240"><a:solidFill><a:srgbClr val="ffffff"/></a:solidFill></a:lnB><a:solidFill><a:srgbClr val="e9ecf3"/></a:solidFill></a:tcPr></a:tc><a:tc><a:txBody><a:bodyPr></a:bodyPr><a:p><a:pPr><a:lnSpc><a:spcPct val="100000"/></a:lnSpc></a:pPr><a:r><a:rPr lang="fr-FR" sz="1800" spc="-1" strike="noStrike"><a:solidFill><a:srgbClr val="000000"/></a:solidFill><a:uFill><a:solidFill><a:srgbClr val="ffffff"/></a:solidFill></a:uFill><a:latin typeface="Calibri"/></a:rPr><a:t>Type</a:t></a:r><a:endParaRPr/></a:p></a:txBody><a:tcPr marL="91440" marR="91440"><a:lnL w="12240"><a:solidFill><a:srgbClr val="ffffff"/></a:solidFill></a:lnL><a:lnR w="12240"><a:solidFill><a:srgbClr val="ffffff"/></a:solidFill></a:lnR><a:lnT w="12240"><a:solidFill><a:srgbClr val="ffffff"/></a:solidFill></a:lnT><a:lnB w="12240"><a:solidFill><a:srgbClr val="ffffff"/></a:solidFill></a:lnB><a:solidFill><a:srgbClr val="e9ecf3"/></a:solidFill></a:tcPr></a:tc><a:tc><a:txBody><a:bodyPr></a:bodyPr><a:p><a:pPr><a:lnSpc><a:spcPct val="100000"/></a:lnSpc></a:pPr><a:r><a:rPr lang="fr-FR" sz="1800" spc="-1" strike="noStrike"><a:solidFill><a:srgbClr val="000000"/></a:solidFill><a:uFill><a:solidFill><a:srgbClr val="ffffff"/></a:solidFill></a:uFill><a:latin typeface="Calibri"/></a:rPr><a:t>Text</a:t></a:r><a:endParaRPr/></a:p></a:txBody><a:tcPr marL="91440" marR="91440"><a:lnL w="12240"><a:solidFill><a:srgbClr val="ffffff"/></a:solidFill></a:lnL><a:lnR w="12240"><a:solidFill><a:srgbClr val="ffffff"/></a:solidFill></a:lnR><a:lnT w="12240"><a:solidFill><a:srgbClr val="ffffff"/></a:solidFill></a:lnT><a:lnB w="12240"><a:solidFill><a:srgbClr val="ffffff"/></a:solidFill></a:lnB><a:solidFill><a:srgbClr val="e9ecf3"/></a:solidFill></a:tcPr></a:tc><a:tc vMerge="1"><a:tcPr><a:solidFill><a:srgbClr val="729fcf"/></a:solidFill></a:tcPr></a:tc><a:tc vMerge="1"><a:tcPr><a:solidFill><a:srgbClr val="729fcf"/></a:solidFill></a:tcPr></a:tc><a:tc vMerge="1"><a:tcPr><a:solidFill><a:srgbClr val="729fcf"/></a:solidFill></a:tcPr></a:tc></a:tr><a:tr h="640080"><a:tc><a:txBody><a:bodyPr></a:bodyPr><a:p><a:pPr><a:lnSpc><a:spcPct val="100000"/></a:lnSpc></a:pPr><a:r><a:rPr lang="fr-FR" sz="1800" spc="-1" strike="noStrike"><a:solidFill><a:srgbClr val="000000"/></a:solidFill><a:uFill><a:solidFill><a:srgbClr val="ffffff"/></a:solidFill></a:uFill><a:latin typeface="Calibri"/></a:rPr><a:t>Limite</a:t></a:r><a:endParaRPr/></a:p></a:txBody><a:tcPr marL="91440" marR="91440"><a:lnL w="12240"><a:solidFill><a:srgbClr val="ffffff"/></a:solidFill></a:lnL><a:lnR w="12240"><a:solidFill><a:srgbClr val="ffffff"/></a:solidFill></a:lnR><a:lnT w="12240"><a:solidFill><a:srgbClr val="ffffff"/></a:solidFill></a:lnT><a:lnB w="12240"><a:solidFill><a:srgbClr val="ffffff"/></a:solidFill></a:lnB><a:solidFill><a:srgbClr val="d0d8e7"/></a:solidFill></a:tcPr></a:tc><a:tc><a:txBody><a:bodyPr></a:bodyPr><a:p><a:pPr><a:lnSpc><a:spcPct val="100000"/></a:lnSpc></a:pPr><a:r><a:rPr lang="fr-FR" sz="1800" spc="-1" strike="noStrike"><a:solidFill><a:srgbClr val="000000"/></a:solidFill><a:uFill><a:solidFill><a:srgbClr val="ffffff"/></a:solidFill></a:uFill><a:latin typeface="Calibri"/></a:rPr><a:t>Limite</a:t></a:r><a:endParaRPr/></a:p></a:txBody><a:tcPr marL="91440" marR="91440"><a:lnL w="12240"><a:solidFill><a:srgbClr val="ffffff"/></a:solidFill></a:lnL><a:lnR w="12240"><a:solidFill><a:srgbClr val="ffffff"/></a:solidFill></a:lnR><a:lnT w="12240"><a:solidFill><a:srgbClr val="ffffff"/></a:solidFill></a:lnT><a:lnB w="12240"><a:solidFill><a:srgbClr val="ffffff"/></a:solidFill></a:lnB><a:solidFill><a:srgbClr val="d0d8e7"/></a:solidFill></a:tcPr></a:tc><a:tc><a:txBody><a:bodyPr></a:bodyPr><a:p><a:pPr><a:lnSpc><a:spcPct val="100000"/></a:lnSpc></a:pPr><a:r><a:rPr lang="fr-FR" sz="1800" spc="-1" strike="noStrike"><a:solidFill><a:srgbClr val="000000"/></a:solidFill><a:uFill><a:solidFill><a:srgbClr val="ffffff"/></a:solidFill></a:uFill><a:latin typeface="Calibri"/></a:rPr><a:t>Integer</a:t></a:r><a:endParaRPr/></a:p></a:txBody><a:tcPr marL="91440" marR="91440"><a:lnL w="12240"><a:solidFill><a:srgbClr val="ffffff"/></a:solidFill></a:lnL><a:lnR w="12240"><a:solidFill><a:srgbClr val="ffffff"/></a:solidFill></a:lnR><a:lnT w="12240"><a:solidFill><a:srgbClr val="ffffff"/></a:solidFill></a:lnT><a:lnB w="12240"><a:solidFill><a:srgbClr val="ffffff"/></a:solidFill></a:lnB><a:solidFill><a:srgbClr val="d0d8e7"/></a:solidFill></a:tcPr></a:tc><a:tcPr><a:solidFill><a:srgbClr val="729fcf"/></a:solidFill></a:tcPr></a:tc><a:tcPr><a:solidFill><a:srgbClr val="729fcf"/></a:solidFill></a:tcPr></a:tc><a:tcPr><a:solidFill><a:srgbClr val="729fcf"/></a:solidFill></a:tcPr></a:tc></a:tr></a:tbl></a:graphicData></a:graphic></p:graphicFrame></p:spTree></p:cSld><p:timing><p:tnLst><p:par><p:cTn id="13" dur="indefinite" restart="never" nodeType="tmRoot"><p:childTnLst><p:seq><p:cTn id="14" nodeType="mainSeq"></p:cTn><p:prevCondLst><p:cond delay="0" evt="onPrev"><p:tgtEl><p:sldTgt/></p:tgtEl></p:cond></p:prevCondLst><p:nextCondLst><p:cond delay="0" evt="onNext"><p:tgtEl><p:sldTgt/></p:tgtEl></p:cond></p:nextCondLst></p:seq></p:childTnLst></p:cTn></p:par></p:tnLst></p:timing></p:sld>
 </file>
 
 <file path=ppt/slides/slide8.xml><?xml version="1.0" encoding="UTF-8" standalone="yes"?>
-<p:sld xmlns:a="http://schemas.openxmlformats.org/drawingml/2006/main" xmlns:p="http://schemas.openxmlformats.org/presentationml/2006/main" xmlns:r="http://schemas.openxmlformats.org/officeDocument/2006/relationships"><p:cSld><p:spTree><p:nvGrpSpPr>        <p:cNvPr id="1" name=""/>        <p:cNvGrpSpPr/>        <p:nvPr/>      </p:nvGrpSpPr>      <p:grpSpPr>        <a:xfrm>          <a:off x="0" y="0"/>          <a:ext cx="0" cy="0"/>          <a:chOff x="0" y="0"/>          <a:chExt cx="0" cy="0"/>        </a:xfrm>      </p:grpSpPr><p:sp><p:nvSpPr><p:cNvPr id="86" name="CustomShape 1"></p:cNvPr><p:cNvSpPr/><p:nvPr/></p:nvSpPr><p:spPr><a:xfrm><a:off x="457200" y="274680"/><a:ext cx="8228520" cy="1141920"/></a:xfrm><a:prstGeom prst="rect"><a:avLst></a:avLst></a:prstGeom><a:noFill/><a:ln><a:noFill/></a:ln></p:spPr><p:style><a:lnRef idx="0"></a:lnRef><a:fillRef idx="0"/><a:effectRef idx="0"></a:effectRef><a:fontRef idx="minor"/></p:style><p:txBody><a:bodyPr lIns="90000" rIns="90000" tIns="45000" bIns="45000" anchor="ctr"></a:bodyPr><a:p><a:pPr algn="ctr"><a:lnSpc><a:spcPct val="100000"/></a:lnSpc></a:pPr><a:r><a:rPr lang="fr-FR" sz="4400" spc="-1" strike="noStrike"><a:solidFill><a:srgbClr val="000000"/></a:solidFill><a:uFill><a:solidFill><a:srgbClr val="ffffff"/></a:solidFill></a:uFill><a:latin typeface="Calibri"/><a:ea typeface="DejaVu Sans"/></a:rPr><a:t>Table des points de prélèvement</a:t></a:r><a:endParaRPr/></a:p></p:txBody></p:sp><p:graphicFrame><p:nvGraphicFramePr><p:cNvPr id="87" name="Table 2"/><p:cNvGraphicFramePr/><p:nvPr/></p:nvGraphicFramePr><p:xfrm><a:off x="64440" y="1418400"/><a:ext cx="8971200" cy="1076040"/></p:xfrm><a:graphic><a:graphicData uri="http://schemas.openxmlformats.org/drawingml/2006/table"><a:tbl><a:tblPr/><a:tblGrid><a:gridCol w="2131200"/><a:gridCol w="1435320"/><a:gridCol w="796320"/><a:gridCol w="1152000"/><a:gridCol w="1440000"/><a:gridCol w="2016720"/></a:tblGrid><a:tr h="448920"><a:tc><a:txBody><a:bodyPr></a:bodyPr><a:p><a:pPr><a:lnSpc><a:spcPct val="100000"/></a:lnSpc></a:pPr><a:r><a:rPr b="1" lang="fr-FR" sz="1200" spc="-1" strike="noStrike"><a:solidFill><a:srgbClr val="ffffff"/></a:solidFill><a:uFill><a:solidFill><a:srgbClr val="ffffff"/></a:solidFill></a:uFill><a:latin typeface="Calibri"/></a:rPr><a:t>Etiquette</a:t></a:r><a:endParaRPr/></a:p></a:txBody><a:tcPr marL="91440" marR="91440"><a:lnL w="12240"><a:solidFill><a:srgbClr val="ffffff"/></a:solidFill></a:lnL><a:lnR w="12240"><a:solidFill><a:srgbClr val="ffffff"/></a:solidFill></a:lnR><a:lnT w="12240"><a:solidFill><a:srgbClr val="ffffff"/></a:solidFill></a:lnT><a:lnB w="38160"><a:solidFill><a:srgbClr val="ffffff"/></a:solidFill></a:lnB><a:solidFill><a:srgbClr val="4f81bd"/></a:solidFill></a:tcPr></a:tc><a:tc><a:txBody><a:bodyPr></a:bodyPr><a:p><a:pPr><a:lnSpc><a:spcPct val="100000"/></a:lnSpc></a:pPr><a:r><a:rPr b="1" lang="fr-FR" sz="1200" spc="-1" strike="noStrike"><a:solidFill><a:srgbClr val="ffffff"/></a:solidFill><a:uFill><a:solidFill><a:srgbClr val="ffffff"/></a:solidFill></a:uFill><a:latin typeface="Calibri"/></a:rPr><a:t>Nom de variable</a:t></a:r><a:endParaRPr/></a:p></a:txBody><a:tcPr marL="91440" marR="91440"><a:lnL w="12240"><a:solidFill><a:srgbClr val="ffffff"/></a:solidFill></a:lnL><a:lnR w="12240"><a:solidFill><a:srgbClr val="ffffff"/></a:solidFill></a:lnR><a:lnT w="12240"><a:solidFill><a:srgbClr val="ffffff"/></a:solidFill></a:lnT><a:lnB w="38160"><a:solidFill><a:srgbClr val="ffffff"/></a:solidFill></a:lnB><a:solidFill><a:srgbClr val="4f81bd"/></a:solidFill></a:tcPr></a:tc><a:tc><a:txBody><a:bodyPr></a:bodyPr><a:p><a:pPr><a:lnSpc><a:spcPct val="100000"/></a:lnSpc></a:pPr><a:r><a:rPr b="1" lang="fr-FR" sz="1200" spc="-1" strike="noStrike"><a:solidFill><a:srgbClr val="ffffff"/></a:solidFill><a:uFill><a:solidFill><a:srgbClr val="ffffff"/></a:solidFill></a:uFill><a:latin typeface="Calibri"/></a:rPr><a:t>Type</a:t></a:r><a:endParaRPr/></a:p></a:txBody><a:tcPr marL="91440" marR="91440"><a:lnL w="12240"><a:solidFill><a:srgbClr val="ffffff"/></a:solidFill></a:lnL><a:lnR w="12240"><a:solidFill><a:srgbClr val="ffffff"/></a:solidFill></a:lnR><a:lnT w="12240"><a:solidFill><a:srgbClr val="ffffff"/></a:solidFill></a:lnT><a:lnB w="38160"><a:solidFill><a:srgbClr val="ffffff"/></a:solidFill></a:lnB><a:solidFill><a:srgbClr val="4f81bd"/></a:solidFill></a:tcPr></a:tc><a:tc><a:txBody><a:bodyPr></a:bodyPr><a:p><a:pPr><a:lnSpc><a:spcPct val="100000"/></a:lnSpc></a:pPr><a:r><a:rPr b="1" lang="fr-FR" sz="1200" spc="-1" strike="noStrike"><a:solidFill><a:srgbClr val="ffffff"/></a:solidFill><a:uFill><a:solidFill><a:srgbClr val="ffffff"/></a:solidFill></a:uFill><a:latin typeface="Calibri"/></a:rPr><a:t>Table</a:t></a:r><a:endParaRPr/></a:p></a:txBody><a:tcPr marL="91440" marR="91440"><a:lnL w="12240"><a:solidFill><a:srgbClr val="ffffff"/></a:solidFill></a:lnL><a:lnR w="12240"><a:solidFill><a:srgbClr val="ffffff"/></a:solidFill></a:lnR><a:lnT w="12240"><a:solidFill><a:srgbClr val="ffffff"/></a:solidFill></a:lnT><a:lnB w="38160"><a:solidFill><a:srgbClr val="ffffff"/></a:solidFill></a:lnB><a:solidFill><a:srgbClr val="4f81bd"/></a:solidFill></a:tcPr></a:tc><a:tc><a:txBody><a:bodyPr></a:bodyPr><a:p><a:pPr><a:lnSpc><a:spcPct val="100000"/></a:lnSpc></a:pPr><a:r><a:rPr b="1" lang="fr-FR" sz="1200" spc="-1" strike="noStrike"><a:solidFill><a:srgbClr val="ffffff"/></a:solidFill><a:uFill><a:solidFill><a:srgbClr val="ffffff"/></a:solidFill></a:uFill><a:latin typeface="Calibri"/></a:rPr><a:t>Clé  primaire</a:t></a:r><a:endParaRPr/></a:p></a:txBody><a:tcPr marL="91440" marR="91440"><a:lnL w="12240"><a:solidFill><a:srgbClr val="ffffff"/></a:solidFill></a:lnL><a:lnR w="12240"><a:solidFill><a:srgbClr val="ffffff"/></a:solidFill></a:lnR><a:lnT w="12240"><a:solidFill><a:srgbClr val="ffffff"/></a:solidFill></a:lnT><a:lnB w="38160"><a:solidFill><a:srgbClr val="ffffff"/></a:solidFill></a:lnB><a:solidFill><a:srgbClr val="4f81bd"/></a:solidFill></a:tcPr></a:tc><a:tc><a:txBody><a:bodyPr></a:bodyPr><a:p><a:pPr><a:lnSpc><a:spcPct val="100000"/></a:lnSpc></a:pPr><a:r><a:rPr b="1" lang="fr-FR" sz="1200" spc="-1" strike="noStrike"><a:solidFill><a:srgbClr val="ffffff"/></a:solidFill><a:uFill><a:solidFill><a:srgbClr val="ffffff"/></a:solidFill></a:uFill><a:latin typeface="Calibri"/></a:rPr><a:t>Clé étrangère</a:t></a:r><a:endParaRPr/></a:p></a:txBody><a:tcPr marL="91440" marR="91440"><a:lnL w="12240"><a:solidFill><a:srgbClr val="ffffff"/></a:solidFill></a:lnL><a:lnR w="12240"><a:solidFill><a:srgbClr val="ffffff"/></a:solidFill></a:lnR><a:lnT w="12240"><a:solidFill><a:srgbClr val="ffffff"/></a:solidFill></a:lnT><a:lnB w="38160"><a:solidFill><a:srgbClr val="ffffff"/></a:solidFill></a:lnB><a:solidFill><a:srgbClr val="4f81bd"/></a:solidFill></a:tcPr></a:tc></a:tr><a:tr h="627480"><a:tc><a:txBody><a:bodyPr></a:bodyPr><a:p><a:pPr><a:lnSpc><a:spcPct val="100000"/></a:lnSpc></a:pPr><a:r><a:rPr lang="fr-FR" sz="1200" spc="-1" strike="noStrike"><a:solidFill><a:srgbClr val="000000"/></a:solidFill><a:uFill><a:solidFill><a:srgbClr val="ffffff"/></a:solidFill></a:uFill><a:latin typeface="Calibri"/></a:rPr><a:t>Point</a:t></a:r><a:endParaRPr/></a:p></a:txBody><a:tcPr marL="91440" marR="91440"><a:lnL w="12240"><a:solidFill><a:srgbClr val="ffffff"/></a:solidFill></a:lnL><a:lnR w="12240"><a:solidFill><a:srgbClr val="ffffff"/></a:solidFill></a:lnR><a:lnT w="12240"><a:solidFill><a:srgbClr val="ffffff"/></a:solidFill></a:lnT><a:lnB w="12240"><a:solidFill><a:srgbClr val="ffffff"/></a:solidFill></a:lnB><a:solidFill><a:srgbClr val="d0d8e7"/></a:solidFill></a:tcPr></a:tc><a:tc><a:txBody><a:bodyPr></a:bodyPr><a:p><a:pPr><a:lnSpc><a:spcPct val="100000"/></a:lnSpc></a:pPr><a:r><a:rPr lang="fr-FR" sz="1200" spc="-1" strike="noStrike"><a:solidFill><a:srgbClr val="000000"/></a:solidFill><a:uFill><a:solidFill><a:srgbClr val="ffffff"/></a:solidFill></a:uFill><a:latin typeface="Calibri"/></a:rPr><a:t>Point</a:t></a:r><a:endParaRPr/></a:p></a:txBody><a:tcPr marL="91440" marR="91440"><a:lnL w="12240"><a:solidFill><a:srgbClr val="ffffff"/></a:solidFill></a:lnL><a:lnR w="12240"><a:solidFill><a:srgbClr val="ffffff"/></a:solidFill></a:lnR><a:lnT w="12240"><a:solidFill><a:srgbClr val="ffffff"/></a:solidFill></a:lnT><a:lnB w="12240"><a:solidFill><a:srgbClr val="ffffff"/></a:solidFill></a:lnB><a:solidFill><a:srgbClr val="d0d8e7"/></a:solidFill></a:tcPr></a:tc><a:tc><a:txBody><a:bodyPr></a:bodyPr><a:p><a:pPr><a:lnSpc><a:spcPct val="100000"/></a:lnSpc></a:pPr><a:r><a:rPr lang="fr-FR" sz="1200" spc="-1" strike="noStrike"><a:solidFill><a:srgbClr val="000000"/></a:solidFill><a:uFill><a:solidFill><a:srgbClr val="ffffff"/></a:solidFill></a:uFill><a:latin typeface="Calibri"/></a:rPr><a:t>Text</a:t></a:r><a:endParaRPr/></a:p></a:txBody><a:tcPr marL="91440" marR="91440"><a:lnL w="12240"><a:solidFill><a:srgbClr val="ffffff"/></a:solidFill></a:lnL><a:lnR w="12240"><a:solidFill><a:srgbClr val="ffffff"/></a:solidFill></a:lnR><a:lnT w="12240"><a:solidFill><a:srgbClr val="ffffff"/></a:solidFill></a:lnT><a:lnB w="12240"><a:solidFill><a:srgbClr val="ffffff"/></a:solidFill></a:lnB><a:solidFill><a:srgbClr val="d0d8e7"/></a:solidFill></a:tcPr></a:tc><a:tc rowSpan="2"><a:txBody><a:bodyPr></a:bodyPr><a:p><a:pPr><a:lnSpc><a:spcPct val="100000"/></a:lnSpc></a:pPr><a:r><a:rPr lang="fr-FR" sz="1200" spc="-1" strike="noStrike"><a:solidFill><a:srgbClr val="000000"/></a:solidFill><a:uFill><a:solidFill><a:srgbClr val="ffffff"/></a:solidFill></a:uFill><a:latin typeface="Calibri"/></a:rPr><a:t>Points_prelev</a:t></a:r><a:endParaRPr/></a:p></a:txBody><a:tcPr marL="91440" marR="91440"><a:lnL w="12240"><a:solidFill><a:srgbClr val="ffffff"/></a:solidFill></a:lnL><a:lnR w="12240"><a:solidFill><a:srgbClr val="ffffff"/></a:solidFill></a:lnR><a:lnT w="12240"><a:solidFill><a:srgbClr val="ffffff"/></a:solidFill></a:lnT><a:lnB w="12240"><a:solidFill><a:srgbClr val="ffffff"/></a:solidFill></a:lnB><a:solidFill><a:srgbClr val="d0d8e7"/></a:solidFill></a:tcPr></a:tc><a:tc rowSpan="2"><a:txBody><a:bodyPr></a:bodyPr><a:p><a:pPr><a:lnSpc><a:spcPct val="100000"/></a:lnSpc></a:pPr><a:r><a:rPr lang="fr-FR" sz="1200" spc="-1" strike="noStrike"><a:solidFill><a:srgbClr val="000000"/></a:solidFill><a:uFill><a:solidFill><a:srgbClr val="ffffff"/></a:solidFill></a:uFill><a:latin typeface="Calibri"/></a:rPr><a:t>ID</a:t></a:r><a:endParaRPr/></a:p></a:txBody><a:tcPr marL="91440" marR="91440"><a:lnL w="12240"><a:solidFill><a:srgbClr val="ffffff"/></a:solidFill></a:lnL><a:lnR w="12240"><a:solidFill><a:srgbClr val="ffffff"/></a:solidFill></a:lnR><a:lnT w="12240"><a:solidFill><a:srgbClr val="ffffff"/></a:solidFill></a:lnT><a:lnB w="12240"><a:solidFill><a:srgbClr val="ffffff"/></a:solidFill></a:lnB><a:solidFill><a:srgbClr val="d0d8e7"/></a:solidFill></a:tcPr></a:tc><a:tc rowSpan="2"><a:txBody><a:bodyPr></a:bodyPr><a:p><a:pPr><a:lnSpc><a:spcPct val="100000"/></a:lnSpc></a:pPr><a:r><a:rPr lang="fr-FR" sz="1200" spc="-1" strike="noStrike"><a:solidFill><a:srgbClr val="000000"/></a:solidFill><a:uFill><a:solidFill><a:srgbClr val="ffffff"/></a:solidFill></a:uFill><a:latin typeface="Calibri"/></a:rPr><a:t>disp_prelev(ID)</a:t></a:r><a:endParaRPr/></a:p><a:p><a:pPr><a:lnSpc><a:spcPct val="100000"/></a:lnSpc></a:pPr><a:r><a:rPr lang="fr-FR" sz="1200" spc="-1" strike="noStrike"><a:solidFill><a:srgbClr val="000000"/></a:solidFill><a:uFill><a:solidFill><a:srgbClr val="ffffff"/></a:solidFill></a:uFill><a:latin typeface="Calibri"/></a:rPr><a:t>limites_classes(ID)</a:t></a:r><a:endParaRPr/></a:p></a:txBody><a:tcPr marL="91440" marR="91440"><a:lnL w="12240"><a:solidFill><a:srgbClr val="ffffff"/></a:solidFill></a:lnL><a:lnR w="12240"><a:solidFill><a:srgbClr val="ffffff"/></a:solidFill></a:lnR><a:lnT w="12240"><a:solidFill><a:srgbClr val="ffffff"/></a:solidFill></a:lnT><a:lnB w="12240"><a:solidFill><a:srgbClr val="ffffff"/></a:solidFill></a:lnB><a:solidFill><a:srgbClr val="d0d8e7"/></a:solidFill></a:tcPr></a:tc></a:tr><a:tr h="627480"><a:tc><a:txBody><a:bodyPr></a:bodyPr><a:p><a:r><a:rPr lang="fr-FR" sz="1200" spc="-1"><a:solidFill><a:srgbClr val="000000"/></a:solidFill><a:latin typeface="Calibri"/><a:ea typeface="Droid Sans Fallback"/></a:rPr><a:t>Description</a:t></a:r><a:endParaRPr/></a:p></a:txBody><a:tcPr marL="91440" marR="91440"><a:lnL w="12240"><a:solidFill><a:srgbClr val="ffffff"/></a:solidFill></a:lnL><a:lnR w="12240"><a:solidFill><a:srgbClr val="ffffff"/></a:solidFill></a:lnR><a:lnT w="12240"><a:solidFill><a:srgbClr val="ffffff"/></a:solidFill></a:lnT><a:lnB w="12240"><a:solidFill><a:srgbClr val="ffffff"/></a:solidFill></a:lnB><a:solidFill><a:srgbClr val="d0d8e7"/></a:solidFill></a:tcPr></a:tc><a:tc><a:txBody><a:bodyPr></a:bodyPr><a:p><a:r><a:rPr lang="fr-FR" sz="1200" spc="-1"><a:solidFill><a:srgbClr val="000000"/></a:solidFill><a:latin typeface="Calibri"/><a:ea typeface="Droid Sans Fallback"/></a:rPr><a:t>description</a:t></a:r><a:endParaRPr/></a:p></a:txBody><a:tcPr marL="91440" marR="91440"><a:lnL w="12240"><a:solidFill><a:srgbClr val="ffffff"/></a:solidFill></a:lnL><a:lnR w="12240"><a:solidFill><a:srgbClr val="ffffff"/></a:solidFill></a:lnR><a:lnT w="12240"><a:solidFill><a:srgbClr val="ffffff"/></a:solidFill></a:lnT><a:lnB w="12240"><a:solidFill><a:srgbClr val="ffffff"/></a:solidFill></a:lnB><a:solidFill><a:srgbClr val="d0d8e7"/></a:solidFill></a:tcPr></a:tc><a:tc><a:txBody><a:bodyPr></a:bodyPr><a:p><a:r><a:rPr lang="fr-FR" sz="1200" spc="-1"><a:latin typeface="Calibri"/></a:rPr><a:t>Text</a:t></a:r><a:endParaRPr/></a:p></a:txBody><a:tcPr marL="91440" marR="91440"><a:lnL w="12240"><a:solidFill><a:srgbClr val="ffffff"/></a:solidFill></a:lnL><a:lnR w="12240"><a:solidFill><a:srgbClr val="ffffff"/></a:solidFill></a:lnR><a:lnT w="12240"><a:solidFill><a:srgbClr val="ffffff"/></a:solidFill></a:lnT><a:lnB w="12240"><a:solidFill><a:srgbClr val="ffffff"/></a:solidFill></a:lnB><a:solidFill><a:srgbClr val="d0d8e7"/></a:solidFill></a:tcPr></a:tc><a:tcPr marL="91440" marR="91440"><a:lnL w="12240"><a:solidFill><a:srgbClr val="ffffff"/></a:solidFill></a:lnL><a:lnR w="12240"><a:solidFill><a:srgbClr val="ffffff"/></a:solidFill></a:lnR><a:lnT w="12240"><a:solidFill><a:srgbClr val="ffffff"/></a:solidFill></a:lnT><a:lnB w="12240"><a:solidFill><a:srgbClr val="ffffff"/></a:solidFill></a:lnB><a:solidFill><a:srgbClr val="d0d8e7"/></a:solidFill></a:tcPr></a:tc><a:tcPr marL="91440" marR="91440"><a:lnL w="12240"><a:solidFill><a:srgbClr val="ffffff"/></a:solidFill></a:lnL><a:lnR w="12240"><a:solidFill><a:srgbClr val="ffffff"/></a:solidFill></a:lnR><a:lnT w="12240"><a:solidFill><a:srgbClr val="ffffff"/></a:solidFill></a:lnT><a:lnB w="12240"><a:solidFill><a:srgbClr val="ffffff"/></a:solidFill></a:lnB><a:solidFill><a:srgbClr val="d0d8e7"/></a:solidFill></a:tcPr></a:tc><a:tcPr marL="91440" marR="91440"><a:lnL w="12240"><a:solidFill><a:srgbClr val="ffffff"/></a:solidFill></a:lnL><a:lnR w="12240"><a:solidFill><a:srgbClr val="ffffff"/></a:solidFill></a:lnR><a:lnT w="12240"><a:solidFill><a:srgbClr val="ffffff"/></a:solidFill></a:lnT><a:lnB w="12240"><a:solidFill><a:srgbClr val="ffffff"/></a:solidFill></a:lnB><a:solidFill><a:srgbClr val="d0d8e7"/></a:solidFill></a:tcPr></a:tc></a:tr></a:tbl></a:graphicData></a:graphic></p:graphicFrame><p:sp><p:nvSpPr><p:cNvPr id="88" name="CustomShape 3"></p:cNvPr><p:cNvSpPr/><p:nvPr/></p:nvSpPr><p:spPr><a:xfrm><a:off x="1907640" y="3501000"/><a:ext cx="5903640" cy="1460520"/></a:xfrm><a:prstGeom prst="rect"><a:avLst></a:avLst></a:prstGeom><a:noFill/><a:ln><a:noFill/></a:ln></p:spPr><p:style><a:lnRef idx="0"></a:lnRef><a:fillRef idx="0"/><a:effectRef idx="0"></a:effectRef><a:fontRef idx="minor"/></p:style><p:txBody><a:bodyPr lIns="90000" rIns="90000" tIns="45000" bIns="45000"></a:bodyPr><a:p><a:pPr><a:lnSpc><a:spcPct val="100000"/></a:lnSpc></a:pPr><a:r><a:rPr lang="fr-FR" sz="1800" spc="-1" strike="noStrike"><a:solidFill><a:srgbClr val="000000"/></a:solidFill><a:uFill><a:solidFill><a:srgbClr val="ffffff"/></a:solidFill></a:uFill><a:latin typeface="Calibri"/><a:ea typeface="DejaVu Sans"/></a:rPr><a:t>CREATE TABLE points_prelev (id SERIAL PRIMARY KEY , point VARCHAR(2) NOT NULL, description VARCHAR(50), id_disp integer not null references disp_prelev(id), id_class integer not null references limites_classes(id)</a:t></a:r><a:endParaRPr/></a:p><a:p><a:pPr><a:lnSpc><a:spcPct val="100000"/></a:lnSpc></a:pPr><a:r><a:rPr lang="fr-FR" sz="1800" spc="-1" strike="noStrike"><a:solidFill><a:srgbClr val="000000"/></a:solidFill><a:uFill><a:solidFill><a:srgbClr val="ffffff"/></a:solidFill></a:uFill><a:latin typeface="Calibri"/><a:ea typeface="DejaVu Sans"/></a:rPr><a:t>)</a:t></a:r><a:endParaRPr/></a:p></p:txBody></p:sp></p:spTree></p:cSld><p:timing><p:tnLst><p:par><p:cTn id="15" dur="indefinite" restart="never" nodeType="tmRoot"><p:childTnLst><p:seq><p:cTn id="16" nodeType="mainSeq"></p:cTn><p:prevCondLst><p:cond delay="0" evt="onPrev"><p:tgtEl><p:sldTgt/></p:tgtEl></p:cond></p:prevCondLst><p:nextCondLst><p:cond delay="0" evt="onNext"><p:tgtEl><p:sldTgt/></p:tgtEl></p:cond></p:nextCondLst></p:seq></p:childTnLst></p:cTn></p:par></p:tnLst></p:timing></p:sld>
+<p:sld xmlns:a="http://schemas.openxmlformats.org/drawingml/2006/main" xmlns:p="http://schemas.openxmlformats.org/presentationml/2006/main" xmlns:r="http://schemas.openxmlformats.org/officeDocument/2006/relationships"><p:cSld><p:spTree><p:nvGrpSpPr>        <p:cNvPr id="1" name=""/>        <p:cNvGrpSpPr/>        <p:nvPr/>      </p:nvGrpSpPr>      <p:grpSpPr>        <a:xfrm>          <a:off x="0" y="0"/>          <a:ext cx="0" cy="0"/>          <a:chOff x="0" y="0"/>          <a:chExt cx="0" cy="0"/>        </a:xfrm>      </p:grpSpPr><p:sp><p:nvSpPr><p:cNvPr id="86" name="CustomShape 1"></p:cNvPr><p:cNvSpPr/><p:nvPr/></p:nvSpPr><p:spPr><a:xfrm><a:off x="457200" y="274680"/><a:ext cx="8228160" cy="1141560"/></a:xfrm><a:prstGeom prst="rect"><a:avLst></a:avLst></a:prstGeom><a:noFill/><a:ln><a:noFill/></a:ln></p:spPr><p:style><a:lnRef idx="0"></a:lnRef><a:fillRef idx="0"/><a:effectRef idx="0"></a:effectRef><a:fontRef idx="minor"/></p:style><p:txBody><a:bodyPr lIns="90000" rIns="90000" tIns="45000" bIns="45000" anchor="ctr"></a:bodyPr><a:p><a:pPr algn="ctr"><a:lnSpc><a:spcPct val="100000"/></a:lnSpc></a:pPr><a:r><a:rPr lang="fr-FR" sz="4400" spc="-1" strike="noStrike"><a:solidFill><a:srgbClr val="000000"/></a:solidFill><a:uFill><a:solidFill><a:srgbClr val="ffffff"/></a:solidFill></a:uFill><a:latin typeface="Calibri"/><a:ea typeface="DejaVu Sans"/></a:rPr><a:t>Table des points de prélèvement</a:t></a:r><a:endParaRPr/></a:p></p:txBody></p:sp><p:graphicFrame><p:nvGraphicFramePr><p:cNvPr id="87" name="Table 2"/><p:cNvGraphicFramePr/><p:nvPr/></p:nvGraphicFramePr><p:xfrm><a:off x="64440" y="1418400"/><a:ext cx="8971200" cy="1703520"/></p:xfrm><a:graphic><a:graphicData uri="http://schemas.openxmlformats.org/drawingml/2006/table"><a:tbl><a:tblPr/><a:tblGrid><a:gridCol w="2131200"/><a:gridCol w="1435320"/><a:gridCol w="796320"/><a:gridCol w="1152000"/><a:gridCol w="1440000"/><a:gridCol w="2016720"/></a:tblGrid><a:tr h="448920"><a:tc><a:txBody><a:bodyPr></a:bodyPr><a:p><a:pPr><a:lnSpc><a:spcPct val="100000"/></a:lnSpc></a:pPr><a:r><a:rPr b="1" lang="fr-FR" sz="1200" spc="-1" strike="noStrike"><a:solidFill><a:srgbClr val="ffffff"/></a:solidFill><a:uFill><a:solidFill><a:srgbClr val="ffffff"/></a:solidFill></a:uFill><a:latin typeface="Calibri"/></a:rPr><a:t>Etiquette</a:t></a:r><a:endParaRPr/></a:p></a:txBody><a:tcPr marL="91440" marR="91440"><a:lnL w="12240"><a:solidFill><a:srgbClr val="ffffff"/></a:solidFill></a:lnL><a:lnR w="12240"><a:solidFill><a:srgbClr val="ffffff"/></a:solidFill></a:lnR><a:lnT w="12240"><a:solidFill><a:srgbClr val="ffffff"/></a:solidFill></a:lnT><a:lnB w="38160"><a:solidFill><a:srgbClr val="ffffff"/></a:solidFill></a:lnB><a:solidFill><a:srgbClr val="4f81bd"/></a:solidFill></a:tcPr></a:tc><a:tc><a:txBody><a:bodyPr></a:bodyPr><a:p><a:pPr><a:lnSpc><a:spcPct val="100000"/></a:lnSpc></a:pPr><a:r><a:rPr b="1" lang="fr-FR" sz="1200" spc="-1" strike="noStrike"><a:solidFill><a:srgbClr val="ffffff"/></a:solidFill><a:uFill><a:solidFill><a:srgbClr val="ffffff"/></a:solidFill></a:uFill><a:latin typeface="Calibri"/></a:rPr><a:t>Nom de variable</a:t></a:r><a:endParaRPr/></a:p></a:txBody><a:tcPr marL="91440" marR="91440"><a:lnL w="12240"><a:solidFill><a:srgbClr val="ffffff"/></a:solidFill></a:lnL><a:lnR w="12240"><a:solidFill><a:srgbClr val="ffffff"/></a:solidFill></a:lnR><a:lnT w="12240"><a:solidFill><a:srgbClr val="ffffff"/></a:solidFill></a:lnT><a:lnB w="38160"><a:solidFill><a:srgbClr val="ffffff"/></a:solidFill></a:lnB><a:solidFill><a:srgbClr val="4f81bd"/></a:solidFill></a:tcPr></a:tc><a:tc><a:txBody><a:bodyPr></a:bodyPr><a:p><a:pPr><a:lnSpc><a:spcPct val="100000"/></a:lnSpc></a:pPr><a:r><a:rPr b="1" lang="fr-FR" sz="1200" spc="-1" strike="noStrike"><a:solidFill><a:srgbClr val="ffffff"/></a:solidFill><a:uFill><a:solidFill><a:srgbClr val="ffffff"/></a:solidFill></a:uFill><a:latin typeface="Calibri"/></a:rPr><a:t>Type</a:t></a:r><a:endParaRPr/></a:p></a:txBody><a:tcPr marL="91440" marR="91440"><a:lnL w="12240"><a:solidFill><a:srgbClr val="ffffff"/></a:solidFill></a:lnL><a:lnR w="12240"><a:solidFill><a:srgbClr val="ffffff"/></a:solidFill></a:lnR><a:lnT w="12240"><a:solidFill><a:srgbClr val="ffffff"/></a:solidFill></a:lnT><a:lnB w="38160"><a:solidFill><a:srgbClr val="ffffff"/></a:solidFill></a:lnB><a:solidFill><a:srgbClr val="4f81bd"/></a:solidFill></a:tcPr></a:tc><a:tc><a:txBody><a:bodyPr></a:bodyPr><a:p><a:pPr><a:lnSpc><a:spcPct val="100000"/></a:lnSpc></a:pPr><a:r><a:rPr b="1" lang="fr-FR" sz="1200" spc="-1" strike="noStrike"><a:solidFill><a:srgbClr val="ffffff"/></a:solidFill><a:uFill><a:solidFill><a:srgbClr val="ffffff"/></a:solidFill></a:uFill><a:latin typeface="Calibri"/></a:rPr><a:t>Table</a:t></a:r><a:endParaRPr/></a:p></a:txBody><a:tcPr marL="91440" marR="91440"><a:lnL w="12240"><a:solidFill><a:srgbClr val="ffffff"/></a:solidFill></a:lnL><a:lnR w="12240"><a:solidFill><a:srgbClr val="ffffff"/></a:solidFill></a:lnR><a:lnT w="12240"><a:solidFill><a:srgbClr val="ffffff"/></a:solidFill></a:lnT><a:lnB w="38160"><a:solidFill><a:srgbClr val="ffffff"/></a:solidFill></a:lnB><a:solidFill><a:srgbClr val="4f81bd"/></a:solidFill></a:tcPr></a:tc><a:tc><a:txBody><a:bodyPr></a:bodyPr><a:p><a:pPr><a:lnSpc><a:spcPct val="100000"/></a:lnSpc></a:pPr><a:r><a:rPr b="1" lang="fr-FR" sz="1200" spc="-1" strike="noStrike"><a:solidFill><a:srgbClr val="ffffff"/></a:solidFill><a:uFill><a:solidFill><a:srgbClr val="ffffff"/></a:solidFill></a:uFill><a:latin typeface="Calibri"/></a:rPr><a:t>Clé  primaire</a:t></a:r><a:endParaRPr/></a:p></a:txBody><a:tcPr marL="91440" marR="91440"><a:lnL w="12240"><a:solidFill><a:srgbClr val="ffffff"/></a:solidFill></a:lnL><a:lnR w="12240"><a:solidFill><a:srgbClr val="ffffff"/></a:solidFill></a:lnR><a:lnT w="12240"><a:solidFill><a:srgbClr val="ffffff"/></a:solidFill></a:lnT><a:lnB w="38160"><a:solidFill><a:srgbClr val="ffffff"/></a:solidFill></a:lnB><a:solidFill><a:srgbClr val="4f81bd"/></a:solidFill></a:tcPr></a:tc><a:tc><a:txBody><a:bodyPr></a:bodyPr><a:p><a:pPr><a:lnSpc><a:spcPct val="100000"/></a:lnSpc></a:pPr><a:r><a:rPr b="1" lang="fr-FR" sz="1200" spc="-1" strike="noStrike"><a:solidFill><a:srgbClr val="ffffff"/></a:solidFill><a:uFill><a:solidFill><a:srgbClr val="ffffff"/></a:solidFill></a:uFill><a:latin typeface="Calibri"/></a:rPr><a:t>Clé étrangère</a:t></a:r><a:endParaRPr/></a:p></a:txBody><a:tcPr marL="91440" marR="91440"><a:lnL w="12240"><a:solidFill><a:srgbClr val="ffffff"/></a:solidFill></a:lnL><a:lnR w="12240"><a:solidFill><a:srgbClr val="ffffff"/></a:solidFill></a:lnR><a:lnT w="12240"><a:solidFill><a:srgbClr val="ffffff"/></a:solidFill></a:lnT><a:lnB w="38160"><a:solidFill><a:srgbClr val="ffffff"/></a:solidFill></a:lnB><a:solidFill><a:srgbClr val="4f81bd"/></a:solidFill></a:tcPr></a:tc></a:tr><a:tr h="627480"><a:tc><a:txBody><a:bodyPr></a:bodyPr><a:p><a:pPr><a:lnSpc><a:spcPct val="100000"/></a:lnSpc></a:pPr><a:r><a:rPr lang="fr-FR" sz="1200" spc="-1" strike="noStrike"><a:solidFill><a:srgbClr val="000000"/></a:solidFill><a:uFill><a:solidFill><a:srgbClr val="ffffff"/></a:solidFill></a:uFill><a:latin typeface="Calibri"/></a:rPr><a:t>Point</a:t></a:r><a:endParaRPr/></a:p></a:txBody><a:tcPr marL="91440" marR="91440"><a:lnL w="12240"><a:solidFill><a:srgbClr val="ffffff"/></a:solidFill></a:lnL><a:lnR w="12240"><a:solidFill><a:srgbClr val="ffffff"/></a:solidFill></a:lnR><a:lnT w="12240"><a:solidFill><a:srgbClr val="ffffff"/></a:solidFill></a:lnT><a:lnB w="12240"><a:solidFill><a:srgbClr val="ffffff"/></a:solidFill></a:lnB><a:solidFill><a:srgbClr val="d0d8e7"/></a:solidFill></a:tcPr></a:tc><a:tc><a:txBody><a:bodyPr></a:bodyPr><a:p><a:pPr><a:lnSpc><a:spcPct val="100000"/></a:lnSpc></a:pPr><a:r><a:rPr lang="fr-FR" sz="1200" spc="-1" strike="noStrike"><a:solidFill><a:srgbClr val="000000"/></a:solidFill><a:uFill><a:solidFill><a:srgbClr val="ffffff"/></a:solidFill></a:uFill><a:latin typeface="Calibri"/></a:rPr><a:t>Point</a:t></a:r><a:endParaRPr/></a:p></a:txBody><a:tcPr marL="91440" marR="91440"><a:lnL w="12240"><a:solidFill><a:srgbClr val="ffffff"/></a:solidFill></a:lnL><a:lnR w="12240"><a:solidFill><a:srgbClr val="ffffff"/></a:solidFill></a:lnR><a:lnT w="12240"><a:solidFill><a:srgbClr val="ffffff"/></a:solidFill></a:lnT><a:lnB w="12240"><a:solidFill><a:srgbClr val="ffffff"/></a:solidFill></a:lnB><a:solidFill><a:srgbClr val="d0d8e7"/></a:solidFill></a:tcPr></a:tc><a:tc><a:txBody><a:bodyPr></a:bodyPr><a:p><a:pPr><a:lnSpc><a:spcPct val="100000"/></a:lnSpc></a:pPr><a:r><a:rPr lang="fr-FR" sz="1200" spc="-1" strike="noStrike"><a:solidFill><a:srgbClr val="000000"/></a:solidFill><a:uFill><a:solidFill><a:srgbClr val="ffffff"/></a:solidFill></a:uFill><a:latin typeface="Calibri"/></a:rPr><a:t>Text</a:t></a:r><a:endParaRPr/></a:p></a:txBody><a:tcPr marL="91440" marR="91440"><a:lnL w="12240"><a:solidFill><a:srgbClr val="ffffff"/></a:solidFill></a:lnL><a:lnR w="12240"><a:solidFill><a:srgbClr val="ffffff"/></a:solidFill></a:lnR><a:lnT w="12240"><a:solidFill><a:srgbClr val="ffffff"/></a:solidFill></a:lnT><a:lnB w="12240"><a:solidFill><a:srgbClr val="ffffff"/></a:solidFill></a:lnB><a:solidFill><a:srgbClr val="d0d8e7"/></a:solidFill></a:tcPr></a:tc><a:tc rowSpan="2"><a:txBody><a:bodyPr></a:bodyPr><a:p><a:pPr><a:lnSpc><a:spcPct val="100000"/></a:lnSpc></a:pPr><a:r><a:rPr lang="fr-FR" sz="1200" spc="-1" strike="noStrike"><a:solidFill><a:srgbClr val="000000"/></a:solidFill><a:uFill><a:solidFill><a:srgbClr val="ffffff"/></a:solidFill></a:uFill><a:latin typeface="Calibri"/></a:rPr><a:t>Points_prelev</a:t></a:r><a:endParaRPr/></a:p></a:txBody><a:tcPr marL="91440" marR="91440"><a:lnL w="12240"><a:solidFill><a:srgbClr val="ffffff"/></a:solidFill></a:lnL><a:lnR w="12240"><a:solidFill><a:srgbClr val="ffffff"/></a:solidFill></a:lnR><a:lnT w="12240"><a:solidFill><a:srgbClr val="ffffff"/></a:solidFill></a:lnT><a:lnB w="12240"><a:solidFill><a:srgbClr val="ffffff"/></a:solidFill></a:lnB><a:solidFill><a:srgbClr val="d0d8e7"/></a:solidFill></a:tcPr></a:tc><a:tc rowSpan="2"><a:txBody><a:bodyPr></a:bodyPr><a:p><a:pPr><a:lnSpc><a:spcPct val="100000"/></a:lnSpc></a:pPr><a:r><a:rPr lang="fr-FR" sz="1200" spc="-1" strike="noStrike"><a:solidFill><a:srgbClr val="000000"/></a:solidFill><a:uFill><a:solidFill><a:srgbClr val="ffffff"/></a:solidFill></a:uFill><a:latin typeface="Calibri"/></a:rPr><a:t>ID</a:t></a:r><a:endParaRPr/></a:p></a:txBody><a:tcPr marL="91440" marR="91440"><a:lnL w="12240"><a:solidFill><a:srgbClr val="ffffff"/></a:solidFill></a:lnL><a:lnR w="12240"><a:solidFill><a:srgbClr val="ffffff"/></a:solidFill></a:lnR><a:lnT w="12240"><a:solidFill><a:srgbClr val="ffffff"/></a:solidFill></a:lnT><a:lnB w="12240"><a:solidFill><a:srgbClr val="ffffff"/></a:solidFill></a:lnB><a:solidFill><a:srgbClr val="d0d8e7"/></a:solidFill></a:tcPr></a:tc><a:tc rowSpan="2"><a:txBody><a:bodyPr></a:bodyPr><a:p><a:pPr><a:lnSpc><a:spcPct val="100000"/></a:lnSpc></a:pPr><a:r><a:rPr lang="fr-FR" sz="1200" spc="-1" strike="noStrike"><a:solidFill><a:srgbClr val="000000"/></a:solidFill><a:uFill><a:solidFill><a:srgbClr val="ffffff"/></a:solidFill></a:uFill><a:latin typeface="Calibri"/></a:rPr><a:t>disp_prelev(ID)</a:t></a:r><a:endParaRPr/></a:p><a:p><a:pPr><a:lnSpc><a:spcPct val="100000"/></a:lnSpc></a:pPr><a:r><a:rPr lang="fr-FR" sz="1200" spc="-1" strike="noStrike"><a:solidFill><a:srgbClr val="000000"/></a:solidFill><a:uFill><a:solidFill><a:srgbClr val="ffffff"/></a:solidFill></a:uFill><a:latin typeface="Calibri"/></a:rPr><a:t>limites_classes(ID)</a:t></a:r><a:endParaRPr/></a:p></a:txBody><a:tcPr marL="91440" marR="91440"><a:lnL w="12240"><a:solidFill><a:srgbClr val="ffffff"/></a:solidFill></a:lnL><a:lnR w="12240"><a:solidFill><a:srgbClr val="ffffff"/></a:solidFill></a:lnR><a:lnT w="12240"><a:solidFill><a:srgbClr val="ffffff"/></a:solidFill></a:lnT><a:lnB w="12240"><a:solidFill><a:srgbClr val="ffffff"/></a:solidFill></a:lnB><a:solidFill><a:srgbClr val="d0d8e7"/></a:solidFill></a:tcPr></a:tc></a:tr><a:tr h="627480"><a:tc><a:txBody><a:bodyPr></a:bodyPr><a:p><a:r><a:rPr lang="fr-FR" sz="1200" spc="-1" strike="noStrike"><a:solidFill><a:srgbClr val="000000"/></a:solidFill><a:uFill><a:solidFill><a:srgbClr val="ffffff"/></a:solidFill></a:uFill><a:latin typeface="Calibri"/><a:ea typeface="Droid Sans Fallback"/></a:rPr><a:t>Description</a:t></a:r><a:endParaRPr/></a:p></a:txBody><a:tcPr marL="91440" marR="91440"><a:lnL w="12240"><a:solidFill><a:srgbClr val="ffffff"/></a:solidFill></a:lnL><a:lnR w="12240"><a:solidFill><a:srgbClr val="ffffff"/></a:solidFill></a:lnR><a:lnT w="12240"><a:solidFill><a:srgbClr val="ffffff"/></a:solidFill></a:lnT><a:lnB w="12240"><a:solidFill><a:srgbClr val="ffffff"/></a:solidFill></a:lnB><a:solidFill><a:srgbClr val="d0d8e7"/></a:solidFill></a:tcPr></a:tc><a:tc><a:txBody><a:bodyPr></a:bodyPr><a:p><a:r><a:rPr lang="fr-FR" sz="1200" spc="-1" strike="noStrike"><a:solidFill><a:srgbClr val="000000"/></a:solidFill><a:uFill><a:solidFill><a:srgbClr val="ffffff"/></a:solidFill></a:uFill><a:latin typeface="Calibri"/><a:ea typeface="Droid Sans Fallback"/></a:rPr><a:t>description</a:t></a:r><a:endParaRPr/></a:p></a:txBody><a:tcPr marL="91440" marR="91440"><a:lnL w="12240"><a:solidFill><a:srgbClr val="ffffff"/></a:solidFill></a:lnL><a:lnR w="12240"><a:solidFill><a:srgbClr val="ffffff"/></a:solidFill></a:lnR><a:lnT w="12240"><a:solidFill><a:srgbClr val="ffffff"/></a:solidFill></a:lnT><a:lnB w="12240"><a:solidFill><a:srgbClr val="ffffff"/></a:solidFill></a:lnB><a:solidFill><a:srgbClr val="d0d8e7"/></a:solidFill></a:tcPr></a:tc><a:tc><a:txBody><a:bodyPr></a:bodyPr><a:p><a:r><a:rPr lang="fr-FR" sz="1200" spc="-1" strike="noStrike"><a:uFill><a:solidFill><a:srgbClr val="ffffff"/></a:solidFill></a:uFill><a:latin typeface="Calibri"/></a:rPr><a:t>Text</a:t></a:r><a:endParaRPr/></a:p></a:txBody><a:tcPr marL="91440" marR="91440"><a:lnL w="12240"><a:solidFill><a:srgbClr val="ffffff"/></a:solidFill></a:lnL><a:lnR w="12240"><a:solidFill><a:srgbClr val="ffffff"/></a:solidFill></a:lnR><a:lnT w="12240"><a:solidFill><a:srgbClr val="ffffff"/></a:solidFill></a:lnT><a:lnB w="12240"><a:solidFill><a:srgbClr val="ffffff"/></a:solidFill></a:lnB><a:solidFill><a:srgbClr val="d0d8e7"/></a:solidFill></a:tcPr></a:tc><a:tcPr><a:solidFill><a:srgbClr val="729fcf"/></a:solidFill></a:tcPr></a:tc><a:tcPr><a:solidFill><a:srgbClr val="729fcf"/></a:solidFill></a:tcPr></a:tc><a:tcPr><a:solidFill><a:srgbClr val="729fcf"/></a:solidFill></a:tcPr></a:tc></a:tr></a:tbl></a:graphicData></a:graphic></p:graphicFrame></p:spTree></p:cSld><p:timing><p:tnLst><p:par><p:cTn id="15" dur="indefinite" restart="never" nodeType="tmRoot"><p:childTnLst><p:seq><p:cTn id="16" nodeType="mainSeq"></p:cTn><p:prevCondLst><p:cond delay="0" evt="onPrev"><p:tgtEl><p:sldTgt/></p:tgtEl></p:cond></p:prevCondLst><p:nextCondLst><p:cond delay="0" evt="onNext"><p:tgtEl><p:sldTgt/></p:tgtEl></p:cond></p:nextCondLst></p:seq></p:childTnLst></p:cTn></p:par></p:tnLst></p:timing></p:sld>
 </file>
 
 <file path=ppt/slides/slide9.xml><?xml version="1.0" encoding="utf-8"?>
@@ -9602,14 +10949,14 @@
       </p:grpSpPr>
       <p:sp>
         <p:nvSpPr>
-          <p:cNvPr id="89" name="CustomShape 1"/>
+          <p:cNvPr id="88" name="CustomShape 1"/>
           <p:cNvSpPr/>
           <p:nvPr/>
         </p:nvSpPr>
         <p:spPr>
           <a:xfrm>
             <a:off x="457200" y="274680"/>
-            <a:ext cx="8228520" cy="1141920"/>
+            <a:ext cx="8228160" cy="1141560"/>
           </a:xfrm>
           <a:prstGeom prst="rect">
             <a:avLst/>
@@ -9654,7 +11001,7 @@
       </p:sp>
       <p:graphicFrame>
         <p:nvGraphicFramePr>
-          <p:cNvPr id="90" name="Table 2"/>
+          <p:cNvPr id="89" name="Table 2"/>
           <p:cNvGraphicFramePr/>
           <p:nvPr/>
         </p:nvGraphicFramePr>
@@ -10330,14 +11677,14 @@
       </p:graphicFrame>
       <p:sp>
         <p:nvSpPr>
-          <p:cNvPr id="91" name="CustomShape 3"/>
+          <p:cNvPr id="90" name="CustomShape 3"/>
           <p:cNvSpPr/>
           <p:nvPr/>
         </p:nvSpPr>
         <p:spPr>
           <a:xfrm>
             <a:off x="2339640" y="3429000"/>
-            <a:ext cx="4679280" cy="911880"/>
+            <a:ext cx="4678920" cy="911520"/>
           </a:xfrm>
           <a:prstGeom prst="rect">
             <a:avLst/>

</xml_diff>